<commit_message>
Added slides for c05s09 - Functions : More On Usage
</commit_message>
<xml_diff>
--- a/docs/learn-computer-programming.pptx
+++ b/docs/learn-computer-programming.pptx
@@ -50,6 +50,8 @@
     <p:sldId id="298" r:id="rId44"/>
     <p:sldId id="300" r:id="rId45"/>
     <p:sldId id="299" r:id="rId46"/>
+    <p:sldId id="303" r:id="rId47"/>
+    <p:sldId id="302" r:id="rId48"/>
   </p:sldIdLst>
   <p:sldSz cx="9144000" cy="6858000" type="screen4x3"/>
   <p:notesSz cx="6858000" cy="9144000"/>
@@ -3596,42 +3598,42 @@
     </dgm:pt>
   </dgm:ptLst>
   <dgm:cxnLst>
-    <dgm:cxn modelId="{0A19088C-A894-A349-B6F2-D0CA96CD47FA}" srcId="{960CE163-DF35-2B44-83E7-B9153BC66084}" destId="{1AD1EA1C-020E-5744-81BA-AEEC1A7A11F3}" srcOrd="2" destOrd="0" parTransId="{12CF4121-F3B4-5C45-B72F-C1FB37DD3C0D}" sibTransId="{E7356A86-2BC1-2844-87C1-0F4142A0BACE}"/>
-    <dgm:cxn modelId="{A5EF75CA-949B-FB42-A967-633DBF9C5416}" srcId="{67DF074B-DE05-B24C-9E35-CDBF726DC2DD}" destId="{2CF1C699-9046-8C42-87E6-2861BF37D660}" srcOrd="1" destOrd="0" parTransId="{F9A1264F-2EB8-8148-8E8F-B74886C30473}" sibTransId="{2B88B2F7-3FE5-E743-A3EF-F1DB3821C219}"/>
-    <dgm:cxn modelId="{1BB5FA34-3C64-DD46-93EA-B2497E30C558}" type="presOf" srcId="{0C3731E6-7189-414B-8AA4-AA411ADE82DC}" destId="{F42357F4-6E12-A041-A7D6-81713E5E517B}" srcOrd="0" destOrd="0" presId="urn:microsoft.com/office/officeart/2005/8/layout/hierarchy1"/>
-    <dgm:cxn modelId="{4143E40A-3339-5746-9665-4720B7275017}" type="presOf" srcId="{4261D7F4-A7D0-3F49-B78A-20CFB380B683}" destId="{C2C1A37D-940A-6743-AC99-D92FAAA879A9}" srcOrd="0" destOrd="0" presId="urn:microsoft.com/office/officeart/2005/8/layout/hierarchy1"/>
-    <dgm:cxn modelId="{62868263-8B87-BF41-9DB1-C409701EE1E3}" type="presOf" srcId="{184A7FBE-4658-3046-B4A7-4EBDDC670AD1}" destId="{2E4A94D1-71F0-A046-B95F-18095848F38A}" srcOrd="0" destOrd="0" presId="urn:microsoft.com/office/officeart/2005/8/layout/hierarchy1"/>
-    <dgm:cxn modelId="{56B8DE62-0A59-E34F-BA89-ACA8FE07FD37}" type="presOf" srcId="{A215CF19-F4EB-414A-A10F-B2A96141FE91}" destId="{0B86410B-498D-AB4D-9967-4C4AEDB1DF45}" srcOrd="0" destOrd="0" presId="urn:microsoft.com/office/officeart/2005/8/layout/hierarchy1"/>
-    <dgm:cxn modelId="{4CC6FB2A-BDF9-2948-B3E8-8BFD444DE0F5}" srcId="{67DF074B-DE05-B24C-9E35-CDBF726DC2DD}" destId="{632DBD1E-A080-C14D-89CD-94A8C0F3CF25}" srcOrd="0" destOrd="0" parTransId="{563BE0E2-35F1-EA43-92A4-487E8781D214}" sibTransId="{BC85FB81-59E3-3246-A1DB-AA9BCA174B1A}"/>
-    <dgm:cxn modelId="{7E833AC7-C906-EC48-8CF2-050B2E9E6DD6}" type="presOf" srcId="{632DBD1E-A080-C14D-89CD-94A8C0F3CF25}" destId="{2246CDBD-2CA8-A34C-A89B-E32ACB07E97A}" srcOrd="0" destOrd="0" presId="urn:microsoft.com/office/officeart/2005/8/layout/hierarchy1"/>
-    <dgm:cxn modelId="{48C3CFE4-65EB-9D4E-A0CE-F9F821B5D78C}" srcId="{FE86CB60-E462-414C-BF0E-606A57D7AD93}" destId="{9C7D04B1-85B2-3F41-9343-3724449F75B3}" srcOrd="0" destOrd="0" parTransId="{184A7FBE-4658-3046-B4A7-4EBDDC670AD1}" sibTransId="{5D03D28D-4580-AA4E-B725-784F886C6797}"/>
-    <dgm:cxn modelId="{5125BE48-CBDA-9E46-A5EC-A00E5922E856}" type="presOf" srcId="{8C382D6E-A069-234E-96CC-A5A865E2BBBD}" destId="{C6BA431E-FA40-1D4E-A3D8-2A8BD37A2453}" srcOrd="0" destOrd="0" presId="urn:microsoft.com/office/officeart/2005/8/layout/hierarchy1"/>
-    <dgm:cxn modelId="{FFC55F0E-24F0-0940-B0B5-F6820B65D7C7}" type="presOf" srcId="{E5C8F682-32CD-424A-896C-91EAD3E64C45}" destId="{76B33B1D-4CA5-544F-BF28-B308B507EF10}" srcOrd="0" destOrd="0" presId="urn:microsoft.com/office/officeart/2005/8/layout/hierarchy1"/>
-    <dgm:cxn modelId="{BE4A5523-AA4B-D244-80FB-A948E67617FE}" srcId="{AE7EA77A-1D8E-3F42-95E1-4EB11A443A81}" destId="{4261D7F4-A7D0-3F49-B78A-20CFB380B683}" srcOrd="0" destOrd="0" parTransId="{8C382D6E-A069-234E-96CC-A5A865E2BBBD}" sibTransId="{BFE6C573-BEC1-BB44-914C-4A90CDE91A1A}"/>
-    <dgm:cxn modelId="{BD876DF4-FBEE-9943-863F-7B7F61CBAEA9}" srcId="{960CE163-DF35-2B44-83E7-B9153BC66084}" destId="{FE86CB60-E462-414C-BF0E-606A57D7AD93}" srcOrd="3" destOrd="0" parTransId="{70F0D127-9705-B346-8456-2EA73B6E30CF}" sibTransId="{B2965BF0-14E0-474E-A2AB-CCA4521513DD}"/>
-    <dgm:cxn modelId="{7B0EFE83-8F7C-2148-A812-1F8ACB477747}" type="presOf" srcId="{F9A1264F-2EB8-8148-8E8F-B74886C30473}" destId="{9541F663-17CE-1449-B545-4E9F3C558C3A}" srcOrd="0" destOrd="0" presId="urn:microsoft.com/office/officeart/2005/8/layout/hierarchy1"/>
-    <dgm:cxn modelId="{1FDA42F0-000F-6E4D-ACBD-DD297AF16C8B}" type="presOf" srcId="{960CE163-DF35-2B44-83E7-B9153BC66084}" destId="{923B0C63-79B7-9B4A-94B9-19130FBE5D7B}" srcOrd="0" destOrd="0" presId="urn:microsoft.com/office/officeart/2005/8/layout/hierarchy1"/>
-    <dgm:cxn modelId="{C885BB5D-362B-1847-87CF-E1B639313EA0}" srcId="{FE86CB60-E462-414C-BF0E-606A57D7AD93}" destId="{E5C8F682-32CD-424A-896C-91EAD3E64C45}" srcOrd="2" destOrd="0" parTransId="{E3372A67-8AD5-414E-9A1F-4D9E3CFF6332}" sibTransId="{B77BD5BE-E444-A847-B5CA-1B150064119C}"/>
-    <dgm:cxn modelId="{68A68B6C-C4A2-404D-9619-7E596F60AE28}" srcId="{FE86CB60-E462-414C-BF0E-606A57D7AD93}" destId="{67DF074B-DE05-B24C-9E35-CDBF726DC2DD}" srcOrd="1" destOrd="0" parTransId="{0C3731E6-7189-414B-8AA4-AA411ADE82DC}" sibTransId="{4A343348-5A18-A64D-B967-67FF94A2182D}"/>
-    <dgm:cxn modelId="{E1A0809A-BAEA-BF42-92A8-DDEE32055693}" type="presOf" srcId="{9C7D04B1-85B2-3F41-9343-3724449F75B3}" destId="{AD6B8219-1F5B-DA4F-B261-22B5D0551A94}" srcOrd="0" destOrd="0" presId="urn:microsoft.com/office/officeart/2005/8/layout/hierarchy1"/>
-    <dgm:cxn modelId="{74C3DF55-2571-4A42-A3D4-79D2D7286452}" type="presOf" srcId="{12CF4121-F3B4-5C45-B72F-C1FB37DD3C0D}" destId="{800FD04D-B3AC-0B4A-955F-2E2198D77D53}" srcOrd="0" destOrd="0" presId="urn:microsoft.com/office/officeart/2005/8/layout/hierarchy1"/>
-    <dgm:cxn modelId="{7DFEC403-3D07-E147-94A7-6948508849D0}" type="presOf" srcId="{563BE0E2-35F1-EA43-92A4-487E8781D214}" destId="{1F5FFC55-2839-634C-8F0C-96EACF5BE3CB}" srcOrd="0" destOrd="0" presId="urn:microsoft.com/office/officeart/2005/8/layout/hierarchy1"/>
-    <dgm:cxn modelId="{D2D6BF3A-81D0-9346-B33A-086AABA7D7D7}" type="presOf" srcId="{D0F565E7-5D70-054E-90E0-C19FE13B6790}" destId="{6B84F89A-BB62-184B-ACA8-8A1AAAE34DE1}" srcOrd="0" destOrd="0" presId="urn:microsoft.com/office/officeart/2005/8/layout/hierarchy1"/>
-    <dgm:cxn modelId="{FE6DB9C5-C848-C041-9BAC-D3D409ECA3D7}" type="presOf" srcId="{67DF074B-DE05-B24C-9E35-CDBF726DC2DD}" destId="{EBC8209D-BB74-B44A-A57A-C51ABEDBBAE8}" srcOrd="0" destOrd="0" presId="urn:microsoft.com/office/officeart/2005/8/layout/hierarchy1"/>
-    <dgm:cxn modelId="{09A4557F-E6E3-CA46-A390-4566B55E38CE}" srcId="{AE7EA77A-1D8E-3F42-95E1-4EB11A443A81}" destId="{A215CF19-F4EB-414A-A10F-B2A96141FE91}" srcOrd="1" destOrd="0" parTransId="{4810192D-B607-5A42-8DCE-8CFCF1A82427}" sibTransId="{466C1D3C-619E-C448-BF54-2F35FBFACADE}"/>
-    <dgm:cxn modelId="{8BD052AF-949A-F948-A12A-2F16C08A8BAA}" type="presOf" srcId="{4810192D-B607-5A42-8DCE-8CFCF1A82427}" destId="{28156514-4C64-AE45-A406-98283D6076D6}" srcOrd="0" destOrd="0" presId="urn:microsoft.com/office/officeart/2005/8/layout/hierarchy1"/>
-    <dgm:cxn modelId="{629969CD-5D04-2A43-B3AF-FE8A98094A86}" type="presOf" srcId="{6C0275DE-9DFE-0E43-8DDA-D28DD222D71F}" destId="{8CFA3E84-678E-C345-8D46-63E85CF195E2}" srcOrd="0" destOrd="0" presId="urn:microsoft.com/office/officeart/2005/8/layout/hierarchy1"/>
     <dgm:cxn modelId="{250B2BE2-FEC5-CD47-89C4-F8108BC7D53A}" type="presOf" srcId="{FE86CB60-E462-414C-BF0E-606A57D7AD93}" destId="{6603764C-B415-664F-8885-A7DAA8CAF3E7}" srcOrd="0" destOrd="0" presId="urn:microsoft.com/office/officeart/2005/8/layout/hierarchy1"/>
     <dgm:cxn modelId="{1D703EA7-18EF-A644-AD84-6BA0E7A84E48}" srcId="{960CE163-DF35-2B44-83E7-B9153BC66084}" destId="{AE7EA77A-1D8E-3F42-95E1-4EB11A443A81}" srcOrd="0" destOrd="0" parTransId="{D0F565E7-5D70-054E-90E0-C19FE13B6790}" sibTransId="{A9860EA9-F28C-E04C-8CCC-2E75895ED615}"/>
+    <dgm:cxn modelId="{BD876DF4-FBEE-9943-863F-7B7F61CBAEA9}" srcId="{960CE163-DF35-2B44-83E7-B9153BC66084}" destId="{FE86CB60-E462-414C-BF0E-606A57D7AD93}" srcOrd="3" destOrd="0" parTransId="{70F0D127-9705-B346-8456-2EA73B6E30CF}" sibTransId="{B2965BF0-14E0-474E-A2AB-CCA4521513DD}"/>
+    <dgm:cxn modelId="{BDB62AEF-004A-3E4A-BA04-15FFC883C6DC}" type="presOf" srcId="{1AD1EA1C-020E-5744-81BA-AEEC1A7A11F3}" destId="{D86CCABB-994E-2B44-9B36-549A167DC946}" srcOrd="0" destOrd="0" presId="urn:microsoft.com/office/officeart/2005/8/layout/hierarchy1"/>
+    <dgm:cxn modelId="{E1A0809A-BAEA-BF42-92A8-DDEE32055693}" type="presOf" srcId="{9C7D04B1-85B2-3F41-9343-3724449F75B3}" destId="{AD6B8219-1F5B-DA4F-B261-22B5D0551A94}" srcOrd="0" destOrd="0" presId="urn:microsoft.com/office/officeart/2005/8/layout/hierarchy1"/>
+    <dgm:cxn modelId="{56B8DE62-0A59-E34F-BA89-ACA8FE07FD37}" type="presOf" srcId="{A215CF19-F4EB-414A-A10F-B2A96141FE91}" destId="{0B86410B-498D-AB4D-9967-4C4AEDB1DF45}" srcOrd="0" destOrd="0" presId="urn:microsoft.com/office/officeart/2005/8/layout/hierarchy1"/>
+    <dgm:cxn modelId="{D2D6BF3A-81D0-9346-B33A-086AABA7D7D7}" type="presOf" srcId="{D0F565E7-5D70-054E-90E0-C19FE13B6790}" destId="{6B84F89A-BB62-184B-ACA8-8A1AAAE34DE1}" srcOrd="0" destOrd="0" presId="urn:microsoft.com/office/officeart/2005/8/layout/hierarchy1"/>
+    <dgm:cxn modelId="{62868263-8B87-BF41-9DB1-C409701EE1E3}" type="presOf" srcId="{184A7FBE-4658-3046-B4A7-4EBDDC670AD1}" destId="{2E4A94D1-71F0-A046-B95F-18095848F38A}" srcOrd="0" destOrd="0" presId="urn:microsoft.com/office/officeart/2005/8/layout/hierarchy1"/>
+    <dgm:cxn modelId="{1BB5FA34-3C64-DD46-93EA-B2497E30C558}" type="presOf" srcId="{0C3731E6-7189-414B-8AA4-AA411ADE82DC}" destId="{F42357F4-6E12-A041-A7D6-81713E5E517B}" srcOrd="0" destOrd="0" presId="urn:microsoft.com/office/officeart/2005/8/layout/hierarchy1"/>
+    <dgm:cxn modelId="{4CC6FB2A-BDF9-2948-B3E8-8BFD444DE0F5}" srcId="{67DF074B-DE05-B24C-9E35-CDBF726DC2DD}" destId="{632DBD1E-A080-C14D-89CD-94A8C0F3CF25}" srcOrd="0" destOrd="0" parTransId="{563BE0E2-35F1-EA43-92A4-487E8781D214}" sibTransId="{BC85FB81-59E3-3246-A1DB-AA9BCA174B1A}"/>
+    <dgm:cxn modelId="{48C3CFE4-65EB-9D4E-A0CE-F9F821B5D78C}" srcId="{FE86CB60-E462-414C-BF0E-606A57D7AD93}" destId="{9C7D04B1-85B2-3F41-9343-3724449F75B3}" srcOrd="0" destOrd="0" parTransId="{184A7FBE-4658-3046-B4A7-4EBDDC670AD1}" sibTransId="{5D03D28D-4580-AA4E-B725-784F886C6797}"/>
+    <dgm:cxn modelId="{89EEE784-3EED-8F43-8217-BBD1C237CA84}" type="presOf" srcId="{2CF1C699-9046-8C42-87E6-2861BF37D660}" destId="{9152FE1E-3F9F-1945-845B-196FD4FE9E7F}" srcOrd="0" destOrd="0" presId="urn:microsoft.com/office/officeart/2005/8/layout/hierarchy1"/>
+    <dgm:cxn modelId="{68A68B6C-C4A2-404D-9619-7E596F60AE28}" srcId="{FE86CB60-E462-414C-BF0E-606A57D7AD93}" destId="{67DF074B-DE05-B24C-9E35-CDBF726DC2DD}" srcOrd="1" destOrd="0" parTransId="{0C3731E6-7189-414B-8AA4-AA411ADE82DC}" sibTransId="{4A343348-5A18-A64D-B967-67FF94A2182D}"/>
+    <dgm:cxn modelId="{80E2C3F7-058F-1C40-8356-C15390BA6FDF}" type="presOf" srcId="{70F0D127-9705-B346-8456-2EA73B6E30CF}" destId="{201C7CC6-525A-FE42-B4FF-8C5914387024}" srcOrd="0" destOrd="0" presId="urn:microsoft.com/office/officeart/2005/8/layout/hierarchy1"/>
+    <dgm:cxn modelId="{8BD052AF-949A-F948-A12A-2F16C08A8BAA}" type="presOf" srcId="{4810192D-B607-5A42-8DCE-8CFCF1A82427}" destId="{28156514-4C64-AE45-A406-98283D6076D6}" srcOrd="0" destOrd="0" presId="urn:microsoft.com/office/officeart/2005/8/layout/hierarchy1"/>
+    <dgm:cxn modelId="{A5EF75CA-949B-FB42-A967-633DBF9C5416}" srcId="{67DF074B-DE05-B24C-9E35-CDBF726DC2DD}" destId="{2CF1C699-9046-8C42-87E6-2861BF37D660}" srcOrd="1" destOrd="0" parTransId="{F9A1264F-2EB8-8148-8E8F-B74886C30473}" sibTransId="{2B88B2F7-3FE5-E743-A3EF-F1DB3821C219}"/>
+    <dgm:cxn modelId="{FFC55F0E-24F0-0940-B0B5-F6820B65D7C7}" type="presOf" srcId="{E5C8F682-32CD-424A-896C-91EAD3E64C45}" destId="{76B33B1D-4CA5-544F-BF28-B308B507EF10}" srcOrd="0" destOrd="0" presId="urn:microsoft.com/office/officeart/2005/8/layout/hierarchy1"/>
+    <dgm:cxn modelId="{F97734D8-6CBC-804D-B286-FA60DFC694E9}" type="presOf" srcId="{84B85FB8-CE49-454E-AFD0-26748DF588CB}" destId="{39E9CE6E-1476-7F49-AD48-00E9588CC1FC}" srcOrd="0" destOrd="0" presId="urn:microsoft.com/office/officeart/2005/8/layout/hierarchy1"/>
+    <dgm:cxn modelId="{1FDA42F0-000F-6E4D-ACBD-DD297AF16C8B}" type="presOf" srcId="{960CE163-DF35-2B44-83E7-B9153BC66084}" destId="{923B0C63-79B7-9B4A-94B9-19130FBE5D7B}" srcOrd="0" destOrd="0" presId="urn:microsoft.com/office/officeart/2005/8/layout/hierarchy1"/>
+    <dgm:cxn modelId="{E7733746-4C87-234A-9D3E-4005D8B583BC}" srcId="{84B85FB8-CE49-454E-AFD0-26748DF588CB}" destId="{960CE163-DF35-2B44-83E7-B9153BC66084}" srcOrd="0" destOrd="0" parTransId="{15F9C8B3-0868-F148-A166-96327192876A}" sibTransId="{AE4D7356-6DD9-B04F-A5BC-257D53ADE85C}"/>
+    <dgm:cxn modelId="{7DFEC403-3D07-E147-94A7-6948508849D0}" type="presOf" srcId="{563BE0E2-35F1-EA43-92A4-487E8781D214}" destId="{1F5FFC55-2839-634C-8F0C-96EACF5BE3CB}" srcOrd="0" destOrd="0" presId="urn:microsoft.com/office/officeart/2005/8/layout/hierarchy1"/>
+    <dgm:cxn modelId="{74C3DF55-2571-4A42-A3D4-79D2D7286452}" type="presOf" srcId="{12CF4121-F3B4-5C45-B72F-C1FB37DD3C0D}" destId="{800FD04D-B3AC-0B4A-955F-2E2198D77D53}" srcOrd="0" destOrd="0" presId="urn:microsoft.com/office/officeart/2005/8/layout/hierarchy1"/>
+    <dgm:cxn modelId="{C885BB5D-362B-1847-87CF-E1B639313EA0}" srcId="{FE86CB60-E462-414C-BF0E-606A57D7AD93}" destId="{E5C8F682-32CD-424A-896C-91EAD3E64C45}" srcOrd="2" destOrd="0" parTransId="{E3372A67-8AD5-414E-9A1F-4D9E3CFF6332}" sibTransId="{B77BD5BE-E444-A847-B5CA-1B150064119C}"/>
+    <dgm:cxn modelId="{BE4A5523-AA4B-D244-80FB-A948E67617FE}" srcId="{AE7EA77A-1D8E-3F42-95E1-4EB11A443A81}" destId="{4261D7F4-A7D0-3F49-B78A-20CFB380B683}" srcOrd="0" destOrd="0" parTransId="{8C382D6E-A069-234E-96CC-A5A865E2BBBD}" sibTransId="{BFE6C573-BEC1-BB44-914C-4A90CDE91A1A}"/>
+    <dgm:cxn modelId="{FBC04F02-4804-8C4A-8D64-8D7E596D7783}" type="presOf" srcId="{AE7EA77A-1D8E-3F42-95E1-4EB11A443A81}" destId="{BBF408DD-FB71-6449-9993-DDA736E8D58A}" srcOrd="0" destOrd="0" presId="urn:microsoft.com/office/officeart/2005/8/layout/hierarchy1"/>
+    <dgm:cxn modelId="{7E833AC7-C906-EC48-8CF2-050B2E9E6DD6}" type="presOf" srcId="{632DBD1E-A080-C14D-89CD-94A8C0F3CF25}" destId="{2246CDBD-2CA8-A34C-A89B-E32ACB07E97A}" srcOrd="0" destOrd="0" presId="urn:microsoft.com/office/officeart/2005/8/layout/hierarchy1"/>
+    <dgm:cxn modelId="{09A4557F-E6E3-CA46-A390-4566B55E38CE}" srcId="{AE7EA77A-1D8E-3F42-95E1-4EB11A443A81}" destId="{A215CF19-F4EB-414A-A10F-B2A96141FE91}" srcOrd="1" destOrd="0" parTransId="{4810192D-B607-5A42-8DCE-8CFCF1A82427}" sibTransId="{466C1D3C-619E-C448-BF54-2F35FBFACADE}"/>
+    <dgm:cxn modelId="{FE6DB9C5-C848-C041-9BAC-D3D409ECA3D7}" type="presOf" srcId="{67DF074B-DE05-B24C-9E35-CDBF726DC2DD}" destId="{EBC8209D-BB74-B44A-A57A-C51ABEDBBAE8}" srcOrd="0" destOrd="0" presId="urn:microsoft.com/office/officeart/2005/8/layout/hierarchy1"/>
+    <dgm:cxn modelId="{629969CD-5D04-2A43-B3AF-FE8A98094A86}" type="presOf" srcId="{6C0275DE-9DFE-0E43-8DDA-D28DD222D71F}" destId="{8CFA3E84-678E-C345-8D46-63E85CF195E2}" srcOrd="0" destOrd="0" presId="urn:microsoft.com/office/officeart/2005/8/layout/hierarchy1"/>
+    <dgm:cxn modelId="{517E7342-1ED5-B24E-84A1-2A79CCE5BC2A}" type="presOf" srcId="{4D875376-E6B9-804F-AC85-A1D4337BBC8A}" destId="{0FEFC8CB-58CB-4A43-9867-EED6738F0C0F}" srcOrd="0" destOrd="0" presId="urn:microsoft.com/office/officeart/2005/8/layout/hierarchy1"/>
+    <dgm:cxn modelId="{0A19088C-A894-A349-B6F2-D0CA96CD47FA}" srcId="{960CE163-DF35-2B44-83E7-B9153BC66084}" destId="{1AD1EA1C-020E-5744-81BA-AEEC1A7A11F3}" srcOrd="2" destOrd="0" parTransId="{12CF4121-F3B4-5C45-B72F-C1FB37DD3C0D}" sibTransId="{E7356A86-2BC1-2844-87C1-0F4142A0BACE}"/>
+    <dgm:cxn modelId="{FB5948D5-A112-7E4F-A7A4-599731141072}" type="presOf" srcId="{E3372A67-8AD5-414E-9A1F-4D9E3CFF6332}" destId="{BA61A876-7050-3746-8DAE-0686A0FD0957}" srcOrd="0" destOrd="0" presId="urn:microsoft.com/office/officeart/2005/8/layout/hierarchy1"/>
+    <dgm:cxn modelId="{7B0EFE83-8F7C-2148-A812-1F8ACB477747}" type="presOf" srcId="{F9A1264F-2EB8-8148-8E8F-B74886C30473}" destId="{9541F663-17CE-1449-B545-4E9F3C558C3A}" srcOrd="0" destOrd="0" presId="urn:microsoft.com/office/officeart/2005/8/layout/hierarchy1"/>
+    <dgm:cxn modelId="{5125BE48-CBDA-9E46-A5EC-A00E5922E856}" type="presOf" srcId="{8C382D6E-A069-234E-96CC-A5A865E2BBBD}" destId="{C6BA431E-FA40-1D4E-A3D8-2A8BD37A2453}" srcOrd="0" destOrd="0" presId="urn:microsoft.com/office/officeart/2005/8/layout/hierarchy1"/>
     <dgm:cxn modelId="{8FC20289-4F63-9E49-BD79-567030E07E0D}" srcId="{960CE163-DF35-2B44-83E7-B9153BC66084}" destId="{4D875376-E6B9-804F-AC85-A1D4337BBC8A}" srcOrd="1" destOrd="0" parTransId="{6C0275DE-9DFE-0E43-8DDA-D28DD222D71F}" sibTransId="{5CBDE70F-8F73-B144-BE9A-D54839868342}"/>
-    <dgm:cxn modelId="{E7733746-4C87-234A-9D3E-4005D8B583BC}" srcId="{84B85FB8-CE49-454E-AFD0-26748DF588CB}" destId="{960CE163-DF35-2B44-83E7-B9153BC66084}" srcOrd="0" destOrd="0" parTransId="{15F9C8B3-0868-F148-A166-96327192876A}" sibTransId="{AE4D7356-6DD9-B04F-A5BC-257D53ADE85C}"/>
-    <dgm:cxn modelId="{89EEE784-3EED-8F43-8217-BBD1C237CA84}" type="presOf" srcId="{2CF1C699-9046-8C42-87E6-2861BF37D660}" destId="{9152FE1E-3F9F-1945-845B-196FD4FE9E7F}" srcOrd="0" destOrd="0" presId="urn:microsoft.com/office/officeart/2005/8/layout/hierarchy1"/>
-    <dgm:cxn modelId="{517E7342-1ED5-B24E-84A1-2A79CCE5BC2A}" type="presOf" srcId="{4D875376-E6B9-804F-AC85-A1D4337BBC8A}" destId="{0FEFC8CB-58CB-4A43-9867-EED6738F0C0F}" srcOrd="0" destOrd="0" presId="urn:microsoft.com/office/officeart/2005/8/layout/hierarchy1"/>
-    <dgm:cxn modelId="{FB5948D5-A112-7E4F-A7A4-599731141072}" type="presOf" srcId="{E3372A67-8AD5-414E-9A1F-4D9E3CFF6332}" destId="{BA61A876-7050-3746-8DAE-0686A0FD0957}" srcOrd="0" destOrd="0" presId="urn:microsoft.com/office/officeart/2005/8/layout/hierarchy1"/>
-    <dgm:cxn modelId="{BDB62AEF-004A-3E4A-BA04-15FFC883C6DC}" type="presOf" srcId="{1AD1EA1C-020E-5744-81BA-AEEC1A7A11F3}" destId="{D86CCABB-994E-2B44-9B36-549A167DC946}" srcOrd="0" destOrd="0" presId="urn:microsoft.com/office/officeart/2005/8/layout/hierarchy1"/>
-    <dgm:cxn modelId="{80E2C3F7-058F-1C40-8356-C15390BA6FDF}" type="presOf" srcId="{70F0D127-9705-B346-8456-2EA73B6E30CF}" destId="{201C7CC6-525A-FE42-B4FF-8C5914387024}" srcOrd="0" destOrd="0" presId="urn:microsoft.com/office/officeart/2005/8/layout/hierarchy1"/>
-    <dgm:cxn modelId="{FBC04F02-4804-8C4A-8D64-8D7E596D7783}" type="presOf" srcId="{AE7EA77A-1D8E-3F42-95E1-4EB11A443A81}" destId="{BBF408DD-FB71-6449-9993-DDA736E8D58A}" srcOrd="0" destOrd="0" presId="urn:microsoft.com/office/officeart/2005/8/layout/hierarchy1"/>
-    <dgm:cxn modelId="{F97734D8-6CBC-804D-B286-FA60DFC694E9}" type="presOf" srcId="{84B85FB8-CE49-454E-AFD0-26748DF588CB}" destId="{39E9CE6E-1476-7F49-AD48-00E9588CC1FC}" srcOrd="0" destOrd="0" presId="urn:microsoft.com/office/officeart/2005/8/layout/hierarchy1"/>
+    <dgm:cxn modelId="{4143E40A-3339-5746-9665-4720B7275017}" type="presOf" srcId="{4261D7F4-A7D0-3F49-B78A-20CFB380B683}" destId="{C2C1A37D-940A-6743-AC99-D92FAAA879A9}" srcOrd="0" destOrd="0" presId="urn:microsoft.com/office/officeart/2005/8/layout/hierarchy1"/>
     <dgm:cxn modelId="{DF469E1B-C306-5F4B-B680-7ACFEA169B9B}" type="presParOf" srcId="{39E9CE6E-1476-7F49-AD48-00E9588CC1FC}" destId="{AFBF1B26-876E-5B4F-868D-ECF533517B41}" srcOrd="0" destOrd="0" presId="urn:microsoft.com/office/officeart/2005/8/layout/hierarchy1"/>
     <dgm:cxn modelId="{9BD7EE58-09E0-D144-8D85-070D725F1603}" type="presParOf" srcId="{AFBF1B26-876E-5B4F-868D-ECF533517B41}" destId="{80FDFEA5-D276-C44B-902D-D2E8A937A02A}" srcOrd="0" destOrd="0" presId="urn:microsoft.com/office/officeart/2005/8/layout/hierarchy1"/>
     <dgm:cxn modelId="{8C3AC7B7-A647-D047-8BDB-5F00B4604513}" type="presParOf" srcId="{80FDFEA5-D276-C44B-902D-D2E8A937A02A}" destId="{DE9E6D4B-E798-AA47-81C3-1E545DF4DB5B}" srcOrd="0" destOrd="0" presId="urn:microsoft.com/office/officeart/2005/8/layout/hierarchy1"/>
@@ -11967,7 +11969,7 @@
           <a:p>
             <a:fld id="{6483C26A-63A4-F547-BB74-146C3D288EFD}" type="datetimeFigureOut">
               <a:rPr lang="en-US" smtClean="0"/>
-              <a:t>2/8/16</a:t>
+              <a:t>2/11/16</a:t>
             </a:fld>
             <a:endParaRPr lang="en-US"/>
           </a:p>
@@ -12137,7 +12139,7 @@
           <a:p>
             <a:fld id="{6483C26A-63A4-F547-BB74-146C3D288EFD}" type="datetimeFigureOut">
               <a:rPr lang="en-US" smtClean="0"/>
-              <a:t>2/8/16</a:t>
+              <a:t>2/11/16</a:t>
             </a:fld>
             <a:endParaRPr lang="en-US"/>
           </a:p>
@@ -12317,7 +12319,7 @@
           <a:p>
             <a:fld id="{6483C26A-63A4-F547-BB74-146C3D288EFD}" type="datetimeFigureOut">
               <a:rPr lang="en-US" smtClean="0"/>
-              <a:t>2/8/16</a:t>
+              <a:t>2/11/16</a:t>
             </a:fld>
             <a:endParaRPr lang="en-US"/>
           </a:p>
@@ -12487,7 +12489,7 @@
           <a:p>
             <a:fld id="{6483C26A-63A4-F547-BB74-146C3D288EFD}" type="datetimeFigureOut">
               <a:rPr lang="en-US" smtClean="0"/>
-              <a:t>2/8/16</a:t>
+              <a:t>2/11/16</a:t>
             </a:fld>
             <a:endParaRPr lang="en-US"/>
           </a:p>
@@ -12733,7 +12735,7 @@
           <a:p>
             <a:fld id="{6483C26A-63A4-F547-BB74-146C3D288EFD}" type="datetimeFigureOut">
               <a:rPr lang="en-US" smtClean="0"/>
-              <a:t>2/8/16</a:t>
+              <a:t>2/11/16</a:t>
             </a:fld>
             <a:endParaRPr lang="en-US"/>
           </a:p>
@@ -13021,7 +13023,7 @@
           <a:p>
             <a:fld id="{6483C26A-63A4-F547-BB74-146C3D288EFD}" type="datetimeFigureOut">
               <a:rPr lang="en-US" smtClean="0"/>
-              <a:t>2/8/16</a:t>
+              <a:t>2/11/16</a:t>
             </a:fld>
             <a:endParaRPr lang="en-US"/>
           </a:p>
@@ -13443,7 +13445,7 @@
           <a:p>
             <a:fld id="{6483C26A-63A4-F547-BB74-146C3D288EFD}" type="datetimeFigureOut">
               <a:rPr lang="en-US" smtClean="0"/>
-              <a:t>2/8/16</a:t>
+              <a:t>2/11/16</a:t>
             </a:fld>
             <a:endParaRPr lang="en-US"/>
           </a:p>
@@ -13561,7 +13563,7 @@
           <a:p>
             <a:fld id="{6483C26A-63A4-F547-BB74-146C3D288EFD}" type="datetimeFigureOut">
               <a:rPr lang="en-US" smtClean="0"/>
-              <a:t>2/8/16</a:t>
+              <a:t>2/11/16</a:t>
             </a:fld>
             <a:endParaRPr lang="en-US"/>
           </a:p>
@@ -13656,7 +13658,7 @@
           <a:p>
             <a:fld id="{6483C26A-63A4-F547-BB74-146C3D288EFD}" type="datetimeFigureOut">
               <a:rPr lang="en-US" smtClean="0"/>
-              <a:t>2/8/16</a:t>
+              <a:t>2/11/16</a:t>
             </a:fld>
             <a:endParaRPr lang="en-US"/>
           </a:p>
@@ -13933,7 +13935,7 @@
           <a:p>
             <a:fld id="{6483C26A-63A4-F547-BB74-146C3D288EFD}" type="datetimeFigureOut">
               <a:rPr lang="en-US" smtClean="0"/>
-              <a:t>2/8/16</a:t>
+              <a:t>2/11/16</a:t>
             </a:fld>
             <a:endParaRPr lang="en-US"/>
           </a:p>
@@ -14186,7 +14188,7 @@
           <a:p>
             <a:fld id="{6483C26A-63A4-F547-BB74-146C3D288EFD}" type="datetimeFigureOut">
               <a:rPr lang="en-US" smtClean="0"/>
-              <a:t>2/8/16</a:t>
+              <a:t>2/11/16</a:t>
             </a:fld>
             <a:endParaRPr lang="en-US"/>
           </a:p>
@@ -14399,7 +14401,7 @@
           <a:p>
             <a:fld id="{6483C26A-63A4-F547-BB74-146C3D288EFD}" type="datetimeFigureOut">
               <a:rPr lang="en-US" smtClean="0"/>
-              <a:t>2/8/16</a:t>
+              <a:t>2/11/16</a:t>
             </a:fld>
             <a:endParaRPr lang="en-US"/>
           </a:p>
@@ -21850,7 +21852,6 @@
               <a:rPr lang="en-US" dirty="0" smtClean="0"/>
               <a:t>One or more statements</a:t>
             </a:r>
-            <a:endParaRPr lang="en-US" dirty="0" smtClean="0"/>
           </a:p>
           <a:p>
             <a:pPr marL="0" indent="0">
@@ -22178,11 +22179,7 @@
           <a:p>
             <a:r>
               <a:rPr lang="en-US" dirty="0" smtClean="0"/>
-              <a:t>Anonymous </a:t>
-            </a:r>
-            <a:r>
-              <a:rPr lang="en-US" dirty="0" smtClean="0"/>
-              <a:t>Function</a:t>
+              <a:t>Anonymous Function</a:t>
             </a:r>
           </a:p>
           <a:p>
@@ -22302,7 +22299,6 @@
               <a:rPr lang="en-US" dirty="0" smtClean="0"/>
               <a:t>Expanded</a:t>
             </a:r>
-            <a:endParaRPr lang="en-US" dirty="0" smtClean="0"/>
           </a:p>
           <a:p>
             <a:pPr marL="400050" lvl="1" indent="0">
@@ -22907,6 +22903,185 @@
     <p:extLst>
       <p:ext uri="{BB962C8B-B14F-4D97-AF65-F5344CB8AC3E}">
         <p14:creationId xmlns:p14="http://schemas.microsoft.com/office/powerpoint/2010/main" val="2060027935"/>
+      </p:ext>
+    </p:extLst>
+  </p:cSld>
+  <p:clrMapOvr>
+    <a:masterClrMapping/>
+  </p:clrMapOvr>
+</p:sld>
+</file>
+
+<file path=ppt/slides/slide46.xml><?xml version="1.0" encoding="utf-8"?>
+<p:sld xmlns:a="http://schemas.openxmlformats.org/drawingml/2006/main" xmlns:r="http://schemas.openxmlformats.org/officeDocument/2006/relationships" xmlns:p="http://schemas.openxmlformats.org/presentationml/2006/main">
+  <p:cSld>
+    <p:spTree>
+      <p:nvGrpSpPr>
+        <p:cNvPr id="1" name=""/>
+        <p:cNvGrpSpPr/>
+        <p:nvPr/>
+      </p:nvGrpSpPr>
+      <p:grpSpPr>
+        <a:xfrm>
+          <a:off x="0" y="0"/>
+          <a:ext cx="0" cy="0"/>
+          <a:chOff x="0" y="0"/>
+          <a:chExt cx="0" cy="0"/>
+        </a:xfrm>
+      </p:grpSpPr>
+      <p:sp>
+        <p:nvSpPr>
+          <p:cNvPr id="2" name="Title 1"/>
+          <p:cNvSpPr>
+            <a:spLocks noGrp="1"/>
+          </p:cNvSpPr>
+          <p:nvPr>
+            <p:ph type="ctrTitle"/>
+          </p:nvPr>
+        </p:nvSpPr>
+        <p:spPr/>
+        <p:txBody>
+          <a:bodyPr/>
+          <a:lstStyle/>
+          <a:p>
+            <a:r>
+              <a:rPr lang="en-US" dirty="0" smtClean="0"/>
+              <a:t>Chapter 5 – JavaScript</a:t>
+            </a:r>
+            <a:endParaRPr lang="en-US" dirty="0"/>
+          </a:p>
+        </p:txBody>
+      </p:sp>
+      <p:sp>
+        <p:nvSpPr>
+          <p:cNvPr id="3" name="Subtitle 2"/>
+          <p:cNvSpPr>
+            <a:spLocks noGrp="1"/>
+          </p:cNvSpPr>
+          <p:nvPr>
+            <p:ph type="subTitle" idx="1"/>
+          </p:nvPr>
+        </p:nvSpPr>
+        <p:spPr/>
+        <p:txBody>
+          <a:bodyPr/>
+          <a:lstStyle/>
+          <a:p>
+            <a:r>
+              <a:rPr lang="en-US" dirty="0" smtClean="0"/>
+              <a:t>#</a:t>
+            </a:r>
+            <a:r>
+              <a:rPr lang="en-US" dirty="0" smtClean="0"/>
+              <a:t>33 </a:t>
+            </a:r>
+            <a:r>
+              <a:rPr lang="en-US" dirty="0" smtClean="0"/>
+              <a:t>– Section </a:t>
+            </a:r>
+            <a:r>
+              <a:rPr lang="en-US" dirty="0" smtClean="0"/>
+              <a:t>9</a:t>
+            </a:r>
+            <a:endParaRPr lang="en-US" dirty="0" smtClean="0"/>
+          </a:p>
+          <a:p>
+            <a:r>
+              <a:rPr lang="en-US" dirty="0" smtClean="0"/>
+              <a:t>Functions : More On Usage</a:t>
+            </a:r>
+            <a:endParaRPr lang="en-US" dirty="0"/>
+          </a:p>
+        </p:txBody>
+      </p:sp>
+    </p:spTree>
+    <p:extLst>
+      <p:ext uri="{BB962C8B-B14F-4D97-AF65-F5344CB8AC3E}">
+        <p14:creationId xmlns:p14="http://schemas.microsoft.com/office/powerpoint/2010/main" val="1575188702"/>
+      </p:ext>
+    </p:extLst>
+  </p:cSld>
+  <p:clrMapOvr>
+    <a:masterClrMapping/>
+  </p:clrMapOvr>
+  <p:timing>
+    <p:tnLst>
+      <p:par>
+        <p:cTn xmlns:p14="http://schemas.microsoft.com/office/powerpoint/2010/main" id="1" dur="indefinite" restart="never" nodeType="tmRoot"/>
+      </p:par>
+    </p:tnLst>
+  </p:timing>
+</p:sld>
+</file>
+
+<file path=ppt/slides/slide47.xml><?xml version="1.0" encoding="utf-8"?>
+<p:sld xmlns:a="http://schemas.openxmlformats.org/drawingml/2006/main" xmlns:r="http://schemas.openxmlformats.org/officeDocument/2006/relationships" xmlns:p="http://schemas.openxmlformats.org/presentationml/2006/main">
+  <p:cSld>
+    <p:spTree>
+      <p:nvGrpSpPr>
+        <p:cNvPr id="1" name=""/>
+        <p:cNvGrpSpPr/>
+        <p:nvPr/>
+      </p:nvGrpSpPr>
+      <p:grpSpPr>
+        <a:xfrm>
+          <a:off x="0" y="0"/>
+          <a:ext cx="0" cy="0"/>
+          <a:chOff x="0" y="0"/>
+          <a:chExt cx="0" cy="0"/>
+        </a:xfrm>
+      </p:grpSpPr>
+      <p:sp>
+        <p:nvSpPr>
+          <p:cNvPr id="2" name="Title 1"/>
+          <p:cNvSpPr>
+            <a:spLocks noGrp="1"/>
+          </p:cNvSpPr>
+          <p:nvPr>
+            <p:ph type="title"/>
+          </p:nvPr>
+        </p:nvSpPr>
+        <p:spPr/>
+        <p:txBody>
+          <a:bodyPr/>
+          <a:lstStyle/>
+          <a:p>
+            <a:r>
+              <a:rPr lang="en-US" dirty="0" smtClean="0"/>
+              <a:t>Your Awesome Program</a:t>
+            </a:r>
+            <a:endParaRPr lang="en-US" dirty="0"/>
+          </a:p>
+        </p:txBody>
+      </p:sp>
+      <p:pic>
+        <p:nvPicPr>
+          <p:cNvPr id="4" name="Picture 3"/>
+          <p:cNvPicPr>
+            <a:picLocks noChangeAspect="1"/>
+          </p:cNvPicPr>
+          <p:nvPr/>
+        </p:nvPicPr>
+        <p:blipFill>
+          <a:blip r:embed="rId2"/>
+          <a:stretch>
+            <a:fillRect/>
+          </a:stretch>
+        </p:blipFill>
+        <p:spPr>
+          <a:xfrm>
+            <a:off x="3191288" y="1726888"/>
+            <a:ext cx="2761424" cy="5131111"/>
+          </a:xfrm>
+          <a:prstGeom prst="rect">
+            <a:avLst/>
+          </a:prstGeom>
+        </p:spPr>
+      </p:pic>
+    </p:spTree>
+    <p:extLst>
+      <p:ext uri="{BB962C8B-B14F-4D97-AF65-F5344CB8AC3E}">
+        <p14:creationId xmlns:p14="http://schemas.microsoft.com/office/powerpoint/2010/main" val="146739861"/>
       </p:ext>
     </p:extLst>
   </p:cSld>

</xml_diff>

<commit_message>
Documenation and slides update for c05s11 - Arrays : More On Usage
</commit_message>
<xml_diff>
--- a/docs/learn-computer-programming.pptx
+++ b/docs/learn-computer-programming.pptx
@@ -65,6 +65,14 @@
     <p:sldId id="311" r:id="rId59"/>
     <p:sldId id="309" r:id="rId60"/>
     <p:sldId id="316" r:id="rId61"/>
+    <p:sldId id="317" r:id="rId62"/>
+    <p:sldId id="321" r:id="rId63"/>
+    <p:sldId id="318" r:id="rId64"/>
+    <p:sldId id="319" r:id="rId65"/>
+    <p:sldId id="320" r:id="rId66"/>
+    <p:sldId id="323" r:id="rId67"/>
+    <p:sldId id="322" r:id="rId68"/>
+    <p:sldId id="324" r:id="rId69"/>
   </p:sldIdLst>
   <p:sldSz cx="9144000" cy="6858000" type="screen4x3"/>
   <p:notesSz cx="6858000" cy="9144000"/>
@@ -3611,42 +3619,42 @@
     </dgm:pt>
   </dgm:ptLst>
   <dgm:cxnLst>
-    <dgm:cxn modelId="{0A19088C-A894-A349-B6F2-D0CA96CD47FA}" srcId="{960CE163-DF35-2B44-83E7-B9153BC66084}" destId="{1AD1EA1C-020E-5744-81BA-AEEC1A7A11F3}" srcOrd="2" destOrd="0" parTransId="{12CF4121-F3B4-5C45-B72F-C1FB37DD3C0D}" sibTransId="{E7356A86-2BC1-2844-87C1-0F4142A0BACE}"/>
-    <dgm:cxn modelId="{A5EF75CA-949B-FB42-A967-633DBF9C5416}" srcId="{67DF074B-DE05-B24C-9E35-CDBF726DC2DD}" destId="{2CF1C699-9046-8C42-87E6-2861BF37D660}" srcOrd="1" destOrd="0" parTransId="{F9A1264F-2EB8-8148-8E8F-B74886C30473}" sibTransId="{2B88B2F7-3FE5-E743-A3EF-F1DB3821C219}"/>
-    <dgm:cxn modelId="{1BB5FA34-3C64-DD46-93EA-B2497E30C558}" type="presOf" srcId="{0C3731E6-7189-414B-8AA4-AA411ADE82DC}" destId="{F42357F4-6E12-A041-A7D6-81713E5E517B}" srcOrd="0" destOrd="0" presId="urn:microsoft.com/office/officeart/2005/8/layout/hierarchy1"/>
-    <dgm:cxn modelId="{4143E40A-3339-5746-9665-4720B7275017}" type="presOf" srcId="{4261D7F4-A7D0-3F49-B78A-20CFB380B683}" destId="{C2C1A37D-940A-6743-AC99-D92FAAA879A9}" srcOrd="0" destOrd="0" presId="urn:microsoft.com/office/officeart/2005/8/layout/hierarchy1"/>
-    <dgm:cxn modelId="{62868263-8B87-BF41-9DB1-C409701EE1E3}" type="presOf" srcId="{184A7FBE-4658-3046-B4A7-4EBDDC670AD1}" destId="{2E4A94D1-71F0-A046-B95F-18095848F38A}" srcOrd="0" destOrd="0" presId="urn:microsoft.com/office/officeart/2005/8/layout/hierarchy1"/>
-    <dgm:cxn modelId="{56B8DE62-0A59-E34F-BA89-ACA8FE07FD37}" type="presOf" srcId="{A215CF19-F4EB-414A-A10F-B2A96141FE91}" destId="{0B86410B-498D-AB4D-9967-4C4AEDB1DF45}" srcOrd="0" destOrd="0" presId="urn:microsoft.com/office/officeart/2005/8/layout/hierarchy1"/>
-    <dgm:cxn modelId="{4CC6FB2A-BDF9-2948-B3E8-8BFD444DE0F5}" srcId="{67DF074B-DE05-B24C-9E35-CDBF726DC2DD}" destId="{632DBD1E-A080-C14D-89CD-94A8C0F3CF25}" srcOrd="0" destOrd="0" parTransId="{563BE0E2-35F1-EA43-92A4-487E8781D214}" sibTransId="{BC85FB81-59E3-3246-A1DB-AA9BCA174B1A}"/>
-    <dgm:cxn modelId="{7E833AC7-C906-EC48-8CF2-050B2E9E6DD6}" type="presOf" srcId="{632DBD1E-A080-C14D-89CD-94A8C0F3CF25}" destId="{2246CDBD-2CA8-A34C-A89B-E32ACB07E97A}" srcOrd="0" destOrd="0" presId="urn:microsoft.com/office/officeart/2005/8/layout/hierarchy1"/>
-    <dgm:cxn modelId="{48C3CFE4-65EB-9D4E-A0CE-F9F821B5D78C}" srcId="{FE86CB60-E462-414C-BF0E-606A57D7AD93}" destId="{9C7D04B1-85B2-3F41-9343-3724449F75B3}" srcOrd="0" destOrd="0" parTransId="{184A7FBE-4658-3046-B4A7-4EBDDC670AD1}" sibTransId="{5D03D28D-4580-AA4E-B725-784F886C6797}"/>
-    <dgm:cxn modelId="{5125BE48-CBDA-9E46-A5EC-A00E5922E856}" type="presOf" srcId="{8C382D6E-A069-234E-96CC-A5A865E2BBBD}" destId="{C6BA431E-FA40-1D4E-A3D8-2A8BD37A2453}" srcOrd="0" destOrd="0" presId="urn:microsoft.com/office/officeart/2005/8/layout/hierarchy1"/>
-    <dgm:cxn modelId="{FFC55F0E-24F0-0940-B0B5-F6820B65D7C7}" type="presOf" srcId="{E5C8F682-32CD-424A-896C-91EAD3E64C45}" destId="{76B33B1D-4CA5-544F-BF28-B308B507EF10}" srcOrd="0" destOrd="0" presId="urn:microsoft.com/office/officeart/2005/8/layout/hierarchy1"/>
-    <dgm:cxn modelId="{BE4A5523-AA4B-D244-80FB-A948E67617FE}" srcId="{AE7EA77A-1D8E-3F42-95E1-4EB11A443A81}" destId="{4261D7F4-A7D0-3F49-B78A-20CFB380B683}" srcOrd="0" destOrd="0" parTransId="{8C382D6E-A069-234E-96CC-A5A865E2BBBD}" sibTransId="{BFE6C573-BEC1-BB44-914C-4A90CDE91A1A}"/>
-    <dgm:cxn modelId="{BD876DF4-FBEE-9943-863F-7B7F61CBAEA9}" srcId="{960CE163-DF35-2B44-83E7-B9153BC66084}" destId="{FE86CB60-E462-414C-BF0E-606A57D7AD93}" srcOrd="3" destOrd="0" parTransId="{70F0D127-9705-B346-8456-2EA73B6E30CF}" sibTransId="{B2965BF0-14E0-474E-A2AB-CCA4521513DD}"/>
-    <dgm:cxn modelId="{7B0EFE83-8F7C-2148-A812-1F8ACB477747}" type="presOf" srcId="{F9A1264F-2EB8-8148-8E8F-B74886C30473}" destId="{9541F663-17CE-1449-B545-4E9F3C558C3A}" srcOrd="0" destOrd="0" presId="urn:microsoft.com/office/officeart/2005/8/layout/hierarchy1"/>
-    <dgm:cxn modelId="{1FDA42F0-000F-6E4D-ACBD-DD297AF16C8B}" type="presOf" srcId="{960CE163-DF35-2B44-83E7-B9153BC66084}" destId="{923B0C63-79B7-9B4A-94B9-19130FBE5D7B}" srcOrd="0" destOrd="0" presId="urn:microsoft.com/office/officeart/2005/8/layout/hierarchy1"/>
-    <dgm:cxn modelId="{C885BB5D-362B-1847-87CF-E1B639313EA0}" srcId="{FE86CB60-E462-414C-BF0E-606A57D7AD93}" destId="{E5C8F682-32CD-424A-896C-91EAD3E64C45}" srcOrd="2" destOrd="0" parTransId="{E3372A67-8AD5-414E-9A1F-4D9E3CFF6332}" sibTransId="{B77BD5BE-E444-A847-B5CA-1B150064119C}"/>
-    <dgm:cxn modelId="{68A68B6C-C4A2-404D-9619-7E596F60AE28}" srcId="{FE86CB60-E462-414C-BF0E-606A57D7AD93}" destId="{67DF074B-DE05-B24C-9E35-CDBF726DC2DD}" srcOrd="1" destOrd="0" parTransId="{0C3731E6-7189-414B-8AA4-AA411ADE82DC}" sibTransId="{4A343348-5A18-A64D-B967-67FF94A2182D}"/>
-    <dgm:cxn modelId="{E1A0809A-BAEA-BF42-92A8-DDEE32055693}" type="presOf" srcId="{9C7D04B1-85B2-3F41-9343-3724449F75B3}" destId="{AD6B8219-1F5B-DA4F-B261-22B5D0551A94}" srcOrd="0" destOrd="0" presId="urn:microsoft.com/office/officeart/2005/8/layout/hierarchy1"/>
-    <dgm:cxn modelId="{74C3DF55-2571-4A42-A3D4-79D2D7286452}" type="presOf" srcId="{12CF4121-F3B4-5C45-B72F-C1FB37DD3C0D}" destId="{800FD04D-B3AC-0B4A-955F-2E2198D77D53}" srcOrd="0" destOrd="0" presId="urn:microsoft.com/office/officeart/2005/8/layout/hierarchy1"/>
-    <dgm:cxn modelId="{7DFEC403-3D07-E147-94A7-6948508849D0}" type="presOf" srcId="{563BE0E2-35F1-EA43-92A4-487E8781D214}" destId="{1F5FFC55-2839-634C-8F0C-96EACF5BE3CB}" srcOrd="0" destOrd="0" presId="urn:microsoft.com/office/officeart/2005/8/layout/hierarchy1"/>
-    <dgm:cxn modelId="{D2D6BF3A-81D0-9346-B33A-086AABA7D7D7}" type="presOf" srcId="{D0F565E7-5D70-054E-90E0-C19FE13B6790}" destId="{6B84F89A-BB62-184B-ACA8-8A1AAAE34DE1}" srcOrd="0" destOrd="0" presId="urn:microsoft.com/office/officeart/2005/8/layout/hierarchy1"/>
-    <dgm:cxn modelId="{FE6DB9C5-C848-C041-9BAC-D3D409ECA3D7}" type="presOf" srcId="{67DF074B-DE05-B24C-9E35-CDBF726DC2DD}" destId="{EBC8209D-BB74-B44A-A57A-C51ABEDBBAE8}" srcOrd="0" destOrd="0" presId="urn:microsoft.com/office/officeart/2005/8/layout/hierarchy1"/>
-    <dgm:cxn modelId="{09A4557F-E6E3-CA46-A390-4566B55E38CE}" srcId="{AE7EA77A-1D8E-3F42-95E1-4EB11A443A81}" destId="{A215CF19-F4EB-414A-A10F-B2A96141FE91}" srcOrd="1" destOrd="0" parTransId="{4810192D-B607-5A42-8DCE-8CFCF1A82427}" sibTransId="{466C1D3C-619E-C448-BF54-2F35FBFACADE}"/>
-    <dgm:cxn modelId="{8BD052AF-949A-F948-A12A-2F16C08A8BAA}" type="presOf" srcId="{4810192D-B607-5A42-8DCE-8CFCF1A82427}" destId="{28156514-4C64-AE45-A406-98283D6076D6}" srcOrd="0" destOrd="0" presId="urn:microsoft.com/office/officeart/2005/8/layout/hierarchy1"/>
-    <dgm:cxn modelId="{629969CD-5D04-2A43-B3AF-FE8A98094A86}" type="presOf" srcId="{6C0275DE-9DFE-0E43-8DDA-D28DD222D71F}" destId="{8CFA3E84-678E-C345-8D46-63E85CF195E2}" srcOrd="0" destOrd="0" presId="urn:microsoft.com/office/officeart/2005/8/layout/hierarchy1"/>
     <dgm:cxn modelId="{250B2BE2-FEC5-CD47-89C4-F8108BC7D53A}" type="presOf" srcId="{FE86CB60-E462-414C-BF0E-606A57D7AD93}" destId="{6603764C-B415-664F-8885-A7DAA8CAF3E7}" srcOrd="0" destOrd="0" presId="urn:microsoft.com/office/officeart/2005/8/layout/hierarchy1"/>
     <dgm:cxn modelId="{1D703EA7-18EF-A644-AD84-6BA0E7A84E48}" srcId="{960CE163-DF35-2B44-83E7-B9153BC66084}" destId="{AE7EA77A-1D8E-3F42-95E1-4EB11A443A81}" srcOrd="0" destOrd="0" parTransId="{D0F565E7-5D70-054E-90E0-C19FE13B6790}" sibTransId="{A9860EA9-F28C-E04C-8CCC-2E75895ED615}"/>
+    <dgm:cxn modelId="{BD876DF4-FBEE-9943-863F-7B7F61CBAEA9}" srcId="{960CE163-DF35-2B44-83E7-B9153BC66084}" destId="{FE86CB60-E462-414C-BF0E-606A57D7AD93}" srcOrd="3" destOrd="0" parTransId="{70F0D127-9705-B346-8456-2EA73B6E30CF}" sibTransId="{B2965BF0-14E0-474E-A2AB-CCA4521513DD}"/>
+    <dgm:cxn modelId="{BDB62AEF-004A-3E4A-BA04-15FFC883C6DC}" type="presOf" srcId="{1AD1EA1C-020E-5744-81BA-AEEC1A7A11F3}" destId="{D86CCABB-994E-2B44-9B36-549A167DC946}" srcOrd="0" destOrd="0" presId="urn:microsoft.com/office/officeart/2005/8/layout/hierarchy1"/>
+    <dgm:cxn modelId="{E1A0809A-BAEA-BF42-92A8-DDEE32055693}" type="presOf" srcId="{9C7D04B1-85B2-3F41-9343-3724449F75B3}" destId="{AD6B8219-1F5B-DA4F-B261-22B5D0551A94}" srcOrd="0" destOrd="0" presId="urn:microsoft.com/office/officeart/2005/8/layout/hierarchy1"/>
+    <dgm:cxn modelId="{56B8DE62-0A59-E34F-BA89-ACA8FE07FD37}" type="presOf" srcId="{A215CF19-F4EB-414A-A10F-B2A96141FE91}" destId="{0B86410B-498D-AB4D-9967-4C4AEDB1DF45}" srcOrd="0" destOrd="0" presId="urn:microsoft.com/office/officeart/2005/8/layout/hierarchy1"/>
+    <dgm:cxn modelId="{D2D6BF3A-81D0-9346-B33A-086AABA7D7D7}" type="presOf" srcId="{D0F565E7-5D70-054E-90E0-C19FE13B6790}" destId="{6B84F89A-BB62-184B-ACA8-8A1AAAE34DE1}" srcOrd="0" destOrd="0" presId="urn:microsoft.com/office/officeart/2005/8/layout/hierarchy1"/>
+    <dgm:cxn modelId="{62868263-8B87-BF41-9DB1-C409701EE1E3}" type="presOf" srcId="{184A7FBE-4658-3046-B4A7-4EBDDC670AD1}" destId="{2E4A94D1-71F0-A046-B95F-18095848F38A}" srcOrd="0" destOrd="0" presId="urn:microsoft.com/office/officeart/2005/8/layout/hierarchy1"/>
+    <dgm:cxn modelId="{1BB5FA34-3C64-DD46-93EA-B2497E30C558}" type="presOf" srcId="{0C3731E6-7189-414B-8AA4-AA411ADE82DC}" destId="{F42357F4-6E12-A041-A7D6-81713E5E517B}" srcOrd="0" destOrd="0" presId="urn:microsoft.com/office/officeart/2005/8/layout/hierarchy1"/>
+    <dgm:cxn modelId="{4CC6FB2A-BDF9-2948-B3E8-8BFD444DE0F5}" srcId="{67DF074B-DE05-B24C-9E35-CDBF726DC2DD}" destId="{632DBD1E-A080-C14D-89CD-94A8C0F3CF25}" srcOrd="0" destOrd="0" parTransId="{563BE0E2-35F1-EA43-92A4-487E8781D214}" sibTransId="{BC85FB81-59E3-3246-A1DB-AA9BCA174B1A}"/>
+    <dgm:cxn modelId="{48C3CFE4-65EB-9D4E-A0CE-F9F821B5D78C}" srcId="{FE86CB60-E462-414C-BF0E-606A57D7AD93}" destId="{9C7D04B1-85B2-3F41-9343-3724449F75B3}" srcOrd="0" destOrd="0" parTransId="{184A7FBE-4658-3046-B4A7-4EBDDC670AD1}" sibTransId="{5D03D28D-4580-AA4E-B725-784F886C6797}"/>
+    <dgm:cxn modelId="{89EEE784-3EED-8F43-8217-BBD1C237CA84}" type="presOf" srcId="{2CF1C699-9046-8C42-87E6-2861BF37D660}" destId="{9152FE1E-3F9F-1945-845B-196FD4FE9E7F}" srcOrd="0" destOrd="0" presId="urn:microsoft.com/office/officeart/2005/8/layout/hierarchy1"/>
+    <dgm:cxn modelId="{68A68B6C-C4A2-404D-9619-7E596F60AE28}" srcId="{FE86CB60-E462-414C-BF0E-606A57D7AD93}" destId="{67DF074B-DE05-B24C-9E35-CDBF726DC2DD}" srcOrd="1" destOrd="0" parTransId="{0C3731E6-7189-414B-8AA4-AA411ADE82DC}" sibTransId="{4A343348-5A18-A64D-B967-67FF94A2182D}"/>
+    <dgm:cxn modelId="{80E2C3F7-058F-1C40-8356-C15390BA6FDF}" type="presOf" srcId="{70F0D127-9705-B346-8456-2EA73B6E30CF}" destId="{201C7CC6-525A-FE42-B4FF-8C5914387024}" srcOrd="0" destOrd="0" presId="urn:microsoft.com/office/officeart/2005/8/layout/hierarchy1"/>
+    <dgm:cxn modelId="{8BD052AF-949A-F948-A12A-2F16C08A8BAA}" type="presOf" srcId="{4810192D-B607-5A42-8DCE-8CFCF1A82427}" destId="{28156514-4C64-AE45-A406-98283D6076D6}" srcOrd="0" destOrd="0" presId="urn:microsoft.com/office/officeart/2005/8/layout/hierarchy1"/>
+    <dgm:cxn modelId="{A5EF75CA-949B-FB42-A967-633DBF9C5416}" srcId="{67DF074B-DE05-B24C-9E35-CDBF726DC2DD}" destId="{2CF1C699-9046-8C42-87E6-2861BF37D660}" srcOrd="1" destOrd="0" parTransId="{F9A1264F-2EB8-8148-8E8F-B74886C30473}" sibTransId="{2B88B2F7-3FE5-E743-A3EF-F1DB3821C219}"/>
+    <dgm:cxn modelId="{FFC55F0E-24F0-0940-B0B5-F6820B65D7C7}" type="presOf" srcId="{E5C8F682-32CD-424A-896C-91EAD3E64C45}" destId="{76B33B1D-4CA5-544F-BF28-B308B507EF10}" srcOrd="0" destOrd="0" presId="urn:microsoft.com/office/officeart/2005/8/layout/hierarchy1"/>
+    <dgm:cxn modelId="{F97734D8-6CBC-804D-B286-FA60DFC694E9}" type="presOf" srcId="{84B85FB8-CE49-454E-AFD0-26748DF588CB}" destId="{39E9CE6E-1476-7F49-AD48-00E9588CC1FC}" srcOrd="0" destOrd="0" presId="urn:microsoft.com/office/officeart/2005/8/layout/hierarchy1"/>
+    <dgm:cxn modelId="{1FDA42F0-000F-6E4D-ACBD-DD297AF16C8B}" type="presOf" srcId="{960CE163-DF35-2B44-83E7-B9153BC66084}" destId="{923B0C63-79B7-9B4A-94B9-19130FBE5D7B}" srcOrd="0" destOrd="0" presId="urn:microsoft.com/office/officeart/2005/8/layout/hierarchy1"/>
+    <dgm:cxn modelId="{E7733746-4C87-234A-9D3E-4005D8B583BC}" srcId="{84B85FB8-CE49-454E-AFD0-26748DF588CB}" destId="{960CE163-DF35-2B44-83E7-B9153BC66084}" srcOrd="0" destOrd="0" parTransId="{15F9C8B3-0868-F148-A166-96327192876A}" sibTransId="{AE4D7356-6DD9-B04F-A5BC-257D53ADE85C}"/>
+    <dgm:cxn modelId="{7DFEC403-3D07-E147-94A7-6948508849D0}" type="presOf" srcId="{563BE0E2-35F1-EA43-92A4-487E8781D214}" destId="{1F5FFC55-2839-634C-8F0C-96EACF5BE3CB}" srcOrd="0" destOrd="0" presId="urn:microsoft.com/office/officeart/2005/8/layout/hierarchy1"/>
+    <dgm:cxn modelId="{74C3DF55-2571-4A42-A3D4-79D2D7286452}" type="presOf" srcId="{12CF4121-F3B4-5C45-B72F-C1FB37DD3C0D}" destId="{800FD04D-B3AC-0B4A-955F-2E2198D77D53}" srcOrd="0" destOrd="0" presId="urn:microsoft.com/office/officeart/2005/8/layout/hierarchy1"/>
+    <dgm:cxn modelId="{C885BB5D-362B-1847-87CF-E1B639313EA0}" srcId="{FE86CB60-E462-414C-BF0E-606A57D7AD93}" destId="{E5C8F682-32CD-424A-896C-91EAD3E64C45}" srcOrd="2" destOrd="0" parTransId="{E3372A67-8AD5-414E-9A1F-4D9E3CFF6332}" sibTransId="{B77BD5BE-E444-A847-B5CA-1B150064119C}"/>
+    <dgm:cxn modelId="{BE4A5523-AA4B-D244-80FB-A948E67617FE}" srcId="{AE7EA77A-1D8E-3F42-95E1-4EB11A443A81}" destId="{4261D7F4-A7D0-3F49-B78A-20CFB380B683}" srcOrd="0" destOrd="0" parTransId="{8C382D6E-A069-234E-96CC-A5A865E2BBBD}" sibTransId="{BFE6C573-BEC1-BB44-914C-4A90CDE91A1A}"/>
+    <dgm:cxn modelId="{FBC04F02-4804-8C4A-8D64-8D7E596D7783}" type="presOf" srcId="{AE7EA77A-1D8E-3F42-95E1-4EB11A443A81}" destId="{BBF408DD-FB71-6449-9993-DDA736E8D58A}" srcOrd="0" destOrd="0" presId="urn:microsoft.com/office/officeart/2005/8/layout/hierarchy1"/>
+    <dgm:cxn modelId="{7E833AC7-C906-EC48-8CF2-050B2E9E6DD6}" type="presOf" srcId="{632DBD1E-A080-C14D-89CD-94A8C0F3CF25}" destId="{2246CDBD-2CA8-A34C-A89B-E32ACB07E97A}" srcOrd="0" destOrd="0" presId="urn:microsoft.com/office/officeart/2005/8/layout/hierarchy1"/>
+    <dgm:cxn modelId="{09A4557F-E6E3-CA46-A390-4566B55E38CE}" srcId="{AE7EA77A-1D8E-3F42-95E1-4EB11A443A81}" destId="{A215CF19-F4EB-414A-A10F-B2A96141FE91}" srcOrd="1" destOrd="0" parTransId="{4810192D-B607-5A42-8DCE-8CFCF1A82427}" sibTransId="{466C1D3C-619E-C448-BF54-2F35FBFACADE}"/>
+    <dgm:cxn modelId="{FE6DB9C5-C848-C041-9BAC-D3D409ECA3D7}" type="presOf" srcId="{67DF074B-DE05-B24C-9E35-CDBF726DC2DD}" destId="{EBC8209D-BB74-B44A-A57A-C51ABEDBBAE8}" srcOrd="0" destOrd="0" presId="urn:microsoft.com/office/officeart/2005/8/layout/hierarchy1"/>
+    <dgm:cxn modelId="{629969CD-5D04-2A43-B3AF-FE8A98094A86}" type="presOf" srcId="{6C0275DE-9DFE-0E43-8DDA-D28DD222D71F}" destId="{8CFA3E84-678E-C345-8D46-63E85CF195E2}" srcOrd="0" destOrd="0" presId="urn:microsoft.com/office/officeart/2005/8/layout/hierarchy1"/>
+    <dgm:cxn modelId="{517E7342-1ED5-B24E-84A1-2A79CCE5BC2A}" type="presOf" srcId="{4D875376-E6B9-804F-AC85-A1D4337BBC8A}" destId="{0FEFC8CB-58CB-4A43-9867-EED6738F0C0F}" srcOrd="0" destOrd="0" presId="urn:microsoft.com/office/officeart/2005/8/layout/hierarchy1"/>
+    <dgm:cxn modelId="{0A19088C-A894-A349-B6F2-D0CA96CD47FA}" srcId="{960CE163-DF35-2B44-83E7-B9153BC66084}" destId="{1AD1EA1C-020E-5744-81BA-AEEC1A7A11F3}" srcOrd="2" destOrd="0" parTransId="{12CF4121-F3B4-5C45-B72F-C1FB37DD3C0D}" sibTransId="{E7356A86-2BC1-2844-87C1-0F4142A0BACE}"/>
+    <dgm:cxn modelId="{FB5948D5-A112-7E4F-A7A4-599731141072}" type="presOf" srcId="{E3372A67-8AD5-414E-9A1F-4D9E3CFF6332}" destId="{BA61A876-7050-3746-8DAE-0686A0FD0957}" srcOrd="0" destOrd="0" presId="urn:microsoft.com/office/officeart/2005/8/layout/hierarchy1"/>
+    <dgm:cxn modelId="{7B0EFE83-8F7C-2148-A812-1F8ACB477747}" type="presOf" srcId="{F9A1264F-2EB8-8148-8E8F-B74886C30473}" destId="{9541F663-17CE-1449-B545-4E9F3C558C3A}" srcOrd="0" destOrd="0" presId="urn:microsoft.com/office/officeart/2005/8/layout/hierarchy1"/>
+    <dgm:cxn modelId="{5125BE48-CBDA-9E46-A5EC-A00E5922E856}" type="presOf" srcId="{8C382D6E-A069-234E-96CC-A5A865E2BBBD}" destId="{C6BA431E-FA40-1D4E-A3D8-2A8BD37A2453}" srcOrd="0" destOrd="0" presId="urn:microsoft.com/office/officeart/2005/8/layout/hierarchy1"/>
     <dgm:cxn modelId="{8FC20289-4F63-9E49-BD79-567030E07E0D}" srcId="{960CE163-DF35-2B44-83E7-B9153BC66084}" destId="{4D875376-E6B9-804F-AC85-A1D4337BBC8A}" srcOrd="1" destOrd="0" parTransId="{6C0275DE-9DFE-0E43-8DDA-D28DD222D71F}" sibTransId="{5CBDE70F-8F73-B144-BE9A-D54839868342}"/>
-    <dgm:cxn modelId="{E7733746-4C87-234A-9D3E-4005D8B583BC}" srcId="{84B85FB8-CE49-454E-AFD0-26748DF588CB}" destId="{960CE163-DF35-2B44-83E7-B9153BC66084}" srcOrd="0" destOrd="0" parTransId="{15F9C8B3-0868-F148-A166-96327192876A}" sibTransId="{AE4D7356-6DD9-B04F-A5BC-257D53ADE85C}"/>
-    <dgm:cxn modelId="{89EEE784-3EED-8F43-8217-BBD1C237CA84}" type="presOf" srcId="{2CF1C699-9046-8C42-87E6-2861BF37D660}" destId="{9152FE1E-3F9F-1945-845B-196FD4FE9E7F}" srcOrd="0" destOrd="0" presId="urn:microsoft.com/office/officeart/2005/8/layout/hierarchy1"/>
-    <dgm:cxn modelId="{517E7342-1ED5-B24E-84A1-2A79CCE5BC2A}" type="presOf" srcId="{4D875376-E6B9-804F-AC85-A1D4337BBC8A}" destId="{0FEFC8CB-58CB-4A43-9867-EED6738F0C0F}" srcOrd="0" destOrd="0" presId="urn:microsoft.com/office/officeart/2005/8/layout/hierarchy1"/>
-    <dgm:cxn modelId="{FB5948D5-A112-7E4F-A7A4-599731141072}" type="presOf" srcId="{E3372A67-8AD5-414E-9A1F-4D9E3CFF6332}" destId="{BA61A876-7050-3746-8DAE-0686A0FD0957}" srcOrd="0" destOrd="0" presId="urn:microsoft.com/office/officeart/2005/8/layout/hierarchy1"/>
-    <dgm:cxn modelId="{BDB62AEF-004A-3E4A-BA04-15FFC883C6DC}" type="presOf" srcId="{1AD1EA1C-020E-5744-81BA-AEEC1A7A11F3}" destId="{D86CCABB-994E-2B44-9B36-549A167DC946}" srcOrd="0" destOrd="0" presId="urn:microsoft.com/office/officeart/2005/8/layout/hierarchy1"/>
-    <dgm:cxn modelId="{80E2C3F7-058F-1C40-8356-C15390BA6FDF}" type="presOf" srcId="{70F0D127-9705-B346-8456-2EA73B6E30CF}" destId="{201C7CC6-525A-FE42-B4FF-8C5914387024}" srcOrd="0" destOrd="0" presId="urn:microsoft.com/office/officeart/2005/8/layout/hierarchy1"/>
-    <dgm:cxn modelId="{FBC04F02-4804-8C4A-8D64-8D7E596D7783}" type="presOf" srcId="{AE7EA77A-1D8E-3F42-95E1-4EB11A443A81}" destId="{BBF408DD-FB71-6449-9993-DDA736E8D58A}" srcOrd="0" destOrd="0" presId="urn:microsoft.com/office/officeart/2005/8/layout/hierarchy1"/>
-    <dgm:cxn modelId="{F97734D8-6CBC-804D-B286-FA60DFC694E9}" type="presOf" srcId="{84B85FB8-CE49-454E-AFD0-26748DF588CB}" destId="{39E9CE6E-1476-7F49-AD48-00E9588CC1FC}" srcOrd="0" destOrd="0" presId="urn:microsoft.com/office/officeart/2005/8/layout/hierarchy1"/>
+    <dgm:cxn modelId="{4143E40A-3339-5746-9665-4720B7275017}" type="presOf" srcId="{4261D7F4-A7D0-3F49-B78A-20CFB380B683}" destId="{C2C1A37D-940A-6743-AC99-D92FAAA879A9}" srcOrd="0" destOrd="0" presId="urn:microsoft.com/office/officeart/2005/8/layout/hierarchy1"/>
     <dgm:cxn modelId="{DF469E1B-C306-5F4B-B680-7ACFEA169B9B}" type="presParOf" srcId="{39E9CE6E-1476-7F49-AD48-00E9588CC1FC}" destId="{AFBF1B26-876E-5B4F-868D-ECF533517B41}" srcOrd="0" destOrd="0" presId="urn:microsoft.com/office/officeart/2005/8/layout/hierarchy1"/>
     <dgm:cxn modelId="{9BD7EE58-09E0-D144-8D85-070D725F1603}" type="presParOf" srcId="{AFBF1B26-876E-5B4F-868D-ECF533517B41}" destId="{80FDFEA5-D276-C44B-902D-D2E8A937A02A}" srcOrd="0" destOrd="0" presId="urn:microsoft.com/office/officeart/2005/8/layout/hierarchy1"/>
     <dgm:cxn modelId="{8C3AC7B7-A647-D047-8BDB-5F00B4604513}" type="presParOf" srcId="{80FDFEA5-D276-C44B-902D-D2E8A937A02A}" destId="{DE9E6D4B-E798-AA47-81C3-1E545DF4DB5B}" srcOrd="0" destOrd="0" presId="urn:microsoft.com/office/officeart/2005/8/layout/hierarchy1"/>
@@ -11982,7 +11990,7 @@
           <a:p>
             <a:fld id="{6483C26A-63A4-F547-BB74-146C3D288EFD}" type="datetimeFigureOut">
               <a:rPr lang="en-US" smtClean="0"/>
-              <a:t>2/14/16</a:t>
+              <a:t>2/15/16</a:t>
             </a:fld>
             <a:endParaRPr lang="en-US"/>
           </a:p>
@@ -12152,7 +12160,7 @@
           <a:p>
             <a:fld id="{6483C26A-63A4-F547-BB74-146C3D288EFD}" type="datetimeFigureOut">
               <a:rPr lang="en-US" smtClean="0"/>
-              <a:t>2/14/16</a:t>
+              <a:t>2/15/16</a:t>
             </a:fld>
             <a:endParaRPr lang="en-US"/>
           </a:p>
@@ -12332,7 +12340,7 @@
           <a:p>
             <a:fld id="{6483C26A-63A4-F547-BB74-146C3D288EFD}" type="datetimeFigureOut">
               <a:rPr lang="en-US" smtClean="0"/>
-              <a:t>2/14/16</a:t>
+              <a:t>2/15/16</a:t>
             </a:fld>
             <a:endParaRPr lang="en-US"/>
           </a:p>
@@ -12502,7 +12510,7 @@
           <a:p>
             <a:fld id="{6483C26A-63A4-F547-BB74-146C3D288EFD}" type="datetimeFigureOut">
               <a:rPr lang="en-US" smtClean="0"/>
-              <a:t>2/14/16</a:t>
+              <a:t>2/15/16</a:t>
             </a:fld>
             <a:endParaRPr lang="en-US"/>
           </a:p>
@@ -12748,7 +12756,7 @@
           <a:p>
             <a:fld id="{6483C26A-63A4-F547-BB74-146C3D288EFD}" type="datetimeFigureOut">
               <a:rPr lang="en-US" smtClean="0"/>
-              <a:t>2/14/16</a:t>
+              <a:t>2/15/16</a:t>
             </a:fld>
             <a:endParaRPr lang="en-US"/>
           </a:p>
@@ -13036,7 +13044,7 @@
           <a:p>
             <a:fld id="{6483C26A-63A4-F547-BB74-146C3D288EFD}" type="datetimeFigureOut">
               <a:rPr lang="en-US" smtClean="0"/>
-              <a:t>2/14/16</a:t>
+              <a:t>2/15/16</a:t>
             </a:fld>
             <a:endParaRPr lang="en-US"/>
           </a:p>
@@ -13458,7 +13466,7 @@
           <a:p>
             <a:fld id="{6483C26A-63A4-F547-BB74-146C3D288EFD}" type="datetimeFigureOut">
               <a:rPr lang="en-US" smtClean="0"/>
-              <a:t>2/14/16</a:t>
+              <a:t>2/15/16</a:t>
             </a:fld>
             <a:endParaRPr lang="en-US"/>
           </a:p>
@@ -13576,7 +13584,7 @@
           <a:p>
             <a:fld id="{6483C26A-63A4-F547-BB74-146C3D288EFD}" type="datetimeFigureOut">
               <a:rPr lang="en-US" smtClean="0"/>
-              <a:t>2/14/16</a:t>
+              <a:t>2/15/16</a:t>
             </a:fld>
             <a:endParaRPr lang="en-US"/>
           </a:p>
@@ -13671,7 +13679,7 @@
           <a:p>
             <a:fld id="{6483C26A-63A4-F547-BB74-146C3D288EFD}" type="datetimeFigureOut">
               <a:rPr lang="en-US" smtClean="0"/>
-              <a:t>2/14/16</a:t>
+              <a:t>2/15/16</a:t>
             </a:fld>
             <a:endParaRPr lang="en-US"/>
           </a:p>
@@ -13948,7 +13956,7 @@
           <a:p>
             <a:fld id="{6483C26A-63A4-F547-BB74-146C3D288EFD}" type="datetimeFigureOut">
               <a:rPr lang="en-US" smtClean="0"/>
-              <a:t>2/14/16</a:t>
+              <a:t>2/15/16</a:t>
             </a:fld>
             <a:endParaRPr lang="en-US"/>
           </a:p>
@@ -14201,7 +14209,7 @@
           <a:p>
             <a:fld id="{6483C26A-63A4-F547-BB74-146C3D288EFD}" type="datetimeFigureOut">
               <a:rPr lang="en-US" smtClean="0"/>
-              <a:t>2/14/16</a:t>
+              <a:t>2/15/16</a:t>
             </a:fld>
             <a:endParaRPr lang="en-US"/>
           </a:p>
@@ -14414,7 +14422,7 @@
           <a:p>
             <a:fld id="{6483C26A-63A4-F547-BB74-146C3D288EFD}" type="datetimeFigureOut">
               <a:rPr lang="en-US" smtClean="0"/>
-              <a:t>2/14/16</a:t>
+              <a:t>2/15/16</a:t>
             </a:fld>
             <a:endParaRPr lang="en-US"/>
           </a:p>
@@ -24875,30 +24883,13 @@
           <a:p>
             <a:r>
               <a:rPr lang="en-US" dirty="0" smtClean="0"/>
-              <a:t>#</a:t>
-            </a:r>
-            <a:r>
-              <a:rPr lang="en-US" dirty="0" smtClean="0"/>
-              <a:t>34 </a:t>
-            </a:r>
-            <a:r>
-              <a:rPr lang="en-US" dirty="0" smtClean="0"/>
-              <a:t>– Section </a:t>
-            </a:r>
-            <a:r>
-              <a:rPr lang="en-US" dirty="0" smtClean="0"/>
-              <a:t>10</a:t>
-            </a:r>
-            <a:endParaRPr lang="en-US" dirty="0" smtClean="0"/>
-          </a:p>
-          <a:p>
-            <a:r>
-              <a:rPr lang="en-US" dirty="0" smtClean="0"/>
-              <a:t>Containers</a:t>
-            </a:r>
-            <a:r>
-              <a:rPr lang="en-US" dirty="0" smtClean="0"/>
-              <a:t>: Arrays</a:t>
+              <a:t>#34 – Section 10</a:t>
+            </a:r>
+          </a:p>
+          <a:p>
+            <a:r>
+              <a:rPr lang="en-US" dirty="0" smtClean="0"/>
+              <a:t>Containers: Arrays</a:t>
             </a:r>
             <a:endParaRPr lang="en-US" dirty="0"/>
           </a:p>
@@ -25214,11 +25205,7 @@
           <a:p>
             <a:r>
               <a:rPr lang="en-US" dirty="0" smtClean="0"/>
-              <a:t>Definition: </a:t>
-            </a:r>
-            <a:r>
-              <a:rPr lang="en-US" dirty="0" smtClean="0"/>
-              <a:t>Array</a:t>
+              <a:t>Definition: Array</a:t>
             </a:r>
             <a:endParaRPr lang="en-US" dirty="0"/>
           </a:p>
@@ -25243,15 +25230,7 @@
           <a:p>
             <a:r>
               <a:rPr lang="en-US" dirty="0" smtClean="0"/>
-              <a:t>What is  a </a:t>
-            </a:r>
-            <a:r>
-              <a:rPr lang="en-US" dirty="0" smtClean="0"/>
-              <a:t>‘array’</a:t>
-            </a:r>
-            <a:r>
-              <a:rPr lang="en-US" dirty="0" smtClean="0"/>
-              <a:t>?</a:t>
+              <a:t>What is  a ‘array’?</a:t>
             </a:r>
           </a:p>
           <a:p>
@@ -25321,24 +25300,12 @@
               </a:rPr>
               <a:t>values</a:t>
             </a:r>
-            <a:endParaRPr lang="en-US" b="1" i="1" dirty="0" smtClean="0">
-              <a:solidFill>
-                <a:schemeClr val="bg2">
-                  <a:lumMod val="50000"/>
-                </a:schemeClr>
-              </a:solidFill>
-            </a:endParaRPr>
-          </a:p>
-          <a:p>
-            <a:r>
-              <a:rPr lang="en-US" dirty="0" smtClean="0"/>
-              <a:t>What are the benefits of </a:t>
-            </a:r>
-            <a:r>
-              <a:rPr lang="en-US" dirty="0" smtClean="0"/>
-              <a:t>arrays?</a:t>
-            </a:r>
-            <a:endParaRPr lang="en-US" dirty="0" smtClean="0"/>
+          </a:p>
+          <a:p>
+            <a:r>
+              <a:rPr lang="en-US" dirty="0" smtClean="0"/>
+              <a:t>What are the benefits of arrays?</a:t>
+            </a:r>
           </a:p>
           <a:p>
             <a:pPr lvl="1"/>
@@ -26809,11 +26776,7 @@
             </a:r>
             <a:r>
               <a:rPr lang="en-US" dirty="0" smtClean="0"/>
-              <a:t>Compact </a:t>
-            </a:r>
-            <a:r>
-              <a:rPr lang="en-US" dirty="0" smtClean="0"/>
-              <a:t>Syntax</a:t>
+              <a:t>Compact Syntax</a:t>
             </a:r>
           </a:p>
           <a:p>
@@ -27432,6 +27395,3837 @@
     <p:extLst>
       <p:ext uri="{BB962C8B-B14F-4D97-AF65-F5344CB8AC3E}">
         <p14:creationId xmlns:p14="http://schemas.microsoft.com/office/powerpoint/2010/main" val="1051472918"/>
+      </p:ext>
+    </p:extLst>
+  </p:cSld>
+  <p:clrMapOvr>
+    <a:masterClrMapping/>
+  </p:clrMapOvr>
+</p:sld>
+</file>
+
+<file path=ppt/slides/slide61.xml><?xml version="1.0" encoding="utf-8"?>
+<p:sld xmlns:a="http://schemas.openxmlformats.org/drawingml/2006/main" xmlns:r="http://schemas.openxmlformats.org/officeDocument/2006/relationships" xmlns:p="http://schemas.openxmlformats.org/presentationml/2006/main">
+  <p:cSld>
+    <p:spTree>
+      <p:nvGrpSpPr>
+        <p:cNvPr id="1" name=""/>
+        <p:cNvGrpSpPr/>
+        <p:nvPr/>
+      </p:nvGrpSpPr>
+      <p:grpSpPr>
+        <a:xfrm>
+          <a:off x="0" y="0"/>
+          <a:ext cx="0" cy="0"/>
+          <a:chOff x="0" y="0"/>
+          <a:chExt cx="0" cy="0"/>
+        </a:xfrm>
+      </p:grpSpPr>
+      <p:sp>
+        <p:nvSpPr>
+          <p:cNvPr id="2" name="Title 1"/>
+          <p:cNvSpPr>
+            <a:spLocks noGrp="1"/>
+          </p:cNvSpPr>
+          <p:nvPr>
+            <p:ph type="ctrTitle"/>
+          </p:nvPr>
+        </p:nvSpPr>
+        <p:spPr/>
+        <p:txBody>
+          <a:bodyPr/>
+          <a:lstStyle/>
+          <a:p>
+            <a:r>
+              <a:rPr lang="en-US" dirty="0" smtClean="0"/>
+              <a:t>Chapter 5 – JavaScript</a:t>
+            </a:r>
+            <a:endParaRPr lang="en-US" dirty="0"/>
+          </a:p>
+        </p:txBody>
+      </p:sp>
+      <p:sp>
+        <p:nvSpPr>
+          <p:cNvPr id="3" name="Subtitle 2"/>
+          <p:cNvSpPr>
+            <a:spLocks noGrp="1"/>
+          </p:cNvSpPr>
+          <p:nvPr>
+            <p:ph type="subTitle" idx="1"/>
+          </p:nvPr>
+        </p:nvSpPr>
+        <p:spPr/>
+        <p:txBody>
+          <a:bodyPr/>
+          <a:lstStyle/>
+          <a:p>
+            <a:r>
+              <a:rPr lang="en-US" dirty="0" smtClean="0"/>
+              <a:t>#</a:t>
+            </a:r>
+            <a:r>
+              <a:rPr lang="en-US" dirty="0" smtClean="0"/>
+              <a:t>35 </a:t>
+            </a:r>
+            <a:r>
+              <a:rPr lang="en-US" dirty="0" smtClean="0"/>
+              <a:t>– Section </a:t>
+            </a:r>
+            <a:r>
+              <a:rPr lang="en-US" dirty="0" smtClean="0"/>
+              <a:t>11</a:t>
+            </a:r>
+            <a:endParaRPr lang="en-US" dirty="0"/>
+          </a:p>
+          <a:p>
+            <a:r>
+              <a:rPr lang="en-US" dirty="0" smtClean="0"/>
+              <a:t>Arrays: </a:t>
+            </a:r>
+            <a:r>
+              <a:rPr lang="en-US" smtClean="0"/>
+              <a:t>More On Usage</a:t>
+            </a:r>
+            <a:endParaRPr lang="en-US" dirty="0" smtClean="0"/>
+          </a:p>
+        </p:txBody>
+      </p:sp>
+    </p:spTree>
+    <p:extLst>
+      <p:ext uri="{BB962C8B-B14F-4D97-AF65-F5344CB8AC3E}">
+        <p14:creationId xmlns:p14="http://schemas.microsoft.com/office/powerpoint/2010/main" val="2858298945"/>
+      </p:ext>
+    </p:extLst>
+  </p:cSld>
+  <p:clrMapOvr>
+    <a:masterClrMapping/>
+  </p:clrMapOvr>
+  <p:timing>
+    <p:tnLst>
+      <p:par>
+        <p:cTn xmlns:p14="http://schemas.microsoft.com/office/powerpoint/2010/main" id="1" dur="indefinite" restart="never" nodeType="tmRoot"/>
+      </p:par>
+    </p:tnLst>
+  </p:timing>
+</p:sld>
+</file>
+
+<file path=ppt/slides/slide62.xml><?xml version="1.0" encoding="utf-8"?>
+<p:sld xmlns:a="http://schemas.openxmlformats.org/drawingml/2006/main" xmlns:r="http://schemas.openxmlformats.org/officeDocument/2006/relationships" xmlns:p="http://schemas.openxmlformats.org/presentationml/2006/main">
+  <p:cSld>
+    <p:spTree>
+      <p:nvGrpSpPr>
+        <p:cNvPr id="1" name=""/>
+        <p:cNvGrpSpPr/>
+        <p:nvPr/>
+      </p:nvGrpSpPr>
+      <p:grpSpPr>
+        <a:xfrm>
+          <a:off x="0" y="0"/>
+          <a:ext cx="0" cy="0"/>
+          <a:chOff x="0" y="0"/>
+          <a:chExt cx="0" cy="0"/>
+        </a:xfrm>
+      </p:grpSpPr>
+      <p:sp>
+        <p:nvSpPr>
+          <p:cNvPr id="2" name="Title 1"/>
+          <p:cNvSpPr>
+            <a:spLocks noGrp="1"/>
+          </p:cNvSpPr>
+          <p:nvPr>
+            <p:ph type="title"/>
+          </p:nvPr>
+        </p:nvSpPr>
+        <p:spPr/>
+        <p:txBody>
+          <a:bodyPr/>
+          <a:lstStyle/>
+          <a:p>
+            <a:r>
+              <a:rPr lang="en-US" dirty="0" smtClean="0"/>
+              <a:t>Topics</a:t>
+            </a:r>
+            <a:endParaRPr lang="en-US" dirty="0"/>
+          </a:p>
+        </p:txBody>
+      </p:sp>
+      <p:sp>
+        <p:nvSpPr>
+          <p:cNvPr id="3" name="Content Placeholder 2"/>
+          <p:cNvSpPr>
+            <a:spLocks noGrp="1"/>
+          </p:cNvSpPr>
+          <p:nvPr>
+            <p:ph idx="1"/>
+          </p:nvPr>
+        </p:nvSpPr>
+        <p:spPr/>
+        <p:txBody>
+          <a:bodyPr>
+            <a:normAutofit/>
+          </a:bodyPr>
+          <a:lstStyle/>
+          <a:p>
+            <a:pPr marL="514350" indent="-514350">
+              <a:buFont typeface="+mj-lt"/>
+              <a:buAutoNum type="arabicPeriod"/>
+            </a:pPr>
+            <a:r>
+              <a:rPr lang="en-US" dirty="0" smtClean="0"/>
+              <a:t>How to access elements of an array?</a:t>
+            </a:r>
+          </a:p>
+          <a:p>
+            <a:pPr marL="514350" indent="-514350">
+              <a:buFont typeface="+mj-lt"/>
+              <a:buAutoNum type="arabicPeriod"/>
+            </a:pPr>
+            <a:r>
+              <a:rPr lang="en-US" dirty="0" smtClean="0"/>
+              <a:t>How to count the elements in an array?</a:t>
+            </a:r>
+          </a:p>
+          <a:p>
+            <a:pPr marL="514350" indent="-514350">
+              <a:buFont typeface="+mj-lt"/>
+              <a:buAutoNum type="arabicPeriod"/>
+            </a:pPr>
+            <a:r>
+              <a:rPr lang="en-US" strike="sngStrike" dirty="0" smtClean="0"/>
+              <a:t>How to modify an array, add/remove elements?</a:t>
+            </a:r>
+          </a:p>
+        </p:txBody>
+      </p:sp>
+    </p:spTree>
+    <p:extLst>
+      <p:ext uri="{BB962C8B-B14F-4D97-AF65-F5344CB8AC3E}">
+        <p14:creationId xmlns:p14="http://schemas.microsoft.com/office/powerpoint/2010/main" val="1993805345"/>
+      </p:ext>
+    </p:extLst>
+  </p:cSld>
+  <p:clrMapOvr>
+    <a:masterClrMapping/>
+  </p:clrMapOvr>
+</p:sld>
+</file>
+
+<file path=ppt/slides/slide63.xml><?xml version="1.0" encoding="utf-8"?>
+<p:sld xmlns:a="http://schemas.openxmlformats.org/drawingml/2006/main" xmlns:r="http://schemas.openxmlformats.org/officeDocument/2006/relationships" xmlns:p="http://schemas.openxmlformats.org/presentationml/2006/main">
+  <p:cSld>
+    <p:spTree>
+      <p:nvGrpSpPr>
+        <p:cNvPr id="1" name=""/>
+        <p:cNvGrpSpPr/>
+        <p:nvPr/>
+      </p:nvGrpSpPr>
+      <p:grpSpPr>
+        <a:xfrm>
+          <a:off x="0" y="0"/>
+          <a:ext cx="0" cy="0"/>
+          <a:chOff x="0" y="0"/>
+          <a:chExt cx="0" cy="0"/>
+        </a:xfrm>
+      </p:grpSpPr>
+      <p:sp>
+        <p:nvSpPr>
+          <p:cNvPr id="2" name="Title 1"/>
+          <p:cNvSpPr>
+            <a:spLocks noGrp="1"/>
+          </p:cNvSpPr>
+          <p:nvPr>
+            <p:ph type="title"/>
+          </p:nvPr>
+        </p:nvSpPr>
+        <p:spPr/>
+        <p:txBody>
+          <a:bodyPr/>
+          <a:lstStyle/>
+          <a:p>
+            <a:r>
+              <a:rPr lang="en-US" dirty="0" smtClean="0"/>
+              <a:t>Why Arrays?</a:t>
+            </a:r>
+            <a:endParaRPr lang="en-US" dirty="0"/>
+          </a:p>
+        </p:txBody>
+      </p:sp>
+      <p:sp>
+        <p:nvSpPr>
+          <p:cNvPr id="3" name="Content Placeholder 2"/>
+          <p:cNvSpPr>
+            <a:spLocks noGrp="1"/>
+          </p:cNvSpPr>
+          <p:nvPr>
+            <p:ph idx="1"/>
+          </p:nvPr>
+        </p:nvSpPr>
+        <p:spPr/>
+        <p:txBody>
+          <a:bodyPr>
+            <a:normAutofit/>
+          </a:bodyPr>
+          <a:lstStyle/>
+          <a:p>
+            <a:r>
+              <a:rPr lang="en-US" dirty="0" smtClean="0"/>
+              <a:t>Record Temperature reading at 8am, 12pm, and 6pm for a week</a:t>
+            </a:r>
+          </a:p>
+          <a:p>
+            <a:pPr lvl="2"/>
+            <a:r>
+              <a:rPr lang="en-US" dirty="0" smtClean="0"/>
+              <a:t>Day 1: 80</a:t>
+            </a:r>
+            <a:r>
+              <a:rPr lang="en-US" dirty="0"/>
+              <a:t>°, 83°, </a:t>
+            </a:r>
+            <a:r>
+              <a:rPr lang="en-US" dirty="0" smtClean="0"/>
+              <a:t>and 76°</a:t>
+            </a:r>
+          </a:p>
+          <a:p>
+            <a:pPr lvl="2"/>
+            <a:r>
+              <a:rPr lang="en-US" dirty="0"/>
+              <a:t>Day </a:t>
+            </a:r>
+            <a:r>
+              <a:rPr lang="en-US" dirty="0" smtClean="0"/>
+              <a:t>2: 79°</a:t>
+            </a:r>
+            <a:r>
+              <a:rPr lang="en-US" dirty="0"/>
+              <a:t>, 83°, and </a:t>
+            </a:r>
+            <a:r>
+              <a:rPr lang="en-US" dirty="0" smtClean="0"/>
+              <a:t>79°</a:t>
+            </a:r>
+            <a:endParaRPr lang="en-US" dirty="0"/>
+          </a:p>
+          <a:p>
+            <a:pPr lvl="2"/>
+            <a:r>
+              <a:rPr lang="en-US" dirty="0"/>
+              <a:t>Day </a:t>
+            </a:r>
+            <a:r>
+              <a:rPr lang="en-US" dirty="0" smtClean="0"/>
+              <a:t>3: </a:t>
+            </a:r>
+            <a:r>
+              <a:rPr lang="en-US" dirty="0"/>
+              <a:t>80°, </a:t>
+            </a:r>
+            <a:r>
+              <a:rPr lang="en-US" dirty="0" smtClean="0"/>
+              <a:t>85°</a:t>
+            </a:r>
+            <a:r>
+              <a:rPr lang="en-US" dirty="0"/>
+              <a:t>, and </a:t>
+            </a:r>
+            <a:r>
+              <a:rPr lang="en-US" dirty="0" smtClean="0"/>
+              <a:t>80°</a:t>
+            </a:r>
+            <a:endParaRPr lang="en-US" dirty="0"/>
+          </a:p>
+          <a:p>
+            <a:pPr lvl="2"/>
+            <a:r>
+              <a:rPr lang="en-US" dirty="0"/>
+              <a:t>Day </a:t>
+            </a:r>
+            <a:r>
+              <a:rPr lang="en-US" dirty="0" smtClean="0"/>
+              <a:t>4: 81°</a:t>
+            </a:r>
+            <a:r>
+              <a:rPr lang="en-US" dirty="0"/>
+              <a:t>, </a:t>
+            </a:r>
+            <a:r>
+              <a:rPr lang="en-US" dirty="0" smtClean="0"/>
+              <a:t>87°</a:t>
+            </a:r>
+            <a:r>
+              <a:rPr lang="en-US" dirty="0"/>
+              <a:t>, and </a:t>
+            </a:r>
+            <a:r>
+              <a:rPr lang="en-US" dirty="0" smtClean="0"/>
+              <a:t>79°</a:t>
+            </a:r>
+            <a:endParaRPr lang="en-US" dirty="0"/>
+          </a:p>
+          <a:p>
+            <a:pPr lvl="2"/>
+            <a:r>
+              <a:rPr lang="en-US" dirty="0"/>
+              <a:t>Day </a:t>
+            </a:r>
+            <a:r>
+              <a:rPr lang="en-US" dirty="0" smtClean="0"/>
+              <a:t>5: 72°</a:t>
+            </a:r>
+            <a:r>
+              <a:rPr lang="en-US" dirty="0"/>
+              <a:t>, </a:t>
+            </a:r>
+            <a:r>
+              <a:rPr lang="en-US" dirty="0" smtClean="0"/>
+              <a:t>79°</a:t>
+            </a:r>
+            <a:r>
+              <a:rPr lang="en-US" dirty="0"/>
+              <a:t>, and </a:t>
+            </a:r>
+            <a:r>
+              <a:rPr lang="en-US" dirty="0" smtClean="0"/>
+              <a:t>75°</a:t>
+            </a:r>
+            <a:endParaRPr lang="en-US" dirty="0"/>
+          </a:p>
+          <a:p>
+            <a:pPr lvl="2"/>
+            <a:r>
+              <a:rPr lang="en-US" dirty="0"/>
+              <a:t>Day </a:t>
+            </a:r>
+            <a:r>
+              <a:rPr lang="en-US" dirty="0" smtClean="0"/>
+              <a:t>6: 75°</a:t>
+            </a:r>
+            <a:r>
+              <a:rPr lang="en-US" dirty="0"/>
+              <a:t>, </a:t>
+            </a:r>
+            <a:r>
+              <a:rPr lang="en-US" dirty="0" smtClean="0"/>
+              <a:t>79°</a:t>
+            </a:r>
+            <a:r>
+              <a:rPr lang="en-US" dirty="0"/>
+              <a:t>, and </a:t>
+            </a:r>
+            <a:r>
+              <a:rPr lang="en-US" dirty="0" smtClean="0"/>
+              <a:t>72°</a:t>
+            </a:r>
+            <a:endParaRPr lang="en-US" dirty="0"/>
+          </a:p>
+          <a:p>
+            <a:pPr lvl="2"/>
+            <a:r>
+              <a:rPr lang="en-US" dirty="0"/>
+              <a:t>Day </a:t>
+            </a:r>
+            <a:r>
+              <a:rPr lang="en-US" dirty="0" smtClean="0"/>
+              <a:t>7: 81°</a:t>
+            </a:r>
+            <a:r>
+              <a:rPr lang="en-US" dirty="0"/>
+              <a:t>, </a:t>
+            </a:r>
+            <a:r>
+              <a:rPr lang="en-US" dirty="0" smtClean="0"/>
+              <a:t>88°</a:t>
+            </a:r>
+            <a:r>
+              <a:rPr lang="en-US" dirty="0"/>
+              <a:t>, and </a:t>
+            </a:r>
+            <a:r>
+              <a:rPr lang="en-US" dirty="0" smtClean="0"/>
+              <a:t>77°</a:t>
+            </a:r>
+            <a:endParaRPr lang="en-US" dirty="0"/>
+          </a:p>
+          <a:p>
+            <a:pPr lvl="2"/>
+            <a:endParaRPr lang="en-US" dirty="0"/>
+          </a:p>
+        </p:txBody>
+      </p:sp>
+    </p:spTree>
+    <p:extLst>
+      <p:ext uri="{BB962C8B-B14F-4D97-AF65-F5344CB8AC3E}">
+        <p14:creationId xmlns:p14="http://schemas.microsoft.com/office/powerpoint/2010/main" val="1489239203"/>
+      </p:ext>
+    </p:extLst>
+  </p:cSld>
+  <p:clrMapOvr>
+    <a:masterClrMapping/>
+  </p:clrMapOvr>
+</p:sld>
+</file>
+
+<file path=ppt/slides/slide64.xml><?xml version="1.0" encoding="utf-8"?>
+<p:sld xmlns:a="http://schemas.openxmlformats.org/drawingml/2006/main" xmlns:r="http://schemas.openxmlformats.org/officeDocument/2006/relationships" xmlns:p="http://schemas.openxmlformats.org/presentationml/2006/main">
+  <p:cSld>
+    <p:spTree>
+      <p:nvGrpSpPr>
+        <p:cNvPr id="1" name=""/>
+        <p:cNvGrpSpPr/>
+        <p:nvPr/>
+      </p:nvGrpSpPr>
+      <p:grpSpPr>
+        <a:xfrm>
+          <a:off x="0" y="0"/>
+          <a:ext cx="0" cy="0"/>
+          <a:chOff x="0" y="0"/>
+          <a:chExt cx="0" cy="0"/>
+        </a:xfrm>
+      </p:grpSpPr>
+      <p:sp>
+        <p:nvSpPr>
+          <p:cNvPr id="2" name="Title 1"/>
+          <p:cNvSpPr>
+            <a:spLocks noGrp="1"/>
+          </p:cNvSpPr>
+          <p:nvPr>
+            <p:ph type="title"/>
+          </p:nvPr>
+        </p:nvSpPr>
+        <p:spPr/>
+        <p:txBody>
+          <a:bodyPr/>
+          <a:lstStyle/>
+          <a:p>
+            <a:r>
+              <a:rPr lang="en-US" dirty="0" smtClean="0"/>
+              <a:t>Why Arrays?</a:t>
+            </a:r>
+            <a:endParaRPr lang="en-US" dirty="0"/>
+          </a:p>
+        </p:txBody>
+      </p:sp>
+      <p:sp>
+        <p:nvSpPr>
+          <p:cNvPr id="11" name="Line Callout 1 10"/>
+          <p:cNvSpPr/>
+          <p:nvPr/>
+        </p:nvSpPr>
+        <p:spPr>
+          <a:xfrm>
+            <a:off x="6878020" y="3697099"/>
+            <a:ext cx="1792566" cy="382131"/>
+          </a:xfrm>
+          <a:prstGeom prst="borderCallout1">
+            <a:avLst>
+              <a:gd name="adj1" fmla="val 49142"/>
+              <a:gd name="adj2" fmla="val 179"/>
+              <a:gd name="adj3" fmla="val 50924"/>
+              <a:gd name="adj4" fmla="val -39130"/>
+            </a:avLst>
+          </a:prstGeom>
+        </p:spPr>
+        <p:style>
+          <a:lnRef idx="2">
+            <a:schemeClr val="accent2">
+              <a:shade val="50000"/>
+            </a:schemeClr>
+          </a:lnRef>
+          <a:fillRef idx="1">
+            <a:schemeClr val="accent2"/>
+          </a:fillRef>
+          <a:effectRef idx="0">
+            <a:schemeClr val="accent2"/>
+          </a:effectRef>
+          <a:fontRef idx="minor">
+            <a:schemeClr val="lt1"/>
+          </a:fontRef>
+        </p:style>
+        <p:txBody>
+          <a:bodyPr rtlCol="0" anchor="ctr"/>
+          <a:lstStyle/>
+          <a:p>
+            <a:pPr algn="ctr"/>
+            <a:r>
+              <a:rPr lang="en-US" dirty="0" smtClean="0"/>
+              <a:t>Daily Grouping</a:t>
+            </a:r>
+            <a:endParaRPr lang="en-US" dirty="0"/>
+          </a:p>
+        </p:txBody>
+      </p:sp>
+      <p:sp>
+        <p:nvSpPr>
+          <p:cNvPr id="15" name="Rounded Rectangle 14"/>
+          <p:cNvSpPr/>
+          <p:nvPr/>
+        </p:nvSpPr>
+        <p:spPr>
+          <a:xfrm>
+            <a:off x="3131985" y="2130494"/>
+            <a:ext cx="3034420" cy="382131"/>
+          </a:xfrm>
+          <a:prstGeom prst="roundRect">
+            <a:avLst/>
+          </a:prstGeom>
+          <a:solidFill>
+            <a:schemeClr val="accent2">
+              <a:alpha val="30000"/>
+            </a:schemeClr>
+          </a:solidFill>
+        </p:spPr>
+        <p:style>
+          <a:lnRef idx="2">
+            <a:schemeClr val="accent2">
+              <a:shade val="50000"/>
+            </a:schemeClr>
+          </a:lnRef>
+          <a:fillRef idx="1">
+            <a:schemeClr val="accent2"/>
+          </a:fillRef>
+          <a:effectRef idx="0">
+            <a:schemeClr val="accent2"/>
+          </a:effectRef>
+          <a:fontRef idx="minor">
+            <a:schemeClr val="lt1"/>
+          </a:fontRef>
+        </p:style>
+        <p:txBody>
+          <a:bodyPr rtlCol="0" anchor="ctr"/>
+          <a:lstStyle/>
+          <a:p>
+            <a:pPr algn="ctr"/>
+            <a:r>
+              <a:rPr lang="en-US" dirty="0" smtClean="0">
+                <a:solidFill>
+                  <a:schemeClr val="tx1"/>
+                </a:solidFill>
+              </a:rPr>
+              <a:t>Day 1: 76</a:t>
+            </a:r>
+            <a:r>
+              <a:rPr lang="en-US" dirty="0">
+                <a:solidFill>
+                  <a:schemeClr val="tx1"/>
+                </a:solidFill>
+              </a:rPr>
+              <a:t>°</a:t>
+            </a:r>
+            <a:r>
+              <a:rPr lang="en-US" dirty="0" smtClean="0">
+                <a:solidFill>
+                  <a:schemeClr val="tx1"/>
+                </a:solidFill>
+              </a:rPr>
+              <a:t>, 81</a:t>
+            </a:r>
+            <a:r>
+              <a:rPr lang="en-US" dirty="0">
+                <a:solidFill>
+                  <a:schemeClr val="tx1"/>
+                </a:solidFill>
+              </a:rPr>
+              <a:t>°</a:t>
+            </a:r>
+            <a:r>
+              <a:rPr lang="en-US" dirty="0" smtClean="0">
+                <a:solidFill>
+                  <a:schemeClr val="tx1"/>
+                </a:solidFill>
+              </a:rPr>
+              <a:t>, 79</a:t>
+            </a:r>
+            <a:r>
+              <a:rPr lang="en-US" dirty="0">
+                <a:solidFill>
+                  <a:schemeClr val="tx1"/>
+                </a:solidFill>
+              </a:rPr>
+              <a:t>°</a:t>
+            </a:r>
+          </a:p>
+        </p:txBody>
+      </p:sp>
+      <p:sp>
+        <p:nvSpPr>
+          <p:cNvPr id="22" name="Rounded Rectangle 21"/>
+          <p:cNvSpPr/>
+          <p:nvPr/>
+        </p:nvSpPr>
+        <p:spPr>
+          <a:xfrm>
+            <a:off x="3131985" y="2652696"/>
+            <a:ext cx="3034420" cy="382131"/>
+          </a:xfrm>
+          <a:prstGeom prst="roundRect">
+            <a:avLst/>
+          </a:prstGeom>
+          <a:solidFill>
+            <a:schemeClr val="accent2">
+              <a:alpha val="30000"/>
+            </a:schemeClr>
+          </a:solidFill>
+        </p:spPr>
+        <p:style>
+          <a:lnRef idx="2">
+            <a:schemeClr val="accent2">
+              <a:shade val="50000"/>
+            </a:schemeClr>
+          </a:lnRef>
+          <a:fillRef idx="1">
+            <a:schemeClr val="accent2"/>
+          </a:fillRef>
+          <a:effectRef idx="0">
+            <a:schemeClr val="accent2"/>
+          </a:effectRef>
+          <a:fontRef idx="minor">
+            <a:schemeClr val="lt1"/>
+          </a:fontRef>
+        </p:style>
+        <p:txBody>
+          <a:bodyPr rtlCol="0" anchor="ctr"/>
+          <a:lstStyle/>
+          <a:p>
+            <a:pPr algn="ctr"/>
+            <a:r>
+              <a:rPr lang="en-US" dirty="0" smtClean="0">
+                <a:solidFill>
+                  <a:schemeClr val="tx1"/>
+                </a:solidFill>
+              </a:rPr>
+              <a:t>Day 2: 79°, 83°, 80°</a:t>
+            </a:r>
+            <a:endParaRPr lang="en-US" dirty="0">
+              <a:solidFill>
+                <a:schemeClr val="tx1"/>
+              </a:solidFill>
+            </a:endParaRPr>
+          </a:p>
+        </p:txBody>
+      </p:sp>
+      <p:sp>
+        <p:nvSpPr>
+          <p:cNvPr id="24" name="Rounded Rectangle 23"/>
+          <p:cNvSpPr/>
+          <p:nvPr/>
+        </p:nvSpPr>
+        <p:spPr>
+          <a:xfrm>
+            <a:off x="3131985" y="3174898"/>
+            <a:ext cx="3034420" cy="382131"/>
+          </a:xfrm>
+          <a:prstGeom prst="roundRect">
+            <a:avLst/>
+          </a:prstGeom>
+          <a:solidFill>
+            <a:schemeClr val="accent2">
+              <a:alpha val="30000"/>
+            </a:schemeClr>
+          </a:solidFill>
+        </p:spPr>
+        <p:style>
+          <a:lnRef idx="2">
+            <a:schemeClr val="accent2">
+              <a:shade val="50000"/>
+            </a:schemeClr>
+          </a:lnRef>
+          <a:fillRef idx="1">
+            <a:schemeClr val="accent2"/>
+          </a:fillRef>
+          <a:effectRef idx="0">
+            <a:schemeClr val="accent2"/>
+          </a:effectRef>
+          <a:fontRef idx="minor">
+            <a:schemeClr val="lt1"/>
+          </a:fontRef>
+        </p:style>
+        <p:txBody>
+          <a:bodyPr rtlCol="0" anchor="ctr"/>
+          <a:lstStyle/>
+          <a:p>
+            <a:pPr algn="ctr"/>
+            <a:r>
+              <a:rPr lang="en-US" dirty="0" smtClean="0">
+                <a:solidFill>
+                  <a:schemeClr val="tx1"/>
+                </a:solidFill>
+              </a:rPr>
+              <a:t>Day 3: 80°, 85°, 80°</a:t>
+            </a:r>
+            <a:endParaRPr lang="en-US" dirty="0">
+              <a:solidFill>
+                <a:schemeClr val="tx1"/>
+              </a:solidFill>
+            </a:endParaRPr>
+          </a:p>
+        </p:txBody>
+      </p:sp>
+      <p:sp>
+        <p:nvSpPr>
+          <p:cNvPr id="25" name="Rounded Rectangle 24"/>
+          <p:cNvSpPr/>
+          <p:nvPr/>
+        </p:nvSpPr>
+        <p:spPr>
+          <a:xfrm>
+            <a:off x="3131985" y="3697100"/>
+            <a:ext cx="3034420" cy="382131"/>
+          </a:xfrm>
+          <a:prstGeom prst="roundRect">
+            <a:avLst/>
+          </a:prstGeom>
+          <a:solidFill>
+            <a:schemeClr val="accent2">
+              <a:alpha val="30000"/>
+            </a:schemeClr>
+          </a:solidFill>
+        </p:spPr>
+        <p:style>
+          <a:lnRef idx="2">
+            <a:schemeClr val="accent2">
+              <a:shade val="50000"/>
+            </a:schemeClr>
+          </a:lnRef>
+          <a:fillRef idx="1">
+            <a:schemeClr val="accent2"/>
+          </a:fillRef>
+          <a:effectRef idx="0">
+            <a:schemeClr val="accent2"/>
+          </a:effectRef>
+          <a:fontRef idx="minor">
+            <a:schemeClr val="lt1"/>
+          </a:fontRef>
+        </p:style>
+        <p:txBody>
+          <a:bodyPr rtlCol="0" anchor="ctr"/>
+          <a:lstStyle/>
+          <a:p>
+            <a:pPr algn="ctr"/>
+            <a:r>
+              <a:rPr lang="en-US" dirty="0" smtClean="0">
+                <a:solidFill>
+                  <a:schemeClr val="tx1"/>
+                </a:solidFill>
+              </a:rPr>
+              <a:t>Day 4: 81°, 87°, 79</a:t>
+            </a:r>
+            <a:r>
+              <a:rPr lang="en-US" dirty="0">
+                <a:solidFill>
+                  <a:schemeClr val="tx1"/>
+                </a:solidFill>
+              </a:rPr>
+              <a:t>°</a:t>
+            </a:r>
+          </a:p>
+        </p:txBody>
+      </p:sp>
+      <p:sp>
+        <p:nvSpPr>
+          <p:cNvPr id="26" name="Rounded Rectangle 25"/>
+          <p:cNvSpPr/>
+          <p:nvPr/>
+        </p:nvSpPr>
+        <p:spPr>
+          <a:xfrm>
+            <a:off x="3131985" y="4219302"/>
+            <a:ext cx="3034420" cy="382131"/>
+          </a:xfrm>
+          <a:prstGeom prst="roundRect">
+            <a:avLst/>
+          </a:prstGeom>
+          <a:solidFill>
+            <a:schemeClr val="accent2">
+              <a:alpha val="30000"/>
+            </a:schemeClr>
+          </a:solidFill>
+        </p:spPr>
+        <p:style>
+          <a:lnRef idx="2">
+            <a:schemeClr val="accent2">
+              <a:shade val="50000"/>
+            </a:schemeClr>
+          </a:lnRef>
+          <a:fillRef idx="1">
+            <a:schemeClr val="accent2"/>
+          </a:fillRef>
+          <a:effectRef idx="0">
+            <a:schemeClr val="accent2"/>
+          </a:effectRef>
+          <a:fontRef idx="minor">
+            <a:schemeClr val="lt1"/>
+          </a:fontRef>
+        </p:style>
+        <p:txBody>
+          <a:bodyPr rtlCol="0" anchor="ctr"/>
+          <a:lstStyle/>
+          <a:p>
+            <a:pPr algn="ctr"/>
+            <a:r>
+              <a:rPr lang="en-US" dirty="0" smtClean="0">
+                <a:solidFill>
+                  <a:schemeClr val="tx1"/>
+                </a:solidFill>
+              </a:rPr>
+              <a:t>Day 5: 72°, 79°, 75°</a:t>
+            </a:r>
+            <a:endParaRPr lang="en-US" dirty="0">
+              <a:solidFill>
+                <a:schemeClr val="tx1"/>
+              </a:solidFill>
+            </a:endParaRPr>
+          </a:p>
+        </p:txBody>
+      </p:sp>
+      <p:sp>
+        <p:nvSpPr>
+          <p:cNvPr id="27" name="Rounded Rectangle 26"/>
+          <p:cNvSpPr/>
+          <p:nvPr/>
+        </p:nvSpPr>
+        <p:spPr>
+          <a:xfrm>
+            <a:off x="3131985" y="4741504"/>
+            <a:ext cx="3034420" cy="382131"/>
+          </a:xfrm>
+          <a:prstGeom prst="roundRect">
+            <a:avLst/>
+          </a:prstGeom>
+          <a:solidFill>
+            <a:schemeClr val="accent2">
+              <a:alpha val="30000"/>
+            </a:schemeClr>
+          </a:solidFill>
+        </p:spPr>
+        <p:style>
+          <a:lnRef idx="2">
+            <a:schemeClr val="accent2">
+              <a:shade val="50000"/>
+            </a:schemeClr>
+          </a:lnRef>
+          <a:fillRef idx="1">
+            <a:schemeClr val="accent2"/>
+          </a:fillRef>
+          <a:effectRef idx="0">
+            <a:schemeClr val="accent2"/>
+          </a:effectRef>
+          <a:fontRef idx="minor">
+            <a:schemeClr val="lt1"/>
+          </a:fontRef>
+        </p:style>
+        <p:txBody>
+          <a:bodyPr rtlCol="0" anchor="ctr"/>
+          <a:lstStyle/>
+          <a:p>
+            <a:pPr algn="ctr"/>
+            <a:r>
+              <a:rPr lang="en-US" dirty="0" smtClean="0">
+                <a:solidFill>
+                  <a:schemeClr val="tx1"/>
+                </a:solidFill>
+              </a:rPr>
+              <a:t>Day 6: 75°, 79°, 72°</a:t>
+            </a:r>
+            <a:endParaRPr lang="en-US" dirty="0">
+              <a:solidFill>
+                <a:schemeClr val="tx1"/>
+              </a:solidFill>
+            </a:endParaRPr>
+          </a:p>
+        </p:txBody>
+      </p:sp>
+      <p:sp>
+        <p:nvSpPr>
+          <p:cNvPr id="28" name="Rounded Rectangle 27"/>
+          <p:cNvSpPr/>
+          <p:nvPr/>
+        </p:nvSpPr>
+        <p:spPr>
+          <a:xfrm>
+            <a:off x="3131985" y="5263705"/>
+            <a:ext cx="3034420" cy="382131"/>
+          </a:xfrm>
+          <a:prstGeom prst="roundRect">
+            <a:avLst/>
+          </a:prstGeom>
+          <a:solidFill>
+            <a:schemeClr val="accent2">
+              <a:alpha val="30000"/>
+            </a:schemeClr>
+          </a:solidFill>
+        </p:spPr>
+        <p:style>
+          <a:lnRef idx="2">
+            <a:schemeClr val="accent2">
+              <a:shade val="50000"/>
+            </a:schemeClr>
+          </a:lnRef>
+          <a:fillRef idx="1">
+            <a:schemeClr val="accent2"/>
+          </a:fillRef>
+          <a:effectRef idx="0">
+            <a:schemeClr val="accent2"/>
+          </a:effectRef>
+          <a:fontRef idx="minor">
+            <a:schemeClr val="lt1"/>
+          </a:fontRef>
+        </p:style>
+        <p:txBody>
+          <a:bodyPr rtlCol="0" anchor="ctr"/>
+          <a:lstStyle/>
+          <a:p>
+            <a:pPr algn="ctr"/>
+            <a:r>
+              <a:rPr lang="en-US" dirty="0" smtClean="0">
+                <a:solidFill>
+                  <a:schemeClr val="tx1"/>
+                </a:solidFill>
+              </a:rPr>
+              <a:t>Day 7: 81°, 88°, 77°</a:t>
+            </a:r>
+            <a:endParaRPr lang="en-US" dirty="0">
+              <a:solidFill>
+                <a:schemeClr val="tx1"/>
+              </a:solidFill>
+            </a:endParaRPr>
+          </a:p>
+        </p:txBody>
+      </p:sp>
+    </p:spTree>
+    <p:extLst>
+      <p:ext uri="{BB962C8B-B14F-4D97-AF65-F5344CB8AC3E}">
+        <p14:creationId xmlns:p14="http://schemas.microsoft.com/office/powerpoint/2010/main" val="3854572962"/>
+      </p:ext>
+    </p:extLst>
+  </p:cSld>
+  <p:clrMapOvr>
+    <a:masterClrMapping/>
+  </p:clrMapOvr>
+</p:sld>
+</file>
+
+<file path=ppt/slides/slide65.xml><?xml version="1.0" encoding="utf-8"?>
+<p:sld xmlns:a="http://schemas.openxmlformats.org/drawingml/2006/main" xmlns:r="http://schemas.openxmlformats.org/officeDocument/2006/relationships" xmlns:p="http://schemas.openxmlformats.org/presentationml/2006/main">
+  <p:cSld>
+    <p:spTree>
+      <p:nvGrpSpPr>
+        <p:cNvPr id="1" name=""/>
+        <p:cNvGrpSpPr/>
+        <p:nvPr/>
+      </p:nvGrpSpPr>
+      <p:grpSpPr>
+        <a:xfrm>
+          <a:off x="0" y="0"/>
+          <a:ext cx="0" cy="0"/>
+          <a:chOff x="0" y="0"/>
+          <a:chExt cx="0" cy="0"/>
+        </a:xfrm>
+      </p:grpSpPr>
+      <p:sp>
+        <p:nvSpPr>
+          <p:cNvPr id="2" name="Title 1"/>
+          <p:cNvSpPr>
+            <a:spLocks noGrp="1"/>
+          </p:cNvSpPr>
+          <p:nvPr>
+            <p:ph type="title"/>
+          </p:nvPr>
+        </p:nvSpPr>
+        <p:spPr/>
+        <p:txBody>
+          <a:bodyPr/>
+          <a:lstStyle/>
+          <a:p>
+            <a:r>
+              <a:rPr lang="en-US" i="1" u="sng" dirty="0" smtClean="0"/>
+              <a:t>Basic</a:t>
+            </a:r>
+            <a:r>
+              <a:rPr lang="en-US" dirty="0" smtClean="0"/>
+              <a:t> Array Usage</a:t>
+            </a:r>
+            <a:endParaRPr lang="en-US" dirty="0"/>
+          </a:p>
+        </p:txBody>
+      </p:sp>
+      <p:pic>
+        <p:nvPicPr>
+          <p:cNvPr id="7" name="Picture 6"/>
+          <p:cNvPicPr>
+            <a:picLocks noChangeAspect="1"/>
+          </p:cNvPicPr>
+          <p:nvPr/>
+        </p:nvPicPr>
+        <p:blipFill>
+          <a:blip r:embed="rId2"/>
+          <a:stretch>
+            <a:fillRect/>
+          </a:stretch>
+        </p:blipFill>
+        <p:spPr>
+          <a:xfrm>
+            <a:off x="4712935" y="1417638"/>
+            <a:ext cx="2565400" cy="1955800"/>
+          </a:xfrm>
+          <a:prstGeom prst="rect">
+            <a:avLst/>
+          </a:prstGeom>
+        </p:spPr>
+      </p:pic>
+      <p:pic>
+        <p:nvPicPr>
+          <p:cNvPr id="10" name="Picture 9"/>
+          <p:cNvPicPr>
+            <a:picLocks noChangeAspect="1"/>
+          </p:cNvPicPr>
+          <p:nvPr/>
+        </p:nvPicPr>
+        <p:blipFill>
+          <a:blip r:embed="rId3"/>
+          <a:stretch>
+            <a:fillRect/>
+          </a:stretch>
+        </p:blipFill>
+        <p:spPr>
+          <a:xfrm>
+            <a:off x="1931635" y="3860800"/>
+            <a:ext cx="5346700" cy="876300"/>
+          </a:xfrm>
+          <a:prstGeom prst="rect">
+            <a:avLst/>
+          </a:prstGeom>
+        </p:spPr>
+      </p:pic>
+      <p:sp>
+        <p:nvSpPr>
+          <p:cNvPr id="5" name="Rounded Rectangle 4"/>
+          <p:cNvSpPr/>
+          <p:nvPr/>
+        </p:nvSpPr>
+        <p:spPr>
+          <a:xfrm>
+            <a:off x="1931635" y="1417638"/>
+            <a:ext cx="1704683" cy="253551"/>
+          </a:xfrm>
+          <a:prstGeom prst="roundRect">
+            <a:avLst/>
+          </a:prstGeom>
+          <a:solidFill>
+            <a:schemeClr val="accent2">
+              <a:alpha val="30000"/>
+            </a:schemeClr>
+          </a:solidFill>
+        </p:spPr>
+        <p:style>
+          <a:lnRef idx="2">
+            <a:schemeClr val="accent2">
+              <a:shade val="50000"/>
+            </a:schemeClr>
+          </a:lnRef>
+          <a:fillRef idx="1">
+            <a:schemeClr val="accent2"/>
+          </a:fillRef>
+          <a:effectRef idx="0">
+            <a:schemeClr val="accent2"/>
+          </a:effectRef>
+          <a:fontRef idx="minor">
+            <a:schemeClr val="lt1"/>
+          </a:fontRef>
+        </p:style>
+        <p:txBody>
+          <a:bodyPr rtlCol="0" anchor="ctr"/>
+          <a:lstStyle/>
+          <a:p>
+            <a:pPr algn="ctr"/>
+            <a:r>
+              <a:rPr lang="en-US" sz="1400" dirty="0" smtClean="0">
+                <a:solidFill>
+                  <a:schemeClr val="tx1"/>
+                </a:solidFill>
+              </a:rPr>
+              <a:t>Day 1: 76</a:t>
+            </a:r>
+            <a:r>
+              <a:rPr lang="en-US" sz="1400" dirty="0">
+                <a:solidFill>
+                  <a:schemeClr val="tx1"/>
+                </a:solidFill>
+              </a:rPr>
+              <a:t>°</a:t>
+            </a:r>
+            <a:r>
+              <a:rPr lang="en-US" sz="1400" dirty="0" smtClean="0">
+                <a:solidFill>
+                  <a:schemeClr val="tx1"/>
+                </a:solidFill>
+              </a:rPr>
+              <a:t>, 81</a:t>
+            </a:r>
+            <a:r>
+              <a:rPr lang="en-US" sz="1400" dirty="0">
+                <a:solidFill>
+                  <a:schemeClr val="tx1"/>
+                </a:solidFill>
+              </a:rPr>
+              <a:t>°</a:t>
+            </a:r>
+            <a:r>
+              <a:rPr lang="en-US" sz="1400" dirty="0" smtClean="0">
+                <a:solidFill>
+                  <a:schemeClr val="tx1"/>
+                </a:solidFill>
+              </a:rPr>
+              <a:t>, 79</a:t>
+            </a:r>
+            <a:r>
+              <a:rPr lang="en-US" sz="1400" dirty="0">
+                <a:solidFill>
+                  <a:schemeClr val="tx1"/>
+                </a:solidFill>
+              </a:rPr>
+              <a:t>°</a:t>
+            </a:r>
+          </a:p>
+        </p:txBody>
+      </p:sp>
+      <p:sp>
+        <p:nvSpPr>
+          <p:cNvPr id="6" name="Rounded Rectangle 5"/>
+          <p:cNvSpPr/>
+          <p:nvPr/>
+        </p:nvSpPr>
+        <p:spPr>
+          <a:xfrm>
+            <a:off x="1931635" y="1701346"/>
+            <a:ext cx="1704683" cy="253551"/>
+          </a:xfrm>
+          <a:prstGeom prst="roundRect">
+            <a:avLst/>
+          </a:prstGeom>
+          <a:solidFill>
+            <a:schemeClr val="accent2">
+              <a:alpha val="30000"/>
+            </a:schemeClr>
+          </a:solidFill>
+        </p:spPr>
+        <p:style>
+          <a:lnRef idx="2">
+            <a:schemeClr val="accent2">
+              <a:shade val="50000"/>
+            </a:schemeClr>
+          </a:lnRef>
+          <a:fillRef idx="1">
+            <a:schemeClr val="accent2"/>
+          </a:fillRef>
+          <a:effectRef idx="0">
+            <a:schemeClr val="accent2"/>
+          </a:effectRef>
+          <a:fontRef idx="minor">
+            <a:schemeClr val="lt1"/>
+          </a:fontRef>
+        </p:style>
+        <p:txBody>
+          <a:bodyPr rtlCol="0" anchor="ctr"/>
+          <a:lstStyle/>
+          <a:p>
+            <a:pPr algn="ctr"/>
+            <a:r>
+              <a:rPr lang="en-US" sz="1400" dirty="0" smtClean="0">
+                <a:solidFill>
+                  <a:schemeClr val="tx1"/>
+                </a:solidFill>
+              </a:rPr>
+              <a:t>Day 2: 79°, 83°, 80°</a:t>
+            </a:r>
+            <a:endParaRPr lang="en-US" sz="1400" dirty="0">
+              <a:solidFill>
+                <a:schemeClr val="tx1"/>
+              </a:solidFill>
+            </a:endParaRPr>
+          </a:p>
+        </p:txBody>
+      </p:sp>
+      <p:sp>
+        <p:nvSpPr>
+          <p:cNvPr id="8" name="Rounded Rectangle 7"/>
+          <p:cNvSpPr/>
+          <p:nvPr/>
+        </p:nvSpPr>
+        <p:spPr>
+          <a:xfrm>
+            <a:off x="1931635" y="1985054"/>
+            <a:ext cx="1704683" cy="253551"/>
+          </a:xfrm>
+          <a:prstGeom prst="roundRect">
+            <a:avLst/>
+          </a:prstGeom>
+          <a:solidFill>
+            <a:schemeClr val="accent2">
+              <a:alpha val="30000"/>
+            </a:schemeClr>
+          </a:solidFill>
+        </p:spPr>
+        <p:style>
+          <a:lnRef idx="2">
+            <a:schemeClr val="accent2">
+              <a:shade val="50000"/>
+            </a:schemeClr>
+          </a:lnRef>
+          <a:fillRef idx="1">
+            <a:schemeClr val="accent2"/>
+          </a:fillRef>
+          <a:effectRef idx="0">
+            <a:schemeClr val="accent2"/>
+          </a:effectRef>
+          <a:fontRef idx="minor">
+            <a:schemeClr val="lt1"/>
+          </a:fontRef>
+        </p:style>
+        <p:txBody>
+          <a:bodyPr rtlCol="0" anchor="ctr"/>
+          <a:lstStyle/>
+          <a:p>
+            <a:pPr algn="ctr"/>
+            <a:r>
+              <a:rPr lang="en-US" sz="1400" dirty="0" smtClean="0">
+                <a:solidFill>
+                  <a:schemeClr val="tx1"/>
+                </a:solidFill>
+              </a:rPr>
+              <a:t>Day 3: 80°, 85°, 80°</a:t>
+            </a:r>
+            <a:endParaRPr lang="en-US" sz="1400" dirty="0">
+              <a:solidFill>
+                <a:schemeClr val="tx1"/>
+              </a:solidFill>
+            </a:endParaRPr>
+          </a:p>
+        </p:txBody>
+      </p:sp>
+      <p:sp>
+        <p:nvSpPr>
+          <p:cNvPr id="9" name="Rounded Rectangle 8"/>
+          <p:cNvSpPr/>
+          <p:nvPr/>
+        </p:nvSpPr>
+        <p:spPr>
+          <a:xfrm>
+            <a:off x="1931635" y="2268762"/>
+            <a:ext cx="1704683" cy="253551"/>
+          </a:xfrm>
+          <a:prstGeom prst="roundRect">
+            <a:avLst/>
+          </a:prstGeom>
+          <a:solidFill>
+            <a:schemeClr val="accent2">
+              <a:alpha val="30000"/>
+            </a:schemeClr>
+          </a:solidFill>
+        </p:spPr>
+        <p:style>
+          <a:lnRef idx="2">
+            <a:schemeClr val="accent2">
+              <a:shade val="50000"/>
+            </a:schemeClr>
+          </a:lnRef>
+          <a:fillRef idx="1">
+            <a:schemeClr val="accent2"/>
+          </a:fillRef>
+          <a:effectRef idx="0">
+            <a:schemeClr val="accent2"/>
+          </a:effectRef>
+          <a:fontRef idx="minor">
+            <a:schemeClr val="lt1"/>
+          </a:fontRef>
+        </p:style>
+        <p:txBody>
+          <a:bodyPr rtlCol="0" anchor="ctr"/>
+          <a:lstStyle/>
+          <a:p>
+            <a:pPr algn="ctr"/>
+            <a:r>
+              <a:rPr lang="en-US" sz="1400" dirty="0" smtClean="0">
+                <a:solidFill>
+                  <a:schemeClr val="tx1"/>
+                </a:solidFill>
+              </a:rPr>
+              <a:t>Day 4: 81°, 87°, 79</a:t>
+            </a:r>
+            <a:r>
+              <a:rPr lang="en-US" sz="1400" dirty="0">
+                <a:solidFill>
+                  <a:schemeClr val="tx1"/>
+                </a:solidFill>
+              </a:rPr>
+              <a:t>°</a:t>
+            </a:r>
+          </a:p>
+        </p:txBody>
+      </p:sp>
+      <p:sp>
+        <p:nvSpPr>
+          <p:cNvPr id="11" name="Rounded Rectangle 10"/>
+          <p:cNvSpPr/>
+          <p:nvPr/>
+        </p:nvSpPr>
+        <p:spPr>
+          <a:xfrm>
+            <a:off x="1931635" y="2552470"/>
+            <a:ext cx="1704683" cy="253551"/>
+          </a:xfrm>
+          <a:prstGeom prst="roundRect">
+            <a:avLst/>
+          </a:prstGeom>
+          <a:solidFill>
+            <a:schemeClr val="accent2">
+              <a:alpha val="30000"/>
+            </a:schemeClr>
+          </a:solidFill>
+        </p:spPr>
+        <p:style>
+          <a:lnRef idx="2">
+            <a:schemeClr val="accent2">
+              <a:shade val="50000"/>
+            </a:schemeClr>
+          </a:lnRef>
+          <a:fillRef idx="1">
+            <a:schemeClr val="accent2"/>
+          </a:fillRef>
+          <a:effectRef idx="0">
+            <a:schemeClr val="accent2"/>
+          </a:effectRef>
+          <a:fontRef idx="minor">
+            <a:schemeClr val="lt1"/>
+          </a:fontRef>
+        </p:style>
+        <p:txBody>
+          <a:bodyPr rtlCol="0" anchor="ctr"/>
+          <a:lstStyle/>
+          <a:p>
+            <a:pPr algn="ctr"/>
+            <a:r>
+              <a:rPr lang="en-US" sz="1400" dirty="0" smtClean="0">
+                <a:solidFill>
+                  <a:schemeClr val="tx1"/>
+                </a:solidFill>
+              </a:rPr>
+              <a:t>Day 5: 72°, 79°, 75°</a:t>
+            </a:r>
+            <a:endParaRPr lang="en-US" sz="1400" dirty="0">
+              <a:solidFill>
+                <a:schemeClr val="tx1"/>
+              </a:solidFill>
+            </a:endParaRPr>
+          </a:p>
+        </p:txBody>
+      </p:sp>
+      <p:sp>
+        <p:nvSpPr>
+          <p:cNvPr id="12" name="Rounded Rectangle 11"/>
+          <p:cNvSpPr/>
+          <p:nvPr/>
+        </p:nvSpPr>
+        <p:spPr>
+          <a:xfrm>
+            <a:off x="1931635" y="2836178"/>
+            <a:ext cx="1704683" cy="253551"/>
+          </a:xfrm>
+          <a:prstGeom prst="roundRect">
+            <a:avLst/>
+          </a:prstGeom>
+          <a:solidFill>
+            <a:schemeClr val="accent2">
+              <a:alpha val="30000"/>
+            </a:schemeClr>
+          </a:solidFill>
+        </p:spPr>
+        <p:style>
+          <a:lnRef idx="2">
+            <a:schemeClr val="accent2">
+              <a:shade val="50000"/>
+            </a:schemeClr>
+          </a:lnRef>
+          <a:fillRef idx="1">
+            <a:schemeClr val="accent2"/>
+          </a:fillRef>
+          <a:effectRef idx="0">
+            <a:schemeClr val="accent2"/>
+          </a:effectRef>
+          <a:fontRef idx="minor">
+            <a:schemeClr val="lt1"/>
+          </a:fontRef>
+        </p:style>
+        <p:txBody>
+          <a:bodyPr rtlCol="0" anchor="ctr"/>
+          <a:lstStyle/>
+          <a:p>
+            <a:pPr algn="ctr"/>
+            <a:r>
+              <a:rPr lang="en-US" sz="1400" dirty="0" smtClean="0">
+                <a:solidFill>
+                  <a:schemeClr val="tx1"/>
+                </a:solidFill>
+              </a:rPr>
+              <a:t>Day 6: 75°, 79°, 72°</a:t>
+            </a:r>
+            <a:endParaRPr lang="en-US" sz="1400" dirty="0">
+              <a:solidFill>
+                <a:schemeClr val="tx1"/>
+              </a:solidFill>
+            </a:endParaRPr>
+          </a:p>
+        </p:txBody>
+      </p:sp>
+      <p:sp>
+        <p:nvSpPr>
+          <p:cNvPr id="13" name="Rounded Rectangle 12"/>
+          <p:cNvSpPr/>
+          <p:nvPr/>
+        </p:nvSpPr>
+        <p:spPr>
+          <a:xfrm>
+            <a:off x="1931635" y="3119887"/>
+            <a:ext cx="1704683" cy="253551"/>
+          </a:xfrm>
+          <a:prstGeom prst="roundRect">
+            <a:avLst/>
+          </a:prstGeom>
+          <a:solidFill>
+            <a:schemeClr val="accent2">
+              <a:alpha val="30000"/>
+            </a:schemeClr>
+          </a:solidFill>
+        </p:spPr>
+        <p:style>
+          <a:lnRef idx="2">
+            <a:schemeClr val="accent2">
+              <a:shade val="50000"/>
+            </a:schemeClr>
+          </a:lnRef>
+          <a:fillRef idx="1">
+            <a:schemeClr val="accent2"/>
+          </a:fillRef>
+          <a:effectRef idx="0">
+            <a:schemeClr val="accent2"/>
+          </a:effectRef>
+          <a:fontRef idx="minor">
+            <a:schemeClr val="lt1"/>
+          </a:fontRef>
+        </p:style>
+        <p:txBody>
+          <a:bodyPr rtlCol="0" anchor="ctr"/>
+          <a:lstStyle/>
+          <a:p>
+            <a:pPr algn="ctr"/>
+            <a:r>
+              <a:rPr lang="en-US" sz="1400" dirty="0" smtClean="0">
+                <a:solidFill>
+                  <a:schemeClr val="tx1"/>
+                </a:solidFill>
+              </a:rPr>
+              <a:t>Day 7: 81°, 88°, 77°</a:t>
+            </a:r>
+            <a:endParaRPr lang="en-US" sz="1400" dirty="0">
+              <a:solidFill>
+                <a:schemeClr val="tx1"/>
+              </a:solidFill>
+            </a:endParaRPr>
+          </a:p>
+        </p:txBody>
+      </p:sp>
+    </p:spTree>
+    <p:extLst>
+      <p:ext uri="{BB962C8B-B14F-4D97-AF65-F5344CB8AC3E}">
+        <p14:creationId xmlns:p14="http://schemas.microsoft.com/office/powerpoint/2010/main" val="2784101889"/>
+      </p:ext>
+    </p:extLst>
+  </p:cSld>
+  <p:clrMapOvr>
+    <a:masterClrMapping/>
+  </p:clrMapOvr>
+</p:sld>
+</file>
+
+<file path=ppt/slides/slide66.xml><?xml version="1.0" encoding="utf-8"?>
+<p:sld xmlns:a="http://schemas.openxmlformats.org/drawingml/2006/main" xmlns:r="http://schemas.openxmlformats.org/officeDocument/2006/relationships" xmlns:p="http://schemas.openxmlformats.org/presentationml/2006/main">
+  <p:cSld>
+    <p:spTree>
+      <p:nvGrpSpPr>
+        <p:cNvPr id="1" name=""/>
+        <p:cNvGrpSpPr/>
+        <p:nvPr/>
+      </p:nvGrpSpPr>
+      <p:grpSpPr>
+        <a:xfrm>
+          <a:off x="0" y="0"/>
+          <a:ext cx="0" cy="0"/>
+          <a:chOff x="0" y="0"/>
+          <a:chExt cx="0" cy="0"/>
+        </a:xfrm>
+      </p:grpSpPr>
+      <p:sp>
+        <p:nvSpPr>
+          <p:cNvPr id="2" name="Title 1"/>
+          <p:cNvSpPr>
+            <a:spLocks noGrp="1"/>
+          </p:cNvSpPr>
+          <p:nvPr>
+            <p:ph type="title"/>
+          </p:nvPr>
+        </p:nvSpPr>
+        <p:spPr/>
+        <p:txBody>
+          <a:bodyPr/>
+          <a:lstStyle/>
+          <a:p>
+            <a:r>
+              <a:rPr lang="en-US" dirty="0" smtClean="0"/>
+              <a:t>An Array Illustrated</a:t>
+            </a:r>
+            <a:endParaRPr lang="en-US" dirty="0"/>
+          </a:p>
+        </p:txBody>
+      </p:sp>
+      <p:sp>
+        <p:nvSpPr>
+          <p:cNvPr id="4" name="Rectangle 3"/>
+          <p:cNvSpPr/>
+          <p:nvPr/>
+        </p:nvSpPr>
+        <p:spPr>
+          <a:xfrm>
+            <a:off x="2537703" y="2490246"/>
+            <a:ext cx="2278038" cy="429898"/>
+          </a:xfrm>
+          <a:prstGeom prst="rect">
+            <a:avLst/>
+          </a:prstGeom>
+        </p:spPr>
+        <p:style>
+          <a:lnRef idx="2">
+            <a:schemeClr val="accent2">
+              <a:shade val="50000"/>
+            </a:schemeClr>
+          </a:lnRef>
+          <a:fillRef idx="1">
+            <a:schemeClr val="accent2"/>
+          </a:fillRef>
+          <a:effectRef idx="0">
+            <a:schemeClr val="accent2"/>
+          </a:effectRef>
+          <a:fontRef idx="minor">
+            <a:schemeClr val="lt1"/>
+          </a:fontRef>
+        </p:style>
+        <p:txBody>
+          <a:bodyPr rtlCol="0" anchor="ctr"/>
+          <a:lstStyle/>
+          <a:p>
+            <a:pPr algn="ctr"/>
+            <a:endParaRPr lang="en-US"/>
+          </a:p>
+        </p:txBody>
+      </p:sp>
+      <p:sp>
+        <p:nvSpPr>
+          <p:cNvPr id="5" name="Rounded Rectangle 4"/>
+          <p:cNvSpPr/>
+          <p:nvPr/>
+        </p:nvSpPr>
+        <p:spPr>
+          <a:xfrm>
+            <a:off x="2642432" y="1675398"/>
+            <a:ext cx="292203" cy="297838"/>
+          </a:xfrm>
+          <a:prstGeom prst="roundRect">
+            <a:avLst/>
+          </a:prstGeom>
+          <a:scene3d>
+            <a:camera prst="orthographicFront"/>
+            <a:lightRig rig="threePt" dir="t"/>
+          </a:scene3d>
+          <a:sp3d>
+            <a:bevelT w="152400" h="50800" prst="softRound"/>
+          </a:sp3d>
+        </p:spPr>
+        <p:style>
+          <a:lnRef idx="1">
+            <a:schemeClr val="accent1"/>
+          </a:lnRef>
+          <a:fillRef idx="3">
+            <a:schemeClr val="accent1"/>
+          </a:fillRef>
+          <a:effectRef idx="2">
+            <a:schemeClr val="accent1"/>
+          </a:effectRef>
+          <a:fontRef idx="minor">
+            <a:schemeClr val="lt1"/>
+          </a:fontRef>
+        </p:style>
+        <p:txBody>
+          <a:bodyPr rtlCol="0" anchor="ctr"/>
+          <a:lstStyle/>
+          <a:p>
+            <a:pPr algn="ctr"/>
+            <a:endParaRPr lang="en-US"/>
+          </a:p>
+        </p:txBody>
+      </p:sp>
+      <p:sp>
+        <p:nvSpPr>
+          <p:cNvPr id="6" name="Rounded Rectangle 5"/>
+          <p:cNvSpPr/>
+          <p:nvPr/>
+        </p:nvSpPr>
+        <p:spPr>
+          <a:xfrm>
+            <a:off x="2997127" y="1675398"/>
+            <a:ext cx="292203" cy="297838"/>
+          </a:xfrm>
+          <a:prstGeom prst="roundRect">
+            <a:avLst/>
+          </a:prstGeom>
+          <a:scene3d>
+            <a:camera prst="orthographicFront"/>
+            <a:lightRig rig="threePt" dir="t"/>
+          </a:scene3d>
+          <a:sp3d>
+            <a:bevelT w="152400" h="50800" prst="softRound"/>
+          </a:sp3d>
+        </p:spPr>
+        <p:style>
+          <a:lnRef idx="1">
+            <a:schemeClr val="accent1"/>
+          </a:lnRef>
+          <a:fillRef idx="3">
+            <a:schemeClr val="accent1"/>
+          </a:fillRef>
+          <a:effectRef idx="2">
+            <a:schemeClr val="accent1"/>
+          </a:effectRef>
+          <a:fontRef idx="minor">
+            <a:schemeClr val="lt1"/>
+          </a:fontRef>
+        </p:style>
+        <p:txBody>
+          <a:bodyPr rtlCol="0" anchor="ctr"/>
+          <a:lstStyle/>
+          <a:p>
+            <a:pPr algn="ctr"/>
+            <a:endParaRPr lang="en-US"/>
+          </a:p>
+        </p:txBody>
+      </p:sp>
+      <p:sp>
+        <p:nvSpPr>
+          <p:cNvPr id="7" name="Rounded Rectangle 6"/>
+          <p:cNvSpPr/>
+          <p:nvPr/>
+        </p:nvSpPr>
+        <p:spPr>
+          <a:xfrm>
+            <a:off x="3351822" y="1675398"/>
+            <a:ext cx="292203" cy="297838"/>
+          </a:xfrm>
+          <a:prstGeom prst="roundRect">
+            <a:avLst/>
+          </a:prstGeom>
+          <a:scene3d>
+            <a:camera prst="orthographicFront"/>
+            <a:lightRig rig="threePt" dir="t"/>
+          </a:scene3d>
+          <a:sp3d>
+            <a:bevelT w="152400" h="50800" prst="softRound"/>
+          </a:sp3d>
+        </p:spPr>
+        <p:style>
+          <a:lnRef idx="1">
+            <a:schemeClr val="accent1"/>
+          </a:lnRef>
+          <a:fillRef idx="3">
+            <a:schemeClr val="accent1"/>
+          </a:fillRef>
+          <a:effectRef idx="2">
+            <a:schemeClr val="accent1"/>
+          </a:effectRef>
+          <a:fontRef idx="minor">
+            <a:schemeClr val="lt1"/>
+          </a:fontRef>
+        </p:style>
+        <p:txBody>
+          <a:bodyPr rtlCol="0" anchor="ctr"/>
+          <a:lstStyle/>
+          <a:p>
+            <a:pPr algn="ctr"/>
+            <a:endParaRPr lang="en-US"/>
+          </a:p>
+        </p:txBody>
+      </p:sp>
+      <p:sp>
+        <p:nvSpPr>
+          <p:cNvPr id="8" name="Rounded Rectangle 7"/>
+          <p:cNvSpPr/>
+          <p:nvPr/>
+        </p:nvSpPr>
+        <p:spPr>
+          <a:xfrm>
+            <a:off x="3706517" y="1675398"/>
+            <a:ext cx="292203" cy="297838"/>
+          </a:xfrm>
+          <a:prstGeom prst="roundRect">
+            <a:avLst/>
+          </a:prstGeom>
+          <a:scene3d>
+            <a:camera prst="orthographicFront"/>
+            <a:lightRig rig="threePt" dir="t"/>
+          </a:scene3d>
+          <a:sp3d>
+            <a:bevelT w="152400" h="50800" prst="softRound"/>
+          </a:sp3d>
+        </p:spPr>
+        <p:style>
+          <a:lnRef idx="1">
+            <a:schemeClr val="accent1"/>
+          </a:lnRef>
+          <a:fillRef idx="3">
+            <a:schemeClr val="accent1"/>
+          </a:fillRef>
+          <a:effectRef idx="2">
+            <a:schemeClr val="accent1"/>
+          </a:effectRef>
+          <a:fontRef idx="minor">
+            <a:schemeClr val="lt1"/>
+          </a:fontRef>
+        </p:style>
+        <p:txBody>
+          <a:bodyPr rtlCol="0" anchor="ctr"/>
+          <a:lstStyle/>
+          <a:p>
+            <a:pPr algn="ctr"/>
+            <a:endParaRPr lang="en-US"/>
+          </a:p>
+        </p:txBody>
+      </p:sp>
+      <p:sp>
+        <p:nvSpPr>
+          <p:cNvPr id="9" name="Rounded Rectangle 8"/>
+          <p:cNvSpPr/>
+          <p:nvPr/>
+        </p:nvSpPr>
+        <p:spPr>
+          <a:xfrm>
+            <a:off x="4061212" y="1675398"/>
+            <a:ext cx="292203" cy="297838"/>
+          </a:xfrm>
+          <a:prstGeom prst="roundRect">
+            <a:avLst/>
+          </a:prstGeom>
+          <a:scene3d>
+            <a:camera prst="orthographicFront"/>
+            <a:lightRig rig="threePt" dir="t"/>
+          </a:scene3d>
+          <a:sp3d>
+            <a:bevelT w="152400" h="50800" prst="softRound"/>
+          </a:sp3d>
+        </p:spPr>
+        <p:style>
+          <a:lnRef idx="1">
+            <a:schemeClr val="accent1"/>
+          </a:lnRef>
+          <a:fillRef idx="3">
+            <a:schemeClr val="accent1"/>
+          </a:fillRef>
+          <a:effectRef idx="2">
+            <a:schemeClr val="accent1"/>
+          </a:effectRef>
+          <a:fontRef idx="minor">
+            <a:schemeClr val="lt1"/>
+          </a:fontRef>
+        </p:style>
+        <p:txBody>
+          <a:bodyPr rtlCol="0" anchor="ctr"/>
+          <a:lstStyle/>
+          <a:p>
+            <a:pPr algn="ctr"/>
+            <a:endParaRPr lang="en-US"/>
+          </a:p>
+        </p:txBody>
+      </p:sp>
+      <p:sp>
+        <p:nvSpPr>
+          <p:cNvPr id="10" name="Rounded Rectangle 9"/>
+          <p:cNvSpPr/>
+          <p:nvPr/>
+        </p:nvSpPr>
+        <p:spPr>
+          <a:xfrm>
+            <a:off x="4415907" y="1675398"/>
+            <a:ext cx="292203" cy="297838"/>
+          </a:xfrm>
+          <a:prstGeom prst="roundRect">
+            <a:avLst/>
+          </a:prstGeom>
+          <a:scene3d>
+            <a:camera prst="orthographicFront"/>
+            <a:lightRig rig="threePt" dir="t"/>
+          </a:scene3d>
+          <a:sp3d>
+            <a:bevelT w="152400" h="50800" prst="softRound"/>
+          </a:sp3d>
+        </p:spPr>
+        <p:style>
+          <a:lnRef idx="1">
+            <a:schemeClr val="accent1"/>
+          </a:lnRef>
+          <a:fillRef idx="3">
+            <a:schemeClr val="accent1"/>
+          </a:fillRef>
+          <a:effectRef idx="2">
+            <a:schemeClr val="accent1"/>
+          </a:effectRef>
+          <a:fontRef idx="minor">
+            <a:schemeClr val="lt1"/>
+          </a:fontRef>
+        </p:style>
+        <p:txBody>
+          <a:bodyPr rtlCol="0" anchor="ctr"/>
+          <a:lstStyle/>
+          <a:p>
+            <a:pPr algn="ctr"/>
+            <a:endParaRPr lang="en-US"/>
+          </a:p>
+        </p:txBody>
+      </p:sp>
+      <p:sp>
+        <p:nvSpPr>
+          <p:cNvPr id="11" name="Line Callout 1 10"/>
+          <p:cNvSpPr/>
+          <p:nvPr/>
+        </p:nvSpPr>
+        <p:spPr>
+          <a:xfrm>
+            <a:off x="5585585" y="1664158"/>
+            <a:ext cx="1702646" cy="297838"/>
+          </a:xfrm>
+          <a:prstGeom prst="borderCallout1">
+            <a:avLst>
+              <a:gd name="adj1" fmla="val 64033"/>
+              <a:gd name="adj2" fmla="val -7673"/>
+              <a:gd name="adj3" fmla="val 63929"/>
+              <a:gd name="adj4" fmla="val -38333"/>
+            </a:avLst>
+          </a:prstGeom>
+        </p:spPr>
+        <p:style>
+          <a:lnRef idx="1">
+            <a:schemeClr val="accent5"/>
+          </a:lnRef>
+          <a:fillRef idx="2">
+            <a:schemeClr val="accent5"/>
+          </a:fillRef>
+          <a:effectRef idx="1">
+            <a:schemeClr val="accent5"/>
+          </a:effectRef>
+          <a:fontRef idx="minor">
+            <a:schemeClr val="dk1"/>
+          </a:fontRef>
+        </p:style>
+        <p:txBody>
+          <a:bodyPr rtlCol="0" anchor="ctr"/>
+          <a:lstStyle/>
+          <a:p>
+            <a:pPr algn="ctr"/>
+            <a:r>
+              <a:rPr lang="en-US" sz="1200" dirty="0" smtClean="0"/>
+              <a:t>Individual values</a:t>
+            </a:r>
+            <a:endParaRPr lang="en-US" sz="1200" dirty="0"/>
+          </a:p>
+        </p:txBody>
+      </p:sp>
+      <p:sp>
+        <p:nvSpPr>
+          <p:cNvPr id="12" name="Line Callout 1 11"/>
+          <p:cNvSpPr/>
+          <p:nvPr/>
+        </p:nvSpPr>
+        <p:spPr>
+          <a:xfrm>
+            <a:off x="5585585" y="2543632"/>
+            <a:ext cx="1702646" cy="297838"/>
+          </a:xfrm>
+          <a:prstGeom prst="borderCallout1">
+            <a:avLst>
+              <a:gd name="adj1" fmla="val 65920"/>
+              <a:gd name="adj2" fmla="val -6353"/>
+              <a:gd name="adj3" fmla="val 63929"/>
+              <a:gd name="adj4" fmla="val -38333"/>
+            </a:avLst>
+          </a:prstGeom>
+        </p:spPr>
+        <p:style>
+          <a:lnRef idx="1">
+            <a:schemeClr val="accent5"/>
+          </a:lnRef>
+          <a:fillRef idx="2">
+            <a:schemeClr val="accent5"/>
+          </a:fillRef>
+          <a:effectRef idx="1">
+            <a:schemeClr val="accent5"/>
+          </a:effectRef>
+          <a:fontRef idx="minor">
+            <a:schemeClr val="dk1"/>
+          </a:fontRef>
+        </p:style>
+        <p:txBody>
+          <a:bodyPr rtlCol="0" anchor="ctr"/>
+          <a:lstStyle/>
+          <a:p>
+            <a:pPr algn="ctr"/>
+            <a:r>
+              <a:rPr lang="en-US" sz="1200" dirty="0" smtClean="0"/>
+              <a:t>Array: named grouping</a:t>
+            </a:r>
+            <a:endParaRPr lang="en-US" sz="1200" dirty="0"/>
+          </a:p>
+        </p:txBody>
+      </p:sp>
+      <p:sp>
+        <p:nvSpPr>
+          <p:cNvPr id="13" name="Rounded Rectangle 12"/>
+          <p:cNvSpPr/>
+          <p:nvPr/>
+        </p:nvSpPr>
+        <p:spPr>
+          <a:xfrm>
+            <a:off x="2642432" y="2561161"/>
+            <a:ext cx="292203" cy="297838"/>
+          </a:xfrm>
+          <a:prstGeom prst="roundRect">
+            <a:avLst/>
+          </a:prstGeom>
+          <a:scene3d>
+            <a:camera prst="orthographicFront"/>
+            <a:lightRig rig="threePt" dir="t"/>
+          </a:scene3d>
+          <a:sp3d>
+            <a:bevelT w="152400" h="50800" prst="softRound"/>
+          </a:sp3d>
+        </p:spPr>
+        <p:style>
+          <a:lnRef idx="1">
+            <a:schemeClr val="accent1"/>
+          </a:lnRef>
+          <a:fillRef idx="3">
+            <a:schemeClr val="accent1"/>
+          </a:fillRef>
+          <a:effectRef idx="2">
+            <a:schemeClr val="accent1"/>
+          </a:effectRef>
+          <a:fontRef idx="minor">
+            <a:schemeClr val="lt1"/>
+          </a:fontRef>
+        </p:style>
+        <p:txBody>
+          <a:bodyPr rtlCol="0" anchor="ctr"/>
+          <a:lstStyle/>
+          <a:p>
+            <a:pPr algn="ctr"/>
+            <a:endParaRPr lang="en-US"/>
+          </a:p>
+        </p:txBody>
+      </p:sp>
+      <p:sp>
+        <p:nvSpPr>
+          <p:cNvPr id="14" name="Rounded Rectangle 13"/>
+          <p:cNvSpPr/>
+          <p:nvPr/>
+        </p:nvSpPr>
+        <p:spPr>
+          <a:xfrm>
+            <a:off x="2997127" y="2561161"/>
+            <a:ext cx="292203" cy="297838"/>
+          </a:xfrm>
+          <a:prstGeom prst="roundRect">
+            <a:avLst/>
+          </a:prstGeom>
+          <a:scene3d>
+            <a:camera prst="orthographicFront"/>
+            <a:lightRig rig="threePt" dir="t"/>
+          </a:scene3d>
+          <a:sp3d>
+            <a:bevelT w="152400" h="50800" prst="softRound"/>
+          </a:sp3d>
+        </p:spPr>
+        <p:style>
+          <a:lnRef idx="1">
+            <a:schemeClr val="accent1"/>
+          </a:lnRef>
+          <a:fillRef idx="3">
+            <a:schemeClr val="accent1"/>
+          </a:fillRef>
+          <a:effectRef idx="2">
+            <a:schemeClr val="accent1"/>
+          </a:effectRef>
+          <a:fontRef idx="minor">
+            <a:schemeClr val="lt1"/>
+          </a:fontRef>
+        </p:style>
+        <p:txBody>
+          <a:bodyPr rtlCol="0" anchor="ctr"/>
+          <a:lstStyle/>
+          <a:p>
+            <a:pPr algn="ctr"/>
+            <a:endParaRPr lang="en-US"/>
+          </a:p>
+        </p:txBody>
+      </p:sp>
+      <p:sp>
+        <p:nvSpPr>
+          <p:cNvPr id="15" name="Rounded Rectangle 14"/>
+          <p:cNvSpPr/>
+          <p:nvPr/>
+        </p:nvSpPr>
+        <p:spPr>
+          <a:xfrm>
+            <a:off x="3351822" y="2561161"/>
+            <a:ext cx="292203" cy="297838"/>
+          </a:xfrm>
+          <a:prstGeom prst="roundRect">
+            <a:avLst/>
+          </a:prstGeom>
+          <a:scene3d>
+            <a:camera prst="orthographicFront"/>
+            <a:lightRig rig="threePt" dir="t"/>
+          </a:scene3d>
+          <a:sp3d>
+            <a:bevelT w="152400" h="50800" prst="softRound"/>
+          </a:sp3d>
+        </p:spPr>
+        <p:style>
+          <a:lnRef idx="1">
+            <a:schemeClr val="accent1"/>
+          </a:lnRef>
+          <a:fillRef idx="3">
+            <a:schemeClr val="accent1"/>
+          </a:fillRef>
+          <a:effectRef idx="2">
+            <a:schemeClr val="accent1"/>
+          </a:effectRef>
+          <a:fontRef idx="minor">
+            <a:schemeClr val="lt1"/>
+          </a:fontRef>
+        </p:style>
+        <p:txBody>
+          <a:bodyPr rtlCol="0" anchor="ctr"/>
+          <a:lstStyle/>
+          <a:p>
+            <a:pPr algn="ctr"/>
+            <a:endParaRPr lang="en-US"/>
+          </a:p>
+        </p:txBody>
+      </p:sp>
+      <p:sp>
+        <p:nvSpPr>
+          <p:cNvPr id="16" name="Rounded Rectangle 15"/>
+          <p:cNvSpPr/>
+          <p:nvPr/>
+        </p:nvSpPr>
+        <p:spPr>
+          <a:xfrm>
+            <a:off x="3706517" y="2561161"/>
+            <a:ext cx="292203" cy="297838"/>
+          </a:xfrm>
+          <a:prstGeom prst="roundRect">
+            <a:avLst/>
+          </a:prstGeom>
+          <a:scene3d>
+            <a:camera prst="orthographicFront"/>
+            <a:lightRig rig="threePt" dir="t"/>
+          </a:scene3d>
+          <a:sp3d>
+            <a:bevelT w="152400" h="50800" prst="softRound"/>
+          </a:sp3d>
+        </p:spPr>
+        <p:style>
+          <a:lnRef idx="1">
+            <a:schemeClr val="accent1"/>
+          </a:lnRef>
+          <a:fillRef idx="3">
+            <a:schemeClr val="accent1"/>
+          </a:fillRef>
+          <a:effectRef idx="2">
+            <a:schemeClr val="accent1"/>
+          </a:effectRef>
+          <a:fontRef idx="minor">
+            <a:schemeClr val="lt1"/>
+          </a:fontRef>
+        </p:style>
+        <p:txBody>
+          <a:bodyPr rtlCol="0" anchor="ctr"/>
+          <a:lstStyle/>
+          <a:p>
+            <a:pPr algn="ctr"/>
+            <a:endParaRPr lang="en-US"/>
+          </a:p>
+        </p:txBody>
+      </p:sp>
+      <p:sp>
+        <p:nvSpPr>
+          <p:cNvPr id="17" name="Rounded Rectangle 16"/>
+          <p:cNvSpPr/>
+          <p:nvPr/>
+        </p:nvSpPr>
+        <p:spPr>
+          <a:xfrm>
+            <a:off x="4061212" y="2561161"/>
+            <a:ext cx="292203" cy="297838"/>
+          </a:xfrm>
+          <a:prstGeom prst="roundRect">
+            <a:avLst/>
+          </a:prstGeom>
+          <a:scene3d>
+            <a:camera prst="orthographicFront"/>
+            <a:lightRig rig="threePt" dir="t"/>
+          </a:scene3d>
+          <a:sp3d>
+            <a:bevelT w="152400" h="50800" prst="softRound"/>
+          </a:sp3d>
+        </p:spPr>
+        <p:style>
+          <a:lnRef idx="1">
+            <a:schemeClr val="accent1"/>
+          </a:lnRef>
+          <a:fillRef idx="3">
+            <a:schemeClr val="accent1"/>
+          </a:fillRef>
+          <a:effectRef idx="2">
+            <a:schemeClr val="accent1"/>
+          </a:effectRef>
+          <a:fontRef idx="minor">
+            <a:schemeClr val="lt1"/>
+          </a:fontRef>
+        </p:style>
+        <p:txBody>
+          <a:bodyPr rtlCol="0" anchor="ctr"/>
+          <a:lstStyle/>
+          <a:p>
+            <a:pPr algn="ctr"/>
+            <a:endParaRPr lang="en-US"/>
+          </a:p>
+        </p:txBody>
+      </p:sp>
+      <p:sp>
+        <p:nvSpPr>
+          <p:cNvPr id="18" name="Rounded Rectangle 17"/>
+          <p:cNvSpPr/>
+          <p:nvPr/>
+        </p:nvSpPr>
+        <p:spPr>
+          <a:xfrm>
+            <a:off x="4415907" y="2561161"/>
+            <a:ext cx="292203" cy="297838"/>
+          </a:xfrm>
+          <a:prstGeom prst="roundRect">
+            <a:avLst/>
+          </a:prstGeom>
+          <a:scene3d>
+            <a:camera prst="orthographicFront"/>
+            <a:lightRig rig="threePt" dir="t"/>
+          </a:scene3d>
+          <a:sp3d>
+            <a:bevelT w="152400" h="50800" prst="softRound"/>
+          </a:sp3d>
+        </p:spPr>
+        <p:style>
+          <a:lnRef idx="1">
+            <a:schemeClr val="accent1"/>
+          </a:lnRef>
+          <a:fillRef idx="3">
+            <a:schemeClr val="accent1"/>
+          </a:fillRef>
+          <a:effectRef idx="2">
+            <a:schemeClr val="accent1"/>
+          </a:effectRef>
+          <a:fontRef idx="minor">
+            <a:schemeClr val="lt1"/>
+          </a:fontRef>
+        </p:style>
+        <p:txBody>
+          <a:bodyPr rtlCol="0" anchor="ctr"/>
+          <a:lstStyle/>
+          <a:p>
+            <a:pPr algn="ctr"/>
+            <a:endParaRPr lang="en-US"/>
+          </a:p>
+        </p:txBody>
+      </p:sp>
+      <p:sp>
+        <p:nvSpPr>
+          <p:cNvPr id="19" name="Rectangle 18"/>
+          <p:cNvSpPr/>
+          <p:nvPr/>
+        </p:nvSpPr>
+        <p:spPr>
+          <a:xfrm>
+            <a:off x="2537703" y="3597204"/>
+            <a:ext cx="2278038" cy="696158"/>
+          </a:xfrm>
+          <a:prstGeom prst="rect">
+            <a:avLst/>
+          </a:prstGeom>
+        </p:spPr>
+        <p:style>
+          <a:lnRef idx="2">
+            <a:schemeClr val="accent2">
+              <a:shade val="50000"/>
+            </a:schemeClr>
+          </a:lnRef>
+          <a:fillRef idx="1">
+            <a:schemeClr val="accent2"/>
+          </a:fillRef>
+          <a:effectRef idx="0">
+            <a:schemeClr val="accent2"/>
+          </a:effectRef>
+          <a:fontRef idx="minor">
+            <a:schemeClr val="lt1"/>
+          </a:fontRef>
+        </p:style>
+        <p:txBody>
+          <a:bodyPr rtlCol="0" anchor="ctr"/>
+          <a:lstStyle/>
+          <a:p>
+            <a:pPr algn="ctr"/>
+            <a:endParaRPr lang="en-US"/>
+          </a:p>
+        </p:txBody>
+      </p:sp>
+      <p:sp>
+        <p:nvSpPr>
+          <p:cNvPr id="20" name="Rounded Rectangle 19"/>
+          <p:cNvSpPr/>
+          <p:nvPr/>
+        </p:nvSpPr>
+        <p:spPr>
+          <a:xfrm>
+            <a:off x="2642432" y="3668119"/>
+            <a:ext cx="292203" cy="297838"/>
+          </a:xfrm>
+          <a:prstGeom prst="roundRect">
+            <a:avLst/>
+          </a:prstGeom>
+          <a:scene3d>
+            <a:camera prst="orthographicFront"/>
+            <a:lightRig rig="threePt" dir="t"/>
+          </a:scene3d>
+          <a:sp3d>
+            <a:bevelT w="152400" h="50800" prst="softRound"/>
+          </a:sp3d>
+        </p:spPr>
+        <p:style>
+          <a:lnRef idx="1">
+            <a:schemeClr val="accent1"/>
+          </a:lnRef>
+          <a:fillRef idx="3">
+            <a:schemeClr val="accent1"/>
+          </a:fillRef>
+          <a:effectRef idx="2">
+            <a:schemeClr val="accent1"/>
+          </a:effectRef>
+          <a:fontRef idx="minor">
+            <a:schemeClr val="lt1"/>
+          </a:fontRef>
+        </p:style>
+        <p:txBody>
+          <a:bodyPr rtlCol="0" anchor="ctr"/>
+          <a:lstStyle/>
+          <a:p>
+            <a:pPr algn="ctr"/>
+            <a:endParaRPr lang="en-US"/>
+          </a:p>
+        </p:txBody>
+      </p:sp>
+      <p:sp>
+        <p:nvSpPr>
+          <p:cNvPr id="21" name="Rounded Rectangle 20"/>
+          <p:cNvSpPr/>
+          <p:nvPr/>
+        </p:nvSpPr>
+        <p:spPr>
+          <a:xfrm>
+            <a:off x="2997127" y="3668119"/>
+            <a:ext cx="292203" cy="297838"/>
+          </a:xfrm>
+          <a:prstGeom prst="roundRect">
+            <a:avLst/>
+          </a:prstGeom>
+          <a:scene3d>
+            <a:camera prst="orthographicFront"/>
+            <a:lightRig rig="threePt" dir="t"/>
+          </a:scene3d>
+          <a:sp3d>
+            <a:bevelT w="152400" h="50800" prst="softRound"/>
+          </a:sp3d>
+        </p:spPr>
+        <p:style>
+          <a:lnRef idx="1">
+            <a:schemeClr val="accent1"/>
+          </a:lnRef>
+          <a:fillRef idx="3">
+            <a:schemeClr val="accent1"/>
+          </a:fillRef>
+          <a:effectRef idx="2">
+            <a:schemeClr val="accent1"/>
+          </a:effectRef>
+          <a:fontRef idx="minor">
+            <a:schemeClr val="lt1"/>
+          </a:fontRef>
+        </p:style>
+        <p:txBody>
+          <a:bodyPr rtlCol="0" anchor="ctr"/>
+          <a:lstStyle/>
+          <a:p>
+            <a:pPr algn="ctr"/>
+            <a:endParaRPr lang="en-US"/>
+          </a:p>
+        </p:txBody>
+      </p:sp>
+      <p:sp>
+        <p:nvSpPr>
+          <p:cNvPr id="22" name="Rounded Rectangle 21"/>
+          <p:cNvSpPr/>
+          <p:nvPr/>
+        </p:nvSpPr>
+        <p:spPr>
+          <a:xfrm>
+            <a:off x="3351822" y="3668119"/>
+            <a:ext cx="292203" cy="297838"/>
+          </a:xfrm>
+          <a:prstGeom prst="roundRect">
+            <a:avLst/>
+          </a:prstGeom>
+          <a:scene3d>
+            <a:camera prst="orthographicFront"/>
+            <a:lightRig rig="threePt" dir="t"/>
+          </a:scene3d>
+          <a:sp3d>
+            <a:bevelT w="152400" h="50800" prst="softRound"/>
+          </a:sp3d>
+        </p:spPr>
+        <p:style>
+          <a:lnRef idx="1">
+            <a:schemeClr val="accent1"/>
+          </a:lnRef>
+          <a:fillRef idx="3">
+            <a:schemeClr val="accent1"/>
+          </a:fillRef>
+          <a:effectRef idx="2">
+            <a:schemeClr val="accent1"/>
+          </a:effectRef>
+          <a:fontRef idx="minor">
+            <a:schemeClr val="lt1"/>
+          </a:fontRef>
+        </p:style>
+        <p:txBody>
+          <a:bodyPr rtlCol="0" anchor="ctr"/>
+          <a:lstStyle/>
+          <a:p>
+            <a:pPr algn="ctr"/>
+            <a:endParaRPr lang="en-US"/>
+          </a:p>
+        </p:txBody>
+      </p:sp>
+      <p:sp>
+        <p:nvSpPr>
+          <p:cNvPr id="23" name="Rounded Rectangle 22"/>
+          <p:cNvSpPr/>
+          <p:nvPr/>
+        </p:nvSpPr>
+        <p:spPr>
+          <a:xfrm>
+            <a:off x="3706517" y="3668119"/>
+            <a:ext cx="292203" cy="297838"/>
+          </a:xfrm>
+          <a:prstGeom prst="roundRect">
+            <a:avLst/>
+          </a:prstGeom>
+          <a:scene3d>
+            <a:camera prst="orthographicFront"/>
+            <a:lightRig rig="threePt" dir="t"/>
+          </a:scene3d>
+          <a:sp3d>
+            <a:bevelT w="152400" h="50800" prst="softRound"/>
+          </a:sp3d>
+        </p:spPr>
+        <p:style>
+          <a:lnRef idx="1">
+            <a:schemeClr val="accent1"/>
+          </a:lnRef>
+          <a:fillRef idx="3">
+            <a:schemeClr val="accent1"/>
+          </a:fillRef>
+          <a:effectRef idx="2">
+            <a:schemeClr val="accent1"/>
+          </a:effectRef>
+          <a:fontRef idx="minor">
+            <a:schemeClr val="lt1"/>
+          </a:fontRef>
+        </p:style>
+        <p:txBody>
+          <a:bodyPr rtlCol="0" anchor="ctr"/>
+          <a:lstStyle/>
+          <a:p>
+            <a:pPr algn="ctr"/>
+            <a:endParaRPr lang="en-US"/>
+          </a:p>
+        </p:txBody>
+      </p:sp>
+      <p:sp>
+        <p:nvSpPr>
+          <p:cNvPr id="24" name="Rounded Rectangle 23"/>
+          <p:cNvSpPr/>
+          <p:nvPr/>
+        </p:nvSpPr>
+        <p:spPr>
+          <a:xfrm>
+            <a:off x="4061212" y="3668119"/>
+            <a:ext cx="292203" cy="297838"/>
+          </a:xfrm>
+          <a:prstGeom prst="roundRect">
+            <a:avLst/>
+          </a:prstGeom>
+          <a:scene3d>
+            <a:camera prst="orthographicFront"/>
+            <a:lightRig rig="threePt" dir="t"/>
+          </a:scene3d>
+          <a:sp3d>
+            <a:bevelT w="152400" h="50800" prst="softRound"/>
+          </a:sp3d>
+        </p:spPr>
+        <p:style>
+          <a:lnRef idx="1">
+            <a:schemeClr val="accent1"/>
+          </a:lnRef>
+          <a:fillRef idx="3">
+            <a:schemeClr val="accent1"/>
+          </a:fillRef>
+          <a:effectRef idx="2">
+            <a:schemeClr val="accent1"/>
+          </a:effectRef>
+          <a:fontRef idx="minor">
+            <a:schemeClr val="lt1"/>
+          </a:fontRef>
+        </p:style>
+        <p:txBody>
+          <a:bodyPr rtlCol="0" anchor="ctr"/>
+          <a:lstStyle/>
+          <a:p>
+            <a:pPr algn="ctr"/>
+            <a:endParaRPr lang="en-US"/>
+          </a:p>
+        </p:txBody>
+      </p:sp>
+      <p:sp>
+        <p:nvSpPr>
+          <p:cNvPr id="25" name="Rounded Rectangle 24"/>
+          <p:cNvSpPr/>
+          <p:nvPr/>
+        </p:nvSpPr>
+        <p:spPr>
+          <a:xfrm>
+            <a:off x="4415907" y="3668119"/>
+            <a:ext cx="292203" cy="297838"/>
+          </a:xfrm>
+          <a:prstGeom prst="roundRect">
+            <a:avLst/>
+          </a:prstGeom>
+          <a:scene3d>
+            <a:camera prst="orthographicFront"/>
+            <a:lightRig rig="threePt" dir="t"/>
+          </a:scene3d>
+          <a:sp3d>
+            <a:bevelT w="152400" h="50800" prst="softRound"/>
+          </a:sp3d>
+        </p:spPr>
+        <p:style>
+          <a:lnRef idx="1">
+            <a:schemeClr val="accent1"/>
+          </a:lnRef>
+          <a:fillRef idx="3">
+            <a:schemeClr val="accent1"/>
+          </a:fillRef>
+          <a:effectRef idx="2">
+            <a:schemeClr val="accent1"/>
+          </a:effectRef>
+          <a:fontRef idx="minor">
+            <a:schemeClr val="lt1"/>
+          </a:fontRef>
+        </p:style>
+        <p:txBody>
+          <a:bodyPr rtlCol="0" anchor="ctr"/>
+          <a:lstStyle/>
+          <a:p>
+            <a:pPr algn="ctr"/>
+            <a:endParaRPr lang="en-US"/>
+          </a:p>
+        </p:txBody>
+      </p:sp>
+      <p:sp>
+        <p:nvSpPr>
+          <p:cNvPr id="26" name="TextBox 25"/>
+          <p:cNvSpPr txBox="1"/>
+          <p:nvPr/>
+        </p:nvSpPr>
+        <p:spPr>
+          <a:xfrm>
+            <a:off x="2642432" y="4047141"/>
+            <a:ext cx="292203" cy="246221"/>
+          </a:xfrm>
+          <a:prstGeom prst="rect">
+            <a:avLst/>
+          </a:prstGeom>
+          <a:noFill/>
+        </p:spPr>
+        <p:txBody>
+          <a:bodyPr wrap="square" rtlCol="0">
+            <a:spAutoFit/>
+          </a:bodyPr>
+          <a:lstStyle/>
+          <a:p>
+            <a:r>
+              <a:rPr lang="en-US" sz="1000" dirty="0" smtClean="0"/>
+              <a:t>0</a:t>
+            </a:r>
+            <a:endParaRPr lang="en-US" sz="1000" dirty="0"/>
+          </a:p>
+        </p:txBody>
+      </p:sp>
+      <p:sp>
+        <p:nvSpPr>
+          <p:cNvPr id="27" name="TextBox 26"/>
+          <p:cNvSpPr txBox="1"/>
+          <p:nvPr/>
+        </p:nvSpPr>
+        <p:spPr>
+          <a:xfrm>
+            <a:off x="2997127" y="4047141"/>
+            <a:ext cx="292203" cy="246221"/>
+          </a:xfrm>
+          <a:prstGeom prst="rect">
+            <a:avLst/>
+          </a:prstGeom>
+          <a:noFill/>
+        </p:spPr>
+        <p:txBody>
+          <a:bodyPr wrap="square" rtlCol="0">
+            <a:spAutoFit/>
+          </a:bodyPr>
+          <a:lstStyle/>
+          <a:p>
+            <a:r>
+              <a:rPr lang="en-US" sz="1000" dirty="0" smtClean="0"/>
+              <a:t>1</a:t>
+            </a:r>
+            <a:endParaRPr lang="en-US" sz="1000" dirty="0"/>
+          </a:p>
+        </p:txBody>
+      </p:sp>
+      <p:sp>
+        <p:nvSpPr>
+          <p:cNvPr id="28" name="TextBox 27"/>
+          <p:cNvSpPr txBox="1"/>
+          <p:nvPr/>
+        </p:nvSpPr>
+        <p:spPr>
+          <a:xfrm>
+            <a:off x="3351822" y="4047141"/>
+            <a:ext cx="292203" cy="246221"/>
+          </a:xfrm>
+          <a:prstGeom prst="rect">
+            <a:avLst/>
+          </a:prstGeom>
+          <a:noFill/>
+        </p:spPr>
+        <p:txBody>
+          <a:bodyPr wrap="square" rtlCol="0">
+            <a:spAutoFit/>
+          </a:bodyPr>
+          <a:lstStyle/>
+          <a:p>
+            <a:r>
+              <a:rPr lang="en-US" sz="1000" dirty="0" smtClean="0"/>
+              <a:t>2</a:t>
+            </a:r>
+            <a:endParaRPr lang="en-US" sz="1000" dirty="0"/>
+          </a:p>
+        </p:txBody>
+      </p:sp>
+      <p:sp>
+        <p:nvSpPr>
+          <p:cNvPr id="29" name="TextBox 28"/>
+          <p:cNvSpPr txBox="1"/>
+          <p:nvPr/>
+        </p:nvSpPr>
+        <p:spPr>
+          <a:xfrm>
+            <a:off x="3706517" y="4047141"/>
+            <a:ext cx="292203" cy="246221"/>
+          </a:xfrm>
+          <a:prstGeom prst="rect">
+            <a:avLst/>
+          </a:prstGeom>
+          <a:noFill/>
+        </p:spPr>
+        <p:txBody>
+          <a:bodyPr wrap="square" rtlCol="0">
+            <a:spAutoFit/>
+          </a:bodyPr>
+          <a:lstStyle/>
+          <a:p>
+            <a:r>
+              <a:rPr lang="en-US" sz="1000" dirty="0" smtClean="0"/>
+              <a:t>3</a:t>
+            </a:r>
+            <a:endParaRPr lang="en-US" sz="1000" dirty="0"/>
+          </a:p>
+        </p:txBody>
+      </p:sp>
+      <p:sp>
+        <p:nvSpPr>
+          <p:cNvPr id="30" name="TextBox 29"/>
+          <p:cNvSpPr txBox="1"/>
+          <p:nvPr/>
+        </p:nvSpPr>
+        <p:spPr>
+          <a:xfrm>
+            <a:off x="4061212" y="4047141"/>
+            <a:ext cx="292203" cy="246221"/>
+          </a:xfrm>
+          <a:prstGeom prst="rect">
+            <a:avLst/>
+          </a:prstGeom>
+          <a:noFill/>
+        </p:spPr>
+        <p:txBody>
+          <a:bodyPr wrap="square" rtlCol="0">
+            <a:spAutoFit/>
+          </a:bodyPr>
+          <a:lstStyle/>
+          <a:p>
+            <a:r>
+              <a:rPr lang="en-US" sz="1000" dirty="0" smtClean="0"/>
+              <a:t>4</a:t>
+            </a:r>
+            <a:endParaRPr lang="en-US" sz="1000" dirty="0"/>
+          </a:p>
+        </p:txBody>
+      </p:sp>
+      <p:sp>
+        <p:nvSpPr>
+          <p:cNvPr id="31" name="TextBox 30"/>
+          <p:cNvSpPr txBox="1"/>
+          <p:nvPr/>
+        </p:nvSpPr>
+        <p:spPr>
+          <a:xfrm>
+            <a:off x="4415907" y="4047141"/>
+            <a:ext cx="292203" cy="246221"/>
+          </a:xfrm>
+          <a:prstGeom prst="rect">
+            <a:avLst/>
+          </a:prstGeom>
+          <a:noFill/>
+        </p:spPr>
+        <p:txBody>
+          <a:bodyPr wrap="square" rtlCol="0">
+            <a:spAutoFit/>
+          </a:bodyPr>
+          <a:lstStyle/>
+          <a:p>
+            <a:r>
+              <a:rPr lang="en-US" sz="1000" dirty="0" smtClean="0"/>
+              <a:t>5</a:t>
+            </a:r>
+            <a:endParaRPr lang="en-US" sz="1000" dirty="0"/>
+          </a:p>
+        </p:txBody>
+      </p:sp>
+      <p:sp>
+        <p:nvSpPr>
+          <p:cNvPr id="32" name="Line Callout 1 31"/>
+          <p:cNvSpPr/>
+          <p:nvPr/>
+        </p:nvSpPr>
+        <p:spPr>
+          <a:xfrm>
+            <a:off x="5585585" y="3965957"/>
+            <a:ext cx="1702646" cy="297838"/>
+          </a:xfrm>
+          <a:prstGeom prst="borderCallout1">
+            <a:avLst>
+              <a:gd name="adj1" fmla="val 79127"/>
+              <a:gd name="adj2" fmla="val -6023"/>
+              <a:gd name="adj3" fmla="val 79023"/>
+              <a:gd name="adj4" fmla="val -36683"/>
+            </a:avLst>
+          </a:prstGeom>
+        </p:spPr>
+        <p:style>
+          <a:lnRef idx="1">
+            <a:schemeClr val="accent5"/>
+          </a:lnRef>
+          <a:fillRef idx="2">
+            <a:schemeClr val="accent5"/>
+          </a:fillRef>
+          <a:effectRef idx="1">
+            <a:schemeClr val="accent5"/>
+          </a:effectRef>
+          <a:fontRef idx="minor">
+            <a:schemeClr val="dk1"/>
+          </a:fontRef>
+        </p:style>
+        <p:txBody>
+          <a:bodyPr rtlCol="0" anchor="ctr"/>
+          <a:lstStyle/>
+          <a:p>
+            <a:pPr algn="ctr"/>
+            <a:r>
+              <a:rPr lang="en-US" sz="1200" dirty="0" smtClean="0"/>
+              <a:t>Index: element address</a:t>
+            </a:r>
+            <a:endParaRPr lang="en-US" sz="1200" dirty="0"/>
+          </a:p>
+        </p:txBody>
+      </p:sp>
+      <p:sp>
+        <p:nvSpPr>
+          <p:cNvPr id="33" name="Rectangle 32"/>
+          <p:cNvSpPr/>
+          <p:nvPr/>
+        </p:nvSpPr>
+        <p:spPr>
+          <a:xfrm>
+            <a:off x="1904945" y="4845423"/>
+            <a:ext cx="2910796" cy="696158"/>
+          </a:xfrm>
+          <a:prstGeom prst="rect">
+            <a:avLst/>
+          </a:prstGeom>
+        </p:spPr>
+        <p:style>
+          <a:lnRef idx="2">
+            <a:schemeClr val="accent2">
+              <a:shade val="50000"/>
+            </a:schemeClr>
+          </a:lnRef>
+          <a:fillRef idx="1">
+            <a:schemeClr val="accent2"/>
+          </a:fillRef>
+          <a:effectRef idx="0">
+            <a:schemeClr val="accent2"/>
+          </a:effectRef>
+          <a:fontRef idx="minor">
+            <a:schemeClr val="lt1"/>
+          </a:fontRef>
+        </p:style>
+        <p:txBody>
+          <a:bodyPr rtlCol="0" anchor="ctr"/>
+          <a:lstStyle/>
+          <a:p>
+            <a:pPr algn="ctr"/>
+            <a:endParaRPr lang="en-US"/>
+          </a:p>
+        </p:txBody>
+      </p:sp>
+      <p:sp>
+        <p:nvSpPr>
+          <p:cNvPr id="34" name="Rounded Rectangle 33"/>
+          <p:cNvSpPr/>
+          <p:nvPr/>
+        </p:nvSpPr>
+        <p:spPr>
+          <a:xfrm>
+            <a:off x="2642432" y="4916338"/>
+            <a:ext cx="292203" cy="297838"/>
+          </a:xfrm>
+          <a:prstGeom prst="roundRect">
+            <a:avLst/>
+          </a:prstGeom>
+          <a:scene3d>
+            <a:camera prst="orthographicFront"/>
+            <a:lightRig rig="threePt" dir="t"/>
+          </a:scene3d>
+          <a:sp3d>
+            <a:bevelT w="152400" h="50800" prst="softRound"/>
+          </a:sp3d>
+        </p:spPr>
+        <p:style>
+          <a:lnRef idx="1">
+            <a:schemeClr val="accent1"/>
+          </a:lnRef>
+          <a:fillRef idx="3">
+            <a:schemeClr val="accent1"/>
+          </a:fillRef>
+          <a:effectRef idx="2">
+            <a:schemeClr val="accent1"/>
+          </a:effectRef>
+          <a:fontRef idx="minor">
+            <a:schemeClr val="lt1"/>
+          </a:fontRef>
+        </p:style>
+        <p:txBody>
+          <a:bodyPr rtlCol="0" anchor="ctr"/>
+          <a:lstStyle/>
+          <a:p>
+            <a:pPr algn="ctr"/>
+            <a:endParaRPr lang="en-US"/>
+          </a:p>
+        </p:txBody>
+      </p:sp>
+      <p:sp>
+        <p:nvSpPr>
+          <p:cNvPr id="35" name="Rounded Rectangle 34"/>
+          <p:cNvSpPr/>
+          <p:nvPr/>
+        </p:nvSpPr>
+        <p:spPr>
+          <a:xfrm>
+            <a:off x="2997127" y="4916338"/>
+            <a:ext cx="292203" cy="297838"/>
+          </a:xfrm>
+          <a:prstGeom prst="roundRect">
+            <a:avLst/>
+          </a:prstGeom>
+          <a:scene3d>
+            <a:camera prst="orthographicFront"/>
+            <a:lightRig rig="threePt" dir="t"/>
+          </a:scene3d>
+          <a:sp3d>
+            <a:bevelT w="152400" h="50800" prst="softRound"/>
+          </a:sp3d>
+        </p:spPr>
+        <p:style>
+          <a:lnRef idx="1">
+            <a:schemeClr val="accent1"/>
+          </a:lnRef>
+          <a:fillRef idx="3">
+            <a:schemeClr val="accent1"/>
+          </a:fillRef>
+          <a:effectRef idx="2">
+            <a:schemeClr val="accent1"/>
+          </a:effectRef>
+          <a:fontRef idx="minor">
+            <a:schemeClr val="lt1"/>
+          </a:fontRef>
+        </p:style>
+        <p:txBody>
+          <a:bodyPr rtlCol="0" anchor="ctr"/>
+          <a:lstStyle/>
+          <a:p>
+            <a:pPr algn="ctr"/>
+            <a:endParaRPr lang="en-US"/>
+          </a:p>
+        </p:txBody>
+      </p:sp>
+      <p:sp>
+        <p:nvSpPr>
+          <p:cNvPr id="36" name="Rounded Rectangle 35"/>
+          <p:cNvSpPr/>
+          <p:nvPr/>
+        </p:nvSpPr>
+        <p:spPr>
+          <a:xfrm>
+            <a:off x="3351822" y="4916338"/>
+            <a:ext cx="292203" cy="297838"/>
+          </a:xfrm>
+          <a:prstGeom prst="roundRect">
+            <a:avLst/>
+          </a:prstGeom>
+          <a:scene3d>
+            <a:camera prst="orthographicFront"/>
+            <a:lightRig rig="threePt" dir="t"/>
+          </a:scene3d>
+          <a:sp3d>
+            <a:bevelT w="152400" h="50800" prst="softRound"/>
+          </a:sp3d>
+        </p:spPr>
+        <p:style>
+          <a:lnRef idx="1">
+            <a:schemeClr val="accent1"/>
+          </a:lnRef>
+          <a:fillRef idx="3">
+            <a:schemeClr val="accent1"/>
+          </a:fillRef>
+          <a:effectRef idx="2">
+            <a:schemeClr val="accent1"/>
+          </a:effectRef>
+          <a:fontRef idx="minor">
+            <a:schemeClr val="lt1"/>
+          </a:fontRef>
+        </p:style>
+        <p:txBody>
+          <a:bodyPr rtlCol="0" anchor="ctr"/>
+          <a:lstStyle/>
+          <a:p>
+            <a:pPr algn="ctr"/>
+            <a:endParaRPr lang="en-US"/>
+          </a:p>
+        </p:txBody>
+      </p:sp>
+      <p:sp>
+        <p:nvSpPr>
+          <p:cNvPr id="37" name="Rounded Rectangle 36"/>
+          <p:cNvSpPr/>
+          <p:nvPr/>
+        </p:nvSpPr>
+        <p:spPr>
+          <a:xfrm>
+            <a:off x="3706517" y="4916338"/>
+            <a:ext cx="292203" cy="297838"/>
+          </a:xfrm>
+          <a:prstGeom prst="roundRect">
+            <a:avLst/>
+          </a:prstGeom>
+          <a:scene3d>
+            <a:camera prst="orthographicFront"/>
+            <a:lightRig rig="threePt" dir="t"/>
+          </a:scene3d>
+          <a:sp3d>
+            <a:bevelT w="152400" h="50800" prst="softRound"/>
+          </a:sp3d>
+        </p:spPr>
+        <p:style>
+          <a:lnRef idx="1">
+            <a:schemeClr val="accent1"/>
+          </a:lnRef>
+          <a:fillRef idx="3">
+            <a:schemeClr val="accent1"/>
+          </a:fillRef>
+          <a:effectRef idx="2">
+            <a:schemeClr val="accent1"/>
+          </a:effectRef>
+          <a:fontRef idx="minor">
+            <a:schemeClr val="lt1"/>
+          </a:fontRef>
+        </p:style>
+        <p:txBody>
+          <a:bodyPr rtlCol="0" anchor="ctr"/>
+          <a:lstStyle/>
+          <a:p>
+            <a:pPr algn="ctr"/>
+            <a:endParaRPr lang="en-US"/>
+          </a:p>
+        </p:txBody>
+      </p:sp>
+      <p:sp>
+        <p:nvSpPr>
+          <p:cNvPr id="38" name="Rounded Rectangle 37"/>
+          <p:cNvSpPr/>
+          <p:nvPr/>
+        </p:nvSpPr>
+        <p:spPr>
+          <a:xfrm>
+            <a:off x="4061212" y="4916338"/>
+            <a:ext cx="292203" cy="297838"/>
+          </a:xfrm>
+          <a:prstGeom prst="roundRect">
+            <a:avLst/>
+          </a:prstGeom>
+          <a:scene3d>
+            <a:camera prst="orthographicFront"/>
+            <a:lightRig rig="threePt" dir="t"/>
+          </a:scene3d>
+          <a:sp3d>
+            <a:bevelT w="152400" h="50800" prst="softRound"/>
+          </a:sp3d>
+        </p:spPr>
+        <p:style>
+          <a:lnRef idx="1">
+            <a:schemeClr val="accent1"/>
+          </a:lnRef>
+          <a:fillRef idx="3">
+            <a:schemeClr val="accent1"/>
+          </a:fillRef>
+          <a:effectRef idx="2">
+            <a:schemeClr val="accent1"/>
+          </a:effectRef>
+          <a:fontRef idx="minor">
+            <a:schemeClr val="lt1"/>
+          </a:fontRef>
+        </p:style>
+        <p:txBody>
+          <a:bodyPr rtlCol="0" anchor="ctr"/>
+          <a:lstStyle/>
+          <a:p>
+            <a:pPr algn="ctr"/>
+            <a:endParaRPr lang="en-US"/>
+          </a:p>
+        </p:txBody>
+      </p:sp>
+      <p:sp>
+        <p:nvSpPr>
+          <p:cNvPr id="39" name="Rounded Rectangle 38"/>
+          <p:cNvSpPr/>
+          <p:nvPr/>
+        </p:nvSpPr>
+        <p:spPr>
+          <a:xfrm>
+            <a:off x="4415907" y="4916338"/>
+            <a:ext cx="292203" cy="297838"/>
+          </a:xfrm>
+          <a:prstGeom prst="roundRect">
+            <a:avLst/>
+          </a:prstGeom>
+          <a:scene3d>
+            <a:camera prst="orthographicFront"/>
+            <a:lightRig rig="threePt" dir="t"/>
+          </a:scene3d>
+          <a:sp3d>
+            <a:bevelT w="152400" h="50800" prst="softRound"/>
+          </a:sp3d>
+        </p:spPr>
+        <p:style>
+          <a:lnRef idx="1">
+            <a:schemeClr val="accent1"/>
+          </a:lnRef>
+          <a:fillRef idx="3">
+            <a:schemeClr val="accent1"/>
+          </a:fillRef>
+          <a:effectRef idx="2">
+            <a:schemeClr val="accent1"/>
+          </a:effectRef>
+          <a:fontRef idx="minor">
+            <a:schemeClr val="lt1"/>
+          </a:fontRef>
+        </p:style>
+        <p:txBody>
+          <a:bodyPr rtlCol="0" anchor="ctr"/>
+          <a:lstStyle/>
+          <a:p>
+            <a:pPr algn="ctr"/>
+            <a:endParaRPr lang="en-US"/>
+          </a:p>
+        </p:txBody>
+      </p:sp>
+      <p:sp>
+        <p:nvSpPr>
+          <p:cNvPr id="40" name="TextBox 39"/>
+          <p:cNvSpPr txBox="1"/>
+          <p:nvPr/>
+        </p:nvSpPr>
+        <p:spPr>
+          <a:xfrm>
+            <a:off x="2642432" y="5295360"/>
+            <a:ext cx="292203" cy="246221"/>
+          </a:xfrm>
+          <a:prstGeom prst="rect">
+            <a:avLst/>
+          </a:prstGeom>
+          <a:noFill/>
+        </p:spPr>
+        <p:txBody>
+          <a:bodyPr wrap="square" rtlCol="0">
+            <a:spAutoFit/>
+          </a:bodyPr>
+          <a:lstStyle/>
+          <a:p>
+            <a:r>
+              <a:rPr lang="en-US" sz="1000" dirty="0" smtClean="0"/>
+              <a:t>0</a:t>
+            </a:r>
+            <a:endParaRPr lang="en-US" sz="1000" dirty="0"/>
+          </a:p>
+        </p:txBody>
+      </p:sp>
+      <p:sp>
+        <p:nvSpPr>
+          <p:cNvPr id="41" name="TextBox 40"/>
+          <p:cNvSpPr txBox="1"/>
+          <p:nvPr/>
+        </p:nvSpPr>
+        <p:spPr>
+          <a:xfrm>
+            <a:off x="2997127" y="5295360"/>
+            <a:ext cx="292203" cy="246221"/>
+          </a:xfrm>
+          <a:prstGeom prst="rect">
+            <a:avLst/>
+          </a:prstGeom>
+          <a:noFill/>
+        </p:spPr>
+        <p:txBody>
+          <a:bodyPr wrap="square" rtlCol="0">
+            <a:spAutoFit/>
+          </a:bodyPr>
+          <a:lstStyle/>
+          <a:p>
+            <a:r>
+              <a:rPr lang="en-US" sz="1000" dirty="0" smtClean="0"/>
+              <a:t>1</a:t>
+            </a:r>
+            <a:endParaRPr lang="en-US" sz="1000" dirty="0"/>
+          </a:p>
+        </p:txBody>
+      </p:sp>
+      <p:sp>
+        <p:nvSpPr>
+          <p:cNvPr id="42" name="TextBox 41"/>
+          <p:cNvSpPr txBox="1"/>
+          <p:nvPr/>
+        </p:nvSpPr>
+        <p:spPr>
+          <a:xfrm>
+            <a:off x="3351822" y="5295360"/>
+            <a:ext cx="292203" cy="246221"/>
+          </a:xfrm>
+          <a:prstGeom prst="rect">
+            <a:avLst/>
+          </a:prstGeom>
+          <a:noFill/>
+        </p:spPr>
+        <p:txBody>
+          <a:bodyPr wrap="square" rtlCol="0">
+            <a:spAutoFit/>
+          </a:bodyPr>
+          <a:lstStyle/>
+          <a:p>
+            <a:r>
+              <a:rPr lang="en-US" sz="1000" dirty="0" smtClean="0"/>
+              <a:t>2</a:t>
+            </a:r>
+            <a:endParaRPr lang="en-US" sz="1000" dirty="0"/>
+          </a:p>
+        </p:txBody>
+      </p:sp>
+      <p:sp>
+        <p:nvSpPr>
+          <p:cNvPr id="43" name="TextBox 42"/>
+          <p:cNvSpPr txBox="1"/>
+          <p:nvPr/>
+        </p:nvSpPr>
+        <p:spPr>
+          <a:xfrm>
+            <a:off x="3706517" y="5295360"/>
+            <a:ext cx="292203" cy="246221"/>
+          </a:xfrm>
+          <a:prstGeom prst="rect">
+            <a:avLst/>
+          </a:prstGeom>
+          <a:noFill/>
+        </p:spPr>
+        <p:txBody>
+          <a:bodyPr wrap="square" rtlCol="0">
+            <a:spAutoFit/>
+          </a:bodyPr>
+          <a:lstStyle/>
+          <a:p>
+            <a:r>
+              <a:rPr lang="en-US" sz="1000" dirty="0" smtClean="0"/>
+              <a:t>3</a:t>
+            </a:r>
+            <a:endParaRPr lang="en-US" sz="1000" dirty="0"/>
+          </a:p>
+        </p:txBody>
+      </p:sp>
+      <p:sp>
+        <p:nvSpPr>
+          <p:cNvPr id="44" name="TextBox 43"/>
+          <p:cNvSpPr txBox="1"/>
+          <p:nvPr/>
+        </p:nvSpPr>
+        <p:spPr>
+          <a:xfrm>
+            <a:off x="4061212" y="5295360"/>
+            <a:ext cx="292203" cy="246221"/>
+          </a:xfrm>
+          <a:prstGeom prst="rect">
+            <a:avLst/>
+          </a:prstGeom>
+          <a:noFill/>
+        </p:spPr>
+        <p:txBody>
+          <a:bodyPr wrap="square" rtlCol="0">
+            <a:spAutoFit/>
+          </a:bodyPr>
+          <a:lstStyle/>
+          <a:p>
+            <a:r>
+              <a:rPr lang="en-US" sz="1000" dirty="0" smtClean="0"/>
+              <a:t>4</a:t>
+            </a:r>
+            <a:endParaRPr lang="en-US" sz="1000" dirty="0"/>
+          </a:p>
+        </p:txBody>
+      </p:sp>
+      <p:sp>
+        <p:nvSpPr>
+          <p:cNvPr id="45" name="TextBox 44"/>
+          <p:cNvSpPr txBox="1"/>
+          <p:nvPr/>
+        </p:nvSpPr>
+        <p:spPr>
+          <a:xfrm>
+            <a:off x="4415907" y="5295360"/>
+            <a:ext cx="292203" cy="246221"/>
+          </a:xfrm>
+          <a:prstGeom prst="rect">
+            <a:avLst/>
+          </a:prstGeom>
+          <a:noFill/>
+        </p:spPr>
+        <p:txBody>
+          <a:bodyPr wrap="square" rtlCol="0">
+            <a:spAutoFit/>
+          </a:bodyPr>
+          <a:lstStyle/>
+          <a:p>
+            <a:r>
+              <a:rPr lang="en-US" sz="1000" dirty="0" smtClean="0"/>
+              <a:t>5</a:t>
+            </a:r>
+            <a:endParaRPr lang="en-US" sz="1000" dirty="0"/>
+          </a:p>
+        </p:txBody>
+      </p:sp>
+      <p:sp>
+        <p:nvSpPr>
+          <p:cNvPr id="46" name="Decagon 45"/>
+          <p:cNvSpPr/>
+          <p:nvPr/>
+        </p:nvSpPr>
+        <p:spPr>
+          <a:xfrm>
+            <a:off x="2090382" y="4950854"/>
+            <a:ext cx="286584" cy="263322"/>
+          </a:xfrm>
+          <a:prstGeom prst="decagon">
+            <a:avLst/>
+          </a:prstGeom>
+        </p:spPr>
+        <p:style>
+          <a:lnRef idx="1">
+            <a:schemeClr val="accent1"/>
+          </a:lnRef>
+          <a:fillRef idx="3">
+            <a:schemeClr val="accent1"/>
+          </a:fillRef>
+          <a:effectRef idx="2">
+            <a:schemeClr val="accent1"/>
+          </a:effectRef>
+          <a:fontRef idx="minor">
+            <a:schemeClr val="lt1"/>
+          </a:fontRef>
+        </p:style>
+        <p:txBody>
+          <a:bodyPr rtlCol="0" anchor="ctr"/>
+          <a:lstStyle/>
+          <a:p>
+            <a:pPr algn="ctr"/>
+            <a:r>
+              <a:rPr lang="en-US" sz="1100" dirty="0" smtClean="0"/>
+              <a:t>6</a:t>
+            </a:r>
+            <a:endParaRPr lang="en-US" sz="1100" dirty="0"/>
+          </a:p>
+        </p:txBody>
+      </p:sp>
+      <p:cxnSp>
+        <p:nvCxnSpPr>
+          <p:cNvPr id="48" name="Straight Connector 47"/>
+          <p:cNvCxnSpPr/>
+          <p:nvPr/>
+        </p:nvCxnSpPr>
+        <p:spPr>
+          <a:xfrm flipH="1">
+            <a:off x="2541099" y="4845423"/>
+            <a:ext cx="16858" cy="696158"/>
+          </a:xfrm>
+          <a:prstGeom prst="line">
+            <a:avLst/>
+          </a:prstGeom>
+          <a:ln>
+            <a:solidFill>
+              <a:srgbClr val="008000"/>
+            </a:solidFill>
+          </a:ln>
+        </p:spPr>
+        <p:style>
+          <a:lnRef idx="2">
+            <a:schemeClr val="accent1"/>
+          </a:lnRef>
+          <a:fillRef idx="0">
+            <a:schemeClr val="accent1"/>
+          </a:fillRef>
+          <a:effectRef idx="1">
+            <a:schemeClr val="accent1"/>
+          </a:effectRef>
+          <a:fontRef idx="minor">
+            <a:schemeClr val="tx1"/>
+          </a:fontRef>
+        </p:style>
+      </p:cxnSp>
+      <p:sp>
+        <p:nvSpPr>
+          <p:cNvPr id="49" name="TextBox 48"/>
+          <p:cNvSpPr txBox="1"/>
+          <p:nvPr/>
+        </p:nvSpPr>
+        <p:spPr>
+          <a:xfrm>
+            <a:off x="1904946" y="5295360"/>
+            <a:ext cx="632758" cy="246221"/>
+          </a:xfrm>
+          <a:prstGeom prst="rect">
+            <a:avLst/>
+          </a:prstGeom>
+          <a:noFill/>
+        </p:spPr>
+        <p:txBody>
+          <a:bodyPr wrap="square" rtlCol="0">
+            <a:spAutoFit/>
+          </a:bodyPr>
+          <a:lstStyle/>
+          <a:p>
+            <a:pPr algn="ctr"/>
+            <a:r>
+              <a:rPr lang="en-US" sz="1000" dirty="0" smtClean="0"/>
+              <a:t>length</a:t>
+            </a:r>
+            <a:endParaRPr lang="en-US" sz="1000" dirty="0"/>
+          </a:p>
+        </p:txBody>
+      </p:sp>
+      <p:sp>
+        <p:nvSpPr>
+          <p:cNvPr id="50" name="TextBox 49"/>
+          <p:cNvSpPr txBox="1"/>
+          <p:nvPr/>
+        </p:nvSpPr>
+        <p:spPr>
+          <a:xfrm>
+            <a:off x="3178167" y="2920146"/>
+            <a:ext cx="1056700" cy="369332"/>
+          </a:xfrm>
+          <a:prstGeom prst="rect">
+            <a:avLst/>
+          </a:prstGeom>
+          <a:noFill/>
+        </p:spPr>
+        <p:txBody>
+          <a:bodyPr wrap="none" rtlCol="0">
+            <a:spAutoFit/>
+          </a:bodyPr>
+          <a:lstStyle/>
+          <a:p>
+            <a:r>
+              <a:rPr lang="en-US" dirty="0" smtClean="0"/>
+              <a:t>Elements</a:t>
+            </a:r>
+            <a:endParaRPr lang="en-US" dirty="0"/>
+          </a:p>
+        </p:txBody>
+      </p:sp>
+      <p:cxnSp>
+        <p:nvCxnSpPr>
+          <p:cNvPr id="52" name="Elbow Connector 51"/>
+          <p:cNvCxnSpPr>
+            <a:endCxn id="13" idx="2"/>
+          </p:cNvCxnSpPr>
+          <p:nvPr/>
+        </p:nvCxnSpPr>
+        <p:spPr>
+          <a:xfrm rot="10800000">
+            <a:off x="2788535" y="2859000"/>
+            <a:ext cx="389633" cy="245811"/>
+          </a:xfrm>
+          <a:prstGeom prst="bentConnector2">
+            <a:avLst/>
+          </a:prstGeom>
+          <a:ln>
+            <a:tailEnd type="arrow"/>
+          </a:ln>
+        </p:spPr>
+        <p:style>
+          <a:lnRef idx="2">
+            <a:schemeClr val="accent1"/>
+          </a:lnRef>
+          <a:fillRef idx="0">
+            <a:schemeClr val="accent1"/>
+          </a:fillRef>
+          <a:effectRef idx="1">
+            <a:schemeClr val="accent1"/>
+          </a:effectRef>
+          <a:fontRef idx="minor">
+            <a:schemeClr val="tx1"/>
+          </a:fontRef>
+        </p:style>
+      </p:cxnSp>
+      <p:cxnSp>
+        <p:nvCxnSpPr>
+          <p:cNvPr id="54" name="Elbow Connector 53"/>
+          <p:cNvCxnSpPr>
+            <a:endCxn id="18" idx="2"/>
+          </p:cNvCxnSpPr>
+          <p:nvPr/>
+        </p:nvCxnSpPr>
+        <p:spPr>
+          <a:xfrm flipV="1">
+            <a:off x="4234867" y="2858999"/>
+            <a:ext cx="327142" cy="245811"/>
+          </a:xfrm>
+          <a:prstGeom prst="bentConnector2">
+            <a:avLst/>
+          </a:prstGeom>
+          <a:ln>
+            <a:tailEnd type="arrow"/>
+          </a:ln>
+        </p:spPr>
+        <p:style>
+          <a:lnRef idx="2">
+            <a:schemeClr val="accent1"/>
+          </a:lnRef>
+          <a:fillRef idx="0">
+            <a:schemeClr val="accent1"/>
+          </a:fillRef>
+          <a:effectRef idx="1">
+            <a:schemeClr val="accent1"/>
+          </a:effectRef>
+          <a:fontRef idx="minor">
+            <a:schemeClr val="tx1"/>
+          </a:fontRef>
+        </p:style>
+      </p:cxnSp>
+    </p:spTree>
+    <p:extLst>
+      <p:ext uri="{BB962C8B-B14F-4D97-AF65-F5344CB8AC3E}">
+        <p14:creationId xmlns:p14="http://schemas.microsoft.com/office/powerpoint/2010/main" val="2486701017"/>
+      </p:ext>
+    </p:extLst>
+  </p:cSld>
+  <p:clrMapOvr>
+    <a:masterClrMapping/>
+  </p:clrMapOvr>
+</p:sld>
+</file>
+
+<file path=ppt/slides/slide67.xml><?xml version="1.0" encoding="utf-8"?>
+<p:sld xmlns:a="http://schemas.openxmlformats.org/drawingml/2006/main" xmlns:r="http://schemas.openxmlformats.org/officeDocument/2006/relationships" xmlns:p="http://schemas.openxmlformats.org/presentationml/2006/main">
+  <p:cSld>
+    <p:spTree>
+      <p:nvGrpSpPr>
+        <p:cNvPr id="1" name=""/>
+        <p:cNvGrpSpPr/>
+        <p:nvPr/>
+      </p:nvGrpSpPr>
+      <p:grpSpPr>
+        <a:xfrm>
+          <a:off x="0" y="0"/>
+          <a:ext cx="0" cy="0"/>
+          <a:chOff x="0" y="0"/>
+          <a:chExt cx="0" cy="0"/>
+        </a:xfrm>
+      </p:grpSpPr>
+      <p:sp>
+        <p:nvSpPr>
+          <p:cNvPr id="2" name="Title 1"/>
+          <p:cNvSpPr>
+            <a:spLocks noGrp="1"/>
+          </p:cNvSpPr>
+          <p:nvPr>
+            <p:ph type="title"/>
+          </p:nvPr>
+        </p:nvSpPr>
+        <p:spPr/>
+        <p:txBody>
+          <a:bodyPr/>
+          <a:lstStyle/>
+          <a:p>
+            <a:r>
+              <a:rPr lang="en-US" dirty="0" smtClean="0"/>
+              <a:t>Access Elements of An array</a:t>
+            </a:r>
+            <a:endParaRPr lang="en-US" dirty="0"/>
+          </a:p>
+        </p:txBody>
+      </p:sp>
+      <p:sp>
+        <p:nvSpPr>
+          <p:cNvPr id="3" name="Content Placeholder 2"/>
+          <p:cNvSpPr>
+            <a:spLocks noGrp="1"/>
+          </p:cNvSpPr>
+          <p:nvPr>
+            <p:ph idx="1"/>
+          </p:nvPr>
+        </p:nvSpPr>
+        <p:spPr/>
+        <p:txBody>
+          <a:bodyPr/>
+          <a:lstStyle/>
+          <a:p>
+            <a:r>
+              <a:rPr lang="en-US" dirty="0" smtClean="0"/>
+              <a:t>Use the ‘[]’, the array ‘</a:t>
+            </a:r>
+            <a:r>
+              <a:rPr lang="en-US" b="1" i="1" dirty="0" smtClean="0">
+                <a:solidFill>
+                  <a:srgbClr val="0000FF"/>
+                </a:solidFill>
+              </a:rPr>
+              <a:t>index operator</a:t>
+            </a:r>
+            <a:r>
+              <a:rPr lang="en-US" dirty="0" smtClean="0"/>
+              <a:t>’</a:t>
+            </a:r>
+          </a:p>
+          <a:p>
+            <a:pPr lvl="1"/>
+            <a:r>
+              <a:rPr lang="en-US" dirty="0" smtClean="0"/>
+              <a:t>Access an element:</a:t>
+            </a:r>
+          </a:p>
+          <a:p>
+            <a:pPr marL="914400" lvl="2" indent="0">
+              <a:buNone/>
+            </a:pPr>
+            <a:r>
+              <a:rPr lang="en-US" i="1" dirty="0" smtClean="0">
+                <a:solidFill>
+                  <a:srgbClr val="008000"/>
+                </a:solidFill>
+              </a:rPr>
+              <a:t>array</a:t>
+            </a:r>
+            <a:r>
+              <a:rPr lang="en-US" dirty="0" smtClean="0"/>
+              <a:t>[</a:t>
+            </a:r>
+            <a:r>
+              <a:rPr lang="en-US" i="1" dirty="0" smtClean="0">
+                <a:solidFill>
+                  <a:srgbClr val="FF6600"/>
+                </a:solidFill>
+              </a:rPr>
+              <a:t>index</a:t>
+            </a:r>
+            <a:r>
+              <a:rPr lang="en-US" dirty="0" smtClean="0"/>
+              <a:t>]</a:t>
+            </a:r>
+          </a:p>
+          <a:p>
+            <a:pPr marL="1371600" lvl="3" indent="0">
+              <a:buNone/>
+            </a:pPr>
+            <a:r>
+              <a:rPr lang="en-US" dirty="0" smtClean="0"/>
+              <a:t>* Index: an integer value</a:t>
+            </a:r>
+          </a:p>
+          <a:p>
+            <a:pPr lvl="1"/>
+            <a:r>
+              <a:rPr lang="en-US" dirty="0" smtClean="0"/>
+              <a:t>Length or count of array elements:</a:t>
+            </a:r>
+          </a:p>
+          <a:p>
+            <a:pPr marL="914400" lvl="2" indent="0">
+              <a:buNone/>
+            </a:pPr>
+            <a:r>
+              <a:rPr lang="en-US" i="1" dirty="0" err="1" smtClean="0">
+                <a:solidFill>
+                  <a:srgbClr val="008000"/>
+                </a:solidFill>
+              </a:rPr>
+              <a:t>array</a:t>
+            </a:r>
+            <a:r>
+              <a:rPr lang="en-US" dirty="0" err="1" smtClean="0"/>
+              <a:t>.</a:t>
+            </a:r>
+            <a:r>
+              <a:rPr lang="en-US" i="1" dirty="0" err="1" smtClean="0">
+                <a:solidFill>
+                  <a:srgbClr val="FF6600"/>
+                </a:solidFill>
+              </a:rPr>
+              <a:t>length</a:t>
+            </a:r>
+            <a:endParaRPr lang="en-US" dirty="0"/>
+          </a:p>
+          <a:p>
+            <a:pPr marL="1371600" lvl="3" indent="0">
+              <a:buNone/>
+            </a:pPr>
+            <a:r>
+              <a:rPr lang="en-US" dirty="0" smtClean="0"/>
+              <a:t>* Return an integer value</a:t>
+            </a:r>
+          </a:p>
+          <a:p>
+            <a:pPr marL="457200" lvl="1" indent="0">
+              <a:buNone/>
+            </a:pPr>
+            <a:endParaRPr lang="en-US" dirty="0"/>
+          </a:p>
+        </p:txBody>
+      </p:sp>
+    </p:spTree>
+    <p:extLst>
+      <p:ext uri="{BB962C8B-B14F-4D97-AF65-F5344CB8AC3E}">
+        <p14:creationId xmlns:p14="http://schemas.microsoft.com/office/powerpoint/2010/main" val="3718751595"/>
+      </p:ext>
+    </p:extLst>
+  </p:cSld>
+  <p:clrMapOvr>
+    <a:masterClrMapping/>
+  </p:clrMapOvr>
+</p:sld>
+</file>
+
+<file path=ppt/slides/slide68.xml><?xml version="1.0" encoding="utf-8"?>
+<p:sld xmlns:a="http://schemas.openxmlformats.org/drawingml/2006/main" xmlns:r="http://schemas.openxmlformats.org/officeDocument/2006/relationships" xmlns:p="http://schemas.openxmlformats.org/presentationml/2006/main">
+  <p:cSld>
+    <p:spTree>
+      <p:nvGrpSpPr>
+        <p:cNvPr id="1" name=""/>
+        <p:cNvGrpSpPr/>
+        <p:nvPr/>
+      </p:nvGrpSpPr>
+      <p:grpSpPr>
+        <a:xfrm>
+          <a:off x="0" y="0"/>
+          <a:ext cx="0" cy="0"/>
+          <a:chOff x="0" y="0"/>
+          <a:chExt cx="0" cy="0"/>
+        </a:xfrm>
+      </p:grpSpPr>
+      <p:sp>
+        <p:nvSpPr>
+          <p:cNvPr id="2" name="Title 1"/>
+          <p:cNvSpPr>
+            <a:spLocks noGrp="1"/>
+          </p:cNvSpPr>
+          <p:nvPr>
+            <p:ph type="title"/>
+          </p:nvPr>
+        </p:nvSpPr>
+        <p:spPr/>
+        <p:txBody>
+          <a:bodyPr/>
+          <a:lstStyle/>
+          <a:p>
+            <a:r>
+              <a:rPr lang="en-US" dirty="0" smtClean="0"/>
+              <a:t>Conclusion</a:t>
+            </a:r>
+            <a:endParaRPr lang="en-US" dirty="0"/>
+          </a:p>
+        </p:txBody>
+      </p:sp>
+      <p:sp>
+        <p:nvSpPr>
+          <p:cNvPr id="3" name="Content Placeholder 2"/>
+          <p:cNvSpPr>
+            <a:spLocks noGrp="1"/>
+          </p:cNvSpPr>
+          <p:nvPr>
+            <p:ph idx="1"/>
+          </p:nvPr>
+        </p:nvSpPr>
+        <p:spPr/>
+        <p:txBody>
+          <a:bodyPr>
+            <a:normAutofit/>
+          </a:bodyPr>
+          <a:lstStyle/>
+          <a:p>
+            <a:pPr marL="514350" indent="-514350">
+              <a:buFont typeface="+mj-lt"/>
+              <a:buAutoNum type="arabicPeriod"/>
+            </a:pPr>
+            <a:r>
+              <a:rPr lang="en-US" dirty="0" smtClean="0"/>
+              <a:t>How to access elements of an array using ‘[]’, the array index operator</a:t>
+            </a:r>
+          </a:p>
+          <a:p>
+            <a:pPr marL="514350" indent="-514350">
+              <a:buFont typeface="+mj-lt"/>
+              <a:buAutoNum type="arabicPeriod"/>
+            </a:pPr>
+            <a:r>
+              <a:rPr lang="en-US" dirty="0" smtClean="0"/>
+              <a:t>How to get the length of an array using the ‘length’ property</a:t>
+            </a:r>
+          </a:p>
+          <a:p>
+            <a:pPr marL="514350" indent="-514350">
+              <a:buFont typeface="+mj-lt"/>
+              <a:buAutoNum type="arabicPeriod"/>
+            </a:pPr>
+            <a:endParaRPr lang="en-US" dirty="0"/>
+          </a:p>
+          <a:p>
+            <a:pPr marL="0" indent="0">
+              <a:buNone/>
+            </a:pPr>
+            <a:r>
+              <a:rPr lang="en-US" dirty="0" smtClean="0"/>
+              <a:t>Resources:</a:t>
+            </a:r>
+          </a:p>
+          <a:p>
+            <a:pPr marL="514350" indent="-514350">
+              <a:buFont typeface="+mj-lt"/>
+              <a:buAutoNum type="arabicPeriod"/>
+            </a:pPr>
+            <a:r>
+              <a:rPr lang="en-US" sz="1600" dirty="0" smtClean="0"/>
+              <a:t>Mozilla Developer Network – Array Documentation</a:t>
+            </a:r>
+          </a:p>
+          <a:p>
+            <a:pPr marL="914400" lvl="1" indent="-514350"/>
+            <a:r>
+              <a:rPr lang="en-US" sz="1200" dirty="0" smtClean="0"/>
+              <a:t>https</a:t>
+            </a:r>
+            <a:r>
+              <a:rPr lang="en-US" sz="1200" dirty="0"/>
+              <a:t>://</a:t>
+            </a:r>
+            <a:r>
+              <a:rPr lang="en-US" sz="1200" dirty="0" err="1"/>
+              <a:t>developer.mozilla.org</a:t>
+            </a:r>
+            <a:r>
+              <a:rPr lang="en-US" sz="1200" dirty="0"/>
+              <a:t>/en-US/docs/Web/JavaScript/Reference/</a:t>
+            </a:r>
+            <a:r>
+              <a:rPr lang="en-US" sz="1200" dirty="0" err="1"/>
+              <a:t>Global_Objects</a:t>
+            </a:r>
+            <a:r>
+              <a:rPr lang="en-US" sz="1200" dirty="0"/>
+              <a:t>/Array</a:t>
+            </a:r>
+            <a:endParaRPr lang="en-US" sz="1200" dirty="0" smtClean="0"/>
+          </a:p>
+        </p:txBody>
+      </p:sp>
+    </p:spTree>
+    <p:extLst>
+      <p:ext uri="{BB962C8B-B14F-4D97-AF65-F5344CB8AC3E}">
+        <p14:creationId xmlns:p14="http://schemas.microsoft.com/office/powerpoint/2010/main" val="3039996554"/>
       </p:ext>
     </p:extLst>
   </p:cSld>

</xml_diff>

<commit_message>
Documentation, slides, and code examples for c05s13 - JavaScript - Array Advance
</commit_message>
<xml_diff>
--- a/docs/learn-computer-programming.pptx
+++ b/docs/learn-computer-programming.pptx
@@ -80,6 +80,13 @@
     <p:sldId id="329" r:id="rId74"/>
     <p:sldId id="330" r:id="rId75"/>
     <p:sldId id="331" r:id="rId76"/>
+    <p:sldId id="332" r:id="rId77"/>
+    <p:sldId id="333" r:id="rId78"/>
+    <p:sldId id="335" r:id="rId79"/>
+    <p:sldId id="334" r:id="rId80"/>
+    <p:sldId id="338" r:id="rId81"/>
+    <p:sldId id="337" r:id="rId82"/>
+    <p:sldId id="336" r:id="rId83"/>
   </p:sldIdLst>
   <p:sldSz cx="9144000" cy="6858000" type="screen4x3"/>
   <p:notesSz cx="6858000" cy="9144000"/>
@@ -7143,7 +7150,7 @@
           <a:p>
             <a:fld id="{6483C26A-63A4-F547-BB74-146C3D288EFD}" type="datetimeFigureOut">
               <a:rPr lang="en-US" smtClean="0"/>
-              <a:t>2/17/16</a:t>
+              <a:t>2/20/16</a:t>
             </a:fld>
             <a:endParaRPr lang="en-US"/>
           </a:p>
@@ -7313,7 +7320,7 @@
           <a:p>
             <a:fld id="{6483C26A-63A4-F547-BB74-146C3D288EFD}" type="datetimeFigureOut">
               <a:rPr lang="en-US" smtClean="0"/>
-              <a:t>2/17/16</a:t>
+              <a:t>2/20/16</a:t>
             </a:fld>
             <a:endParaRPr lang="en-US"/>
           </a:p>
@@ -7493,7 +7500,7 @@
           <a:p>
             <a:fld id="{6483C26A-63A4-F547-BB74-146C3D288EFD}" type="datetimeFigureOut">
               <a:rPr lang="en-US" smtClean="0"/>
-              <a:t>2/17/16</a:t>
+              <a:t>2/20/16</a:t>
             </a:fld>
             <a:endParaRPr lang="en-US"/>
           </a:p>
@@ -7663,7 +7670,7 @@
           <a:p>
             <a:fld id="{6483C26A-63A4-F547-BB74-146C3D288EFD}" type="datetimeFigureOut">
               <a:rPr lang="en-US" smtClean="0"/>
-              <a:t>2/17/16</a:t>
+              <a:t>2/20/16</a:t>
             </a:fld>
             <a:endParaRPr lang="en-US"/>
           </a:p>
@@ -7909,7 +7916,7 @@
           <a:p>
             <a:fld id="{6483C26A-63A4-F547-BB74-146C3D288EFD}" type="datetimeFigureOut">
               <a:rPr lang="en-US" smtClean="0"/>
-              <a:t>2/17/16</a:t>
+              <a:t>2/20/16</a:t>
             </a:fld>
             <a:endParaRPr lang="en-US"/>
           </a:p>
@@ -8197,7 +8204,7 @@
           <a:p>
             <a:fld id="{6483C26A-63A4-F547-BB74-146C3D288EFD}" type="datetimeFigureOut">
               <a:rPr lang="en-US" smtClean="0"/>
-              <a:t>2/17/16</a:t>
+              <a:t>2/20/16</a:t>
             </a:fld>
             <a:endParaRPr lang="en-US"/>
           </a:p>
@@ -8619,7 +8626,7 @@
           <a:p>
             <a:fld id="{6483C26A-63A4-F547-BB74-146C3D288EFD}" type="datetimeFigureOut">
               <a:rPr lang="en-US" smtClean="0"/>
-              <a:t>2/17/16</a:t>
+              <a:t>2/20/16</a:t>
             </a:fld>
             <a:endParaRPr lang="en-US"/>
           </a:p>
@@ -8737,7 +8744,7 @@
           <a:p>
             <a:fld id="{6483C26A-63A4-F547-BB74-146C3D288EFD}" type="datetimeFigureOut">
               <a:rPr lang="en-US" smtClean="0"/>
-              <a:t>2/17/16</a:t>
+              <a:t>2/20/16</a:t>
             </a:fld>
             <a:endParaRPr lang="en-US"/>
           </a:p>
@@ -8832,7 +8839,7 @@
           <a:p>
             <a:fld id="{6483C26A-63A4-F547-BB74-146C3D288EFD}" type="datetimeFigureOut">
               <a:rPr lang="en-US" smtClean="0"/>
-              <a:t>2/17/16</a:t>
+              <a:t>2/20/16</a:t>
             </a:fld>
             <a:endParaRPr lang="en-US"/>
           </a:p>
@@ -9109,7 +9116,7 @@
           <a:p>
             <a:fld id="{6483C26A-63A4-F547-BB74-146C3D288EFD}" type="datetimeFigureOut">
               <a:rPr lang="en-US" smtClean="0"/>
-              <a:t>2/17/16</a:t>
+              <a:t>2/20/16</a:t>
             </a:fld>
             <a:endParaRPr lang="en-US"/>
           </a:p>
@@ -9362,7 +9369,7 @@
           <a:p>
             <a:fld id="{6483C26A-63A4-F547-BB74-146C3D288EFD}" type="datetimeFigureOut">
               <a:rPr lang="en-US" smtClean="0"/>
-              <a:t>2/17/16</a:t>
+              <a:t>2/20/16</a:t>
             </a:fld>
             <a:endParaRPr lang="en-US"/>
           </a:p>
@@ -9575,7 +9582,7 @@
           <a:p>
             <a:fld id="{6483C26A-63A4-F547-BB74-146C3D288EFD}" type="datetimeFigureOut">
               <a:rPr lang="en-US" smtClean="0"/>
-              <a:t>2/17/16</a:t>
+              <a:t>2/20/16</a:t>
             </a:fld>
             <a:endParaRPr lang="en-US"/>
           </a:p>
@@ -35765,6 +35772,2127 @@
 </p:sld>
 </file>
 
+<file path=ppt/slides/slide76.xml><?xml version="1.0" encoding="utf-8"?>
+<p:sld xmlns:a="http://schemas.openxmlformats.org/drawingml/2006/main" xmlns:r="http://schemas.openxmlformats.org/officeDocument/2006/relationships" xmlns:p="http://schemas.openxmlformats.org/presentationml/2006/main">
+  <p:cSld>
+    <p:spTree>
+      <p:nvGrpSpPr>
+        <p:cNvPr id="1" name=""/>
+        <p:cNvGrpSpPr/>
+        <p:nvPr/>
+      </p:nvGrpSpPr>
+      <p:grpSpPr>
+        <a:xfrm>
+          <a:off x="0" y="0"/>
+          <a:ext cx="0" cy="0"/>
+          <a:chOff x="0" y="0"/>
+          <a:chExt cx="0" cy="0"/>
+        </a:xfrm>
+      </p:grpSpPr>
+      <p:sp>
+        <p:nvSpPr>
+          <p:cNvPr id="2" name="Title 1"/>
+          <p:cNvSpPr>
+            <a:spLocks noGrp="1"/>
+          </p:cNvSpPr>
+          <p:nvPr>
+            <p:ph type="ctrTitle"/>
+          </p:nvPr>
+        </p:nvSpPr>
+        <p:spPr/>
+        <p:txBody>
+          <a:bodyPr/>
+          <a:lstStyle/>
+          <a:p>
+            <a:r>
+              <a:rPr lang="en-US" dirty="0" smtClean="0"/>
+              <a:t>Chapter 5 – JavaScript</a:t>
+            </a:r>
+            <a:endParaRPr lang="en-US" dirty="0"/>
+          </a:p>
+        </p:txBody>
+      </p:sp>
+      <p:sp>
+        <p:nvSpPr>
+          <p:cNvPr id="3" name="Subtitle 2"/>
+          <p:cNvSpPr>
+            <a:spLocks noGrp="1"/>
+          </p:cNvSpPr>
+          <p:nvPr>
+            <p:ph type="subTitle" idx="1"/>
+          </p:nvPr>
+        </p:nvSpPr>
+        <p:spPr/>
+        <p:txBody>
+          <a:bodyPr/>
+          <a:lstStyle/>
+          <a:p>
+            <a:r>
+              <a:rPr lang="en-US" dirty="0" smtClean="0"/>
+              <a:t>#37 – Section 13</a:t>
+            </a:r>
+            <a:endParaRPr lang="en-US" dirty="0"/>
+          </a:p>
+          <a:p>
+            <a:r>
+              <a:rPr lang="en-US" dirty="0" smtClean="0"/>
+              <a:t>Arrays: Advance Usage</a:t>
+            </a:r>
+          </a:p>
+        </p:txBody>
+      </p:sp>
+    </p:spTree>
+    <p:extLst>
+      <p:ext uri="{BB962C8B-B14F-4D97-AF65-F5344CB8AC3E}">
+        <p14:creationId xmlns:p14="http://schemas.microsoft.com/office/powerpoint/2010/main" val="2110504391"/>
+      </p:ext>
+    </p:extLst>
+  </p:cSld>
+  <p:clrMapOvr>
+    <a:masterClrMapping/>
+  </p:clrMapOvr>
+  <p:timing>
+    <p:tnLst>
+      <p:par>
+        <p:cTn xmlns:p14="http://schemas.microsoft.com/office/powerpoint/2010/main" id="1" dur="indefinite" restart="never" nodeType="tmRoot"/>
+      </p:par>
+    </p:tnLst>
+  </p:timing>
+</p:sld>
+</file>
+
+<file path=ppt/slides/slide77.xml><?xml version="1.0" encoding="utf-8"?>
+<p:sld xmlns:a="http://schemas.openxmlformats.org/drawingml/2006/main" xmlns:r="http://schemas.openxmlformats.org/officeDocument/2006/relationships" xmlns:p="http://schemas.openxmlformats.org/presentationml/2006/main">
+  <p:cSld>
+    <p:spTree>
+      <p:nvGrpSpPr>
+        <p:cNvPr id="1" name=""/>
+        <p:cNvGrpSpPr/>
+        <p:nvPr/>
+      </p:nvGrpSpPr>
+      <p:grpSpPr>
+        <a:xfrm>
+          <a:off x="0" y="0"/>
+          <a:ext cx="0" cy="0"/>
+          <a:chOff x="0" y="0"/>
+          <a:chExt cx="0" cy="0"/>
+        </a:xfrm>
+      </p:grpSpPr>
+      <p:sp>
+        <p:nvSpPr>
+          <p:cNvPr id="2" name="Title 1"/>
+          <p:cNvSpPr>
+            <a:spLocks noGrp="1"/>
+          </p:cNvSpPr>
+          <p:nvPr>
+            <p:ph type="title"/>
+          </p:nvPr>
+        </p:nvSpPr>
+        <p:spPr/>
+        <p:txBody>
+          <a:bodyPr/>
+          <a:lstStyle/>
+          <a:p>
+            <a:r>
+              <a:rPr lang="en-US" dirty="0" smtClean="0"/>
+              <a:t>Topics</a:t>
+            </a:r>
+            <a:endParaRPr lang="en-US" dirty="0"/>
+          </a:p>
+        </p:txBody>
+      </p:sp>
+      <p:sp>
+        <p:nvSpPr>
+          <p:cNvPr id="3" name="Content Placeholder 2"/>
+          <p:cNvSpPr>
+            <a:spLocks noGrp="1"/>
+          </p:cNvSpPr>
+          <p:nvPr>
+            <p:ph idx="1"/>
+          </p:nvPr>
+        </p:nvSpPr>
+        <p:spPr/>
+        <p:txBody>
+          <a:bodyPr>
+            <a:normAutofit/>
+          </a:bodyPr>
+          <a:lstStyle/>
+          <a:p>
+            <a:pPr marL="514350" indent="-514350">
+              <a:buFont typeface="+mj-lt"/>
+              <a:buAutoNum type="arabicPeriod"/>
+            </a:pPr>
+            <a:r>
+              <a:rPr lang="en-US" dirty="0" smtClean="0"/>
+              <a:t>What are some of the other Array operations available?</a:t>
+            </a:r>
+          </a:p>
+          <a:p>
+            <a:pPr marL="914400" lvl="1" indent="-514350">
+              <a:buFont typeface="+mj-lt"/>
+              <a:buAutoNum type="arabicPeriod"/>
+            </a:pPr>
+            <a:r>
+              <a:rPr lang="en-US" dirty="0" err="1" smtClean="0"/>
+              <a:t>forEach</a:t>
+            </a:r>
+            <a:r>
+              <a:rPr lang="en-US" dirty="0" smtClean="0"/>
+              <a:t>()</a:t>
+            </a:r>
+          </a:p>
+          <a:p>
+            <a:pPr marL="914400" lvl="1" indent="-514350">
+              <a:buFont typeface="+mj-lt"/>
+              <a:buAutoNum type="arabicPeriod"/>
+            </a:pPr>
+            <a:r>
+              <a:rPr lang="en-US" dirty="0" smtClean="0"/>
+              <a:t>every()</a:t>
+            </a:r>
+          </a:p>
+          <a:p>
+            <a:pPr marL="914400" lvl="1" indent="-514350">
+              <a:buFont typeface="+mj-lt"/>
+              <a:buAutoNum type="arabicPeriod"/>
+            </a:pPr>
+            <a:r>
+              <a:rPr lang="en-US" dirty="0" smtClean="0"/>
+              <a:t>map()</a:t>
+            </a:r>
+          </a:p>
+          <a:p>
+            <a:pPr marL="914400" lvl="1" indent="-514350">
+              <a:buFont typeface="+mj-lt"/>
+              <a:buAutoNum type="arabicPeriod"/>
+            </a:pPr>
+            <a:r>
+              <a:rPr lang="en-US" dirty="0"/>
+              <a:t>f</a:t>
+            </a:r>
+            <a:r>
+              <a:rPr lang="en-US" dirty="0" smtClean="0"/>
+              <a:t>ilter()</a:t>
+            </a:r>
+          </a:p>
+          <a:p>
+            <a:pPr marL="914400" lvl="1" indent="-514350">
+              <a:buFont typeface="+mj-lt"/>
+              <a:buAutoNum type="arabicPeriod"/>
+            </a:pPr>
+            <a:r>
+              <a:rPr lang="en-US" smtClean="0"/>
+              <a:t>And more</a:t>
+            </a:r>
+            <a:endParaRPr lang="en-US" dirty="0" smtClean="0"/>
+          </a:p>
+        </p:txBody>
+      </p:sp>
+    </p:spTree>
+    <p:extLst>
+      <p:ext uri="{BB962C8B-B14F-4D97-AF65-F5344CB8AC3E}">
+        <p14:creationId xmlns:p14="http://schemas.microsoft.com/office/powerpoint/2010/main" val="2902047586"/>
+      </p:ext>
+    </p:extLst>
+  </p:cSld>
+  <p:clrMapOvr>
+    <a:masterClrMapping/>
+  </p:clrMapOvr>
+</p:sld>
+</file>
+
+<file path=ppt/slides/slide78.xml><?xml version="1.0" encoding="utf-8"?>
+<p:sld xmlns:a="http://schemas.openxmlformats.org/drawingml/2006/main" xmlns:r="http://schemas.openxmlformats.org/officeDocument/2006/relationships" xmlns:p="http://schemas.openxmlformats.org/presentationml/2006/main">
+  <p:cSld>
+    <p:spTree>
+      <p:nvGrpSpPr>
+        <p:cNvPr id="1" name=""/>
+        <p:cNvGrpSpPr/>
+        <p:nvPr/>
+      </p:nvGrpSpPr>
+      <p:grpSpPr>
+        <a:xfrm>
+          <a:off x="0" y="0"/>
+          <a:ext cx="0" cy="0"/>
+          <a:chOff x="0" y="0"/>
+          <a:chExt cx="0" cy="0"/>
+        </a:xfrm>
+      </p:grpSpPr>
+      <p:sp>
+        <p:nvSpPr>
+          <p:cNvPr id="2" name="Title 1"/>
+          <p:cNvSpPr>
+            <a:spLocks noGrp="1"/>
+          </p:cNvSpPr>
+          <p:nvPr>
+            <p:ph type="title"/>
+          </p:nvPr>
+        </p:nvSpPr>
+        <p:spPr/>
+        <p:txBody>
+          <a:bodyPr/>
+          <a:lstStyle/>
+          <a:p>
+            <a:r>
+              <a:rPr lang="en-US" dirty="0" err="1" smtClean="0"/>
+              <a:t>forEach</a:t>
+            </a:r>
+            <a:r>
+              <a:rPr lang="en-US" dirty="0" smtClean="0"/>
+              <a:t>()</a:t>
+            </a:r>
+            <a:endParaRPr lang="en-US" dirty="0"/>
+          </a:p>
+        </p:txBody>
+      </p:sp>
+      <p:sp>
+        <p:nvSpPr>
+          <p:cNvPr id="19" name="Rectangle 18"/>
+          <p:cNvSpPr/>
+          <p:nvPr/>
+        </p:nvSpPr>
+        <p:spPr>
+          <a:xfrm>
+            <a:off x="3306683" y="2240244"/>
+            <a:ext cx="2278038" cy="696158"/>
+          </a:xfrm>
+          <a:prstGeom prst="rect">
+            <a:avLst/>
+          </a:prstGeom>
+        </p:spPr>
+        <p:style>
+          <a:lnRef idx="2">
+            <a:schemeClr val="accent2">
+              <a:shade val="50000"/>
+            </a:schemeClr>
+          </a:lnRef>
+          <a:fillRef idx="1">
+            <a:schemeClr val="accent2"/>
+          </a:fillRef>
+          <a:effectRef idx="0">
+            <a:schemeClr val="accent2"/>
+          </a:effectRef>
+          <a:fontRef idx="minor">
+            <a:schemeClr val="lt1"/>
+          </a:fontRef>
+        </p:style>
+        <p:txBody>
+          <a:bodyPr rtlCol="0" anchor="ctr"/>
+          <a:lstStyle/>
+          <a:p>
+            <a:pPr algn="ctr"/>
+            <a:endParaRPr lang="en-US"/>
+          </a:p>
+        </p:txBody>
+      </p:sp>
+      <p:sp>
+        <p:nvSpPr>
+          <p:cNvPr id="20" name="Rounded Rectangle 19"/>
+          <p:cNvSpPr/>
+          <p:nvPr/>
+        </p:nvSpPr>
+        <p:spPr>
+          <a:xfrm>
+            <a:off x="3372079" y="2311159"/>
+            <a:ext cx="292203" cy="297838"/>
+          </a:xfrm>
+          <a:prstGeom prst="roundRect">
+            <a:avLst/>
+          </a:prstGeom>
+          <a:scene3d>
+            <a:camera prst="orthographicFront"/>
+            <a:lightRig rig="threePt" dir="t"/>
+          </a:scene3d>
+          <a:sp3d>
+            <a:bevelT w="152400" h="50800" prst="softRound"/>
+          </a:sp3d>
+        </p:spPr>
+        <p:style>
+          <a:lnRef idx="1">
+            <a:schemeClr val="accent1"/>
+          </a:lnRef>
+          <a:fillRef idx="3">
+            <a:schemeClr val="accent1"/>
+          </a:fillRef>
+          <a:effectRef idx="2">
+            <a:schemeClr val="accent1"/>
+          </a:effectRef>
+          <a:fontRef idx="minor">
+            <a:schemeClr val="lt1"/>
+          </a:fontRef>
+        </p:style>
+        <p:txBody>
+          <a:bodyPr rtlCol="0" anchor="ctr"/>
+          <a:lstStyle/>
+          <a:p>
+            <a:pPr algn="ctr"/>
+            <a:endParaRPr lang="en-US"/>
+          </a:p>
+        </p:txBody>
+      </p:sp>
+      <p:sp>
+        <p:nvSpPr>
+          <p:cNvPr id="21" name="Rounded Rectangle 20"/>
+          <p:cNvSpPr/>
+          <p:nvPr/>
+        </p:nvSpPr>
+        <p:spPr>
+          <a:xfrm>
+            <a:off x="3994853" y="2311159"/>
+            <a:ext cx="292203" cy="297838"/>
+          </a:xfrm>
+          <a:prstGeom prst="roundRect">
+            <a:avLst/>
+          </a:prstGeom>
+          <a:scene3d>
+            <a:camera prst="orthographicFront"/>
+            <a:lightRig rig="threePt" dir="t"/>
+          </a:scene3d>
+          <a:sp3d>
+            <a:bevelT w="152400" h="50800" prst="softRound"/>
+          </a:sp3d>
+        </p:spPr>
+        <p:style>
+          <a:lnRef idx="1">
+            <a:schemeClr val="accent1"/>
+          </a:lnRef>
+          <a:fillRef idx="3">
+            <a:schemeClr val="accent1"/>
+          </a:fillRef>
+          <a:effectRef idx="2">
+            <a:schemeClr val="accent1"/>
+          </a:effectRef>
+          <a:fontRef idx="minor">
+            <a:schemeClr val="lt1"/>
+          </a:fontRef>
+        </p:style>
+        <p:txBody>
+          <a:bodyPr rtlCol="0" anchor="ctr"/>
+          <a:lstStyle/>
+          <a:p>
+            <a:pPr algn="ctr"/>
+            <a:endParaRPr lang="en-US"/>
+          </a:p>
+        </p:txBody>
+      </p:sp>
+      <p:sp>
+        <p:nvSpPr>
+          <p:cNvPr id="22" name="Rounded Rectangle 21"/>
+          <p:cNvSpPr/>
+          <p:nvPr/>
+        </p:nvSpPr>
+        <p:spPr>
+          <a:xfrm>
+            <a:off x="4617627" y="2311159"/>
+            <a:ext cx="292203" cy="297838"/>
+          </a:xfrm>
+          <a:prstGeom prst="roundRect">
+            <a:avLst/>
+          </a:prstGeom>
+          <a:scene3d>
+            <a:camera prst="orthographicFront"/>
+            <a:lightRig rig="threePt" dir="t"/>
+          </a:scene3d>
+          <a:sp3d>
+            <a:bevelT w="152400" h="50800" prst="softRound"/>
+          </a:sp3d>
+        </p:spPr>
+        <p:style>
+          <a:lnRef idx="1">
+            <a:schemeClr val="accent1"/>
+          </a:lnRef>
+          <a:fillRef idx="3">
+            <a:schemeClr val="accent1"/>
+          </a:fillRef>
+          <a:effectRef idx="2">
+            <a:schemeClr val="accent1"/>
+          </a:effectRef>
+          <a:fontRef idx="minor">
+            <a:schemeClr val="lt1"/>
+          </a:fontRef>
+        </p:style>
+        <p:txBody>
+          <a:bodyPr rtlCol="0" anchor="ctr"/>
+          <a:lstStyle/>
+          <a:p>
+            <a:pPr algn="ctr"/>
+            <a:endParaRPr lang="en-US"/>
+          </a:p>
+        </p:txBody>
+      </p:sp>
+      <p:sp>
+        <p:nvSpPr>
+          <p:cNvPr id="24" name="Rounded Rectangle 23"/>
+          <p:cNvSpPr/>
+          <p:nvPr/>
+        </p:nvSpPr>
+        <p:spPr>
+          <a:xfrm>
+            <a:off x="5240400" y="2311159"/>
+            <a:ext cx="292203" cy="297838"/>
+          </a:xfrm>
+          <a:prstGeom prst="roundRect">
+            <a:avLst/>
+          </a:prstGeom>
+          <a:scene3d>
+            <a:camera prst="orthographicFront"/>
+            <a:lightRig rig="threePt" dir="t"/>
+          </a:scene3d>
+          <a:sp3d>
+            <a:bevelT w="152400" h="50800" prst="softRound"/>
+          </a:sp3d>
+        </p:spPr>
+        <p:style>
+          <a:lnRef idx="1">
+            <a:schemeClr val="accent1"/>
+          </a:lnRef>
+          <a:fillRef idx="3">
+            <a:schemeClr val="accent1"/>
+          </a:fillRef>
+          <a:effectRef idx="2">
+            <a:schemeClr val="accent1"/>
+          </a:effectRef>
+          <a:fontRef idx="minor">
+            <a:schemeClr val="lt1"/>
+          </a:fontRef>
+        </p:style>
+        <p:txBody>
+          <a:bodyPr rtlCol="0" anchor="ctr"/>
+          <a:lstStyle/>
+          <a:p>
+            <a:pPr algn="ctr"/>
+            <a:endParaRPr lang="en-US"/>
+          </a:p>
+        </p:txBody>
+      </p:sp>
+      <p:sp>
+        <p:nvSpPr>
+          <p:cNvPr id="26" name="TextBox 25"/>
+          <p:cNvSpPr txBox="1"/>
+          <p:nvPr/>
+        </p:nvSpPr>
+        <p:spPr>
+          <a:xfrm>
+            <a:off x="3372079" y="2690181"/>
+            <a:ext cx="292203" cy="246221"/>
+          </a:xfrm>
+          <a:prstGeom prst="rect">
+            <a:avLst/>
+          </a:prstGeom>
+          <a:noFill/>
+        </p:spPr>
+        <p:txBody>
+          <a:bodyPr wrap="square" rtlCol="0">
+            <a:spAutoFit/>
+          </a:bodyPr>
+          <a:lstStyle/>
+          <a:p>
+            <a:r>
+              <a:rPr lang="en-US" sz="1000" dirty="0" smtClean="0"/>
+              <a:t>0</a:t>
+            </a:r>
+            <a:endParaRPr lang="en-US" sz="1000" dirty="0"/>
+          </a:p>
+        </p:txBody>
+      </p:sp>
+      <p:sp>
+        <p:nvSpPr>
+          <p:cNvPr id="27" name="TextBox 26"/>
+          <p:cNvSpPr txBox="1"/>
+          <p:nvPr/>
+        </p:nvSpPr>
+        <p:spPr>
+          <a:xfrm>
+            <a:off x="3994853" y="2690181"/>
+            <a:ext cx="292203" cy="246221"/>
+          </a:xfrm>
+          <a:prstGeom prst="rect">
+            <a:avLst/>
+          </a:prstGeom>
+          <a:noFill/>
+        </p:spPr>
+        <p:txBody>
+          <a:bodyPr wrap="square" rtlCol="0">
+            <a:spAutoFit/>
+          </a:bodyPr>
+          <a:lstStyle/>
+          <a:p>
+            <a:r>
+              <a:rPr lang="en-US" sz="1000" dirty="0" smtClean="0"/>
+              <a:t>1</a:t>
+            </a:r>
+            <a:endParaRPr lang="en-US" sz="1000" dirty="0"/>
+          </a:p>
+        </p:txBody>
+      </p:sp>
+      <p:sp>
+        <p:nvSpPr>
+          <p:cNvPr id="28" name="TextBox 27"/>
+          <p:cNvSpPr txBox="1"/>
+          <p:nvPr/>
+        </p:nvSpPr>
+        <p:spPr>
+          <a:xfrm>
+            <a:off x="4617627" y="2690181"/>
+            <a:ext cx="292203" cy="246221"/>
+          </a:xfrm>
+          <a:prstGeom prst="rect">
+            <a:avLst/>
+          </a:prstGeom>
+          <a:noFill/>
+        </p:spPr>
+        <p:txBody>
+          <a:bodyPr wrap="square" rtlCol="0">
+            <a:spAutoFit/>
+          </a:bodyPr>
+          <a:lstStyle/>
+          <a:p>
+            <a:r>
+              <a:rPr lang="en-US" sz="1000" dirty="0" smtClean="0"/>
+              <a:t>2</a:t>
+            </a:r>
+            <a:endParaRPr lang="en-US" sz="1000" dirty="0"/>
+          </a:p>
+        </p:txBody>
+      </p:sp>
+      <p:sp>
+        <p:nvSpPr>
+          <p:cNvPr id="30" name="TextBox 29"/>
+          <p:cNvSpPr txBox="1"/>
+          <p:nvPr/>
+        </p:nvSpPr>
+        <p:spPr>
+          <a:xfrm>
+            <a:off x="5240400" y="2690181"/>
+            <a:ext cx="292203" cy="246221"/>
+          </a:xfrm>
+          <a:prstGeom prst="rect">
+            <a:avLst/>
+          </a:prstGeom>
+          <a:noFill/>
+        </p:spPr>
+        <p:txBody>
+          <a:bodyPr wrap="square" rtlCol="0">
+            <a:spAutoFit/>
+          </a:bodyPr>
+          <a:lstStyle/>
+          <a:p>
+            <a:r>
+              <a:rPr lang="en-US" sz="1000" dirty="0"/>
+              <a:t>3</a:t>
+            </a:r>
+            <a:endParaRPr lang="en-US" sz="1000" dirty="0"/>
+          </a:p>
+        </p:txBody>
+      </p:sp>
+      <p:cxnSp>
+        <p:nvCxnSpPr>
+          <p:cNvPr id="56" name="Straight Arrow Connector 55"/>
+          <p:cNvCxnSpPr/>
+          <p:nvPr/>
+        </p:nvCxnSpPr>
+        <p:spPr>
+          <a:xfrm>
+            <a:off x="3571203" y="3731404"/>
+            <a:ext cx="0" cy="404610"/>
+          </a:xfrm>
+          <a:prstGeom prst="straightConnector1">
+            <a:avLst/>
+          </a:prstGeom>
+          <a:ln>
+            <a:solidFill>
+              <a:schemeClr val="accent3">
+                <a:lumMod val="75000"/>
+              </a:schemeClr>
+            </a:solidFill>
+            <a:tailEnd type="arrow"/>
+          </a:ln>
+        </p:spPr>
+        <p:style>
+          <a:lnRef idx="2">
+            <a:schemeClr val="accent1"/>
+          </a:lnRef>
+          <a:fillRef idx="0">
+            <a:schemeClr val="accent1"/>
+          </a:fillRef>
+          <a:effectRef idx="1">
+            <a:schemeClr val="accent1"/>
+          </a:effectRef>
+          <a:fontRef idx="minor">
+            <a:schemeClr val="tx1"/>
+          </a:fontRef>
+        </p:style>
+      </p:cxnSp>
+      <p:cxnSp>
+        <p:nvCxnSpPr>
+          <p:cNvPr id="6" name="Straight Arrow Connector 5"/>
+          <p:cNvCxnSpPr>
+            <a:endCxn id="37" idx="0"/>
+          </p:cNvCxnSpPr>
+          <p:nvPr/>
+        </p:nvCxnSpPr>
+        <p:spPr>
+          <a:xfrm>
+            <a:off x="3551395" y="2978380"/>
+            <a:ext cx="3062" cy="449566"/>
+          </a:xfrm>
+          <a:prstGeom prst="straightConnector1">
+            <a:avLst/>
+          </a:prstGeom>
+          <a:ln>
+            <a:solidFill>
+              <a:schemeClr val="bg2">
+                <a:lumMod val="50000"/>
+              </a:schemeClr>
+            </a:solidFill>
+            <a:tailEnd type="arrow"/>
+          </a:ln>
+        </p:spPr>
+        <p:style>
+          <a:lnRef idx="2">
+            <a:schemeClr val="accent1"/>
+          </a:lnRef>
+          <a:fillRef idx="0">
+            <a:schemeClr val="accent1"/>
+          </a:fillRef>
+          <a:effectRef idx="1">
+            <a:schemeClr val="accent1"/>
+          </a:effectRef>
+          <a:fontRef idx="minor">
+            <a:schemeClr val="tx1"/>
+          </a:fontRef>
+        </p:style>
+      </p:cxnSp>
+      <p:cxnSp>
+        <p:nvCxnSpPr>
+          <p:cNvPr id="34" name="Straight Arrow Connector 33"/>
+          <p:cNvCxnSpPr>
+            <a:endCxn id="38" idx="0"/>
+          </p:cNvCxnSpPr>
+          <p:nvPr/>
+        </p:nvCxnSpPr>
+        <p:spPr>
+          <a:xfrm>
+            <a:off x="4153046" y="2978380"/>
+            <a:ext cx="0" cy="449566"/>
+          </a:xfrm>
+          <a:prstGeom prst="straightConnector1">
+            <a:avLst/>
+          </a:prstGeom>
+          <a:ln>
+            <a:solidFill>
+              <a:schemeClr val="bg2">
+                <a:lumMod val="50000"/>
+              </a:schemeClr>
+            </a:solidFill>
+            <a:tailEnd type="arrow"/>
+          </a:ln>
+        </p:spPr>
+        <p:style>
+          <a:lnRef idx="2">
+            <a:schemeClr val="accent1"/>
+          </a:lnRef>
+          <a:fillRef idx="0">
+            <a:schemeClr val="accent1"/>
+          </a:fillRef>
+          <a:effectRef idx="1">
+            <a:schemeClr val="accent1"/>
+          </a:effectRef>
+          <a:fontRef idx="minor">
+            <a:schemeClr val="tx1"/>
+          </a:fontRef>
+        </p:style>
+      </p:cxnSp>
+      <p:cxnSp>
+        <p:nvCxnSpPr>
+          <p:cNvPr id="35" name="Straight Arrow Connector 34"/>
+          <p:cNvCxnSpPr>
+            <a:endCxn id="39" idx="0"/>
+          </p:cNvCxnSpPr>
+          <p:nvPr/>
+        </p:nvCxnSpPr>
+        <p:spPr>
+          <a:xfrm>
+            <a:off x="4751635" y="2978380"/>
+            <a:ext cx="0" cy="449566"/>
+          </a:xfrm>
+          <a:prstGeom prst="straightConnector1">
+            <a:avLst/>
+          </a:prstGeom>
+          <a:ln>
+            <a:solidFill>
+              <a:schemeClr val="bg2">
+                <a:lumMod val="50000"/>
+              </a:schemeClr>
+            </a:solidFill>
+            <a:tailEnd type="arrow"/>
+          </a:ln>
+        </p:spPr>
+        <p:style>
+          <a:lnRef idx="2">
+            <a:schemeClr val="accent1"/>
+          </a:lnRef>
+          <a:fillRef idx="0">
+            <a:schemeClr val="accent1"/>
+          </a:fillRef>
+          <a:effectRef idx="1">
+            <a:schemeClr val="accent1"/>
+          </a:effectRef>
+          <a:fontRef idx="minor">
+            <a:schemeClr val="tx1"/>
+          </a:fontRef>
+        </p:style>
+      </p:cxnSp>
+      <p:cxnSp>
+        <p:nvCxnSpPr>
+          <p:cNvPr id="36" name="Straight Arrow Connector 35"/>
+          <p:cNvCxnSpPr>
+            <a:endCxn id="40" idx="0"/>
+          </p:cNvCxnSpPr>
+          <p:nvPr/>
+        </p:nvCxnSpPr>
+        <p:spPr>
+          <a:xfrm>
+            <a:off x="5350225" y="2978380"/>
+            <a:ext cx="0" cy="449566"/>
+          </a:xfrm>
+          <a:prstGeom prst="straightConnector1">
+            <a:avLst/>
+          </a:prstGeom>
+          <a:ln>
+            <a:solidFill>
+              <a:schemeClr val="bg2">
+                <a:lumMod val="50000"/>
+              </a:schemeClr>
+            </a:solidFill>
+            <a:tailEnd type="arrow"/>
+          </a:ln>
+        </p:spPr>
+        <p:style>
+          <a:lnRef idx="2">
+            <a:schemeClr val="accent1"/>
+          </a:lnRef>
+          <a:fillRef idx="0">
+            <a:schemeClr val="accent1"/>
+          </a:fillRef>
+          <a:effectRef idx="1">
+            <a:schemeClr val="accent1"/>
+          </a:effectRef>
+          <a:fontRef idx="minor">
+            <a:schemeClr val="tx1"/>
+          </a:fontRef>
+        </p:style>
+      </p:cxnSp>
+      <p:sp>
+        <p:nvSpPr>
+          <p:cNvPr id="42" name="Rounded Rectangle 41"/>
+          <p:cNvSpPr/>
+          <p:nvPr/>
+        </p:nvSpPr>
+        <p:spPr>
+          <a:xfrm>
+            <a:off x="3425101" y="4164112"/>
+            <a:ext cx="292203" cy="297838"/>
+          </a:xfrm>
+          <a:prstGeom prst="roundRect">
+            <a:avLst/>
+          </a:prstGeom>
+        </p:spPr>
+        <p:style>
+          <a:lnRef idx="1">
+            <a:schemeClr val="accent2"/>
+          </a:lnRef>
+          <a:fillRef idx="2">
+            <a:schemeClr val="accent2"/>
+          </a:fillRef>
+          <a:effectRef idx="1">
+            <a:schemeClr val="accent2"/>
+          </a:effectRef>
+          <a:fontRef idx="minor">
+            <a:schemeClr val="dk1"/>
+          </a:fontRef>
+        </p:style>
+        <p:txBody>
+          <a:bodyPr rtlCol="0" anchor="ctr"/>
+          <a:lstStyle/>
+          <a:p>
+            <a:pPr algn="ctr"/>
+            <a:endParaRPr lang="en-US"/>
+          </a:p>
+        </p:txBody>
+      </p:sp>
+      <p:sp>
+        <p:nvSpPr>
+          <p:cNvPr id="37" name="Predefined Process 36"/>
+          <p:cNvSpPr/>
+          <p:nvPr/>
+        </p:nvSpPr>
+        <p:spPr>
+          <a:xfrm>
+            <a:off x="3372079" y="3427946"/>
+            <a:ext cx="364756" cy="274690"/>
+          </a:xfrm>
+          <a:prstGeom prst="flowChartPredefinedProcess">
+            <a:avLst/>
+          </a:prstGeom>
+        </p:spPr>
+        <p:style>
+          <a:lnRef idx="1">
+            <a:schemeClr val="accent6"/>
+          </a:lnRef>
+          <a:fillRef idx="2">
+            <a:schemeClr val="accent6"/>
+          </a:fillRef>
+          <a:effectRef idx="1">
+            <a:schemeClr val="accent6"/>
+          </a:effectRef>
+          <a:fontRef idx="minor">
+            <a:schemeClr val="dk1"/>
+          </a:fontRef>
+        </p:style>
+        <p:txBody>
+          <a:bodyPr rtlCol="0" anchor="ctr"/>
+          <a:lstStyle/>
+          <a:p>
+            <a:pPr algn="ctr"/>
+            <a:r>
+              <a:rPr lang="en-US" sz="600" dirty="0" smtClean="0"/>
+              <a:t>()</a:t>
+            </a:r>
+            <a:endParaRPr lang="en-US" sz="600" dirty="0"/>
+          </a:p>
+        </p:txBody>
+      </p:sp>
+      <p:sp>
+        <p:nvSpPr>
+          <p:cNvPr id="38" name="Predefined Process 37"/>
+          <p:cNvSpPr/>
+          <p:nvPr/>
+        </p:nvSpPr>
+        <p:spPr>
+          <a:xfrm>
+            <a:off x="3970668" y="3427946"/>
+            <a:ext cx="364756" cy="274690"/>
+          </a:xfrm>
+          <a:prstGeom prst="flowChartPredefinedProcess">
+            <a:avLst/>
+          </a:prstGeom>
+        </p:spPr>
+        <p:style>
+          <a:lnRef idx="1">
+            <a:schemeClr val="accent6"/>
+          </a:lnRef>
+          <a:fillRef idx="2">
+            <a:schemeClr val="accent6"/>
+          </a:fillRef>
+          <a:effectRef idx="1">
+            <a:schemeClr val="accent6"/>
+          </a:effectRef>
+          <a:fontRef idx="minor">
+            <a:schemeClr val="dk1"/>
+          </a:fontRef>
+        </p:style>
+        <p:txBody>
+          <a:bodyPr rtlCol="0" anchor="ctr"/>
+          <a:lstStyle/>
+          <a:p>
+            <a:pPr algn="ctr"/>
+            <a:r>
+              <a:rPr lang="en-US" sz="600" dirty="0" smtClean="0"/>
+              <a:t>()</a:t>
+            </a:r>
+            <a:endParaRPr lang="en-US" sz="600" dirty="0"/>
+          </a:p>
+        </p:txBody>
+      </p:sp>
+      <p:sp>
+        <p:nvSpPr>
+          <p:cNvPr id="39" name="Predefined Process 38"/>
+          <p:cNvSpPr/>
+          <p:nvPr/>
+        </p:nvSpPr>
+        <p:spPr>
+          <a:xfrm>
+            <a:off x="4569257" y="3427946"/>
+            <a:ext cx="364756" cy="274690"/>
+          </a:xfrm>
+          <a:prstGeom prst="flowChartPredefinedProcess">
+            <a:avLst/>
+          </a:prstGeom>
+        </p:spPr>
+        <p:style>
+          <a:lnRef idx="1">
+            <a:schemeClr val="accent6"/>
+          </a:lnRef>
+          <a:fillRef idx="2">
+            <a:schemeClr val="accent6"/>
+          </a:fillRef>
+          <a:effectRef idx="1">
+            <a:schemeClr val="accent6"/>
+          </a:effectRef>
+          <a:fontRef idx="minor">
+            <a:schemeClr val="dk1"/>
+          </a:fontRef>
+        </p:style>
+        <p:txBody>
+          <a:bodyPr rtlCol="0" anchor="ctr"/>
+          <a:lstStyle/>
+          <a:p>
+            <a:pPr algn="ctr"/>
+            <a:r>
+              <a:rPr lang="en-US" sz="600" dirty="0" smtClean="0"/>
+              <a:t>()</a:t>
+            </a:r>
+            <a:endParaRPr lang="en-US" sz="600" dirty="0"/>
+          </a:p>
+        </p:txBody>
+      </p:sp>
+      <p:sp>
+        <p:nvSpPr>
+          <p:cNvPr id="40" name="Predefined Process 39"/>
+          <p:cNvSpPr/>
+          <p:nvPr/>
+        </p:nvSpPr>
+        <p:spPr>
+          <a:xfrm>
+            <a:off x="5167847" y="3427946"/>
+            <a:ext cx="364756" cy="274690"/>
+          </a:xfrm>
+          <a:prstGeom prst="flowChartPredefinedProcess">
+            <a:avLst/>
+          </a:prstGeom>
+        </p:spPr>
+        <p:style>
+          <a:lnRef idx="1">
+            <a:schemeClr val="accent6"/>
+          </a:lnRef>
+          <a:fillRef idx="2">
+            <a:schemeClr val="accent6"/>
+          </a:fillRef>
+          <a:effectRef idx="1">
+            <a:schemeClr val="accent6"/>
+          </a:effectRef>
+          <a:fontRef idx="minor">
+            <a:schemeClr val="dk1"/>
+          </a:fontRef>
+        </p:style>
+        <p:txBody>
+          <a:bodyPr rtlCol="0" anchor="ctr"/>
+          <a:lstStyle/>
+          <a:p>
+            <a:pPr algn="ctr"/>
+            <a:r>
+              <a:rPr lang="en-US" sz="600" dirty="0" smtClean="0"/>
+              <a:t>()</a:t>
+            </a:r>
+            <a:endParaRPr lang="en-US" sz="600" dirty="0"/>
+          </a:p>
+        </p:txBody>
+      </p:sp>
+      <p:cxnSp>
+        <p:nvCxnSpPr>
+          <p:cNvPr id="41" name="Straight Arrow Connector 40"/>
+          <p:cNvCxnSpPr/>
+          <p:nvPr/>
+        </p:nvCxnSpPr>
+        <p:spPr>
+          <a:xfrm>
+            <a:off x="4153046" y="3734885"/>
+            <a:ext cx="0" cy="404610"/>
+          </a:xfrm>
+          <a:prstGeom prst="straightConnector1">
+            <a:avLst/>
+          </a:prstGeom>
+          <a:ln>
+            <a:solidFill>
+              <a:schemeClr val="accent3">
+                <a:lumMod val="75000"/>
+              </a:schemeClr>
+            </a:solidFill>
+            <a:tailEnd type="arrow"/>
+          </a:ln>
+        </p:spPr>
+        <p:style>
+          <a:lnRef idx="2">
+            <a:schemeClr val="accent1"/>
+          </a:lnRef>
+          <a:fillRef idx="0">
+            <a:schemeClr val="accent1"/>
+          </a:fillRef>
+          <a:effectRef idx="1">
+            <a:schemeClr val="accent1"/>
+          </a:effectRef>
+          <a:fontRef idx="minor">
+            <a:schemeClr val="tx1"/>
+          </a:fontRef>
+        </p:style>
+      </p:cxnSp>
+      <p:sp>
+        <p:nvSpPr>
+          <p:cNvPr id="43" name="Rounded Rectangle 42"/>
+          <p:cNvSpPr/>
+          <p:nvPr/>
+        </p:nvSpPr>
+        <p:spPr>
+          <a:xfrm>
+            <a:off x="4006944" y="4167593"/>
+            <a:ext cx="292203" cy="297838"/>
+          </a:xfrm>
+          <a:prstGeom prst="roundRect">
+            <a:avLst/>
+          </a:prstGeom>
+        </p:spPr>
+        <p:style>
+          <a:lnRef idx="1">
+            <a:schemeClr val="accent3"/>
+          </a:lnRef>
+          <a:fillRef idx="2">
+            <a:schemeClr val="accent3"/>
+          </a:fillRef>
+          <a:effectRef idx="1">
+            <a:schemeClr val="accent3"/>
+          </a:effectRef>
+          <a:fontRef idx="minor">
+            <a:schemeClr val="dk1"/>
+          </a:fontRef>
+        </p:style>
+        <p:txBody>
+          <a:bodyPr rtlCol="0" anchor="ctr"/>
+          <a:lstStyle/>
+          <a:p>
+            <a:pPr algn="ctr"/>
+            <a:endParaRPr lang="en-US"/>
+          </a:p>
+        </p:txBody>
+      </p:sp>
+      <p:cxnSp>
+        <p:nvCxnSpPr>
+          <p:cNvPr id="44" name="Straight Arrow Connector 43"/>
+          <p:cNvCxnSpPr/>
+          <p:nvPr/>
+        </p:nvCxnSpPr>
+        <p:spPr>
+          <a:xfrm>
+            <a:off x="4763729" y="3731404"/>
+            <a:ext cx="0" cy="404610"/>
+          </a:xfrm>
+          <a:prstGeom prst="straightConnector1">
+            <a:avLst/>
+          </a:prstGeom>
+          <a:ln>
+            <a:solidFill>
+              <a:schemeClr val="accent3">
+                <a:lumMod val="75000"/>
+              </a:schemeClr>
+            </a:solidFill>
+            <a:tailEnd type="arrow"/>
+          </a:ln>
+        </p:spPr>
+        <p:style>
+          <a:lnRef idx="2">
+            <a:schemeClr val="accent1"/>
+          </a:lnRef>
+          <a:fillRef idx="0">
+            <a:schemeClr val="accent1"/>
+          </a:fillRef>
+          <a:effectRef idx="1">
+            <a:schemeClr val="accent1"/>
+          </a:effectRef>
+          <a:fontRef idx="minor">
+            <a:schemeClr val="tx1"/>
+          </a:fontRef>
+        </p:style>
+      </p:cxnSp>
+      <p:sp>
+        <p:nvSpPr>
+          <p:cNvPr id="45" name="Rounded Rectangle 44"/>
+          <p:cNvSpPr/>
+          <p:nvPr/>
+        </p:nvSpPr>
+        <p:spPr>
+          <a:xfrm>
+            <a:off x="4617627" y="4164112"/>
+            <a:ext cx="292203" cy="297838"/>
+          </a:xfrm>
+          <a:prstGeom prst="roundRect">
+            <a:avLst/>
+          </a:prstGeom>
+        </p:spPr>
+        <p:style>
+          <a:lnRef idx="1">
+            <a:schemeClr val="accent4"/>
+          </a:lnRef>
+          <a:fillRef idx="2">
+            <a:schemeClr val="accent4"/>
+          </a:fillRef>
+          <a:effectRef idx="1">
+            <a:schemeClr val="accent4"/>
+          </a:effectRef>
+          <a:fontRef idx="minor">
+            <a:schemeClr val="dk1"/>
+          </a:fontRef>
+        </p:style>
+        <p:txBody>
+          <a:bodyPr rtlCol="0" anchor="ctr"/>
+          <a:lstStyle/>
+          <a:p>
+            <a:pPr algn="ctr"/>
+            <a:endParaRPr lang="en-US"/>
+          </a:p>
+        </p:txBody>
+      </p:sp>
+      <p:cxnSp>
+        <p:nvCxnSpPr>
+          <p:cNvPr id="46" name="Straight Arrow Connector 45"/>
+          <p:cNvCxnSpPr/>
+          <p:nvPr/>
+        </p:nvCxnSpPr>
+        <p:spPr>
+          <a:xfrm>
+            <a:off x="5350225" y="3734885"/>
+            <a:ext cx="0" cy="404610"/>
+          </a:xfrm>
+          <a:prstGeom prst="straightConnector1">
+            <a:avLst/>
+          </a:prstGeom>
+          <a:ln>
+            <a:solidFill>
+              <a:schemeClr val="accent3">
+                <a:lumMod val="75000"/>
+              </a:schemeClr>
+            </a:solidFill>
+            <a:tailEnd type="arrow"/>
+          </a:ln>
+        </p:spPr>
+        <p:style>
+          <a:lnRef idx="2">
+            <a:schemeClr val="accent1"/>
+          </a:lnRef>
+          <a:fillRef idx="0">
+            <a:schemeClr val="accent1"/>
+          </a:fillRef>
+          <a:effectRef idx="1">
+            <a:schemeClr val="accent1"/>
+          </a:effectRef>
+          <a:fontRef idx="minor">
+            <a:schemeClr val="tx1"/>
+          </a:fontRef>
+        </p:style>
+      </p:cxnSp>
+      <p:sp>
+        <p:nvSpPr>
+          <p:cNvPr id="47" name="Rounded Rectangle 46"/>
+          <p:cNvSpPr/>
+          <p:nvPr/>
+        </p:nvSpPr>
+        <p:spPr>
+          <a:xfrm>
+            <a:off x="5204123" y="4167593"/>
+            <a:ext cx="292203" cy="297838"/>
+          </a:xfrm>
+          <a:prstGeom prst="roundRect">
+            <a:avLst/>
+          </a:prstGeom>
+        </p:spPr>
+        <p:style>
+          <a:lnRef idx="1">
+            <a:schemeClr val="accent5"/>
+          </a:lnRef>
+          <a:fillRef idx="2">
+            <a:schemeClr val="accent5"/>
+          </a:fillRef>
+          <a:effectRef idx="1">
+            <a:schemeClr val="accent5"/>
+          </a:effectRef>
+          <a:fontRef idx="minor">
+            <a:schemeClr val="dk1"/>
+          </a:fontRef>
+        </p:style>
+        <p:txBody>
+          <a:bodyPr rtlCol="0" anchor="ctr"/>
+          <a:lstStyle/>
+          <a:p>
+            <a:pPr algn="ctr"/>
+            <a:endParaRPr lang="en-US"/>
+          </a:p>
+        </p:txBody>
+      </p:sp>
+    </p:spTree>
+    <p:extLst>
+      <p:ext uri="{BB962C8B-B14F-4D97-AF65-F5344CB8AC3E}">
+        <p14:creationId xmlns:p14="http://schemas.microsoft.com/office/powerpoint/2010/main" val="3380543562"/>
+      </p:ext>
+    </p:extLst>
+  </p:cSld>
+  <p:clrMapOvr>
+    <a:masterClrMapping/>
+  </p:clrMapOvr>
+</p:sld>
+</file>
+
+<file path=ppt/slides/slide79.xml><?xml version="1.0" encoding="utf-8"?>
+<p:sld xmlns:a="http://schemas.openxmlformats.org/drawingml/2006/main" xmlns:r="http://schemas.openxmlformats.org/officeDocument/2006/relationships" xmlns:p="http://schemas.openxmlformats.org/presentationml/2006/main">
+  <p:cSld>
+    <p:spTree>
+      <p:nvGrpSpPr>
+        <p:cNvPr id="1" name=""/>
+        <p:cNvGrpSpPr/>
+        <p:nvPr/>
+      </p:nvGrpSpPr>
+      <p:grpSpPr>
+        <a:xfrm>
+          <a:off x="0" y="0"/>
+          <a:ext cx="0" cy="0"/>
+          <a:chOff x="0" y="0"/>
+          <a:chExt cx="0" cy="0"/>
+        </a:xfrm>
+      </p:grpSpPr>
+      <p:sp>
+        <p:nvSpPr>
+          <p:cNvPr id="2" name="Title 1"/>
+          <p:cNvSpPr>
+            <a:spLocks noGrp="1"/>
+          </p:cNvSpPr>
+          <p:nvPr>
+            <p:ph type="title"/>
+          </p:nvPr>
+        </p:nvSpPr>
+        <p:spPr/>
+        <p:txBody>
+          <a:bodyPr/>
+          <a:lstStyle/>
+          <a:p>
+            <a:r>
+              <a:rPr lang="en-US" dirty="0" smtClean="0"/>
+              <a:t>Print Temperature Taken per Day</a:t>
+            </a:r>
+            <a:endParaRPr lang="en-US" dirty="0"/>
+          </a:p>
+        </p:txBody>
+      </p:sp>
+      <p:sp>
+        <p:nvSpPr>
+          <p:cNvPr id="19" name="Rectangle 18"/>
+          <p:cNvSpPr/>
+          <p:nvPr/>
+        </p:nvSpPr>
+        <p:spPr>
+          <a:xfrm>
+            <a:off x="3306683" y="1644589"/>
+            <a:ext cx="2278038" cy="696158"/>
+          </a:xfrm>
+          <a:prstGeom prst="rect">
+            <a:avLst/>
+          </a:prstGeom>
+        </p:spPr>
+        <p:style>
+          <a:lnRef idx="2">
+            <a:schemeClr val="accent2">
+              <a:shade val="50000"/>
+            </a:schemeClr>
+          </a:lnRef>
+          <a:fillRef idx="1">
+            <a:schemeClr val="accent2"/>
+          </a:fillRef>
+          <a:effectRef idx="0">
+            <a:schemeClr val="accent2"/>
+          </a:effectRef>
+          <a:fontRef idx="minor">
+            <a:schemeClr val="lt1"/>
+          </a:fontRef>
+        </p:style>
+        <p:txBody>
+          <a:bodyPr rtlCol="0" anchor="ctr"/>
+          <a:lstStyle/>
+          <a:p>
+            <a:pPr algn="ctr"/>
+            <a:endParaRPr lang="en-US"/>
+          </a:p>
+        </p:txBody>
+      </p:sp>
+      <p:sp>
+        <p:nvSpPr>
+          <p:cNvPr id="20" name="Rounded Rectangle 19"/>
+          <p:cNvSpPr/>
+          <p:nvPr/>
+        </p:nvSpPr>
+        <p:spPr>
+          <a:xfrm>
+            <a:off x="3411412" y="1715504"/>
+            <a:ext cx="603668" cy="297838"/>
+          </a:xfrm>
+          <a:prstGeom prst="roundRect">
+            <a:avLst/>
+          </a:prstGeom>
+          <a:scene3d>
+            <a:camera prst="orthographicFront"/>
+            <a:lightRig rig="threePt" dir="t"/>
+          </a:scene3d>
+          <a:sp3d>
+            <a:bevelT w="152400" h="50800" prst="softRound"/>
+          </a:sp3d>
+        </p:spPr>
+        <p:style>
+          <a:lnRef idx="1">
+            <a:schemeClr val="accent1"/>
+          </a:lnRef>
+          <a:fillRef idx="3">
+            <a:schemeClr val="accent1"/>
+          </a:fillRef>
+          <a:effectRef idx="2">
+            <a:schemeClr val="accent1"/>
+          </a:effectRef>
+          <a:fontRef idx="minor">
+            <a:schemeClr val="lt1"/>
+          </a:fontRef>
+        </p:style>
+        <p:txBody>
+          <a:bodyPr rtlCol="0" anchor="ctr"/>
+          <a:lstStyle/>
+          <a:p>
+            <a:pPr algn="ctr"/>
+            <a:r>
+              <a:rPr lang="en-US" sz="1050" dirty="0" smtClean="0"/>
+              <a:t>76</a:t>
+            </a:r>
+            <a:endParaRPr lang="en-US" sz="1050" dirty="0"/>
+          </a:p>
+        </p:txBody>
+      </p:sp>
+      <p:sp>
+        <p:nvSpPr>
+          <p:cNvPr id="22" name="Rounded Rectangle 21"/>
+          <p:cNvSpPr/>
+          <p:nvPr/>
+        </p:nvSpPr>
+        <p:spPr>
+          <a:xfrm>
+            <a:off x="4120802" y="1715504"/>
+            <a:ext cx="603668" cy="297838"/>
+          </a:xfrm>
+          <a:prstGeom prst="roundRect">
+            <a:avLst/>
+          </a:prstGeom>
+          <a:scene3d>
+            <a:camera prst="orthographicFront"/>
+            <a:lightRig rig="threePt" dir="t"/>
+          </a:scene3d>
+          <a:sp3d>
+            <a:bevelT w="152400" h="50800" prst="softRound"/>
+          </a:sp3d>
+        </p:spPr>
+        <p:style>
+          <a:lnRef idx="1">
+            <a:schemeClr val="accent1"/>
+          </a:lnRef>
+          <a:fillRef idx="3">
+            <a:schemeClr val="accent1"/>
+          </a:fillRef>
+          <a:effectRef idx="2">
+            <a:schemeClr val="accent1"/>
+          </a:effectRef>
+          <a:fontRef idx="minor">
+            <a:schemeClr val="lt1"/>
+          </a:fontRef>
+        </p:style>
+        <p:txBody>
+          <a:bodyPr rtlCol="0" anchor="ctr"/>
+          <a:lstStyle/>
+          <a:p>
+            <a:pPr algn="ctr"/>
+            <a:r>
+              <a:rPr lang="en-US" sz="1050" dirty="0" smtClean="0"/>
+              <a:t>81</a:t>
+            </a:r>
+            <a:endParaRPr lang="en-US" sz="1050" dirty="0"/>
+          </a:p>
+        </p:txBody>
+      </p:sp>
+      <p:sp>
+        <p:nvSpPr>
+          <p:cNvPr id="24" name="Rounded Rectangle 23"/>
+          <p:cNvSpPr/>
+          <p:nvPr/>
+        </p:nvSpPr>
+        <p:spPr>
+          <a:xfrm>
+            <a:off x="4830192" y="1715504"/>
+            <a:ext cx="603668" cy="297838"/>
+          </a:xfrm>
+          <a:prstGeom prst="roundRect">
+            <a:avLst/>
+          </a:prstGeom>
+          <a:scene3d>
+            <a:camera prst="orthographicFront"/>
+            <a:lightRig rig="threePt" dir="t"/>
+          </a:scene3d>
+          <a:sp3d>
+            <a:bevelT w="152400" h="50800" prst="softRound"/>
+          </a:sp3d>
+        </p:spPr>
+        <p:style>
+          <a:lnRef idx="1">
+            <a:schemeClr val="accent1"/>
+          </a:lnRef>
+          <a:fillRef idx="3">
+            <a:schemeClr val="accent1"/>
+          </a:fillRef>
+          <a:effectRef idx="2">
+            <a:schemeClr val="accent1"/>
+          </a:effectRef>
+          <a:fontRef idx="minor">
+            <a:schemeClr val="lt1"/>
+          </a:fontRef>
+        </p:style>
+        <p:txBody>
+          <a:bodyPr rtlCol="0" anchor="ctr"/>
+          <a:lstStyle/>
+          <a:p>
+            <a:pPr algn="ctr"/>
+            <a:r>
+              <a:rPr lang="en-US" sz="1050" dirty="0" smtClean="0"/>
+              <a:t>79</a:t>
+            </a:r>
+            <a:endParaRPr lang="en-US" sz="1050" dirty="0"/>
+          </a:p>
+        </p:txBody>
+      </p:sp>
+      <p:sp>
+        <p:nvSpPr>
+          <p:cNvPr id="26" name="TextBox 25"/>
+          <p:cNvSpPr txBox="1"/>
+          <p:nvPr/>
+        </p:nvSpPr>
+        <p:spPr>
+          <a:xfrm>
+            <a:off x="3603147" y="2055189"/>
+            <a:ext cx="292203" cy="246221"/>
+          </a:xfrm>
+          <a:prstGeom prst="rect">
+            <a:avLst/>
+          </a:prstGeom>
+          <a:noFill/>
+        </p:spPr>
+        <p:txBody>
+          <a:bodyPr wrap="square" rtlCol="0">
+            <a:spAutoFit/>
+          </a:bodyPr>
+          <a:lstStyle/>
+          <a:p>
+            <a:r>
+              <a:rPr lang="en-US" sz="1000" dirty="0" smtClean="0"/>
+              <a:t>0</a:t>
+            </a:r>
+            <a:endParaRPr lang="en-US" sz="1000" dirty="0"/>
+          </a:p>
+        </p:txBody>
+      </p:sp>
+      <p:sp>
+        <p:nvSpPr>
+          <p:cNvPr id="28" name="TextBox 27"/>
+          <p:cNvSpPr txBox="1"/>
+          <p:nvPr/>
+        </p:nvSpPr>
+        <p:spPr>
+          <a:xfrm>
+            <a:off x="4323277" y="2091326"/>
+            <a:ext cx="292203" cy="246221"/>
+          </a:xfrm>
+          <a:prstGeom prst="rect">
+            <a:avLst/>
+          </a:prstGeom>
+          <a:noFill/>
+        </p:spPr>
+        <p:txBody>
+          <a:bodyPr wrap="square" rtlCol="0">
+            <a:spAutoFit/>
+          </a:bodyPr>
+          <a:lstStyle/>
+          <a:p>
+            <a:r>
+              <a:rPr lang="en-US" sz="1000" dirty="0"/>
+              <a:t>1</a:t>
+            </a:r>
+            <a:endParaRPr lang="en-US" sz="1000" dirty="0"/>
+          </a:p>
+        </p:txBody>
+      </p:sp>
+      <p:sp>
+        <p:nvSpPr>
+          <p:cNvPr id="30" name="TextBox 29"/>
+          <p:cNvSpPr txBox="1"/>
+          <p:nvPr/>
+        </p:nvSpPr>
+        <p:spPr>
+          <a:xfrm>
+            <a:off x="5012413" y="2092926"/>
+            <a:ext cx="292203" cy="246221"/>
+          </a:xfrm>
+          <a:prstGeom prst="rect">
+            <a:avLst/>
+          </a:prstGeom>
+          <a:noFill/>
+        </p:spPr>
+        <p:txBody>
+          <a:bodyPr wrap="square" rtlCol="0">
+            <a:spAutoFit/>
+          </a:bodyPr>
+          <a:lstStyle/>
+          <a:p>
+            <a:r>
+              <a:rPr lang="en-US" sz="1000" dirty="0" smtClean="0"/>
+              <a:t>2</a:t>
+            </a:r>
+            <a:endParaRPr lang="en-US" sz="1000" dirty="0"/>
+          </a:p>
+        </p:txBody>
+      </p:sp>
+      <p:cxnSp>
+        <p:nvCxnSpPr>
+          <p:cNvPr id="6" name="Straight Arrow Connector 5"/>
+          <p:cNvCxnSpPr>
+            <a:endCxn id="39" idx="0"/>
+          </p:cNvCxnSpPr>
+          <p:nvPr/>
+        </p:nvCxnSpPr>
+        <p:spPr>
+          <a:xfrm>
+            <a:off x="3725594" y="2364730"/>
+            <a:ext cx="0" cy="232188"/>
+          </a:xfrm>
+          <a:prstGeom prst="straightConnector1">
+            <a:avLst/>
+          </a:prstGeom>
+          <a:ln>
+            <a:solidFill>
+              <a:schemeClr val="bg2">
+                <a:lumMod val="50000"/>
+              </a:schemeClr>
+            </a:solidFill>
+            <a:tailEnd type="arrow"/>
+          </a:ln>
+        </p:spPr>
+        <p:style>
+          <a:lnRef idx="2">
+            <a:schemeClr val="accent1"/>
+          </a:lnRef>
+          <a:fillRef idx="0">
+            <a:schemeClr val="accent1"/>
+          </a:fillRef>
+          <a:effectRef idx="1">
+            <a:schemeClr val="accent1"/>
+          </a:effectRef>
+          <a:fontRef idx="minor">
+            <a:schemeClr val="tx1"/>
+          </a:fontRef>
+        </p:style>
+      </p:cxnSp>
+      <p:sp>
+        <p:nvSpPr>
+          <p:cNvPr id="42" name="Rounded Rectangle 41"/>
+          <p:cNvSpPr/>
+          <p:nvPr/>
+        </p:nvSpPr>
+        <p:spPr>
+          <a:xfrm>
+            <a:off x="5384106" y="3689319"/>
+            <a:ext cx="1697027" cy="297838"/>
+          </a:xfrm>
+          <a:prstGeom prst="roundRect">
+            <a:avLst/>
+          </a:prstGeom>
+        </p:spPr>
+        <p:style>
+          <a:lnRef idx="1">
+            <a:schemeClr val="accent2"/>
+          </a:lnRef>
+          <a:fillRef idx="2">
+            <a:schemeClr val="accent2"/>
+          </a:fillRef>
+          <a:effectRef idx="1">
+            <a:schemeClr val="accent2"/>
+          </a:effectRef>
+          <a:fontRef idx="minor">
+            <a:schemeClr val="dk1"/>
+          </a:fontRef>
+        </p:style>
+        <p:txBody>
+          <a:bodyPr rtlCol="0" anchor="ctr"/>
+          <a:lstStyle/>
+          <a:p>
+            <a:pPr algn="ctr"/>
+            <a:r>
+              <a:rPr lang="en-US" sz="1100" dirty="0" smtClean="0"/>
+              <a:t>It was 78 </a:t>
+            </a:r>
+            <a:r>
+              <a:rPr lang="en-US" sz="1100" dirty="0" err="1" smtClean="0"/>
+              <a:t>deg</a:t>
+            </a:r>
+            <a:r>
+              <a:rPr lang="en-US" sz="1100" dirty="0" smtClean="0"/>
+              <a:t> at 8am </a:t>
+            </a:r>
+            <a:endParaRPr lang="en-US" sz="1100" dirty="0"/>
+          </a:p>
+        </p:txBody>
+      </p:sp>
+      <p:sp>
+        <p:nvSpPr>
+          <p:cNvPr id="39" name="Predefined Process 38"/>
+          <p:cNvSpPr/>
+          <p:nvPr/>
+        </p:nvSpPr>
+        <p:spPr>
+          <a:xfrm>
+            <a:off x="3483964" y="2596918"/>
+            <a:ext cx="483259" cy="314697"/>
+          </a:xfrm>
+          <a:prstGeom prst="flowChartPredefinedProcess">
+            <a:avLst/>
+          </a:prstGeom>
+        </p:spPr>
+        <p:style>
+          <a:lnRef idx="1">
+            <a:schemeClr val="accent6"/>
+          </a:lnRef>
+          <a:fillRef idx="2">
+            <a:schemeClr val="accent6"/>
+          </a:fillRef>
+          <a:effectRef idx="1">
+            <a:schemeClr val="accent6"/>
+          </a:effectRef>
+          <a:fontRef idx="minor">
+            <a:schemeClr val="dk1"/>
+          </a:fontRef>
+        </p:style>
+        <p:txBody>
+          <a:bodyPr rtlCol="0" anchor="ctr"/>
+          <a:lstStyle/>
+          <a:p>
+            <a:pPr algn="ctr"/>
+            <a:r>
+              <a:rPr lang="en-US" sz="1050" dirty="0" smtClean="0"/>
+              <a:t>(</a:t>
+            </a:r>
+            <a:r>
+              <a:rPr lang="is-IS" sz="1050" dirty="0" smtClean="0"/>
+              <a:t>…</a:t>
+            </a:r>
+            <a:r>
+              <a:rPr lang="en-US" sz="1050" dirty="0" smtClean="0"/>
+              <a:t>)</a:t>
+            </a:r>
+            <a:endParaRPr lang="en-US" sz="1050" dirty="0"/>
+          </a:p>
+        </p:txBody>
+      </p:sp>
+      <p:cxnSp>
+        <p:nvCxnSpPr>
+          <p:cNvPr id="48" name="Straight Arrow Connector 47"/>
+          <p:cNvCxnSpPr/>
+          <p:nvPr/>
+        </p:nvCxnSpPr>
+        <p:spPr>
+          <a:xfrm flipH="1">
+            <a:off x="4451369" y="2364730"/>
+            <a:ext cx="2" cy="209235"/>
+          </a:xfrm>
+          <a:prstGeom prst="straightConnector1">
+            <a:avLst/>
+          </a:prstGeom>
+          <a:ln>
+            <a:solidFill>
+              <a:schemeClr val="bg2">
+                <a:lumMod val="50000"/>
+              </a:schemeClr>
+            </a:solidFill>
+            <a:tailEnd type="arrow"/>
+          </a:ln>
+        </p:spPr>
+        <p:style>
+          <a:lnRef idx="2">
+            <a:schemeClr val="accent1"/>
+          </a:lnRef>
+          <a:fillRef idx="0">
+            <a:schemeClr val="accent1"/>
+          </a:fillRef>
+          <a:effectRef idx="1">
+            <a:schemeClr val="accent1"/>
+          </a:effectRef>
+          <a:fontRef idx="minor">
+            <a:schemeClr val="tx1"/>
+          </a:fontRef>
+        </p:style>
+      </p:cxnSp>
+      <p:sp>
+        <p:nvSpPr>
+          <p:cNvPr id="49" name="Rounded Rectangle 48"/>
+          <p:cNvSpPr/>
+          <p:nvPr/>
+        </p:nvSpPr>
+        <p:spPr>
+          <a:xfrm>
+            <a:off x="5384106" y="3319097"/>
+            <a:ext cx="1697027" cy="297838"/>
+          </a:xfrm>
+          <a:prstGeom prst="roundRect">
+            <a:avLst/>
+          </a:prstGeom>
+        </p:spPr>
+        <p:style>
+          <a:lnRef idx="1">
+            <a:schemeClr val="accent2"/>
+          </a:lnRef>
+          <a:fillRef idx="2">
+            <a:schemeClr val="accent2"/>
+          </a:fillRef>
+          <a:effectRef idx="1">
+            <a:schemeClr val="accent2"/>
+          </a:effectRef>
+          <a:fontRef idx="minor">
+            <a:schemeClr val="dk1"/>
+          </a:fontRef>
+        </p:style>
+        <p:txBody>
+          <a:bodyPr rtlCol="0" anchor="ctr"/>
+          <a:lstStyle/>
+          <a:p>
+            <a:pPr algn="ctr"/>
+            <a:r>
+              <a:rPr lang="en-US" sz="1100" dirty="0" smtClean="0"/>
+              <a:t>It was 81 </a:t>
+            </a:r>
+            <a:r>
+              <a:rPr lang="en-US" sz="1100" dirty="0" err="1" smtClean="0"/>
+              <a:t>deg</a:t>
+            </a:r>
+            <a:r>
+              <a:rPr lang="en-US" sz="1100" dirty="0" smtClean="0"/>
+              <a:t> at 12pm </a:t>
+            </a:r>
+            <a:endParaRPr lang="en-US" sz="1100" dirty="0"/>
+          </a:p>
+        </p:txBody>
+      </p:sp>
+      <p:sp>
+        <p:nvSpPr>
+          <p:cNvPr id="51" name="Predefined Process 50"/>
+          <p:cNvSpPr/>
+          <p:nvPr/>
+        </p:nvSpPr>
+        <p:spPr>
+          <a:xfrm>
+            <a:off x="4198501" y="2596918"/>
+            <a:ext cx="483259" cy="314697"/>
+          </a:xfrm>
+          <a:prstGeom prst="flowChartPredefinedProcess">
+            <a:avLst/>
+          </a:prstGeom>
+        </p:spPr>
+        <p:style>
+          <a:lnRef idx="1">
+            <a:schemeClr val="accent6"/>
+          </a:lnRef>
+          <a:fillRef idx="2">
+            <a:schemeClr val="accent6"/>
+          </a:fillRef>
+          <a:effectRef idx="1">
+            <a:schemeClr val="accent6"/>
+          </a:effectRef>
+          <a:fontRef idx="minor">
+            <a:schemeClr val="dk1"/>
+          </a:fontRef>
+        </p:style>
+        <p:txBody>
+          <a:bodyPr rtlCol="0" anchor="ctr"/>
+          <a:lstStyle/>
+          <a:p>
+            <a:pPr algn="ctr"/>
+            <a:r>
+              <a:rPr lang="en-US" sz="1050" dirty="0" smtClean="0"/>
+              <a:t>(</a:t>
+            </a:r>
+            <a:r>
+              <a:rPr lang="is-IS" sz="1050" dirty="0" smtClean="0"/>
+              <a:t>…</a:t>
+            </a:r>
+            <a:r>
+              <a:rPr lang="en-US" sz="1050" dirty="0" smtClean="0"/>
+              <a:t>)</a:t>
+            </a:r>
+            <a:endParaRPr lang="en-US" sz="1050" dirty="0"/>
+          </a:p>
+        </p:txBody>
+      </p:sp>
+      <p:cxnSp>
+        <p:nvCxnSpPr>
+          <p:cNvPr id="53" name="Straight Arrow Connector 52"/>
+          <p:cNvCxnSpPr/>
+          <p:nvPr/>
+        </p:nvCxnSpPr>
+        <p:spPr>
+          <a:xfrm>
+            <a:off x="5142476" y="2364730"/>
+            <a:ext cx="2" cy="209235"/>
+          </a:xfrm>
+          <a:prstGeom prst="straightConnector1">
+            <a:avLst/>
+          </a:prstGeom>
+          <a:ln>
+            <a:solidFill>
+              <a:schemeClr val="bg2">
+                <a:lumMod val="50000"/>
+              </a:schemeClr>
+            </a:solidFill>
+            <a:tailEnd type="arrow"/>
+          </a:ln>
+        </p:spPr>
+        <p:style>
+          <a:lnRef idx="2">
+            <a:schemeClr val="accent1"/>
+          </a:lnRef>
+          <a:fillRef idx="0">
+            <a:schemeClr val="accent1"/>
+          </a:fillRef>
+          <a:effectRef idx="1">
+            <a:schemeClr val="accent1"/>
+          </a:effectRef>
+          <a:fontRef idx="minor">
+            <a:schemeClr val="tx1"/>
+          </a:fontRef>
+        </p:style>
+      </p:cxnSp>
+      <p:sp>
+        <p:nvSpPr>
+          <p:cNvPr id="54" name="Rounded Rectangle 53"/>
+          <p:cNvSpPr/>
+          <p:nvPr/>
+        </p:nvSpPr>
+        <p:spPr>
+          <a:xfrm>
+            <a:off x="5384106" y="2954433"/>
+            <a:ext cx="1697027" cy="297838"/>
+          </a:xfrm>
+          <a:prstGeom prst="roundRect">
+            <a:avLst/>
+          </a:prstGeom>
+        </p:spPr>
+        <p:style>
+          <a:lnRef idx="1">
+            <a:schemeClr val="accent2"/>
+          </a:lnRef>
+          <a:fillRef idx="2">
+            <a:schemeClr val="accent2"/>
+          </a:fillRef>
+          <a:effectRef idx="1">
+            <a:schemeClr val="accent2"/>
+          </a:effectRef>
+          <a:fontRef idx="minor">
+            <a:schemeClr val="dk1"/>
+          </a:fontRef>
+        </p:style>
+        <p:txBody>
+          <a:bodyPr rtlCol="0" anchor="ctr"/>
+          <a:lstStyle/>
+          <a:p>
+            <a:pPr algn="ctr"/>
+            <a:r>
+              <a:rPr lang="en-US" sz="1100" dirty="0" smtClean="0"/>
+              <a:t>It was 79 </a:t>
+            </a:r>
+            <a:r>
+              <a:rPr lang="en-US" sz="1100" dirty="0" err="1" smtClean="0"/>
+              <a:t>deg</a:t>
+            </a:r>
+            <a:r>
+              <a:rPr lang="en-US" sz="1100" dirty="0" smtClean="0"/>
+              <a:t> at 6pm </a:t>
+            </a:r>
+            <a:endParaRPr lang="en-US" sz="1100" dirty="0"/>
+          </a:p>
+        </p:txBody>
+      </p:sp>
+      <p:sp>
+        <p:nvSpPr>
+          <p:cNvPr id="57" name="Predefined Process 56"/>
+          <p:cNvSpPr/>
+          <p:nvPr/>
+        </p:nvSpPr>
+        <p:spPr>
+          <a:xfrm>
+            <a:off x="4900847" y="2594433"/>
+            <a:ext cx="483259" cy="314697"/>
+          </a:xfrm>
+          <a:prstGeom prst="flowChartPredefinedProcess">
+            <a:avLst/>
+          </a:prstGeom>
+        </p:spPr>
+        <p:style>
+          <a:lnRef idx="1">
+            <a:schemeClr val="accent6"/>
+          </a:lnRef>
+          <a:fillRef idx="2">
+            <a:schemeClr val="accent6"/>
+          </a:fillRef>
+          <a:effectRef idx="1">
+            <a:schemeClr val="accent6"/>
+          </a:effectRef>
+          <a:fontRef idx="minor">
+            <a:schemeClr val="dk1"/>
+          </a:fontRef>
+        </p:style>
+        <p:txBody>
+          <a:bodyPr rtlCol="0" anchor="ctr"/>
+          <a:lstStyle/>
+          <a:p>
+            <a:pPr algn="ctr"/>
+            <a:r>
+              <a:rPr lang="en-US" sz="1050" dirty="0" smtClean="0"/>
+              <a:t>(</a:t>
+            </a:r>
+            <a:r>
+              <a:rPr lang="is-IS" sz="1050" dirty="0" smtClean="0"/>
+              <a:t>…</a:t>
+            </a:r>
+            <a:r>
+              <a:rPr lang="en-US" sz="1050" dirty="0" smtClean="0"/>
+              <a:t>)</a:t>
+            </a:r>
+            <a:endParaRPr lang="en-US" sz="1050" dirty="0"/>
+          </a:p>
+        </p:txBody>
+      </p:sp>
+      <p:cxnSp>
+        <p:nvCxnSpPr>
+          <p:cNvPr id="59" name="Elbow Connector 58"/>
+          <p:cNvCxnSpPr>
+            <a:stCxn id="57" idx="2"/>
+            <a:endCxn id="54" idx="1"/>
+          </p:cNvCxnSpPr>
+          <p:nvPr/>
+        </p:nvCxnSpPr>
+        <p:spPr>
+          <a:xfrm rot="16200000" flipH="1">
+            <a:off x="5166180" y="2885426"/>
+            <a:ext cx="194222" cy="241629"/>
+          </a:xfrm>
+          <a:prstGeom prst="bentConnector2">
+            <a:avLst/>
+          </a:prstGeom>
+          <a:ln>
+            <a:solidFill>
+              <a:srgbClr val="948A54"/>
+            </a:solidFill>
+            <a:tailEnd type="arrow"/>
+          </a:ln>
+        </p:spPr>
+        <p:style>
+          <a:lnRef idx="2">
+            <a:schemeClr val="accent1"/>
+          </a:lnRef>
+          <a:fillRef idx="0">
+            <a:schemeClr val="accent1"/>
+          </a:fillRef>
+          <a:effectRef idx="1">
+            <a:schemeClr val="accent1"/>
+          </a:effectRef>
+          <a:fontRef idx="minor">
+            <a:schemeClr val="tx1"/>
+          </a:fontRef>
+        </p:style>
+      </p:cxnSp>
+      <p:cxnSp>
+        <p:nvCxnSpPr>
+          <p:cNvPr id="62" name="Elbow Connector 61"/>
+          <p:cNvCxnSpPr>
+            <a:stCxn id="51" idx="2"/>
+            <a:endCxn id="49" idx="1"/>
+          </p:cNvCxnSpPr>
+          <p:nvPr/>
+        </p:nvCxnSpPr>
+        <p:spPr>
+          <a:xfrm rot="16200000" flipH="1">
+            <a:off x="4633918" y="2717827"/>
+            <a:ext cx="556401" cy="943975"/>
+          </a:xfrm>
+          <a:prstGeom prst="bentConnector2">
+            <a:avLst/>
+          </a:prstGeom>
+          <a:ln>
+            <a:solidFill>
+              <a:srgbClr val="948A54"/>
+            </a:solidFill>
+            <a:tailEnd type="arrow"/>
+          </a:ln>
+        </p:spPr>
+        <p:style>
+          <a:lnRef idx="2">
+            <a:schemeClr val="accent1"/>
+          </a:lnRef>
+          <a:fillRef idx="0">
+            <a:schemeClr val="accent1"/>
+          </a:fillRef>
+          <a:effectRef idx="1">
+            <a:schemeClr val="accent1"/>
+          </a:effectRef>
+          <a:fontRef idx="minor">
+            <a:schemeClr val="tx1"/>
+          </a:fontRef>
+        </p:style>
+      </p:cxnSp>
+      <p:cxnSp>
+        <p:nvCxnSpPr>
+          <p:cNvPr id="66" name="Elbow Connector 65"/>
+          <p:cNvCxnSpPr>
+            <a:stCxn id="39" idx="2"/>
+            <a:endCxn id="42" idx="1"/>
+          </p:cNvCxnSpPr>
+          <p:nvPr/>
+        </p:nvCxnSpPr>
+        <p:spPr>
+          <a:xfrm rot="16200000" flipH="1">
+            <a:off x="4091539" y="2545670"/>
+            <a:ext cx="926623" cy="1658512"/>
+          </a:xfrm>
+          <a:prstGeom prst="bentConnector2">
+            <a:avLst/>
+          </a:prstGeom>
+          <a:ln>
+            <a:solidFill>
+              <a:srgbClr val="948A54"/>
+            </a:solidFill>
+            <a:tailEnd type="arrow"/>
+          </a:ln>
+        </p:spPr>
+        <p:style>
+          <a:lnRef idx="2">
+            <a:schemeClr val="accent1"/>
+          </a:lnRef>
+          <a:fillRef idx="0">
+            <a:schemeClr val="accent1"/>
+          </a:fillRef>
+          <a:effectRef idx="1">
+            <a:schemeClr val="accent1"/>
+          </a:effectRef>
+          <a:fontRef idx="minor">
+            <a:schemeClr val="tx1"/>
+          </a:fontRef>
+        </p:style>
+      </p:cxnSp>
+    </p:spTree>
+    <p:extLst>
+      <p:ext uri="{BB962C8B-B14F-4D97-AF65-F5344CB8AC3E}">
+        <p14:creationId xmlns:p14="http://schemas.microsoft.com/office/powerpoint/2010/main" val="2714916313"/>
+      </p:ext>
+    </p:extLst>
+  </p:cSld>
+  <p:clrMapOvr>
+    <a:masterClrMapping/>
+  </p:clrMapOvr>
+</p:sld>
+</file>
+
 <file path=ppt/slides/slide8.xml><?xml version="1.0" encoding="utf-8"?>
 <p:sld xmlns:a="http://schemas.openxmlformats.org/drawingml/2006/main" xmlns:r="http://schemas.openxmlformats.org/officeDocument/2006/relationships" xmlns:p="http://schemas.openxmlformats.org/presentationml/2006/main">
   <p:cSld>
@@ -36178,6 +38306,1775 @@
       </p:par>
     </p:tnLst>
   </p:timing>
+</p:sld>
+</file>
+
+<file path=ppt/slides/slide80.xml><?xml version="1.0" encoding="utf-8"?>
+<p:sld xmlns:a="http://schemas.openxmlformats.org/drawingml/2006/main" xmlns:r="http://schemas.openxmlformats.org/officeDocument/2006/relationships" xmlns:p="http://schemas.openxmlformats.org/presentationml/2006/main">
+  <p:cSld>
+    <p:spTree>
+      <p:nvGrpSpPr>
+        <p:cNvPr id="1" name=""/>
+        <p:cNvGrpSpPr/>
+        <p:nvPr/>
+      </p:nvGrpSpPr>
+      <p:grpSpPr>
+        <a:xfrm>
+          <a:off x="0" y="0"/>
+          <a:ext cx="0" cy="0"/>
+          <a:chOff x="0" y="0"/>
+          <a:chExt cx="0" cy="0"/>
+        </a:xfrm>
+      </p:grpSpPr>
+      <p:sp>
+        <p:nvSpPr>
+          <p:cNvPr id="2" name="Title 1"/>
+          <p:cNvSpPr>
+            <a:spLocks noGrp="1"/>
+          </p:cNvSpPr>
+          <p:nvPr>
+            <p:ph type="title"/>
+          </p:nvPr>
+        </p:nvSpPr>
+        <p:spPr/>
+        <p:txBody>
+          <a:bodyPr/>
+          <a:lstStyle/>
+          <a:p>
+            <a:r>
+              <a:rPr lang="en-US" dirty="0"/>
+              <a:t>r</a:t>
+            </a:r>
+            <a:r>
+              <a:rPr lang="en-US" dirty="0" smtClean="0"/>
+              <a:t>educe()</a:t>
+            </a:r>
+            <a:endParaRPr lang="en-US" dirty="0"/>
+          </a:p>
+        </p:txBody>
+      </p:sp>
+      <p:sp>
+        <p:nvSpPr>
+          <p:cNvPr id="19" name="Rectangle 18"/>
+          <p:cNvSpPr/>
+          <p:nvPr/>
+        </p:nvSpPr>
+        <p:spPr>
+          <a:xfrm>
+            <a:off x="3306683" y="2240244"/>
+            <a:ext cx="2278038" cy="696158"/>
+          </a:xfrm>
+          <a:prstGeom prst="rect">
+            <a:avLst/>
+          </a:prstGeom>
+        </p:spPr>
+        <p:style>
+          <a:lnRef idx="2">
+            <a:schemeClr val="accent2">
+              <a:shade val="50000"/>
+            </a:schemeClr>
+          </a:lnRef>
+          <a:fillRef idx="1">
+            <a:schemeClr val="accent2"/>
+          </a:fillRef>
+          <a:effectRef idx="0">
+            <a:schemeClr val="accent2"/>
+          </a:effectRef>
+          <a:fontRef idx="minor">
+            <a:schemeClr val="lt1"/>
+          </a:fontRef>
+        </p:style>
+        <p:txBody>
+          <a:bodyPr rtlCol="0" anchor="ctr"/>
+          <a:lstStyle/>
+          <a:p>
+            <a:pPr algn="ctr"/>
+            <a:endParaRPr lang="en-US"/>
+          </a:p>
+        </p:txBody>
+      </p:sp>
+      <p:sp>
+        <p:nvSpPr>
+          <p:cNvPr id="20" name="Rounded Rectangle 19"/>
+          <p:cNvSpPr/>
+          <p:nvPr/>
+        </p:nvSpPr>
+        <p:spPr>
+          <a:xfrm>
+            <a:off x="3411412" y="2311159"/>
+            <a:ext cx="292203" cy="297838"/>
+          </a:xfrm>
+          <a:prstGeom prst="roundRect">
+            <a:avLst/>
+          </a:prstGeom>
+          <a:scene3d>
+            <a:camera prst="orthographicFront"/>
+            <a:lightRig rig="threePt" dir="t"/>
+          </a:scene3d>
+          <a:sp3d>
+            <a:bevelT w="152400" h="50800" prst="softRound"/>
+          </a:sp3d>
+        </p:spPr>
+        <p:style>
+          <a:lnRef idx="1">
+            <a:schemeClr val="accent1"/>
+          </a:lnRef>
+          <a:fillRef idx="3">
+            <a:schemeClr val="accent1"/>
+          </a:fillRef>
+          <a:effectRef idx="2">
+            <a:schemeClr val="accent1"/>
+          </a:effectRef>
+          <a:fontRef idx="minor">
+            <a:schemeClr val="lt1"/>
+          </a:fontRef>
+        </p:style>
+        <p:txBody>
+          <a:bodyPr rtlCol="0" anchor="ctr"/>
+          <a:lstStyle/>
+          <a:p>
+            <a:pPr algn="ctr"/>
+            <a:endParaRPr lang="en-US"/>
+          </a:p>
+        </p:txBody>
+      </p:sp>
+      <p:sp>
+        <p:nvSpPr>
+          <p:cNvPr id="21" name="Rounded Rectangle 20"/>
+          <p:cNvSpPr/>
+          <p:nvPr/>
+        </p:nvSpPr>
+        <p:spPr>
+          <a:xfrm>
+            <a:off x="3766107" y="2311159"/>
+            <a:ext cx="292203" cy="297838"/>
+          </a:xfrm>
+          <a:prstGeom prst="roundRect">
+            <a:avLst/>
+          </a:prstGeom>
+          <a:scene3d>
+            <a:camera prst="orthographicFront"/>
+            <a:lightRig rig="threePt" dir="t"/>
+          </a:scene3d>
+          <a:sp3d>
+            <a:bevelT w="152400" h="50800" prst="softRound"/>
+          </a:sp3d>
+        </p:spPr>
+        <p:style>
+          <a:lnRef idx="1">
+            <a:schemeClr val="accent1"/>
+          </a:lnRef>
+          <a:fillRef idx="3">
+            <a:schemeClr val="accent1"/>
+          </a:fillRef>
+          <a:effectRef idx="2">
+            <a:schemeClr val="accent1"/>
+          </a:effectRef>
+          <a:fontRef idx="minor">
+            <a:schemeClr val="lt1"/>
+          </a:fontRef>
+        </p:style>
+        <p:txBody>
+          <a:bodyPr rtlCol="0" anchor="ctr"/>
+          <a:lstStyle/>
+          <a:p>
+            <a:pPr algn="ctr"/>
+            <a:endParaRPr lang="en-US"/>
+          </a:p>
+        </p:txBody>
+      </p:sp>
+      <p:sp>
+        <p:nvSpPr>
+          <p:cNvPr id="22" name="Rounded Rectangle 21"/>
+          <p:cNvSpPr/>
+          <p:nvPr/>
+        </p:nvSpPr>
+        <p:spPr>
+          <a:xfrm>
+            <a:off x="4120802" y="2311159"/>
+            <a:ext cx="292203" cy="297838"/>
+          </a:xfrm>
+          <a:prstGeom prst="roundRect">
+            <a:avLst/>
+          </a:prstGeom>
+          <a:scene3d>
+            <a:camera prst="orthographicFront"/>
+            <a:lightRig rig="threePt" dir="t"/>
+          </a:scene3d>
+          <a:sp3d>
+            <a:bevelT w="152400" h="50800" prst="softRound"/>
+          </a:sp3d>
+        </p:spPr>
+        <p:style>
+          <a:lnRef idx="1">
+            <a:schemeClr val="accent1"/>
+          </a:lnRef>
+          <a:fillRef idx="3">
+            <a:schemeClr val="accent1"/>
+          </a:fillRef>
+          <a:effectRef idx="2">
+            <a:schemeClr val="accent1"/>
+          </a:effectRef>
+          <a:fontRef idx="minor">
+            <a:schemeClr val="lt1"/>
+          </a:fontRef>
+        </p:style>
+        <p:txBody>
+          <a:bodyPr rtlCol="0" anchor="ctr"/>
+          <a:lstStyle/>
+          <a:p>
+            <a:pPr algn="ctr"/>
+            <a:endParaRPr lang="en-US"/>
+          </a:p>
+        </p:txBody>
+      </p:sp>
+      <p:sp>
+        <p:nvSpPr>
+          <p:cNvPr id="23" name="Rounded Rectangle 22"/>
+          <p:cNvSpPr/>
+          <p:nvPr/>
+        </p:nvSpPr>
+        <p:spPr>
+          <a:xfrm>
+            <a:off x="4475497" y="2311159"/>
+            <a:ext cx="292203" cy="297838"/>
+          </a:xfrm>
+          <a:prstGeom prst="roundRect">
+            <a:avLst/>
+          </a:prstGeom>
+          <a:scene3d>
+            <a:camera prst="orthographicFront"/>
+            <a:lightRig rig="threePt" dir="t"/>
+          </a:scene3d>
+          <a:sp3d>
+            <a:bevelT w="152400" h="50800" prst="softRound"/>
+          </a:sp3d>
+        </p:spPr>
+        <p:style>
+          <a:lnRef idx="1">
+            <a:schemeClr val="accent1"/>
+          </a:lnRef>
+          <a:fillRef idx="3">
+            <a:schemeClr val="accent1"/>
+          </a:fillRef>
+          <a:effectRef idx="2">
+            <a:schemeClr val="accent1"/>
+          </a:effectRef>
+          <a:fontRef idx="minor">
+            <a:schemeClr val="lt1"/>
+          </a:fontRef>
+        </p:style>
+        <p:txBody>
+          <a:bodyPr rtlCol="0" anchor="ctr"/>
+          <a:lstStyle/>
+          <a:p>
+            <a:pPr algn="ctr"/>
+            <a:endParaRPr lang="en-US"/>
+          </a:p>
+        </p:txBody>
+      </p:sp>
+      <p:sp>
+        <p:nvSpPr>
+          <p:cNvPr id="24" name="Rounded Rectangle 23"/>
+          <p:cNvSpPr/>
+          <p:nvPr/>
+        </p:nvSpPr>
+        <p:spPr>
+          <a:xfrm>
+            <a:off x="4830192" y="2311159"/>
+            <a:ext cx="292203" cy="297838"/>
+          </a:xfrm>
+          <a:prstGeom prst="roundRect">
+            <a:avLst/>
+          </a:prstGeom>
+          <a:scene3d>
+            <a:camera prst="orthographicFront"/>
+            <a:lightRig rig="threePt" dir="t"/>
+          </a:scene3d>
+          <a:sp3d>
+            <a:bevelT w="152400" h="50800" prst="softRound"/>
+          </a:sp3d>
+        </p:spPr>
+        <p:style>
+          <a:lnRef idx="1">
+            <a:schemeClr val="accent1"/>
+          </a:lnRef>
+          <a:fillRef idx="3">
+            <a:schemeClr val="accent1"/>
+          </a:fillRef>
+          <a:effectRef idx="2">
+            <a:schemeClr val="accent1"/>
+          </a:effectRef>
+          <a:fontRef idx="minor">
+            <a:schemeClr val="lt1"/>
+          </a:fontRef>
+        </p:style>
+        <p:txBody>
+          <a:bodyPr rtlCol="0" anchor="ctr"/>
+          <a:lstStyle/>
+          <a:p>
+            <a:pPr algn="ctr"/>
+            <a:endParaRPr lang="en-US"/>
+          </a:p>
+        </p:txBody>
+      </p:sp>
+      <p:sp>
+        <p:nvSpPr>
+          <p:cNvPr id="25" name="Rounded Rectangle 24"/>
+          <p:cNvSpPr/>
+          <p:nvPr/>
+        </p:nvSpPr>
+        <p:spPr>
+          <a:xfrm>
+            <a:off x="5184887" y="2311159"/>
+            <a:ext cx="292203" cy="297838"/>
+          </a:xfrm>
+          <a:prstGeom prst="roundRect">
+            <a:avLst/>
+          </a:prstGeom>
+          <a:scene3d>
+            <a:camera prst="orthographicFront"/>
+            <a:lightRig rig="threePt" dir="t"/>
+          </a:scene3d>
+          <a:sp3d>
+            <a:bevelT w="152400" h="50800" prst="softRound"/>
+          </a:sp3d>
+        </p:spPr>
+        <p:style>
+          <a:lnRef idx="1">
+            <a:schemeClr val="accent1"/>
+          </a:lnRef>
+          <a:fillRef idx="3">
+            <a:schemeClr val="accent1"/>
+          </a:fillRef>
+          <a:effectRef idx="2">
+            <a:schemeClr val="accent1"/>
+          </a:effectRef>
+          <a:fontRef idx="minor">
+            <a:schemeClr val="lt1"/>
+          </a:fontRef>
+        </p:style>
+        <p:txBody>
+          <a:bodyPr rtlCol="0" anchor="ctr"/>
+          <a:lstStyle/>
+          <a:p>
+            <a:pPr algn="ctr"/>
+            <a:endParaRPr lang="en-US"/>
+          </a:p>
+        </p:txBody>
+      </p:sp>
+      <p:sp>
+        <p:nvSpPr>
+          <p:cNvPr id="26" name="TextBox 25"/>
+          <p:cNvSpPr txBox="1"/>
+          <p:nvPr/>
+        </p:nvSpPr>
+        <p:spPr>
+          <a:xfrm>
+            <a:off x="3411412" y="2690181"/>
+            <a:ext cx="292203" cy="246221"/>
+          </a:xfrm>
+          <a:prstGeom prst="rect">
+            <a:avLst/>
+          </a:prstGeom>
+          <a:noFill/>
+        </p:spPr>
+        <p:txBody>
+          <a:bodyPr wrap="square" rtlCol="0">
+            <a:spAutoFit/>
+          </a:bodyPr>
+          <a:lstStyle/>
+          <a:p>
+            <a:r>
+              <a:rPr lang="en-US" sz="1000" dirty="0" smtClean="0"/>
+              <a:t>0</a:t>
+            </a:r>
+            <a:endParaRPr lang="en-US" sz="1000" dirty="0"/>
+          </a:p>
+        </p:txBody>
+      </p:sp>
+      <p:sp>
+        <p:nvSpPr>
+          <p:cNvPr id="27" name="TextBox 26"/>
+          <p:cNvSpPr txBox="1"/>
+          <p:nvPr/>
+        </p:nvSpPr>
+        <p:spPr>
+          <a:xfrm>
+            <a:off x="3766107" y="2690181"/>
+            <a:ext cx="292203" cy="246221"/>
+          </a:xfrm>
+          <a:prstGeom prst="rect">
+            <a:avLst/>
+          </a:prstGeom>
+          <a:noFill/>
+        </p:spPr>
+        <p:txBody>
+          <a:bodyPr wrap="square" rtlCol="0">
+            <a:spAutoFit/>
+          </a:bodyPr>
+          <a:lstStyle/>
+          <a:p>
+            <a:r>
+              <a:rPr lang="en-US" sz="1000" dirty="0" smtClean="0"/>
+              <a:t>1</a:t>
+            </a:r>
+            <a:endParaRPr lang="en-US" sz="1000" dirty="0"/>
+          </a:p>
+        </p:txBody>
+      </p:sp>
+      <p:sp>
+        <p:nvSpPr>
+          <p:cNvPr id="28" name="TextBox 27"/>
+          <p:cNvSpPr txBox="1"/>
+          <p:nvPr/>
+        </p:nvSpPr>
+        <p:spPr>
+          <a:xfrm>
+            <a:off x="4120802" y="2690181"/>
+            <a:ext cx="292203" cy="246221"/>
+          </a:xfrm>
+          <a:prstGeom prst="rect">
+            <a:avLst/>
+          </a:prstGeom>
+          <a:noFill/>
+        </p:spPr>
+        <p:txBody>
+          <a:bodyPr wrap="square" rtlCol="0">
+            <a:spAutoFit/>
+          </a:bodyPr>
+          <a:lstStyle/>
+          <a:p>
+            <a:r>
+              <a:rPr lang="en-US" sz="1000" dirty="0" smtClean="0"/>
+              <a:t>2</a:t>
+            </a:r>
+            <a:endParaRPr lang="en-US" sz="1000" dirty="0"/>
+          </a:p>
+        </p:txBody>
+      </p:sp>
+      <p:sp>
+        <p:nvSpPr>
+          <p:cNvPr id="29" name="TextBox 28"/>
+          <p:cNvSpPr txBox="1"/>
+          <p:nvPr/>
+        </p:nvSpPr>
+        <p:spPr>
+          <a:xfrm>
+            <a:off x="4475497" y="2690181"/>
+            <a:ext cx="292203" cy="246221"/>
+          </a:xfrm>
+          <a:prstGeom prst="rect">
+            <a:avLst/>
+          </a:prstGeom>
+          <a:noFill/>
+        </p:spPr>
+        <p:txBody>
+          <a:bodyPr wrap="square" rtlCol="0">
+            <a:spAutoFit/>
+          </a:bodyPr>
+          <a:lstStyle/>
+          <a:p>
+            <a:r>
+              <a:rPr lang="en-US" sz="1000" dirty="0" smtClean="0"/>
+              <a:t>3</a:t>
+            </a:r>
+            <a:endParaRPr lang="en-US" sz="1000" dirty="0"/>
+          </a:p>
+        </p:txBody>
+      </p:sp>
+      <p:sp>
+        <p:nvSpPr>
+          <p:cNvPr id="30" name="TextBox 29"/>
+          <p:cNvSpPr txBox="1"/>
+          <p:nvPr/>
+        </p:nvSpPr>
+        <p:spPr>
+          <a:xfrm>
+            <a:off x="4830192" y="2690181"/>
+            <a:ext cx="292203" cy="246221"/>
+          </a:xfrm>
+          <a:prstGeom prst="rect">
+            <a:avLst/>
+          </a:prstGeom>
+          <a:noFill/>
+        </p:spPr>
+        <p:txBody>
+          <a:bodyPr wrap="square" rtlCol="0">
+            <a:spAutoFit/>
+          </a:bodyPr>
+          <a:lstStyle/>
+          <a:p>
+            <a:r>
+              <a:rPr lang="en-US" sz="1000" dirty="0" smtClean="0"/>
+              <a:t>4</a:t>
+            </a:r>
+            <a:endParaRPr lang="en-US" sz="1000" dirty="0"/>
+          </a:p>
+        </p:txBody>
+      </p:sp>
+      <p:sp>
+        <p:nvSpPr>
+          <p:cNvPr id="31" name="TextBox 30"/>
+          <p:cNvSpPr txBox="1"/>
+          <p:nvPr/>
+        </p:nvSpPr>
+        <p:spPr>
+          <a:xfrm>
+            <a:off x="5184887" y="2690181"/>
+            <a:ext cx="292203" cy="246221"/>
+          </a:xfrm>
+          <a:prstGeom prst="rect">
+            <a:avLst/>
+          </a:prstGeom>
+          <a:noFill/>
+        </p:spPr>
+        <p:txBody>
+          <a:bodyPr wrap="square" rtlCol="0">
+            <a:spAutoFit/>
+          </a:bodyPr>
+          <a:lstStyle/>
+          <a:p>
+            <a:r>
+              <a:rPr lang="en-US" sz="1000" dirty="0" smtClean="0"/>
+              <a:t>5</a:t>
+            </a:r>
+            <a:endParaRPr lang="en-US" sz="1000" dirty="0"/>
+          </a:p>
+        </p:txBody>
+      </p:sp>
+      <p:cxnSp>
+        <p:nvCxnSpPr>
+          <p:cNvPr id="56" name="Straight Arrow Connector 55"/>
+          <p:cNvCxnSpPr/>
+          <p:nvPr/>
+        </p:nvCxnSpPr>
+        <p:spPr>
+          <a:xfrm>
+            <a:off x="4413005" y="4029242"/>
+            <a:ext cx="0" cy="404610"/>
+          </a:xfrm>
+          <a:prstGeom prst="straightConnector1">
+            <a:avLst/>
+          </a:prstGeom>
+          <a:ln>
+            <a:solidFill>
+              <a:schemeClr val="accent3">
+                <a:lumMod val="75000"/>
+              </a:schemeClr>
+            </a:solidFill>
+            <a:tailEnd type="arrow"/>
+          </a:ln>
+        </p:spPr>
+        <p:style>
+          <a:lnRef idx="2">
+            <a:schemeClr val="accent1"/>
+          </a:lnRef>
+          <a:fillRef idx="0">
+            <a:schemeClr val="accent1"/>
+          </a:fillRef>
+          <a:effectRef idx="1">
+            <a:schemeClr val="accent1"/>
+          </a:effectRef>
+          <a:fontRef idx="minor">
+            <a:schemeClr val="tx1"/>
+          </a:fontRef>
+        </p:style>
+      </p:cxnSp>
+      <p:sp>
+        <p:nvSpPr>
+          <p:cNvPr id="4" name="Manual Operation 3"/>
+          <p:cNvSpPr/>
+          <p:nvPr/>
+        </p:nvSpPr>
+        <p:spPr>
+          <a:xfrm>
+            <a:off x="3906091" y="3545958"/>
+            <a:ext cx="1061368" cy="427089"/>
+          </a:xfrm>
+          <a:prstGeom prst="flowChartManualOperation">
+            <a:avLst/>
+          </a:prstGeom>
+        </p:spPr>
+        <p:style>
+          <a:lnRef idx="1">
+            <a:schemeClr val="accent6"/>
+          </a:lnRef>
+          <a:fillRef idx="2">
+            <a:schemeClr val="accent6"/>
+          </a:fillRef>
+          <a:effectRef idx="1">
+            <a:schemeClr val="accent6"/>
+          </a:effectRef>
+          <a:fontRef idx="minor">
+            <a:schemeClr val="dk1"/>
+          </a:fontRef>
+        </p:style>
+        <p:txBody>
+          <a:bodyPr rtlCol="0" anchor="ctr"/>
+          <a:lstStyle/>
+          <a:p>
+            <a:pPr algn="ctr"/>
+            <a:r>
+              <a:rPr lang="en-US" sz="900" dirty="0" smtClean="0"/>
+              <a:t>Reduce()</a:t>
+            </a:r>
+            <a:endParaRPr lang="en-US" sz="900" dirty="0"/>
+          </a:p>
+        </p:txBody>
+      </p:sp>
+      <p:cxnSp>
+        <p:nvCxnSpPr>
+          <p:cNvPr id="6" name="Straight Arrow Connector 5"/>
+          <p:cNvCxnSpPr/>
+          <p:nvPr/>
+        </p:nvCxnSpPr>
+        <p:spPr>
+          <a:xfrm>
+            <a:off x="3551395" y="2978380"/>
+            <a:ext cx="618123" cy="466425"/>
+          </a:xfrm>
+          <a:prstGeom prst="straightConnector1">
+            <a:avLst/>
+          </a:prstGeom>
+          <a:ln>
+            <a:solidFill>
+              <a:schemeClr val="bg2">
+                <a:lumMod val="50000"/>
+              </a:schemeClr>
+            </a:solidFill>
+            <a:tailEnd type="arrow"/>
+          </a:ln>
+        </p:spPr>
+        <p:style>
+          <a:lnRef idx="2">
+            <a:schemeClr val="accent1"/>
+          </a:lnRef>
+          <a:fillRef idx="0">
+            <a:schemeClr val="accent1"/>
+          </a:fillRef>
+          <a:effectRef idx="1">
+            <a:schemeClr val="accent1"/>
+          </a:effectRef>
+          <a:fontRef idx="minor">
+            <a:schemeClr val="tx1"/>
+          </a:fontRef>
+        </p:style>
+      </p:cxnSp>
+      <p:cxnSp>
+        <p:nvCxnSpPr>
+          <p:cNvPr id="32" name="Straight Arrow Connector 31"/>
+          <p:cNvCxnSpPr/>
+          <p:nvPr/>
+        </p:nvCxnSpPr>
+        <p:spPr>
+          <a:xfrm>
+            <a:off x="3906090" y="2978380"/>
+            <a:ext cx="354695" cy="466425"/>
+          </a:xfrm>
+          <a:prstGeom prst="straightConnector1">
+            <a:avLst/>
+          </a:prstGeom>
+          <a:ln>
+            <a:solidFill>
+              <a:schemeClr val="bg2">
+                <a:lumMod val="50000"/>
+              </a:schemeClr>
+            </a:solidFill>
+            <a:tailEnd type="arrow"/>
+          </a:ln>
+        </p:spPr>
+        <p:style>
+          <a:lnRef idx="2">
+            <a:schemeClr val="accent1"/>
+          </a:lnRef>
+          <a:fillRef idx="0">
+            <a:schemeClr val="accent1"/>
+          </a:fillRef>
+          <a:effectRef idx="1">
+            <a:schemeClr val="accent1"/>
+          </a:effectRef>
+          <a:fontRef idx="minor">
+            <a:schemeClr val="tx1"/>
+          </a:fontRef>
+        </p:style>
+      </p:cxnSp>
+      <p:cxnSp>
+        <p:nvCxnSpPr>
+          <p:cNvPr id="33" name="Straight Arrow Connector 32"/>
+          <p:cNvCxnSpPr/>
+          <p:nvPr/>
+        </p:nvCxnSpPr>
+        <p:spPr>
+          <a:xfrm>
+            <a:off x="4260785" y="2978380"/>
+            <a:ext cx="111028" cy="466425"/>
+          </a:xfrm>
+          <a:prstGeom prst="straightConnector1">
+            <a:avLst/>
+          </a:prstGeom>
+          <a:ln>
+            <a:solidFill>
+              <a:schemeClr val="bg2">
+                <a:lumMod val="50000"/>
+              </a:schemeClr>
+            </a:solidFill>
+            <a:tailEnd type="arrow"/>
+          </a:ln>
+        </p:spPr>
+        <p:style>
+          <a:lnRef idx="2">
+            <a:schemeClr val="accent1"/>
+          </a:lnRef>
+          <a:fillRef idx="0">
+            <a:schemeClr val="accent1"/>
+          </a:fillRef>
+          <a:effectRef idx="1">
+            <a:schemeClr val="accent1"/>
+          </a:effectRef>
+          <a:fontRef idx="minor">
+            <a:schemeClr val="tx1"/>
+          </a:fontRef>
+        </p:style>
+      </p:cxnSp>
+      <p:cxnSp>
+        <p:nvCxnSpPr>
+          <p:cNvPr id="34" name="Straight Arrow Connector 33"/>
+          <p:cNvCxnSpPr/>
+          <p:nvPr/>
+        </p:nvCxnSpPr>
+        <p:spPr>
+          <a:xfrm flipH="1">
+            <a:off x="4475497" y="2978380"/>
+            <a:ext cx="139983" cy="466425"/>
+          </a:xfrm>
+          <a:prstGeom prst="straightConnector1">
+            <a:avLst/>
+          </a:prstGeom>
+          <a:ln>
+            <a:solidFill>
+              <a:schemeClr val="bg2">
+                <a:lumMod val="50000"/>
+              </a:schemeClr>
+            </a:solidFill>
+            <a:tailEnd type="arrow"/>
+          </a:ln>
+        </p:spPr>
+        <p:style>
+          <a:lnRef idx="2">
+            <a:schemeClr val="accent1"/>
+          </a:lnRef>
+          <a:fillRef idx="0">
+            <a:schemeClr val="accent1"/>
+          </a:fillRef>
+          <a:effectRef idx="1">
+            <a:schemeClr val="accent1"/>
+          </a:effectRef>
+          <a:fontRef idx="minor">
+            <a:schemeClr val="tx1"/>
+          </a:fontRef>
+        </p:style>
+      </p:cxnSp>
+      <p:cxnSp>
+        <p:nvCxnSpPr>
+          <p:cNvPr id="35" name="Straight Arrow Connector 34"/>
+          <p:cNvCxnSpPr/>
+          <p:nvPr/>
+        </p:nvCxnSpPr>
+        <p:spPr>
+          <a:xfrm flipH="1">
+            <a:off x="4615480" y="2978380"/>
+            <a:ext cx="351979" cy="466425"/>
+          </a:xfrm>
+          <a:prstGeom prst="straightConnector1">
+            <a:avLst/>
+          </a:prstGeom>
+          <a:ln>
+            <a:solidFill>
+              <a:schemeClr val="bg2">
+                <a:lumMod val="50000"/>
+              </a:schemeClr>
+            </a:solidFill>
+            <a:tailEnd type="arrow"/>
+          </a:ln>
+        </p:spPr>
+        <p:style>
+          <a:lnRef idx="2">
+            <a:schemeClr val="accent1"/>
+          </a:lnRef>
+          <a:fillRef idx="0">
+            <a:schemeClr val="accent1"/>
+          </a:fillRef>
+          <a:effectRef idx="1">
+            <a:schemeClr val="accent1"/>
+          </a:effectRef>
+          <a:fontRef idx="minor">
+            <a:schemeClr val="tx1"/>
+          </a:fontRef>
+        </p:style>
+      </p:cxnSp>
+      <p:cxnSp>
+        <p:nvCxnSpPr>
+          <p:cNvPr id="36" name="Straight Arrow Connector 35"/>
+          <p:cNvCxnSpPr/>
+          <p:nvPr/>
+        </p:nvCxnSpPr>
+        <p:spPr>
+          <a:xfrm flipH="1">
+            <a:off x="4696189" y="2936402"/>
+            <a:ext cx="608427" cy="508403"/>
+          </a:xfrm>
+          <a:prstGeom prst="straightConnector1">
+            <a:avLst/>
+          </a:prstGeom>
+          <a:ln>
+            <a:solidFill>
+              <a:schemeClr val="bg2">
+                <a:lumMod val="50000"/>
+              </a:schemeClr>
+            </a:solidFill>
+            <a:tailEnd type="arrow"/>
+          </a:ln>
+        </p:spPr>
+        <p:style>
+          <a:lnRef idx="2">
+            <a:schemeClr val="accent1"/>
+          </a:lnRef>
+          <a:fillRef idx="0">
+            <a:schemeClr val="accent1"/>
+          </a:fillRef>
+          <a:effectRef idx="1">
+            <a:schemeClr val="accent1"/>
+          </a:effectRef>
+          <a:fontRef idx="minor">
+            <a:schemeClr val="tx1"/>
+          </a:fontRef>
+        </p:style>
+      </p:cxnSp>
+      <p:sp>
+        <p:nvSpPr>
+          <p:cNvPr id="42" name="Rounded Rectangle 41"/>
+          <p:cNvSpPr/>
+          <p:nvPr/>
+        </p:nvSpPr>
+        <p:spPr>
+          <a:xfrm>
+            <a:off x="4266903" y="4497848"/>
+            <a:ext cx="292203" cy="297838"/>
+          </a:xfrm>
+          <a:prstGeom prst="roundRect">
+            <a:avLst/>
+          </a:prstGeom>
+        </p:spPr>
+        <p:style>
+          <a:lnRef idx="1">
+            <a:schemeClr val="accent2"/>
+          </a:lnRef>
+          <a:fillRef idx="2">
+            <a:schemeClr val="accent2"/>
+          </a:fillRef>
+          <a:effectRef idx="1">
+            <a:schemeClr val="accent2"/>
+          </a:effectRef>
+          <a:fontRef idx="minor">
+            <a:schemeClr val="dk1"/>
+          </a:fontRef>
+        </p:style>
+        <p:txBody>
+          <a:bodyPr rtlCol="0" anchor="ctr"/>
+          <a:lstStyle/>
+          <a:p>
+            <a:pPr algn="ctr"/>
+            <a:endParaRPr lang="en-US"/>
+          </a:p>
+        </p:txBody>
+      </p:sp>
+    </p:spTree>
+    <p:extLst>
+      <p:ext uri="{BB962C8B-B14F-4D97-AF65-F5344CB8AC3E}">
+        <p14:creationId xmlns:p14="http://schemas.microsoft.com/office/powerpoint/2010/main" val="2007915763"/>
+      </p:ext>
+    </p:extLst>
+  </p:cSld>
+  <p:clrMapOvr>
+    <a:masterClrMapping/>
+  </p:clrMapOvr>
+</p:sld>
+</file>
+
+<file path=ppt/slides/slide81.xml><?xml version="1.0" encoding="utf-8"?>
+<p:sld xmlns:a="http://schemas.openxmlformats.org/drawingml/2006/main" xmlns:r="http://schemas.openxmlformats.org/officeDocument/2006/relationships" xmlns:p="http://schemas.openxmlformats.org/presentationml/2006/main">
+  <p:cSld>
+    <p:spTree>
+      <p:nvGrpSpPr>
+        <p:cNvPr id="1" name=""/>
+        <p:cNvGrpSpPr/>
+        <p:nvPr/>
+      </p:nvGrpSpPr>
+      <p:grpSpPr>
+        <a:xfrm>
+          <a:off x="0" y="0"/>
+          <a:ext cx="0" cy="0"/>
+          <a:chOff x="0" y="0"/>
+          <a:chExt cx="0" cy="0"/>
+        </a:xfrm>
+      </p:grpSpPr>
+      <p:sp>
+        <p:nvSpPr>
+          <p:cNvPr id="2" name="Title 1"/>
+          <p:cNvSpPr>
+            <a:spLocks noGrp="1"/>
+          </p:cNvSpPr>
+          <p:nvPr>
+            <p:ph type="title"/>
+          </p:nvPr>
+        </p:nvSpPr>
+        <p:spPr/>
+        <p:txBody>
+          <a:bodyPr/>
+          <a:lstStyle/>
+          <a:p>
+            <a:r>
+              <a:rPr lang="en-US" dirty="0" smtClean="0"/>
+              <a:t>Average Daily Temperature</a:t>
+            </a:r>
+            <a:endParaRPr lang="en-US" dirty="0"/>
+          </a:p>
+        </p:txBody>
+      </p:sp>
+      <p:sp>
+        <p:nvSpPr>
+          <p:cNvPr id="19" name="Rectangle 18"/>
+          <p:cNvSpPr/>
+          <p:nvPr/>
+        </p:nvSpPr>
+        <p:spPr>
+          <a:xfrm>
+            <a:off x="3306683" y="2521244"/>
+            <a:ext cx="2278038" cy="696158"/>
+          </a:xfrm>
+          <a:prstGeom prst="rect">
+            <a:avLst/>
+          </a:prstGeom>
+        </p:spPr>
+        <p:style>
+          <a:lnRef idx="2">
+            <a:schemeClr val="accent2">
+              <a:shade val="50000"/>
+            </a:schemeClr>
+          </a:lnRef>
+          <a:fillRef idx="1">
+            <a:schemeClr val="accent2"/>
+          </a:fillRef>
+          <a:effectRef idx="0">
+            <a:schemeClr val="accent2"/>
+          </a:effectRef>
+          <a:fontRef idx="minor">
+            <a:schemeClr val="lt1"/>
+          </a:fontRef>
+        </p:style>
+        <p:txBody>
+          <a:bodyPr rtlCol="0" anchor="ctr"/>
+          <a:lstStyle/>
+          <a:p>
+            <a:pPr algn="ctr"/>
+            <a:endParaRPr lang="en-US"/>
+          </a:p>
+        </p:txBody>
+      </p:sp>
+      <p:sp>
+        <p:nvSpPr>
+          <p:cNvPr id="20" name="Rounded Rectangle 19"/>
+          <p:cNvSpPr/>
+          <p:nvPr/>
+        </p:nvSpPr>
+        <p:spPr>
+          <a:xfrm>
+            <a:off x="3411412" y="2592159"/>
+            <a:ext cx="603668" cy="297838"/>
+          </a:xfrm>
+          <a:prstGeom prst="roundRect">
+            <a:avLst/>
+          </a:prstGeom>
+          <a:scene3d>
+            <a:camera prst="orthographicFront"/>
+            <a:lightRig rig="threePt" dir="t"/>
+          </a:scene3d>
+          <a:sp3d>
+            <a:bevelT w="152400" h="50800" prst="softRound"/>
+          </a:sp3d>
+        </p:spPr>
+        <p:style>
+          <a:lnRef idx="1">
+            <a:schemeClr val="accent1"/>
+          </a:lnRef>
+          <a:fillRef idx="3">
+            <a:schemeClr val="accent1"/>
+          </a:fillRef>
+          <a:effectRef idx="2">
+            <a:schemeClr val="accent1"/>
+          </a:effectRef>
+          <a:fontRef idx="minor">
+            <a:schemeClr val="lt1"/>
+          </a:fontRef>
+        </p:style>
+        <p:txBody>
+          <a:bodyPr rtlCol="0" anchor="ctr"/>
+          <a:lstStyle/>
+          <a:p>
+            <a:pPr algn="ctr"/>
+            <a:r>
+              <a:rPr lang="en-US" sz="1050" dirty="0" smtClean="0"/>
+              <a:t>76</a:t>
+            </a:r>
+            <a:endParaRPr lang="en-US" sz="1050" dirty="0"/>
+          </a:p>
+        </p:txBody>
+      </p:sp>
+      <p:sp>
+        <p:nvSpPr>
+          <p:cNvPr id="22" name="Rounded Rectangle 21"/>
+          <p:cNvSpPr/>
+          <p:nvPr/>
+        </p:nvSpPr>
+        <p:spPr>
+          <a:xfrm>
+            <a:off x="4120802" y="2592159"/>
+            <a:ext cx="603668" cy="297838"/>
+          </a:xfrm>
+          <a:prstGeom prst="roundRect">
+            <a:avLst/>
+          </a:prstGeom>
+          <a:scene3d>
+            <a:camera prst="orthographicFront"/>
+            <a:lightRig rig="threePt" dir="t"/>
+          </a:scene3d>
+          <a:sp3d>
+            <a:bevelT w="152400" h="50800" prst="softRound"/>
+          </a:sp3d>
+        </p:spPr>
+        <p:style>
+          <a:lnRef idx="1">
+            <a:schemeClr val="accent1"/>
+          </a:lnRef>
+          <a:fillRef idx="3">
+            <a:schemeClr val="accent1"/>
+          </a:fillRef>
+          <a:effectRef idx="2">
+            <a:schemeClr val="accent1"/>
+          </a:effectRef>
+          <a:fontRef idx="minor">
+            <a:schemeClr val="lt1"/>
+          </a:fontRef>
+        </p:style>
+        <p:txBody>
+          <a:bodyPr rtlCol="0" anchor="ctr"/>
+          <a:lstStyle/>
+          <a:p>
+            <a:pPr algn="ctr"/>
+            <a:r>
+              <a:rPr lang="en-US" sz="1050" dirty="0" smtClean="0"/>
+              <a:t>81</a:t>
+            </a:r>
+            <a:endParaRPr lang="en-US" sz="1050" dirty="0"/>
+          </a:p>
+        </p:txBody>
+      </p:sp>
+      <p:sp>
+        <p:nvSpPr>
+          <p:cNvPr id="24" name="Rounded Rectangle 23"/>
+          <p:cNvSpPr/>
+          <p:nvPr/>
+        </p:nvSpPr>
+        <p:spPr>
+          <a:xfrm>
+            <a:off x="4830192" y="2592159"/>
+            <a:ext cx="603668" cy="297838"/>
+          </a:xfrm>
+          <a:prstGeom prst="roundRect">
+            <a:avLst/>
+          </a:prstGeom>
+          <a:scene3d>
+            <a:camera prst="orthographicFront"/>
+            <a:lightRig rig="threePt" dir="t"/>
+          </a:scene3d>
+          <a:sp3d>
+            <a:bevelT w="152400" h="50800" prst="softRound"/>
+          </a:sp3d>
+        </p:spPr>
+        <p:style>
+          <a:lnRef idx="1">
+            <a:schemeClr val="accent1"/>
+          </a:lnRef>
+          <a:fillRef idx="3">
+            <a:schemeClr val="accent1"/>
+          </a:fillRef>
+          <a:effectRef idx="2">
+            <a:schemeClr val="accent1"/>
+          </a:effectRef>
+          <a:fontRef idx="minor">
+            <a:schemeClr val="lt1"/>
+          </a:fontRef>
+        </p:style>
+        <p:txBody>
+          <a:bodyPr rtlCol="0" anchor="ctr"/>
+          <a:lstStyle/>
+          <a:p>
+            <a:pPr algn="ctr"/>
+            <a:r>
+              <a:rPr lang="en-US" sz="1050" dirty="0" smtClean="0"/>
+              <a:t>79</a:t>
+            </a:r>
+            <a:endParaRPr lang="en-US" sz="1050" dirty="0"/>
+          </a:p>
+        </p:txBody>
+      </p:sp>
+      <p:sp>
+        <p:nvSpPr>
+          <p:cNvPr id="26" name="TextBox 25"/>
+          <p:cNvSpPr txBox="1"/>
+          <p:nvPr/>
+        </p:nvSpPr>
+        <p:spPr>
+          <a:xfrm>
+            <a:off x="3603147" y="2931844"/>
+            <a:ext cx="292203" cy="246221"/>
+          </a:xfrm>
+          <a:prstGeom prst="rect">
+            <a:avLst/>
+          </a:prstGeom>
+          <a:noFill/>
+        </p:spPr>
+        <p:txBody>
+          <a:bodyPr wrap="square" rtlCol="0">
+            <a:spAutoFit/>
+          </a:bodyPr>
+          <a:lstStyle/>
+          <a:p>
+            <a:r>
+              <a:rPr lang="en-US" sz="1000" dirty="0" smtClean="0"/>
+              <a:t>0</a:t>
+            </a:r>
+            <a:endParaRPr lang="en-US" sz="1000" dirty="0"/>
+          </a:p>
+        </p:txBody>
+      </p:sp>
+      <p:sp>
+        <p:nvSpPr>
+          <p:cNvPr id="28" name="TextBox 27"/>
+          <p:cNvSpPr txBox="1"/>
+          <p:nvPr/>
+        </p:nvSpPr>
+        <p:spPr>
+          <a:xfrm>
+            <a:off x="4323277" y="2967981"/>
+            <a:ext cx="292203" cy="246221"/>
+          </a:xfrm>
+          <a:prstGeom prst="rect">
+            <a:avLst/>
+          </a:prstGeom>
+          <a:noFill/>
+        </p:spPr>
+        <p:txBody>
+          <a:bodyPr wrap="square" rtlCol="0">
+            <a:spAutoFit/>
+          </a:bodyPr>
+          <a:lstStyle/>
+          <a:p>
+            <a:r>
+              <a:rPr lang="en-US" sz="1000" dirty="0"/>
+              <a:t>1</a:t>
+            </a:r>
+            <a:endParaRPr lang="en-US" sz="1000" dirty="0"/>
+          </a:p>
+        </p:txBody>
+      </p:sp>
+      <p:sp>
+        <p:nvSpPr>
+          <p:cNvPr id="30" name="TextBox 29"/>
+          <p:cNvSpPr txBox="1"/>
+          <p:nvPr/>
+        </p:nvSpPr>
+        <p:spPr>
+          <a:xfrm>
+            <a:off x="5012413" y="2969581"/>
+            <a:ext cx="292203" cy="246221"/>
+          </a:xfrm>
+          <a:prstGeom prst="rect">
+            <a:avLst/>
+          </a:prstGeom>
+          <a:noFill/>
+        </p:spPr>
+        <p:txBody>
+          <a:bodyPr wrap="square" rtlCol="0">
+            <a:spAutoFit/>
+          </a:bodyPr>
+          <a:lstStyle/>
+          <a:p>
+            <a:r>
+              <a:rPr lang="en-US" sz="1000" dirty="0" smtClean="0"/>
+              <a:t>2</a:t>
+            </a:r>
+            <a:endParaRPr lang="en-US" sz="1000" dirty="0"/>
+          </a:p>
+        </p:txBody>
+      </p:sp>
+      <p:cxnSp>
+        <p:nvCxnSpPr>
+          <p:cNvPr id="56" name="Straight Arrow Connector 55"/>
+          <p:cNvCxnSpPr/>
+          <p:nvPr/>
+        </p:nvCxnSpPr>
+        <p:spPr>
+          <a:xfrm>
+            <a:off x="4413005" y="4310242"/>
+            <a:ext cx="0" cy="404610"/>
+          </a:xfrm>
+          <a:prstGeom prst="straightConnector1">
+            <a:avLst/>
+          </a:prstGeom>
+          <a:ln>
+            <a:solidFill>
+              <a:schemeClr val="accent3">
+                <a:lumMod val="75000"/>
+              </a:schemeClr>
+            </a:solidFill>
+            <a:tailEnd type="arrow"/>
+          </a:ln>
+        </p:spPr>
+        <p:style>
+          <a:lnRef idx="2">
+            <a:schemeClr val="accent1"/>
+          </a:lnRef>
+          <a:fillRef idx="0">
+            <a:schemeClr val="accent1"/>
+          </a:fillRef>
+          <a:effectRef idx="1">
+            <a:schemeClr val="accent1"/>
+          </a:effectRef>
+          <a:fontRef idx="minor">
+            <a:schemeClr val="tx1"/>
+          </a:fontRef>
+        </p:style>
+      </p:cxnSp>
+      <p:sp>
+        <p:nvSpPr>
+          <p:cNvPr id="4" name="Manual Operation 3"/>
+          <p:cNvSpPr/>
+          <p:nvPr/>
+        </p:nvSpPr>
+        <p:spPr>
+          <a:xfrm>
+            <a:off x="3906091" y="3826958"/>
+            <a:ext cx="1061368" cy="427089"/>
+          </a:xfrm>
+          <a:prstGeom prst="flowChartManualOperation">
+            <a:avLst/>
+          </a:prstGeom>
+        </p:spPr>
+        <p:style>
+          <a:lnRef idx="1">
+            <a:schemeClr val="accent6"/>
+          </a:lnRef>
+          <a:fillRef idx="2">
+            <a:schemeClr val="accent6"/>
+          </a:fillRef>
+          <a:effectRef idx="1">
+            <a:schemeClr val="accent6"/>
+          </a:effectRef>
+          <a:fontRef idx="minor">
+            <a:schemeClr val="dk1"/>
+          </a:fontRef>
+        </p:style>
+        <p:txBody>
+          <a:bodyPr rtlCol="0" anchor="ctr"/>
+          <a:lstStyle/>
+          <a:p>
+            <a:pPr algn="ctr"/>
+            <a:r>
+              <a:rPr lang="en-US" sz="900" dirty="0" smtClean="0"/>
+              <a:t>sum()</a:t>
+            </a:r>
+            <a:endParaRPr lang="en-US" sz="900" dirty="0"/>
+          </a:p>
+        </p:txBody>
+      </p:sp>
+      <p:cxnSp>
+        <p:nvCxnSpPr>
+          <p:cNvPr id="6" name="Straight Arrow Connector 5"/>
+          <p:cNvCxnSpPr/>
+          <p:nvPr/>
+        </p:nvCxnSpPr>
+        <p:spPr>
+          <a:xfrm>
+            <a:off x="3551395" y="3259380"/>
+            <a:ext cx="618123" cy="466425"/>
+          </a:xfrm>
+          <a:prstGeom prst="straightConnector1">
+            <a:avLst/>
+          </a:prstGeom>
+          <a:ln>
+            <a:solidFill>
+              <a:schemeClr val="bg2">
+                <a:lumMod val="50000"/>
+              </a:schemeClr>
+            </a:solidFill>
+            <a:tailEnd type="arrow"/>
+          </a:ln>
+        </p:spPr>
+        <p:style>
+          <a:lnRef idx="2">
+            <a:schemeClr val="accent1"/>
+          </a:lnRef>
+          <a:fillRef idx="0">
+            <a:schemeClr val="accent1"/>
+          </a:fillRef>
+          <a:effectRef idx="1">
+            <a:schemeClr val="accent1"/>
+          </a:effectRef>
+          <a:fontRef idx="minor">
+            <a:schemeClr val="tx1"/>
+          </a:fontRef>
+        </p:style>
+      </p:cxnSp>
+      <p:cxnSp>
+        <p:nvCxnSpPr>
+          <p:cNvPr id="32" name="Straight Arrow Connector 31"/>
+          <p:cNvCxnSpPr/>
+          <p:nvPr/>
+        </p:nvCxnSpPr>
+        <p:spPr>
+          <a:xfrm>
+            <a:off x="3906090" y="3259380"/>
+            <a:ext cx="354695" cy="466425"/>
+          </a:xfrm>
+          <a:prstGeom prst="straightConnector1">
+            <a:avLst/>
+          </a:prstGeom>
+          <a:ln>
+            <a:solidFill>
+              <a:schemeClr val="bg2">
+                <a:lumMod val="50000"/>
+              </a:schemeClr>
+            </a:solidFill>
+            <a:tailEnd type="arrow"/>
+          </a:ln>
+        </p:spPr>
+        <p:style>
+          <a:lnRef idx="2">
+            <a:schemeClr val="accent1"/>
+          </a:lnRef>
+          <a:fillRef idx="0">
+            <a:schemeClr val="accent1"/>
+          </a:fillRef>
+          <a:effectRef idx="1">
+            <a:schemeClr val="accent1"/>
+          </a:effectRef>
+          <a:fontRef idx="minor">
+            <a:schemeClr val="tx1"/>
+          </a:fontRef>
+        </p:style>
+      </p:cxnSp>
+      <p:cxnSp>
+        <p:nvCxnSpPr>
+          <p:cNvPr id="33" name="Straight Arrow Connector 32"/>
+          <p:cNvCxnSpPr/>
+          <p:nvPr/>
+        </p:nvCxnSpPr>
+        <p:spPr>
+          <a:xfrm>
+            <a:off x="4260785" y="3259380"/>
+            <a:ext cx="111028" cy="466425"/>
+          </a:xfrm>
+          <a:prstGeom prst="straightConnector1">
+            <a:avLst/>
+          </a:prstGeom>
+          <a:ln>
+            <a:solidFill>
+              <a:schemeClr val="bg2">
+                <a:lumMod val="50000"/>
+              </a:schemeClr>
+            </a:solidFill>
+            <a:tailEnd type="arrow"/>
+          </a:ln>
+        </p:spPr>
+        <p:style>
+          <a:lnRef idx="2">
+            <a:schemeClr val="accent1"/>
+          </a:lnRef>
+          <a:fillRef idx="0">
+            <a:schemeClr val="accent1"/>
+          </a:fillRef>
+          <a:effectRef idx="1">
+            <a:schemeClr val="accent1"/>
+          </a:effectRef>
+          <a:fontRef idx="minor">
+            <a:schemeClr val="tx1"/>
+          </a:fontRef>
+        </p:style>
+      </p:cxnSp>
+      <p:cxnSp>
+        <p:nvCxnSpPr>
+          <p:cNvPr id="34" name="Straight Arrow Connector 33"/>
+          <p:cNvCxnSpPr/>
+          <p:nvPr/>
+        </p:nvCxnSpPr>
+        <p:spPr>
+          <a:xfrm flipH="1">
+            <a:off x="4475497" y="3259380"/>
+            <a:ext cx="139983" cy="466425"/>
+          </a:xfrm>
+          <a:prstGeom prst="straightConnector1">
+            <a:avLst/>
+          </a:prstGeom>
+          <a:ln>
+            <a:solidFill>
+              <a:schemeClr val="bg2">
+                <a:lumMod val="50000"/>
+              </a:schemeClr>
+            </a:solidFill>
+            <a:tailEnd type="arrow"/>
+          </a:ln>
+        </p:spPr>
+        <p:style>
+          <a:lnRef idx="2">
+            <a:schemeClr val="accent1"/>
+          </a:lnRef>
+          <a:fillRef idx="0">
+            <a:schemeClr val="accent1"/>
+          </a:fillRef>
+          <a:effectRef idx="1">
+            <a:schemeClr val="accent1"/>
+          </a:effectRef>
+          <a:fontRef idx="minor">
+            <a:schemeClr val="tx1"/>
+          </a:fontRef>
+        </p:style>
+      </p:cxnSp>
+      <p:cxnSp>
+        <p:nvCxnSpPr>
+          <p:cNvPr id="35" name="Straight Arrow Connector 34"/>
+          <p:cNvCxnSpPr/>
+          <p:nvPr/>
+        </p:nvCxnSpPr>
+        <p:spPr>
+          <a:xfrm flipH="1">
+            <a:off x="4615480" y="3259380"/>
+            <a:ext cx="351979" cy="466425"/>
+          </a:xfrm>
+          <a:prstGeom prst="straightConnector1">
+            <a:avLst/>
+          </a:prstGeom>
+          <a:ln>
+            <a:solidFill>
+              <a:schemeClr val="bg2">
+                <a:lumMod val="50000"/>
+              </a:schemeClr>
+            </a:solidFill>
+            <a:tailEnd type="arrow"/>
+          </a:ln>
+        </p:spPr>
+        <p:style>
+          <a:lnRef idx="2">
+            <a:schemeClr val="accent1"/>
+          </a:lnRef>
+          <a:fillRef idx="0">
+            <a:schemeClr val="accent1"/>
+          </a:fillRef>
+          <a:effectRef idx="1">
+            <a:schemeClr val="accent1"/>
+          </a:effectRef>
+          <a:fontRef idx="minor">
+            <a:schemeClr val="tx1"/>
+          </a:fontRef>
+        </p:style>
+      </p:cxnSp>
+      <p:cxnSp>
+        <p:nvCxnSpPr>
+          <p:cNvPr id="36" name="Straight Arrow Connector 35"/>
+          <p:cNvCxnSpPr/>
+          <p:nvPr/>
+        </p:nvCxnSpPr>
+        <p:spPr>
+          <a:xfrm flipH="1">
+            <a:off x="4696189" y="3217402"/>
+            <a:ext cx="608427" cy="508403"/>
+          </a:xfrm>
+          <a:prstGeom prst="straightConnector1">
+            <a:avLst/>
+          </a:prstGeom>
+          <a:ln>
+            <a:solidFill>
+              <a:schemeClr val="bg2">
+                <a:lumMod val="50000"/>
+              </a:schemeClr>
+            </a:solidFill>
+            <a:tailEnd type="arrow"/>
+          </a:ln>
+        </p:spPr>
+        <p:style>
+          <a:lnRef idx="2">
+            <a:schemeClr val="accent1"/>
+          </a:lnRef>
+          <a:fillRef idx="0">
+            <a:schemeClr val="accent1"/>
+          </a:fillRef>
+          <a:effectRef idx="1">
+            <a:schemeClr val="accent1"/>
+          </a:effectRef>
+          <a:fontRef idx="minor">
+            <a:schemeClr val="tx1"/>
+          </a:fontRef>
+        </p:style>
+      </p:cxnSp>
+      <p:sp>
+        <p:nvSpPr>
+          <p:cNvPr id="42" name="Rounded Rectangle 41"/>
+          <p:cNvSpPr/>
+          <p:nvPr/>
+        </p:nvSpPr>
+        <p:spPr>
+          <a:xfrm>
+            <a:off x="4169519" y="4778848"/>
+            <a:ext cx="526670" cy="297838"/>
+          </a:xfrm>
+          <a:prstGeom prst="roundRect">
+            <a:avLst/>
+          </a:prstGeom>
+        </p:spPr>
+        <p:style>
+          <a:lnRef idx="1">
+            <a:schemeClr val="accent2"/>
+          </a:lnRef>
+          <a:fillRef idx="2">
+            <a:schemeClr val="accent2"/>
+          </a:fillRef>
+          <a:effectRef idx="1">
+            <a:schemeClr val="accent2"/>
+          </a:effectRef>
+          <a:fontRef idx="minor">
+            <a:schemeClr val="dk1"/>
+          </a:fontRef>
+        </p:style>
+        <p:txBody>
+          <a:bodyPr rtlCol="0" anchor="ctr"/>
+          <a:lstStyle/>
+          <a:p>
+            <a:pPr algn="ctr"/>
+            <a:r>
+              <a:rPr lang="en-US" sz="1100" dirty="0" smtClean="0"/>
+              <a:t>236</a:t>
+            </a:r>
+            <a:endParaRPr lang="en-US" sz="1100" dirty="0"/>
+          </a:p>
+        </p:txBody>
+      </p:sp>
+      <p:sp>
+        <p:nvSpPr>
+          <p:cNvPr id="38" name="TextBox 37"/>
+          <p:cNvSpPr txBox="1"/>
+          <p:nvPr/>
+        </p:nvSpPr>
+        <p:spPr>
+          <a:xfrm>
+            <a:off x="2877080" y="1815126"/>
+            <a:ext cx="3423421" cy="369332"/>
+          </a:xfrm>
+          <a:prstGeom prst="rect">
+            <a:avLst/>
+          </a:prstGeom>
+          <a:noFill/>
+        </p:spPr>
+        <p:txBody>
+          <a:bodyPr wrap="none" rtlCol="0">
+            <a:spAutoFit/>
+          </a:bodyPr>
+          <a:lstStyle/>
+          <a:p>
+            <a:r>
+              <a:rPr lang="en-US" dirty="0" smtClean="0"/>
+              <a:t>(76 + 81 + 79)/3 =&gt; 236/3 =&gt; 78.67</a:t>
+            </a:r>
+            <a:endParaRPr lang="en-US" dirty="0"/>
+          </a:p>
+        </p:txBody>
+      </p:sp>
+    </p:spTree>
+    <p:extLst>
+      <p:ext uri="{BB962C8B-B14F-4D97-AF65-F5344CB8AC3E}">
+        <p14:creationId xmlns:p14="http://schemas.microsoft.com/office/powerpoint/2010/main" val="1531004752"/>
+      </p:ext>
+    </p:extLst>
+  </p:cSld>
+  <p:clrMapOvr>
+    <a:masterClrMapping/>
+  </p:clrMapOvr>
+</p:sld>
+</file>
+
+<file path=ppt/slides/slide82.xml><?xml version="1.0" encoding="utf-8"?>
+<p:sld xmlns:a="http://schemas.openxmlformats.org/drawingml/2006/main" xmlns:r="http://schemas.openxmlformats.org/officeDocument/2006/relationships" xmlns:p="http://schemas.openxmlformats.org/presentationml/2006/main">
+  <p:cSld>
+    <p:spTree>
+      <p:nvGrpSpPr>
+        <p:cNvPr id="1" name=""/>
+        <p:cNvGrpSpPr/>
+        <p:nvPr/>
+      </p:nvGrpSpPr>
+      <p:grpSpPr>
+        <a:xfrm>
+          <a:off x="0" y="0"/>
+          <a:ext cx="0" cy="0"/>
+          <a:chOff x="0" y="0"/>
+          <a:chExt cx="0" cy="0"/>
+        </a:xfrm>
+      </p:grpSpPr>
+      <p:sp>
+        <p:nvSpPr>
+          <p:cNvPr id="2" name="Title 1"/>
+          <p:cNvSpPr>
+            <a:spLocks noGrp="1"/>
+          </p:cNvSpPr>
+          <p:nvPr>
+            <p:ph type="title"/>
+          </p:nvPr>
+        </p:nvSpPr>
+        <p:spPr/>
+        <p:txBody>
+          <a:bodyPr/>
+          <a:lstStyle/>
+          <a:p>
+            <a:r>
+              <a:rPr lang="en-US" dirty="0" smtClean="0"/>
+              <a:t>Conclusion</a:t>
+            </a:r>
+            <a:endParaRPr lang="en-US" dirty="0"/>
+          </a:p>
+        </p:txBody>
+      </p:sp>
+      <p:sp>
+        <p:nvSpPr>
+          <p:cNvPr id="3" name="Content Placeholder 2"/>
+          <p:cNvSpPr>
+            <a:spLocks noGrp="1"/>
+          </p:cNvSpPr>
+          <p:nvPr>
+            <p:ph idx="1"/>
+          </p:nvPr>
+        </p:nvSpPr>
+        <p:spPr/>
+        <p:txBody>
+          <a:bodyPr>
+            <a:normAutofit/>
+          </a:bodyPr>
+          <a:lstStyle/>
+          <a:p>
+            <a:pPr marL="514350" indent="-514350">
+              <a:buFont typeface="+mj-lt"/>
+              <a:buAutoNum type="arabicPeriod"/>
+            </a:pPr>
+            <a:r>
+              <a:rPr lang="en-US" dirty="0" smtClean="0"/>
+              <a:t>Array are very cool</a:t>
+            </a:r>
+          </a:p>
+          <a:p>
+            <a:pPr marL="514350" indent="-514350">
+              <a:buFont typeface="+mj-lt"/>
+              <a:buAutoNum type="arabicPeriod"/>
+            </a:pPr>
+            <a:r>
+              <a:rPr lang="en-US" dirty="0" smtClean="0"/>
+              <a:t>Fairly easy to use</a:t>
+            </a:r>
+          </a:p>
+          <a:p>
+            <a:pPr marL="514350" indent="-514350">
+              <a:buFont typeface="+mj-lt"/>
+              <a:buAutoNum type="arabicPeriod"/>
+            </a:pPr>
+            <a:r>
+              <a:rPr lang="en-US" dirty="0" smtClean="0"/>
+              <a:t>Flexible</a:t>
+            </a:r>
+          </a:p>
+          <a:p>
+            <a:pPr marL="514350" indent="-514350">
+              <a:buFont typeface="+mj-lt"/>
+              <a:buAutoNum type="arabicPeriod"/>
+            </a:pPr>
+            <a:r>
+              <a:rPr lang="en-US" dirty="0" smtClean="0"/>
+              <a:t>Provides a number of useful methods out of the box</a:t>
+            </a:r>
+            <a:endParaRPr lang="en-US" dirty="0" smtClean="0"/>
+          </a:p>
+          <a:p>
+            <a:pPr marL="514350" indent="-514350">
+              <a:buFont typeface="+mj-lt"/>
+              <a:buAutoNum type="arabicPeriod"/>
+            </a:pPr>
+            <a:endParaRPr lang="en-US" dirty="0"/>
+          </a:p>
+          <a:p>
+            <a:pPr marL="0" indent="0">
+              <a:buNone/>
+            </a:pPr>
+            <a:r>
+              <a:rPr lang="en-US" dirty="0" smtClean="0"/>
+              <a:t>Resources:</a:t>
+            </a:r>
+          </a:p>
+          <a:p>
+            <a:pPr marL="514350" indent="-514350">
+              <a:buFont typeface="+mj-lt"/>
+              <a:buAutoNum type="arabicPeriod"/>
+            </a:pPr>
+            <a:r>
+              <a:rPr lang="en-US" sz="1600" dirty="0" smtClean="0"/>
+              <a:t>Mozilla Developer Network – Array Documentation</a:t>
+            </a:r>
+          </a:p>
+          <a:p>
+            <a:pPr marL="914400" lvl="1" indent="-514350"/>
+            <a:r>
+              <a:rPr lang="en-US" sz="1200" dirty="0" smtClean="0"/>
+              <a:t>https</a:t>
+            </a:r>
+            <a:r>
+              <a:rPr lang="en-US" sz="1200" dirty="0"/>
+              <a:t>://</a:t>
+            </a:r>
+            <a:r>
+              <a:rPr lang="en-US" sz="1200" dirty="0" err="1"/>
+              <a:t>developer.mozilla.org</a:t>
+            </a:r>
+            <a:r>
+              <a:rPr lang="en-US" sz="1200" dirty="0"/>
+              <a:t>/en-US/docs/Web/JavaScript/Reference/</a:t>
+            </a:r>
+            <a:r>
+              <a:rPr lang="en-US" sz="1200" dirty="0" err="1"/>
+              <a:t>Global_Objects</a:t>
+            </a:r>
+            <a:r>
+              <a:rPr lang="en-US" sz="1200" dirty="0"/>
+              <a:t>/Array</a:t>
+            </a:r>
+            <a:endParaRPr lang="en-US" sz="1200" dirty="0" smtClean="0"/>
+          </a:p>
+        </p:txBody>
+      </p:sp>
+    </p:spTree>
+    <p:extLst>
+      <p:ext uri="{BB962C8B-B14F-4D97-AF65-F5344CB8AC3E}">
+        <p14:creationId xmlns:p14="http://schemas.microsoft.com/office/powerpoint/2010/main" val="2368369695"/>
+      </p:ext>
+    </p:extLst>
+  </p:cSld>
+  <p:clrMapOvr>
+    <a:masterClrMapping/>
+  </p:clrMapOvr>
 </p:sld>
 </file>
 

</xml_diff>

<commit_message>
Updated document, slides and code example for c05s17 - JavaScript - Switch Statement
</commit_message>
<xml_diff>
--- a/docs/learn-computer-programming.pptx
+++ b/docs/learn-computer-programming.pptx
@@ -123,6 +123,13 @@
     <p:sldId id="383" r:id="rId117"/>
     <p:sldId id="386" r:id="rId118"/>
     <p:sldId id="377" r:id="rId119"/>
+    <p:sldId id="395" r:id="rId120"/>
+    <p:sldId id="397" r:id="rId121"/>
+    <p:sldId id="398" r:id="rId122"/>
+    <p:sldId id="399" r:id="rId123"/>
+    <p:sldId id="400" r:id="rId124"/>
+    <p:sldId id="401" r:id="rId125"/>
+    <p:sldId id="402" r:id="rId126"/>
   </p:sldIdLst>
   <p:sldSz cx="9144000" cy="6858000" type="screen4x3"/>
   <p:notesSz cx="6858000" cy="9144000"/>
@@ -5289,42 +5296,42 @@
     </dgm:pt>
   </dgm:ptLst>
   <dgm:cxnLst>
+    <dgm:cxn modelId="{0A19088C-A894-A349-B6F2-D0CA96CD47FA}" srcId="{960CE163-DF35-2B44-83E7-B9153BC66084}" destId="{1AD1EA1C-020E-5744-81BA-AEEC1A7A11F3}" srcOrd="2" destOrd="0" parTransId="{12CF4121-F3B4-5C45-B72F-C1FB37DD3C0D}" sibTransId="{E7356A86-2BC1-2844-87C1-0F4142A0BACE}"/>
+    <dgm:cxn modelId="{A5EF75CA-949B-FB42-A967-633DBF9C5416}" srcId="{67DF074B-DE05-B24C-9E35-CDBF726DC2DD}" destId="{2CF1C699-9046-8C42-87E6-2861BF37D660}" srcOrd="1" destOrd="0" parTransId="{F9A1264F-2EB8-8148-8E8F-B74886C30473}" sibTransId="{2B88B2F7-3FE5-E743-A3EF-F1DB3821C219}"/>
+    <dgm:cxn modelId="{1BB5FA34-3C64-DD46-93EA-B2497E30C558}" type="presOf" srcId="{0C3731E6-7189-414B-8AA4-AA411ADE82DC}" destId="{F42357F4-6E12-A041-A7D6-81713E5E517B}" srcOrd="0" destOrd="0" presId="urn:microsoft.com/office/officeart/2005/8/layout/hierarchy1"/>
+    <dgm:cxn modelId="{4143E40A-3339-5746-9665-4720B7275017}" type="presOf" srcId="{4261D7F4-A7D0-3F49-B78A-20CFB380B683}" destId="{C2C1A37D-940A-6743-AC99-D92FAAA879A9}" srcOrd="0" destOrd="0" presId="urn:microsoft.com/office/officeart/2005/8/layout/hierarchy1"/>
+    <dgm:cxn modelId="{62868263-8B87-BF41-9DB1-C409701EE1E3}" type="presOf" srcId="{184A7FBE-4658-3046-B4A7-4EBDDC670AD1}" destId="{2E4A94D1-71F0-A046-B95F-18095848F38A}" srcOrd="0" destOrd="0" presId="urn:microsoft.com/office/officeart/2005/8/layout/hierarchy1"/>
+    <dgm:cxn modelId="{56B8DE62-0A59-E34F-BA89-ACA8FE07FD37}" type="presOf" srcId="{A215CF19-F4EB-414A-A10F-B2A96141FE91}" destId="{0B86410B-498D-AB4D-9967-4C4AEDB1DF45}" srcOrd="0" destOrd="0" presId="urn:microsoft.com/office/officeart/2005/8/layout/hierarchy1"/>
+    <dgm:cxn modelId="{4CC6FB2A-BDF9-2948-B3E8-8BFD444DE0F5}" srcId="{67DF074B-DE05-B24C-9E35-CDBF726DC2DD}" destId="{632DBD1E-A080-C14D-89CD-94A8C0F3CF25}" srcOrd="0" destOrd="0" parTransId="{563BE0E2-35F1-EA43-92A4-487E8781D214}" sibTransId="{BC85FB81-59E3-3246-A1DB-AA9BCA174B1A}"/>
+    <dgm:cxn modelId="{7E833AC7-C906-EC48-8CF2-050B2E9E6DD6}" type="presOf" srcId="{632DBD1E-A080-C14D-89CD-94A8C0F3CF25}" destId="{2246CDBD-2CA8-A34C-A89B-E32ACB07E97A}" srcOrd="0" destOrd="0" presId="urn:microsoft.com/office/officeart/2005/8/layout/hierarchy1"/>
+    <dgm:cxn modelId="{48C3CFE4-65EB-9D4E-A0CE-F9F821B5D78C}" srcId="{FE86CB60-E462-414C-BF0E-606A57D7AD93}" destId="{9C7D04B1-85B2-3F41-9343-3724449F75B3}" srcOrd="0" destOrd="0" parTransId="{184A7FBE-4658-3046-B4A7-4EBDDC670AD1}" sibTransId="{5D03D28D-4580-AA4E-B725-784F886C6797}"/>
+    <dgm:cxn modelId="{5125BE48-CBDA-9E46-A5EC-A00E5922E856}" type="presOf" srcId="{8C382D6E-A069-234E-96CC-A5A865E2BBBD}" destId="{C6BA431E-FA40-1D4E-A3D8-2A8BD37A2453}" srcOrd="0" destOrd="0" presId="urn:microsoft.com/office/officeart/2005/8/layout/hierarchy1"/>
+    <dgm:cxn modelId="{FFC55F0E-24F0-0940-B0B5-F6820B65D7C7}" type="presOf" srcId="{E5C8F682-32CD-424A-896C-91EAD3E64C45}" destId="{76B33B1D-4CA5-544F-BF28-B308B507EF10}" srcOrd="0" destOrd="0" presId="urn:microsoft.com/office/officeart/2005/8/layout/hierarchy1"/>
+    <dgm:cxn modelId="{BE4A5523-AA4B-D244-80FB-A948E67617FE}" srcId="{AE7EA77A-1D8E-3F42-95E1-4EB11A443A81}" destId="{4261D7F4-A7D0-3F49-B78A-20CFB380B683}" srcOrd="0" destOrd="0" parTransId="{8C382D6E-A069-234E-96CC-A5A865E2BBBD}" sibTransId="{BFE6C573-BEC1-BB44-914C-4A90CDE91A1A}"/>
+    <dgm:cxn modelId="{BD876DF4-FBEE-9943-863F-7B7F61CBAEA9}" srcId="{960CE163-DF35-2B44-83E7-B9153BC66084}" destId="{FE86CB60-E462-414C-BF0E-606A57D7AD93}" srcOrd="3" destOrd="0" parTransId="{70F0D127-9705-B346-8456-2EA73B6E30CF}" sibTransId="{B2965BF0-14E0-474E-A2AB-CCA4521513DD}"/>
+    <dgm:cxn modelId="{7B0EFE83-8F7C-2148-A812-1F8ACB477747}" type="presOf" srcId="{F9A1264F-2EB8-8148-8E8F-B74886C30473}" destId="{9541F663-17CE-1449-B545-4E9F3C558C3A}" srcOrd="0" destOrd="0" presId="urn:microsoft.com/office/officeart/2005/8/layout/hierarchy1"/>
+    <dgm:cxn modelId="{1FDA42F0-000F-6E4D-ACBD-DD297AF16C8B}" type="presOf" srcId="{960CE163-DF35-2B44-83E7-B9153BC66084}" destId="{923B0C63-79B7-9B4A-94B9-19130FBE5D7B}" srcOrd="0" destOrd="0" presId="urn:microsoft.com/office/officeart/2005/8/layout/hierarchy1"/>
+    <dgm:cxn modelId="{C885BB5D-362B-1847-87CF-E1B639313EA0}" srcId="{FE86CB60-E462-414C-BF0E-606A57D7AD93}" destId="{E5C8F682-32CD-424A-896C-91EAD3E64C45}" srcOrd="2" destOrd="0" parTransId="{E3372A67-8AD5-414E-9A1F-4D9E3CFF6332}" sibTransId="{B77BD5BE-E444-A847-B5CA-1B150064119C}"/>
+    <dgm:cxn modelId="{68A68B6C-C4A2-404D-9619-7E596F60AE28}" srcId="{FE86CB60-E462-414C-BF0E-606A57D7AD93}" destId="{67DF074B-DE05-B24C-9E35-CDBF726DC2DD}" srcOrd="1" destOrd="0" parTransId="{0C3731E6-7189-414B-8AA4-AA411ADE82DC}" sibTransId="{4A343348-5A18-A64D-B967-67FF94A2182D}"/>
+    <dgm:cxn modelId="{E1A0809A-BAEA-BF42-92A8-DDEE32055693}" type="presOf" srcId="{9C7D04B1-85B2-3F41-9343-3724449F75B3}" destId="{AD6B8219-1F5B-DA4F-B261-22B5D0551A94}" srcOrd="0" destOrd="0" presId="urn:microsoft.com/office/officeart/2005/8/layout/hierarchy1"/>
+    <dgm:cxn modelId="{74C3DF55-2571-4A42-A3D4-79D2D7286452}" type="presOf" srcId="{12CF4121-F3B4-5C45-B72F-C1FB37DD3C0D}" destId="{800FD04D-B3AC-0B4A-955F-2E2198D77D53}" srcOrd="0" destOrd="0" presId="urn:microsoft.com/office/officeart/2005/8/layout/hierarchy1"/>
+    <dgm:cxn modelId="{7DFEC403-3D07-E147-94A7-6948508849D0}" type="presOf" srcId="{563BE0E2-35F1-EA43-92A4-487E8781D214}" destId="{1F5FFC55-2839-634C-8F0C-96EACF5BE3CB}" srcOrd="0" destOrd="0" presId="urn:microsoft.com/office/officeart/2005/8/layout/hierarchy1"/>
+    <dgm:cxn modelId="{D2D6BF3A-81D0-9346-B33A-086AABA7D7D7}" type="presOf" srcId="{D0F565E7-5D70-054E-90E0-C19FE13B6790}" destId="{6B84F89A-BB62-184B-ACA8-8A1AAAE34DE1}" srcOrd="0" destOrd="0" presId="urn:microsoft.com/office/officeart/2005/8/layout/hierarchy1"/>
+    <dgm:cxn modelId="{FE6DB9C5-C848-C041-9BAC-D3D409ECA3D7}" type="presOf" srcId="{67DF074B-DE05-B24C-9E35-CDBF726DC2DD}" destId="{EBC8209D-BB74-B44A-A57A-C51ABEDBBAE8}" srcOrd="0" destOrd="0" presId="urn:microsoft.com/office/officeart/2005/8/layout/hierarchy1"/>
+    <dgm:cxn modelId="{09A4557F-E6E3-CA46-A390-4566B55E38CE}" srcId="{AE7EA77A-1D8E-3F42-95E1-4EB11A443A81}" destId="{A215CF19-F4EB-414A-A10F-B2A96141FE91}" srcOrd="1" destOrd="0" parTransId="{4810192D-B607-5A42-8DCE-8CFCF1A82427}" sibTransId="{466C1D3C-619E-C448-BF54-2F35FBFACADE}"/>
+    <dgm:cxn modelId="{8BD052AF-949A-F948-A12A-2F16C08A8BAA}" type="presOf" srcId="{4810192D-B607-5A42-8DCE-8CFCF1A82427}" destId="{28156514-4C64-AE45-A406-98283D6076D6}" srcOrd="0" destOrd="0" presId="urn:microsoft.com/office/officeart/2005/8/layout/hierarchy1"/>
+    <dgm:cxn modelId="{629969CD-5D04-2A43-B3AF-FE8A98094A86}" type="presOf" srcId="{6C0275DE-9DFE-0E43-8DDA-D28DD222D71F}" destId="{8CFA3E84-678E-C345-8D46-63E85CF195E2}" srcOrd="0" destOrd="0" presId="urn:microsoft.com/office/officeart/2005/8/layout/hierarchy1"/>
     <dgm:cxn modelId="{250B2BE2-FEC5-CD47-89C4-F8108BC7D53A}" type="presOf" srcId="{FE86CB60-E462-414C-BF0E-606A57D7AD93}" destId="{6603764C-B415-664F-8885-A7DAA8CAF3E7}" srcOrd="0" destOrd="0" presId="urn:microsoft.com/office/officeart/2005/8/layout/hierarchy1"/>
     <dgm:cxn modelId="{1D703EA7-18EF-A644-AD84-6BA0E7A84E48}" srcId="{960CE163-DF35-2B44-83E7-B9153BC66084}" destId="{AE7EA77A-1D8E-3F42-95E1-4EB11A443A81}" srcOrd="0" destOrd="0" parTransId="{D0F565E7-5D70-054E-90E0-C19FE13B6790}" sibTransId="{A9860EA9-F28C-E04C-8CCC-2E75895ED615}"/>
-    <dgm:cxn modelId="{BD876DF4-FBEE-9943-863F-7B7F61CBAEA9}" srcId="{960CE163-DF35-2B44-83E7-B9153BC66084}" destId="{FE86CB60-E462-414C-BF0E-606A57D7AD93}" srcOrd="3" destOrd="0" parTransId="{70F0D127-9705-B346-8456-2EA73B6E30CF}" sibTransId="{B2965BF0-14E0-474E-A2AB-CCA4521513DD}"/>
+    <dgm:cxn modelId="{8FC20289-4F63-9E49-BD79-567030E07E0D}" srcId="{960CE163-DF35-2B44-83E7-B9153BC66084}" destId="{4D875376-E6B9-804F-AC85-A1D4337BBC8A}" srcOrd="1" destOrd="0" parTransId="{6C0275DE-9DFE-0E43-8DDA-D28DD222D71F}" sibTransId="{5CBDE70F-8F73-B144-BE9A-D54839868342}"/>
+    <dgm:cxn modelId="{E7733746-4C87-234A-9D3E-4005D8B583BC}" srcId="{84B85FB8-CE49-454E-AFD0-26748DF588CB}" destId="{960CE163-DF35-2B44-83E7-B9153BC66084}" srcOrd="0" destOrd="0" parTransId="{15F9C8B3-0868-F148-A166-96327192876A}" sibTransId="{AE4D7356-6DD9-B04F-A5BC-257D53ADE85C}"/>
+    <dgm:cxn modelId="{89EEE784-3EED-8F43-8217-BBD1C237CA84}" type="presOf" srcId="{2CF1C699-9046-8C42-87E6-2861BF37D660}" destId="{9152FE1E-3F9F-1945-845B-196FD4FE9E7F}" srcOrd="0" destOrd="0" presId="urn:microsoft.com/office/officeart/2005/8/layout/hierarchy1"/>
+    <dgm:cxn modelId="{517E7342-1ED5-B24E-84A1-2A79CCE5BC2A}" type="presOf" srcId="{4D875376-E6B9-804F-AC85-A1D4337BBC8A}" destId="{0FEFC8CB-58CB-4A43-9867-EED6738F0C0F}" srcOrd="0" destOrd="0" presId="urn:microsoft.com/office/officeart/2005/8/layout/hierarchy1"/>
+    <dgm:cxn modelId="{FB5948D5-A112-7E4F-A7A4-599731141072}" type="presOf" srcId="{E3372A67-8AD5-414E-9A1F-4D9E3CFF6332}" destId="{BA61A876-7050-3746-8DAE-0686A0FD0957}" srcOrd="0" destOrd="0" presId="urn:microsoft.com/office/officeart/2005/8/layout/hierarchy1"/>
     <dgm:cxn modelId="{BDB62AEF-004A-3E4A-BA04-15FFC883C6DC}" type="presOf" srcId="{1AD1EA1C-020E-5744-81BA-AEEC1A7A11F3}" destId="{D86CCABB-994E-2B44-9B36-549A167DC946}" srcOrd="0" destOrd="0" presId="urn:microsoft.com/office/officeart/2005/8/layout/hierarchy1"/>
-    <dgm:cxn modelId="{E1A0809A-BAEA-BF42-92A8-DDEE32055693}" type="presOf" srcId="{9C7D04B1-85B2-3F41-9343-3724449F75B3}" destId="{AD6B8219-1F5B-DA4F-B261-22B5D0551A94}" srcOrd="0" destOrd="0" presId="urn:microsoft.com/office/officeart/2005/8/layout/hierarchy1"/>
-    <dgm:cxn modelId="{56B8DE62-0A59-E34F-BA89-ACA8FE07FD37}" type="presOf" srcId="{A215CF19-F4EB-414A-A10F-B2A96141FE91}" destId="{0B86410B-498D-AB4D-9967-4C4AEDB1DF45}" srcOrd="0" destOrd="0" presId="urn:microsoft.com/office/officeart/2005/8/layout/hierarchy1"/>
-    <dgm:cxn modelId="{D2D6BF3A-81D0-9346-B33A-086AABA7D7D7}" type="presOf" srcId="{D0F565E7-5D70-054E-90E0-C19FE13B6790}" destId="{6B84F89A-BB62-184B-ACA8-8A1AAAE34DE1}" srcOrd="0" destOrd="0" presId="urn:microsoft.com/office/officeart/2005/8/layout/hierarchy1"/>
-    <dgm:cxn modelId="{62868263-8B87-BF41-9DB1-C409701EE1E3}" type="presOf" srcId="{184A7FBE-4658-3046-B4A7-4EBDDC670AD1}" destId="{2E4A94D1-71F0-A046-B95F-18095848F38A}" srcOrd="0" destOrd="0" presId="urn:microsoft.com/office/officeart/2005/8/layout/hierarchy1"/>
-    <dgm:cxn modelId="{1BB5FA34-3C64-DD46-93EA-B2497E30C558}" type="presOf" srcId="{0C3731E6-7189-414B-8AA4-AA411ADE82DC}" destId="{F42357F4-6E12-A041-A7D6-81713E5E517B}" srcOrd="0" destOrd="0" presId="urn:microsoft.com/office/officeart/2005/8/layout/hierarchy1"/>
-    <dgm:cxn modelId="{4CC6FB2A-BDF9-2948-B3E8-8BFD444DE0F5}" srcId="{67DF074B-DE05-B24C-9E35-CDBF726DC2DD}" destId="{632DBD1E-A080-C14D-89CD-94A8C0F3CF25}" srcOrd="0" destOrd="0" parTransId="{563BE0E2-35F1-EA43-92A4-487E8781D214}" sibTransId="{BC85FB81-59E3-3246-A1DB-AA9BCA174B1A}"/>
-    <dgm:cxn modelId="{48C3CFE4-65EB-9D4E-A0CE-F9F821B5D78C}" srcId="{FE86CB60-E462-414C-BF0E-606A57D7AD93}" destId="{9C7D04B1-85B2-3F41-9343-3724449F75B3}" srcOrd="0" destOrd="0" parTransId="{184A7FBE-4658-3046-B4A7-4EBDDC670AD1}" sibTransId="{5D03D28D-4580-AA4E-B725-784F886C6797}"/>
-    <dgm:cxn modelId="{89EEE784-3EED-8F43-8217-BBD1C237CA84}" type="presOf" srcId="{2CF1C699-9046-8C42-87E6-2861BF37D660}" destId="{9152FE1E-3F9F-1945-845B-196FD4FE9E7F}" srcOrd="0" destOrd="0" presId="urn:microsoft.com/office/officeart/2005/8/layout/hierarchy1"/>
-    <dgm:cxn modelId="{68A68B6C-C4A2-404D-9619-7E596F60AE28}" srcId="{FE86CB60-E462-414C-BF0E-606A57D7AD93}" destId="{67DF074B-DE05-B24C-9E35-CDBF726DC2DD}" srcOrd="1" destOrd="0" parTransId="{0C3731E6-7189-414B-8AA4-AA411ADE82DC}" sibTransId="{4A343348-5A18-A64D-B967-67FF94A2182D}"/>
     <dgm:cxn modelId="{80E2C3F7-058F-1C40-8356-C15390BA6FDF}" type="presOf" srcId="{70F0D127-9705-B346-8456-2EA73B6E30CF}" destId="{201C7CC6-525A-FE42-B4FF-8C5914387024}" srcOrd="0" destOrd="0" presId="urn:microsoft.com/office/officeart/2005/8/layout/hierarchy1"/>
-    <dgm:cxn modelId="{8BD052AF-949A-F948-A12A-2F16C08A8BAA}" type="presOf" srcId="{4810192D-B607-5A42-8DCE-8CFCF1A82427}" destId="{28156514-4C64-AE45-A406-98283D6076D6}" srcOrd="0" destOrd="0" presId="urn:microsoft.com/office/officeart/2005/8/layout/hierarchy1"/>
-    <dgm:cxn modelId="{A5EF75CA-949B-FB42-A967-633DBF9C5416}" srcId="{67DF074B-DE05-B24C-9E35-CDBF726DC2DD}" destId="{2CF1C699-9046-8C42-87E6-2861BF37D660}" srcOrd="1" destOrd="0" parTransId="{F9A1264F-2EB8-8148-8E8F-B74886C30473}" sibTransId="{2B88B2F7-3FE5-E743-A3EF-F1DB3821C219}"/>
-    <dgm:cxn modelId="{FFC55F0E-24F0-0940-B0B5-F6820B65D7C7}" type="presOf" srcId="{E5C8F682-32CD-424A-896C-91EAD3E64C45}" destId="{76B33B1D-4CA5-544F-BF28-B308B507EF10}" srcOrd="0" destOrd="0" presId="urn:microsoft.com/office/officeart/2005/8/layout/hierarchy1"/>
+    <dgm:cxn modelId="{FBC04F02-4804-8C4A-8D64-8D7E596D7783}" type="presOf" srcId="{AE7EA77A-1D8E-3F42-95E1-4EB11A443A81}" destId="{BBF408DD-FB71-6449-9993-DDA736E8D58A}" srcOrd="0" destOrd="0" presId="urn:microsoft.com/office/officeart/2005/8/layout/hierarchy1"/>
     <dgm:cxn modelId="{F97734D8-6CBC-804D-B286-FA60DFC694E9}" type="presOf" srcId="{84B85FB8-CE49-454E-AFD0-26748DF588CB}" destId="{39E9CE6E-1476-7F49-AD48-00E9588CC1FC}" srcOrd="0" destOrd="0" presId="urn:microsoft.com/office/officeart/2005/8/layout/hierarchy1"/>
-    <dgm:cxn modelId="{1FDA42F0-000F-6E4D-ACBD-DD297AF16C8B}" type="presOf" srcId="{960CE163-DF35-2B44-83E7-B9153BC66084}" destId="{923B0C63-79B7-9B4A-94B9-19130FBE5D7B}" srcOrd="0" destOrd="0" presId="urn:microsoft.com/office/officeart/2005/8/layout/hierarchy1"/>
-    <dgm:cxn modelId="{E7733746-4C87-234A-9D3E-4005D8B583BC}" srcId="{84B85FB8-CE49-454E-AFD0-26748DF588CB}" destId="{960CE163-DF35-2B44-83E7-B9153BC66084}" srcOrd="0" destOrd="0" parTransId="{15F9C8B3-0868-F148-A166-96327192876A}" sibTransId="{AE4D7356-6DD9-B04F-A5BC-257D53ADE85C}"/>
-    <dgm:cxn modelId="{7DFEC403-3D07-E147-94A7-6948508849D0}" type="presOf" srcId="{563BE0E2-35F1-EA43-92A4-487E8781D214}" destId="{1F5FFC55-2839-634C-8F0C-96EACF5BE3CB}" srcOrd="0" destOrd="0" presId="urn:microsoft.com/office/officeart/2005/8/layout/hierarchy1"/>
-    <dgm:cxn modelId="{74C3DF55-2571-4A42-A3D4-79D2D7286452}" type="presOf" srcId="{12CF4121-F3B4-5C45-B72F-C1FB37DD3C0D}" destId="{800FD04D-B3AC-0B4A-955F-2E2198D77D53}" srcOrd="0" destOrd="0" presId="urn:microsoft.com/office/officeart/2005/8/layout/hierarchy1"/>
-    <dgm:cxn modelId="{C885BB5D-362B-1847-87CF-E1B639313EA0}" srcId="{FE86CB60-E462-414C-BF0E-606A57D7AD93}" destId="{E5C8F682-32CD-424A-896C-91EAD3E64C45}" srcOrd="2" destOrd="0" parTransId="{E3372A67-8AD5-414E-9A1F-4D9E3CFF6332}" sibTransId="{B77BD5BE-E444-A847-B5CA-1B150064119C}"/>
-    <dgm:cxn modelId="{BE4A5523-AA4B-D244-80FB-A948E67617FE}" srcId="{AE7EA77A-1D8E-3F42-95E1-4EB11A443A81}" destId="{4261D7F4-A7D0-3F49-B78A-20CFB380B683}" srcOrd="0" destOrd="0" parTransId="{8C382D6E-A069-234E-96CC-A5A865E2BBBD}" sibTransId="{BFE6C573-BEC1-BB44-914C-4A90CDE91A1A}"/>
-    <dgm:cxn modelId="{FBC04F02-4804-8C4A-8D64-8D7E596D7783}" type="presOf" srcId="{AE7EA77A-1D8E-3F42-95E1-4EB11A443A81}" destId="{BBF408DD-FB71-6449-9993-DDA736E8D58A}" srcOrd="0" destOrd="0" presId="urn:microsoft.com/office/officeart/2005/8/layout/hierarchy1"/>
-    <dgm:cxn modelId="{7E833AC7-C906-EC48-8CF2-050B2E9E6DD6}" type="presOf" srcId="{632DBD1E-A080-C14D-89CD-94A8C0F3CF25}" destId="{2246CDBD-2CA8-A34C-A89B-E32ACB07E97A}" srcOrd="0" destOrd="0" presId="urn:microsoft.com/office/officeart/2005/8/layout/hierarchy1"/>
-    <dgm:cxn modelId="{09A4557F-E6E3-CA46-A390-4566B55E38CE}" srcId="{AE7EA77A-1D8E-3F42-95E1-4EB11A443A81}" destId="{A215CF19-F4EB-414A-A10F-B2A96141FE91}" srcOrd="1" destOrd="0" parTransId="{4810192D-B607-5A42-8DCE-8CFCF1A82427}" sibTransId="{466C1D3C-619E-C448-BF54-2F35FBFACADE}"/>
-    <dgm:cxn modelId="{FE6DB9C5-C848-C041-9BAC-D3D409ECA3D7}" type="presOf" srcId="{67DF074B-DE05-B24C-9E35-CDBF726DC2DD}" destId="{EBC8209D-BB74-B44A-A57A-C51ABEDBBAE8}" srcOrd="0" destOrd="0" presId="urn:microsoft.com/office/officeart/2005/8/layout/hierarchy1"/>
-    <dgm:cxn modelId="{629969CD-5D04-2A43-B3AF-FE8A98094A86}" type="presOf" srcId="{6C0275DE-9DFE-0E43-8DDA-D28DD222D71F}" destId="{8CFA3E84-678E-C345-8D46-63E85CF195E2}" srcOrd="0" destOrd="0" presId="urn:microsoft.com/office/officeart/2005/8/layout/hierarchy1"/>
-    <dgm:cxn modelId="{517E7342-1ED5-B24E-84A1-2A79CCE5BC2A}" type="presOf" srcId="{4D875376-E6B9-804F-AC85-A1D4337BBC8A}" destId="{0FEFC8CB-58CB-4A43-9867-EED6738F0C0F}" srcOrd="0" destOrd="0" presId="urn:microsoft.com/office/officeart/2005/8/layout/hierarchy1"/>
-    <dgm:cxn modelId="{0A19088C-A894-A349-B6F2-D0CA96CD47FA}" srcId="{960CE163-DF35-2B44-83E7-B9153BC66084}" destId="{1AD1EA1C-020E-5744-81BA-AEEC1A7A11F3}" srcOrd="2" destOrd="0" parTransId="{12CF4121-F3B4-5C45-B72F-C1FB37DD3C0D}" sibTransId="{E7356A86-2BC1-2844-87C1-0F4142A0BACE}"/>
-    <dgm:cxn modelId="{FB5948D5-A112-7E4F-A7A4-599731141072}" type="presOf" srcId="{E3372A67-8AD5-414E-9A1F-4D9E3CFF6332}" destId="{BA61A876-7050-3746-8DAE-0686A0FD0957}" srcOrd="0" destOrd="0" presId="urn:microsoft.com/office/officeart/2005/8/layout/hierarchy1"/>
-    <dgm:cxn modelId="{7B0EFE83-8F7C-2148-A812-1F8ACB477747}" type="presOf" srcId="{F9A1264F-2EB8-8148-8E8F-B74886C30473}" destId="{9541F663-17CE-1449-B545-4E9F3C558C3A}" srcOrd="0" destOrd="0" presId="urn:microsoft.com/office/officeart/2005/8/layout/hierarchy1"/>
-    <dgm:cxn modelId="{5125BE48-CBDA-9E46-A5EC-A00E5922E856}" type="presOf" srcId="{8C382D6E-A069-234E-96CC-A5A865E2BBBD}" destId="{C6BA431E-FA40-1D4E-A3D8-2A8BD37A2453}" srcOrd="0" destOrd="0" presId="urn:microsoft.com/office/officeart/2005/8/layout/hierarchy1"/>
-    <dgm:cxn modelId="{8FC20289-4F63-9E49-BD79-567030E07E0D}" srcId="{960CE163-DF35-2B44-83E7-B9153BC66084}" destId="{4D875376-E6B9-804F-AC85-A1D4337BBC8A}" srcOrd="1" destOrd="0" parTransId="{6C0275DE-9DFE-0E43-8DDA-D28DD222D71F}" sibTransId="{5CBDE70F-8F73-B144-BE9A-D54839868342}"/>
-    <dgm:cxn modelId="{4143E40A-3339-5746-9665-4720B7275017}" type="presOf" srcId="{4261D7F4-A7D0-3F49-B78A-20CFB380B683}" destId="{C2C1A37D-940A-6743-AC99-D92FAAA879A9}" srcOrd="0" destOrd="0" presId="urn:microsoft.com/office/officeart/2005/8/layout/hierarchy1"/>
     <dgm:cxn modelId="{DF469E1B-C306-5F4B-B680-7ACFEA169B9B}" type="presParOf" srcId="{39E9CE6E-1476-7F49-AD48-00E9588CC1FC}" destId="{AFBF1B26-876E-5B4F-868D-ECF533517B41}" srcOrd="0" destOrd="0" presId="urn:microsoft.com/office/officeart/2005/8/layout/hierarchy1"/>
     <dgm:cxn modelId="{9BD7EE58-09E0-D144-8D85-070D725F1603}" type="presParOf" srcId="{AFBF1B26-876E-5B4F-868D-ECF533517B41}" destId="{80FDFEA5-D276-C44B-902D-D2E8A937A02A}" srcOrd="0" destOrd="0" presId="urn:microsoft.com/office/officeart/2005/8/layout/hierarchy1"/>
     <dgm:cxn modelId="{8C3AC7B7-A647-D047-8BDB-5F00B4604513}" type="presParOf" srcId="{80FDFEA5-D276-C44B-902D-D2E8A937A02A}" destId="{DE9E6D4B-E798-AA47-81C3-1E545DF4DB5B}" srcOrd="0" destOrd="0" presId="urn:microsoft.com/office/officeart/2005/8/layout/hierarchy1"/>
@@ -12972,7 +12979,7 @@
           <a:p>
             <a:fld id="{6483C26A-63A4-F547-BB74-146C3D288EFD}" type="datetimeFigureOut">
               <a:rPr lang="en-US" smtClean="0"/>
-              <a:t>3/17/16</a:t>
+              <a:t>3/23/16</a:t>
             </a:fld>
             <a:endParaRPr lang="en-US"/>
           </a:p>
@@ -13142,7 +13149,7 @@
           <a:p>
             <a:fld id="{6483C26A-63A4-F547-BB74-146C3D288EFD}" type="datetimeFigureOut">
               <a:rPr lang="en-US" smtClean="0"/>
-              <a:t>3/17/16</a:t>
+              <a:t>3/23/16</a:t>
             </a:fld>
             <a:endParaRPr lang="en-US"/>
           </a:p>
@@ -13322,7 +13329,7 @@
           <a:p>
             <a:fld id="{6483C26A-63A4-F547-BB74-146C3D288EFD}" type="datetimeFigureOut">
               <a:rPr lang="en-US" smtClean="0"/>
-              <a:t>3/17/16</a:t>
+              <a:t>3/23/16</a:t>
             </a:fld>
             <a:endParaRPr lang="en-US"/>
           </a:p>
@@ -13492,7 +13499,7 @@
           <a:p>
             <a:fld id="{6483C26A-63A4-F547-BB74-146C3D288EFD}" type="datetimeFigureOut">
               <a:rPr lang="en-US" smtClean="0"/>
-              <a:t>3/17/16</a:t>
+              <a:t>3/23/16</a:t>
             </a:fld>
             <a:endParaRPr lang="en-US"/>
           </a:p>
@@ -13738,7 +13745,7 @@
           <a:p>
             <a:fld id="{6483C26A-63A4-F547-BB74-146C3D288EFD}" type="datetimeFigureOut">
               <a:rPr lang="en-US" smtClean="0"/>
-              <a:t>3/17/16</a:t>
+              <a:t>3/23/16</a:t>
             </a:fld>
             <a:endParaRPr lang="en-US"/>
           </a:p>
@@ -14026,7 +14033,7 @@
           <a:p>
             <a:fld id="{6483C26A-63A4-F547-BB74-146C3D288EFD}" type="datetimeFigureOut">
               <a:rPr lang="en-US" smtClean="0"/>
-              <a:t>3/17/16</a:t>
+              <a:t>3/23/16</a:t>
             </a:fld>
             <a:endParaRPr lang="en-US"/>
           </a:p>
@@ -14448,7 +14455,7 @@
           <a:p>
             <a:fld id="{6483C26A-63A4-F547-BB74-146C3D288EFD}" type="datetimeFigureOut">
               <a:rPr lang="en-US" smtClean="0"/>
-              <a:t>3/17/16</a:t>
+              <a:t>3/23/16</a:t>
             </a:fld>
             <a:endParaRPr lang="en-US"/>
           </a:p>
@@ -14566,7 +14573,7 @@
           <a:p>
             <a:fld id="{6483C26A-63A4-F547-BB74-146C3D288EFD}" type="datetimeFigureOut">
               <a:rPr lang="en-US" smtClean="0"/>
-              <a:t>3/17/16</a:t>
+              <a:t>3/23/16</a:t>
             </a:fld>
             <a:endParaRPr lang="en-US"/>
           </a:p>
@@ -14661,7 +14668,7 @@
           <a:p>
             <a:fld id="{6483C26A-63A4-F547-BB74-146C3D288EFD}" type="datetimeFigureOut">
               <a:rPr lang="en-US" smtClean="0"/>
-              <a:t>3/17/16</a:t>
+              <a:t>3/23/16</a:t>
             </a:fld>
             <a:endParaRPr lang="en-US"/>
           </a:p>
@@ -14938,7 +14945,7 @@
           <a:p>
             <a:fld id="{6483C26A-63A4-F547-BB74-146C3D288EFD}" type="datetimeFigureOut">
               <a:rPr lang="en-US" smtClean="0"/>
-              <a:t>3/17/16</a:t>
+              <a:t>3/23/16</a:t>
             </a:fld>
             <a:endParaRPr lang="en-US"/>
           </a:p>
@@ -15191,7 +15198,7 @@
           <a:p>
             <a:fld id="{6483C26A-63A4-F547-BB74-146C3D288EFD}" type="datetimeFigureOut">
               <a:rPr lang="en-US" smtClean="0"/>
-              <a:t>3/17/16</a:t>
+              <a:t>3/23/16</a:t>
             </a:fld>
             <a:endParaRPr lang="en-US"/>
           </a:p>
@@ -15404,7 +15411,7 @@
           <a:p>
             <a:fld id="{6483C26A-63A4-F547-BB74-146C3D288EFD}" type="datetimeFigureOut">
               <a:rPr lang="en-US" smtClean="0"/>
-              <a:t>3/17/16</a:t>
+              <a:t>3/23/16</a:t>
             </a:fld>
             <a:endParaRPr lang="en-US"/>
           </a:p>
@@ -17612,11 +17619,7 @@
           <a:p>
             <a:r>
               <a:rPr lang="en-US" dirty="0" smtClean="0"/>
-              <a:t>Control </a:t>
-            </a:r>
-            <a:r>
-              <a:rPr lang="en-US" dirty="0" smtClean="0"/>
-              <a:t>Flow – </a:t>
+              <a:t>Control Flow – </a:t>
             </a:r>
             <a:r>
               <a:rPr lang="en-US" smtClean="0"/>
@@ -19423,21 +19426,8 @@
             <a:pPr lvl="1"/>
             <a:r>
               <a:rPr lang="en-US" dirty="0" smtClean="0"/>
-              <a:t>Control Flow allows </a:t>
-            </a:r>
-            <a:r>
-              <a:rPr lang="en-US" dirty="0" smtClean="0"/>
-              <a:t>some of </a:t>
-            </a:r>
-            <a:r>
-              <a:rPr lang="en-US" dirty="0" smtClean="0"/>
-              <a:t>the following to occur for one statement or </a:t>
-            </a:r>
-            <a:r>
-              <a:rPr lang="en-US" dirty="0" smtClean="0"/>
-              <a:t>a statement block:</a:t>
-            </a:r>
-            <a:endParaRPr lang="en-US" dirty="0" smtClean="0"/>
+              <a:t>Control Flow allows some of the following to occur for one statement or a statement block:</a:t>
+            </a:r>
           </a:p>
           <a:p>
             <a:pPr lvl="2"/>
@@ -19463,15 +19453,7 @@
                   <a:schemeClr val="accent2"/>
                 </a:solidFill>
               </a:rPr>
-              <a:t>only </a:t>
-            </a:r>
-            <a:r>
-              <a:rPr lang="en-US" i="1" dirty="0" smtClean="0">
-                <a:solidFill>
-                  <a:schemeClr val="accent2"/>
-                </a:solidFill>
-              </a:rPr>
-              <a:t>once</a:t>
+              <a:t>only once</a:t>
             </a:r>
           </a:p>
           <a:p>
@@ -21944,7 +21926,23 @@
                   <a:srgbClr val="000000"/>
                 </a:solidFill>
               </a:rPr>
-              <a:t>Condition is an expression that evaluates to the </a:t>
+              <a:t>‘</a:t>
+            </a:r>
+            <a:r>
+              <a:rPr lang="en-US" i="1" dirty="0">
+                <a:solidFill>
+                  <a:srgbClr val="C0504D"/>
+                </a:solidFill>
+              </a:rPr>
+              <a:t>condition</a:t>
+            </a:r>
+            <a:r>
+              <a:rPr lang="en-US" dirty="0" smtClean="0">
+                <a:solidFill>
+                  <a:srgbClr val="000000"/>
+                </a:solidFill>
+              </a:rPr>
+              <a:t>’ is an expression that evaluates to the </a:t>
             </a:r>
             <a:r>
               <a:rPr lang="en-US" dirty="0" err="1" smtClean="0">
@@ -22073,15 +22071,7 @@
             </a:pPr>
             <a:r>
               <a:rPr lang="en-US" dirty="0" smtClean="0"/>
-              <a:t>Control </a:t>
-            </a:r>
-            <a:r>
-              <a:rPr lang="en-US" dirty="0" smtClean="0"/>
-              <a:t>Flow gives the programmer the ability to write more sophisticated and elegant </a:t>
-            </a:r>
-            <a:r>
-              <a:rPr lang="en-US" dirty="0" smtClean="0"/>
-              <a:t>programs</a:t>
+              <a:t>Control Flow gives the programmer the ability to write more sophisticated and elegant programs</a:t>
             </a:r>
           </a:p>
           <a:p>
@@ -22117,6 +22107,95 @@
   <p:clrMapOvr>
     <a:masterClrMapping/>
   </p:clrMapOvr>
+</p:sld>
+</file>
+
+<file path=ppt/slides/slide119.xml><?xml version="1.0" encoding="utf-8"?>
+<p:sld xmlns:a="http://schemas.openxmlformats.org/drawingml/2006/main" xmlns:r="http://schemas.openxmlformats.org/officeDocument/2006/relationships" xmlns:p="http://schemas.openxmlformats.org/presentationml/2006/main">
+  <p:cSld>
+    <p:spTree>
+      <p:nvGrpSpPr>
+        <p:cNvPr id="1" name=""/>
+        <p:cNvGrpSpPr/>
+        <p:nvPr/>
+      </p:nvGrpSpPr>
+      <p:grpSpPr>
+        <a:xfrm>
+          <a:off x="0" y="0"/>
+          <a:ext cx="0" cy="0"/>
+          <a:chOff x="0" y="0"/>
+          <a:chExt cx="0" cy="0"/>
+        </a:xfrm>
+      </p:grpSpPr>
+      <p:sp>
+        <p:nvSpPr>
+          <p:cNvPr id="2" name="Title 1"/>
+          <p:cNvSpPr>
+            <a:spLocks noGrp="1"/>
+          </p:cNvSpPr>
+          <p:nvPr>
+            <p:ph type="ctrTitle"/>
+          </p:nvPr>
+        </p:nvSpPr>
+        <p:spPr/>
+        <p:txBody>
+          <a:bodyPr/>
+          <a:lstStyle/>
+          <a:p>
+            <a:r>
+              <a:rPr lang="en-US" dirty="0" smtClean="0"/>
+              <a:t>Chapter 5 – JavaScript</a:t>
+            </a:r>
+            <a:endParaRPr lang="en-US" dirty="0"/>
+          </a:p>
+        </p:txBody>
+      </p:sp>
+      <p:sp>
+        <p:nvSpPr>
+          <p:cNvPr id="3" name="Subtitle 2"/>
+          <p:cNvSpPr>
+            <a:spLocks noGrp="1"/>
+          </p:cNvSpPr>
+          <p:nvPr>
+            <p:ph type="subTitle" idx="1"/>
+          </p:nvPr>
+        </p:nvSpPr>
+        <p:spPr/>
+        <p:txBody>
+          <a:bodyPr/>
+          <a:lstStyle/>
+          <a:p>
+            <a:r>
+              <a:rPr lang="en-US" dirty="0" smtClean="0"/>
+              <a:t>#41 – Section 17</a:t>
+            </a:r>
+            <a:endParaRPr lang="en-US" dirty="0"/>
+          </a:p>
+          <a:p>
+            <a:r>
+              <a:rPr lang="en-US" dirty="0" smtClean="0"/>
+              <a:t>Control Flow – Switch Statement</a:t>
+            </a:r>
+          </a:p>
+        </p:txBody>
+      </p:sp>
+    </p:spTree>
+    <p:extLst>
+      <p:ext uri="{BB962C8B-B14F-4D97-AF65-F5344CB8AC3E}">
+        <p14:creationId xmlns:p14="http://schemas.microsoft.com/office/powerpoint/2010/main" val="2692495746"/>
+      </p:ext>
+    </p:extLst>
+  </p:cSld>
+  <p:clrMapOvr>
+    <a:masterClrMapping/>
+  </p:clrMapOvr>
+  <p:timing>
+    <p:tnLst>
+      <p:par>
+        <p:cTn xmlns:p14="http://schemas.microsoft.com/office/powerpoint/2010/main" id="1" dur="indefinite" restart="never" nodeType="tmRoot"/>
+      </p:par>
+    </p:tnLst>
+  </p:timing>
 </p:sld>
 </file>
 
@@ -22324,6 +22403,3205 @@
       </p:par>
     </p:tnLst>
   </p:timing>
+</p:sld>
+</file>
+
+<file path=ppt/slides/slide120.xml><?xml version="1.0" encoding="utf-8"?>
+<p:sld xmlns:a="http://schemas.openxmlformats.org/drawingml/2006/main" xmlns:r="http://schemas.openxmlformats.org/officeDocument/2006/relationships" xmlns:p="http://schemas.openxmlformats.org/presentationml/2006/main">
+  <p:cSld>
+    <p:spTree>
+      <p:nvGrpSpPr>
+        <p:cNvPr id="1" name=""/>
+        <p:cNvGrpSpPr/>
+        <p:nvPr/>
+      </p:nvGrpSpPr>
+      <p:grpSpPr>
+        <a:xfrm>
+          <a:off x="0" y="0"/>
+          <a:ext cx="0" cy="0"/>
+          <a:chOff x="0" y="0"/>
+          <a:chExt cx="0" cy="0"/>
+        </a:xfrm>
+      </p:grpSpPr>
+      <p:sp>
+        <p:nvSpPr>
+          <p:cNvPr id="2" name="Title 1"/>
+          <p:cNvSpPr>
+            <a:spLocks noGrp="1"/>
+          </p:cNvSpPr>
+          <p:nvPr>
+            <p:ph type="title"/>
+          </p:nvPr>
+        </p:nvSpPr>
+        <p:spPr/>
+        <p:txBody>
+          <a:bodyPr/>
+          <a:lstStyle/>
+          <a:p>
+            <a:r>
+              <a:rPr lang="en-US" dirty="0" smtClean="0"/>
+              <a:t>Topics</a:t>
+            </a:r>
+            <a:endParaRPr lang="en-US" dirty="0"/>
+          </a:p>
+        </p:txBody>
+      </p:sp>
+      <p:sp>
+        <p:nvSpPr>
+          <p:cNvPr id="3" name="Content Placeholder 2"/>
+          <p:cNvSpPr>
+            <a:spLocks noGrp="1"/>
+          </p:cNvSpPr>
+          <p:nvPr>
+            <p:ph idx="1"/>
+          </p:nvPr>
+        </p:nvSpPr>
+        <p:spPr/>
+        <p:txBody>
+          <a:bodyPr>
+            <a:normAutofit/>
+          </a:bodyPr>
+          <a:lstStyle/>
+          <a:p>
+            <a:pPr marL="514350" indent="-514350">
+              <a:buFont typeface="+mj-lt"/>
+              <a:buAutoNum type="arabicPeriod"/>
+            </a:pPr>
+            <a:r>
+              <a:rPr lang="en-US" dirty="0" smtClean="0"/>
+              <a:t>The </a:t>
+            </a:r>
+            <a:r>
+              <a:rPr lang="en-US" dirty="0"/>
+              <a:t>‘switch’ </a:t>
+            </a:r>
+            <a:r>
+              <a:rPr lang="en-US" dirty="0" smtClean="0"/>
+              <a:t>Statement</a:t>
+            </a:r>
+          </a:p>
+          <a:p>
+            <a:pPr marL="514350" indent="-514350">
+              <a:buFont typeface="+mj-lt"/>
+              <a:buAutoNum type="arabicPeriod"/>
+            </a:pPr>
+            <a:r>
+              <a:rPr lang="en-US" dirty="0" smtClean="0"/>
+              <a:t>Understanding Fall-through</a:t>
+            </a:r>
+            <a:endParaRPr lang="en-US" dirty="0"/>
+          </a:p>
+          <a:p>
+            <a:pPr marL="514350" indent="-514350">
+              <a:buFont typeface="+mj-lt"/>
+              <a:buAutoNum type="arabicPeriod"/>
+            </a:pPr>
+            <a:endParaRPr lang="en-US" dirty="0" smtClean="0"/>
+          </a:p>
+        </p:txBody>
+      </p:sp>
+    </p:spTree>
+    <p:extLst>
+      <p:ext uri="{BB962C8B-B14F-4D97-AF65-F5344CB8AC3E}">
+        <p14:creationId xmlns:p14="http://schemas.microsoft.com/office/powerpoint/2010/main" val="2164111911"/>
+      </p:ext>
+    </p:extLst>
+  </p:cSld>
+  <p:clrMapOvr>
+    <a:masterClrMapping/>
+  </p:clrMapOvr>
+</p:sld>
+</file>
+
+<file path=ppt/slides/slide121.xml><?xml version="1.0" encoding="utf-8"?>
+<p:sld xmlns:a="http://schemas.openxmlformats.org/drawingml/2006/main" xmlns:r="http://schemas.openxmlformats.org/officeDocument/2006/relationships" xmlns:p="http://schemas.openxmlformats.org/presentationml/2006/main">
+  <p:cSld>
+    <p:spTree>
+      <p:nvGrpSpPr>
+        <p:cNvPr id="1" name=""/>
+        <p:cNvGrpSpPr/>
+        <p:nvPr/>
+      </p:nvGrpSpPr>
+      <p:grpSpPr>
+        <a:xfrm>
+          <a:off x="0" y="0"/>
+          <a:ext cx="0" cy="0"/>
+          <a:chOff x="0" y="0"/>
+          <a:chExt cx="0" cy="0"/>
+        </a:xfrm>
+      </p:grpSpPr>
+      <p:sp>
+        <p:nvSpPr>
+          <p:cNvPr id="2" name="Title 1"/>
+          <p:cNvSpPr>
+            <a:spLocks noGrp="1"/>
+          </p:cNvSpPr>
+          <p:nvPr>
+            <p:ph type="title"/>
+          </p:nvPr>
+        </p:nvSpPr>
+        <p:spPr/>
+        <p:txBody>
+          <a:bodyPr/>
+          <a:lstStyle/>
+          <a:p>
+            <a:r>
+              <a:rPr lang="en-US" dirty="0" smtClean="0"/>
+              <a:t>Choosing One Of Many Paths</a:t>
+            </a:r>
+            <a:endParaRPr lang="en-US" dirty="0"/>
+          </a:p>
+        </p:txBody>
+      </p:sp>
+      <p:sp>
+        <p:nvSpPr>
+          <p:cNvPr id="5" name="Rectangle 4"/>
+          <p:cNvSpPr/>
+          <p:nvPr/>
+        </p:nvSpPr>
+        <p:spPr>
+          <a:xfrm>
+            <a:off x="3790462" y="2389556"/>
+            <a:ext cx="1563077" cy="227949"/>
+          </a:xfrm>
+          <a:prstGeom prst="rect">
+            <a:avLst/>
+          </a:prstGeom>
+        </p:spPr>
+        <p:style>
+          <a:lnRef idx="1">
+            <a:schemeClr val="dk1"/>
+          </a:lnRef>
+          <a:fillRef idx="2">
+            <a:schemeClr val="dk1"/>
+          </a:fillRef>
+          <a:effectRef idx="1">
+            <a:schemeClr val="dk1"/>
+          </a:effectRef>
+          <a:fontRef idx="minor">
+            <a:schemeClr val="dk1"/>
+          </a:fontRef>
+        </p:style>
+        <p:txBody>
+          <a:bodyPr rtlCol="0" anchor="ctr"/>
+          <a:lstStyle/>
+          <a:p>
+            <a:pPr algn="ctr"/>
+            <a:r>
+              <a:rPr lang="en-US" sz="1600" dirty="0" smtClean="0"/>
+              <a:t>Statement 1</a:t>
+            </a:r>
+            <a:endParaRPr lang="en-US" sz="1600" dirty="0"/>
+          </a:p>
+        </p:txBody>
+      </p:sp>
+      <p:sp>
+        <p:nvSpPr>
+          <p:cNvPr id="6" name="Rectangle 5"/>
+          <p:cNvSpPr/>
+          <p:nvPr/>
+        </p:nvSpPr>
+        <p:spPr>
+          <a:xfrm>
+            <a:off x="1804054" y="3348249"/>
+            <a:ext cx="1563077" cy="227949"/>
+          </a:xfrm>
+          <a:prstGeom prst="rect">
+            <a:avLst/>
+          </a:prstGeom>
+        </p:spPr>
+        <p:style>
+          <a:lnRef idx="1">
+            <a:schemeClr val="accent2"/>
+          </a:lnRef>
+          <a:fillRef idx="2">
+            <a:schemeClr val="accent2"/>
+          </a:fillRef>
+          <a:effectRef idx="1">
+            <a:schemeClr val="accent2"/>
+          </a:effectRef>
+          <a:fontRef idx="minor">
+            <a:schemeClr val="dk1"/>
+          </a:fontRef>
+        </p:style>
+        <p:txBody>
+          <a:bodyPr rtlCol="0" anchor="ctr"/>
+          <a:lstStyle/>
+          <a:p>
+            <a:pPr algn="ctr"/>
+            <a:r>
+              <a:rPr lang="en-US" sz="1600" dirty="0" smtClean="0"/>
+              <a:t>Statement A</a:t>
+            </a:r>
+            <a:endParaRPr lang="en-US" sz="1600" dirty="0"/>
+          </a:p>
+        </p:txBody>
+      </p:sp>
+      <p:sp>
+        <p:nvSpPr>
+          <p:cNvPr id="7" name="Rectangle 6"/>
+          <p:cNvSpPr/>
+          <p:nvPr/>
+        </p:nvSpPr>
+        <p:spPr>
+          <a:xfrm>
+            <a:off x="3790462" y="3344337"/>
+            <a:ext cx="1563077" cy="227949"/>
+          </a:xfrm>
+          <a:prstGeom prst="rect">
+            <a:avLst/>
+          </a:prstGeom>
+        </p:spPr>
+        <p:style>
+          <a:lnRef idx="1">
+            <a:schemeClr val="accent2"/>
+          </a:lnRef>
+          <a:fillRef idx="2">
+            <a:schemeClr val="accent2"/>
+          </a:fillRef>
+          <a:effectRef idx="1">
+            <a:schemeClr val="accent2"/>
+          </a:effectRef>
+          <a:fontRef idx="minor">
+            <a:schemeClr val="dk1"/>
+          </a:fontRef>
+        </p:style>
+        <p:txBody>
+          <a:bodyPr rtlCol="0" anchor="ctr"/>
+          <a:lstStyle/>
+          <a:p>
+            <a:pPr algn="ctr"/>
+            <a:r>
+              <a:rPr lang="en-US" sz="1600" dirty="0" smtClean="0"/>
+              <a:t>Statement </a:t>
+            </a:r>
+            <a:r>
+              <a:rPr lang="is-IS" sz="1600" dirty="0" smtClean="0"/>
+              <a:t>…</a:t>
+            </a:r>
+            <a:endParaRPr lang="en-US" sz="1600" dirty="0"/>
+          </a:p>
+        </p:txBody>
+      </p:sp>
+      <p:sp>
+        <p:nvSpPr>
+          <p:cNvPr id="8" name="Rectangle 7"/>
+          <p:cNvSpPr/>
+          <p:nvPr/>
+        </p:nvSpPr>
+        <p:spPr>
+          <a:xfrm>
+            <a:off x="3790462" y="3849078"/>
+            <a:ext cx="1563077" cy="227949"/>
+          </a:xfrm>
+          <a:prstGeom prst="rect">
+            <a:avLst/>
+          </a:prstGeom>
+        </p:spPr>
+        <p:style>
+          <a:lnRef idx="1">
+            <a:schemeClr val="dk1"/>
+          </a:lnRef>
+          <a:fillRef idx="2">
+            <a:schemeClr val="dk1"/>
+          </a:fillRef>
+          <a:effectRef idx="1">
+            <a:schemeClr val="dk1"/>
+          </a:effectRef>
+          <a:fontRef idx="minor">
+            <a:schemeClr val="dk1"/>
+          </a:fontRef>
+        </p:style>
+        <p:txBody>
+          <a:bodyPr rtlCol="0" anchor="ctr"/>
+          <a:lstStyle/>
+          <a:p>
+            <a:pPr algn="ctr"/>
+            <a:r>
+              <a:rPr lang="en-US" sz="1600" dirty="0" smtClean="0"/>
+              <a:t>Statement </a:t>
+            </a:r>
+            <a:r>
+              <a:rPr lang="is-IS" sz="1600" dirty="0" smtClean="0"/>
+              <a:t>…</a:t>
+            </a:r>
+            <a:endParaRPr lang="en-US" sz="1600" dirty="0"/>
+          </a:p>
+        </p:txBody>
+      </p:sp>
+      <p:sp>
+        <p:nvSpPr>
+          <p:cNvPr id="9" name="Rectangle 8"/>
+          <p:cNvSpPr/>
+          <p:nvPr/>
+        </p:nvSpPr>
+        <p:spPr>
+          <a:xfrm>
+            <a:off x="3790462" y="4320606"/>
+            <a:ext cx="1563077" cy="227949"/>
+          </a:xfrm>
+          <a:prstGeom prst="rect">
+            <a:avLst/>
+          </a:prstGeom>
+        </p:spPr>
+        <p:style>
+          <a:lnRef idx="1">
+            <a:schemeClr val="dk1"/>
+          </a:lnRef>
+          <a:fillRef idx="2">
+            <a:schemeClr val="dk1"/>
+          </a:fillRef>
+          <a:effectRef idx="1">
+            <a:schemeClr val="dk1"/>
+          </a:effectRef>
+          <a:fontRef idx="minor">
+            <a:schemeClr val="dk1"/>
+          </a:fontRef>
+        </p:style>
+        <p:txBody>
+          <a:bodyPr rtlCol="0" anchor="ctr"/>
+          <a:lstStyle/>
+          <a:p>
+            <a:pPr algn="ctr"/>
+            <a:r>
+              <a:rPr lang="en-US" sz="1600" dirty="0" smtClean="0"/>
+              <a:t>Statement N</a:t>
+            </a:r>
+            <a:endParaRPr lang="en-US" sz="1600" dirty="0"/>
+          </a:p>
+        </p:txBody>
+      </p:sp>
+      <p:sp>
+        <p:nvSpPr>
+          <p:cNvPr id="10" name="Rectangle 9"/>
+          <p:cNvSpPr/>
+          <p:nvPr/>
+        </p:nvSpPr>
+        <p:spPr>
+          <a:xfrm>
+            <a:off x="3790462" y="4792134"/>
+            <a:ext cx="1563077" cy="227949"/>
+          </a:xfrm>
+          <a:prstGeom prst="rect">
+            <a:avLst/>
+          </a:prstGeom>
+        </p:spPr>
+        <p:style>
+          <a:lnRef idx="3">
+            <a:schemeClr val="lt1"/>
+          </a:lnRef>
+          <a:fillRef idx="1">
+            <a:schemeClr val="accent1"/>
+          </a:fillRef>
+          <a:effectRef idx="1">
+            <a:schemeClr val="accent1"/>
+          </a:effectRef>
+          <a:fontRef idx="minor">
+            <a:schemeClr val="lt1"/>
+          </a:fontRef>
+        </p:style>
+        <p:txBody>
+          <a:bodyPr rtlCol="0" anchor="ctr"/>
+          <a:lstStyle/>
+          <a:p>
+            <a:pPr algn="ctr"/>
+            <a:r>
+              <a:rPr lang="en-US" sz="1600" dirty="0" smtClean="0"/>
+              <a:t>End</a:t>
+            </a:r>
+            <a:endParaRPr lang="en-US" sz="1600" dirty="0"/>
+          </a:p>
+        </p:txBody>
+      </p:sp>
+      <p:sp>
+        <p:nvSpPr>
+          <p:cNvPr id="11" name="Rectangle 10"/>
+          <p:cNvSpPr/>
+          <p:nvPr/>
+        </p:nvSpPr>
+        <p:spPr>
+          <a:xfrm>
+            <a:off x="3790462" y="1983152"/>
+            <a:ext cx="1563077" cy="227949"/>
+          </a:xfrm>
+          <a:prstGeom prst="rect">
+            <a:avLst/>
+          </a:prstGeom>
+        </p:spPr>
+        <p:style>
+          <a:lnRef idx="3">
+            <a:schemeClr val="lt1"/>
+          </a:lnRef>
+          <a:fillRef idx="1">
+            <a:schemeClr val="accent1"/>
+          </a:fillRef>
+          <a:effectRef idx="1">
+            <a:schemeClr val="accent1"/>
+          </a:effectRef>
+          <a:fontRef idx="minor">
+            <a:schemeClr val="lt1"/>
+          </a:fontRef>
+        </p:style>
+        <p:txBody>
+          <a:bodyPr rtlCol="0" anchor="ctr"/>
+          <a:lstStyle/>
+          <a:p>
+            <a:pPr algn="ctr"/>
+            <a:r>
+              <a:rPr lang="en-US" sz="1600" dirty="0" smtClean="0"/>
+              <a:t>Start</a:t>
+            </a:r>
+            <a:endParaRPr lang="en-US" sz="1600" dirty="0"/>
+          </a:p>
+        </p:txBody>
+      </p:sp>
+      <p:cxnSp>
+        <p:nvCxnSpPr>
+          <p:cNvPr id="4" name="Straight Arrow Connector 3"/>
+          <p:cNvCxnSpPr>
+            <a:stCxn id="16" idx="1"/>
+            <a:endCxn id="6" idx="0"/>
+          </p:cNvCxnSpPr>
+          <p:nvPr/>
+        </p:nvCxnSpPr>
+        <p:spPr>
+          <a:xfrm flipH="1">
+            <a:off x="2585593" y="2953893"/>
+            <a:ext cx="1823587" cy="394356"/>
+          </a:xfrm>
+          <a:prstGeom prst="straightConnector1">
+            <a:avLst/>
+          </a:prstGeom>
+          <a:ln>
+            <a:solidFill>
+              <a:schemeClr val="accent3">
+                <a:lumMod val="75000"/>
+              </a:schemeClr>
+            </a:solidFill>
+            <a:tailEnd type="arrow"/>
+          </a:ln>
+        </p:spPr>
+        <p:style>
+          <a:lnRef idx="2">
+            <a:schemeClr val="accent1"/>
+          </a:lnRef>
+          <a:fillRef idx="0">
+            <a:schemeClr val="accent1"/>
+          </a:fillRef>
+          <a:effectRef idx="1">
+            <a:schemeClr val="accent1"/>
+          </a:effectRef>
+          <a:fontRef idx="minor">
+            <a:schemeClr val="tx1"/>
+          </a:fontRef>
+        </p:style>
+      </p:cxnSp>
+      <p:cxnSp>
+        <p:nvCxnSpPr>
+          <p:cNvPr id="13" name="Straight Arrow Connector 12"/>
+          <p:cNvCxnSpPr>
+            <a:stCxn id="16" idx="2"/>
+            <a:endCxn id="7" idx="0"/>
+          </p:cNvCxnSpPr>
+          <p:nvPr/>
+        </p:nvCxnSpPr>
+        <p:spPr>
+          <a:xfrm>
+            <a:off x="4572001" y="3048653"/>
+            <a:ext cx="0" cy="295684"/>
+          </a:xfrm>
+          <a:prstGeom prst="straightConnector1">
+            <a:avLst/>
+          </a:prstGeom>
+          <a:ln>
+            <a:solidFill>
+              <a:schemeClr val="accent2">
+                <a:lumMod val="75000"/>
+              </a:schemeClr>
+            </a:solidFill>
+            <a:tailEnd type="arrow"/>
+          </a:ln>
+        </p:spPr>
+        <p:style>
+          <a:lnRef idx="2">
+            <a:schemeClr val="accent1"/>
+          </a:lnRef>
+          <a:fillRef idx="0">
+            <a:schemeClr val="accent1"/>
+          </a:fillRef>
+          <a:effectRef idx="1">
+            <a:schemeClr val="accent1"/>
+          </a:effectRef>
+          <a:fontRef idx="minor">
+            <a:schemeClr val="tx1"/>
+          </a:fontRef>
+        </p:style>
+      </p:cxnSp>
+      <p:sp>
+        <p:nvSpPr>
+          <p:cNvPr id="16" name="Decision 15"/>
+          <p:cNvSpPr/>
+          <p:nvPr/>
+        </p:nvSpPr>
+        <p:spPr>
+          <a:xfrm>
+            <a:off x="4409180" y="2859132"/>
+            <a:ext cx="325641" cy="189521"/>
+          </a:xfrm>
+          <a:prstGeom prst="flowChartDecision">
+            <a:avLst/>
+          </a:prstGeom>
+        </p:spPr>
+        <p:style>
+          <a:lnRef idx="1">
+            <a:schemeClr val="accent1"/>
+          </a:lnRef>
+          <a:fillRef idx="3">
+            <a:schemeClr val="accent1"/>
+          </a:fillRef>
+          <a:effectRef idx="2">
+            <a:schemeClr val="accent1"/>
+          </a:effectRef>
+          <a:fontRef idx="minor">
+            <a:schemeClr val="lt1"/>
+          </a:fontRef>
+        </p:style>
+        <p:txBody>
+          <a:bodyPr rtlCol="0" anchor="ctr"/>
+          <a:lstStyle/>
+          <a:p>
+            <a:pPr algn="ctr"/>
+            <a:endParaRPr lang="en-US"/>
+          </a:p>
+        </p:txBody>
+      </p:sp>
+      <p:cxnSp>
+        <p:nvCxnSpPr>
+          <p:cNvPr id="26" name="Straight Arrow Connector 25"/>
+          <p:cNvCxnSpPr>
+            <a:stCxn id="5" idx="2"/>
+            <a:endCxn id="16" idx="0"/>
+          </p:cNvCxnSpPr>
+          <p:nvPr/>
+        </p:nvCxnSpPr>
+        <p:spPr>
+          <a:xfrm>
+            <a:off x="4572001" y="2617505"/>
+            <a:ext cx="0" cy="241627"/>
+          </a:xfrm>
+          <a:prstGeom prst="straightConnector1">
+            <a:avLst/>
+          </a:prstGeom>
+          <a:ln>
+            <a:tailEnd type="arrow"/>
+          </a:ln>
+        </p:spPr>
+        <p:style>
+          <a:lnRef idx="2">
+            <a:schemeClr val="accent1"/>
+          </a:lnRef>
+          <a:fillRef idx="0">
+            <a:schemeClr val="accent1"/>
+          </a:fillRef>
+          <a:effectRef idx="1">
+            <a:schemeClr val="accent1"/>
+          </a:effectRef>
+          <a:fontRef idx="minor">
+            <a:schemeClr val="tx1"/>
+          </a:fontRef>
+        </p:style>
+      </p:cxnSp>
+      <p:cxnSp>
+        <p:nvCxnSpPr>
+          <p:cNvPr id="33" name="Elbow Connector 32"/>
+          <p:cNvCxnSpPr>
+            <a:stCxn id="6" idx="2"/>
+            <a:endCxn id="8" idx="1"/>
+          </p:cNvCxnSpPr>
+          <p:nvPr/>
+        </p:nvCxnSpPr>
+        <p:spPr>
+          <a:xfrm rot="16200000" flipH="1">
+            <a:off x="2994600" y="3167190"/>
+            <a:ext cx="386855" cy="1204869"/>
+          </a:xfrm>
+          <a:prstGeom prst="bentConnector2">
+            <a:avLst/>
+          </a:prstGeom>
+          <a:ln>
+            <a:solidFill>
+              <a:schemeClr val="accent3">
+                <a:lumMod val="75000"/>
+              </a:schemeClr>
+            </a:solidFill>
+            <a:tailEnd type="arrow"/>
+          </a:ln>
+        </p:spPr>
+        <p:style>
+          <a:lnRef idx="2">
+            <a:schemeClr val="accent1"/>
+          </a:lnRef>
+          <a:fillRef idx="0">
+            <a:schemeClr val="accent1"/>
+          </a:fillRef>
+          <a:effectRef idx="1">
+            <a:schemeClr val="accent1"/>
+          </a:effectRef>
+          <a:fontRef idx="minor">
+            <a:schemeClr val="tx1"/>
+          </a:fontRef>
+        </p:style>
+      </p:cxnSp>
+      <p:cxnSp>
+        <p:nvCxnSpPr>
+          <p:cNvPr id="35" name="Elbow Connector 34"/>
+          <p:cNvCxnSpPr>
+            <a:stCxn id="7" idx="2"/>
+            <a:endCxn id="8" idx="0"/>
+          </p:cNvCxnSpPr>
+          <p:nvPr/>
+        </p:nvCxnSpPr>
+        <p:spPr>
+          <a:xfrm rot="5400000">
+            <a:off x="4433605" y="3710682"/>
+            <a:ext cx="276792" cy="12700"/>
+          </a:xfrm>
+          <a:prstGeom prst="bentConnector3">
+            <a:avLst>
+              <a:gd name="adj1" fmla="val 50000"/>
+            </a:avLst>
+          </a:prstGeom>
+          <a:ln>
+            <a:solidFill>
+              <a:schemeClr val="accent2">
+                <a:lumMod val="75000"/>
+              </a:schemeClr>
+            </a:solidFill>
+            <a:tailEnd type="arrow"/>
+          </a:ln>
+        </p:spPr>
+        <p:style>
+          <a:lnRef idx="2">
+            <a:schemeClr val="accent1"/>
+          </a:lnRef>
+          <a:fillRef idx="0">
+            <a:schemeClr val="accent1"/>
+          </a:fillRef>
+          <a:effectRef idx="1">
+            <a:schemeClr val="accent1"/>
+          </a:effectRef>
+          <a:fontRef idx="minor">
+            <a:schemeClr val="tx1"/>
+          </a:fontRef>
+        </p:style>
+      </p:cxnSp>
+      <p:cxnSp>
+        <p:nvCxnSpPr>
+          <p:cNvPr id="42" name="Straight Arrow Connector 41"/>
+          <p:cNvCxnSpPr>
+            <a:stCxn id="11" idx="2"/>
+            <a:endCxn id="5" idx="0"/>
+          </p:cNvCxnSpPr>
+          <p:nvPr/>
+        </p:nvCxnSpPr>
+        <p:spPr>
+          <a:xfrm>
+            <a:off x="4572001" y="2211101"/>
+            <a:ext cx="0" cy="178455"/>
+          </a:xfrm>
+          <a:prstGeom prst="straightConnector1">
+            <a:avLst/>
+          </a:prstGeom>
+          <a:ln>
+            <a:tailEnd type="arrow"/>
+          </a:ln>
+        </p:spPr>
+        <p:style>
+          <a:lnRef idx="2">
+            <a:schemeClr val="accent1"/>
+          </a:lnRef>
+          <a:fillRef idx="0">
+            <a:schemeClr val="accent1"/>
+          </a:fillRef>
+          <a:effectRef idx="1">
+            <a:schemeClr val="accent1"/>
+          </a:effectRef>
+          <a:fontRef idx="minor">
+            <a:schemeClr val="tx1"/>
+          </a:fontRef>
+        </p:style>
+      </p:cxnSp>
+      <p:cxnSp>
+        <p:nvCxnSpPr>
+          <p:cNvPr id="43" name="Straight Arrow Connector 42"/>
+          <p:cNvCxnSpPr>
+            <a:stCxn id="8" idx="2"/>
+            <a:endCxn id="9" idx="0"/>
+          </p:cNvCxnSpPr>
+          <p:nvPr/>
+        </p:nvCxnSpPr>
+        <p:spPr>
+          <a:xfrm>
+            <a:off x="4572001" y="4077027"/>
+            <a:ext cx="0" cy="243579"/>
+          </a:xfrm>
+          <a:prstGeom prst="straightConnector1">
+            <a:avLst/>
+          </a:prstGeom>
+          <a:ln>
+            <a:tailEnd type="arrow"/>
+          </a:ln>
+        </p:spPr>
+        <p:style>
+          <a:lnRef idx="2">
+            <a:schemeClr val="accent1"/>
+          </a:lnRef>
+          <a:fillRef idx="0">
+            <a:schemeClr val="accent1"/>
+          </a:fillRef>
+          <a:effectRef idx="1">
+            <a:schemeClr val="accent1"/>
+          </a:effectRef>
+          <a:fontRef idx="minor">
+            <a:schemeClr val="tx1"/>
+          </a:fontRef>
+        </p:style>
+      </p:cxnSp>
+      <p:cxnSp>
+        <p:nvCxnSpPr>
+          <p:cNvPr id="46" name="Straight Arrow Connector 45"/>
+          <p:cNvCxnSpPr>
+            <a:stCxn id="9" idx="2"/>
+            <a:endCxn id="10" idx="0"/>
+          </p:cNvCxnSpPr>
+          <p:nvPr/>
+        </p:nvCxnSpPr>
+        <p:spPr>
+          <a:xfrm>
+            <a:off x="4572001" y="4548555"/>
+            <a:ext cx="0" cy="243579"/>
+          </a:xfrm>
+          <a:prstGeom prst="straightConnector1">
+            <a:avLst/>
+          </a:prstGeom>
+          <a:ln>
+            <a:tailEnd type="arrow"/>
+          </a:ln>
+        </p:spPr>
+        <p:style>
+          <a:lnRef idx="2">
+            <a:schemeClr val="accent1"/>
+          </a:lnRef>
+          <a:fillRef idx="0">
+            <a:schemeClr val="accent1"/>
+          </a:fillRef>
+          <a:effectRef idx="1">
+            <a:schemeClr val="accent1"/>
+          </a:effectRef>
+          <a:fontRef idx="minor">
+            <a:schemeClr val="tx1"/>
+          </a:fontRef>
+        </p:style>
+      </p:cxnSp>
+      <p:sp>
+        <p:nvSpPr>
+          <p:cNvPr id="21" name="Rectangle 20"/>
+          <p:cNvSpPr/>
+          <p:nvPr/>
+        </p:nvSpPr>
+        <p:spPr>
+          <a:xfrm>
+            <a:off x="5805528" y="3344336"/>
+            <a:ext cx="1563077" cy="227949"/>
+          </a:xfrm>
+          <a:prstGeom prst="rect">
+            <a:avLst/>
+          </a:prstGeom>
+        </p:spPr>
+        <p:style>
+          <a:lnRef idx="1">
+            <a:schemeClr val="accent2"/>
+          </a:lnRef>
+          <a:fillRef idx="2">
+            <a:schemeClr val="accent2"/>
+          </a:fillRef>
+          <a:effectRef idx="1">
+            <a:schemeClr val="accent2"/>
+          </a:effectRef>
+          <a:fontRef idx="minor">
+            <a:schemeClr val="dk1"/>
+          </a:fontRef>
+        </p:style>
+        <p:txBody>
+          <a:bodyPr rtlCol="0" anchor="ctr"/>
+          <a:lstStyle/>
+          <a:p>
+            <a:pPr algn="ctr"/>
+            <a:r>
+              <a:rPr lang="en-US" sz="1600" dirty="0" smtClean="0"/>
+              <a:t>Statement Z</a:t>
+            </a:r>
+            <a:endParaRPr lang="en-US" sz="1600" dirty="0"/>
+          </a:p>
+        </p:txBody>
+      </p:sp>
+      <p:cxnSp>
+        <p:nvCxnSpPr>
+          <p:cNvPr id="27" name="Straight Arrow Connector 26"/>
+          <p:cNvCxnSpPr>
+            <a:stCxn id="16" idx="3"/>
+            <a:endCxn id="21" idx="0"/>
+          </p:cNvCxnSpPr>
+          <p:nvPr/>
+        </p:nvCxnSpPr>
+        <p:spPr>
+          <a:xfrm>
+            <a:off x="4734821" y="2953893"/>
+            <a:ext cx="1852246" cy="390443"/>
+          </a:xfrm>
+          <a:prstGeom prst="straightConnector1">
+            <a:avLst/>
+          </a:prstGeom>
+          <a:ln>
+            <a:solidFill>
+              <a:schemeClr val="accent4">
+                <a:lumMod val="75000"/>
+              </a:schemeClr>
+            </a:solidFill>
+            <a:tailEnd type="arrow"/>
+          </a:ln>
+        </p:spPr>
+        <p:style>
+          <a:lnRef idx="2">
+            <a:schemeClr val="accent1"/>
+          </a:lnRef>
+          <a:fillRef idx="0">
+            <a:schemeClr val="accent1"/>
+          </a:fillRef>
+          <a:effectRef idx="1">
+            <a:schemeClr val="accent1"/>
+          </a:effectRef>
+          <a:fontRef idx="minor">
+            <a:schemeClr val="tx1"/>
+          </a:fontRef>
+        </p:style>
+      </p:cxnSp>
+      <p:cxnSp>
+        <p:nvCxnSpPr>
+          <p:cNvPr id="30" name="Elbow Connector 29"/>
+          <p:cNvCxnSpPr>
+            <a:stCxn id="21" idx="2"/>
+            <a:endCxn id="8" idx="3"/>
+          </p:cNvCxnSpPr>
+          <p:nvPr/>
+        </p:nvCxnSpPr>
+        <p:spPr>
+          <a:xfrm rot="5400000">
+            <a:off x="5774919" y="3150905"/>
+            <a:ext cx="390768" cy="1233528"/>
+          </a:xfrm>
+          <a:prstGeom prst="bentConnector2">
+            <a:avLst/>
+          </a:prstGeom>
+          <a:ln>
+            <a:solidFill>
+              <a:srgbClr val="604A7B"/>
+            </a:solidFill>
+            <a:tailEnd type="arrow"/>
+          </a:ln>
+        </p:spPr>
+        <p:style>
+          <a:lnRef idx="2">
+            <a:schemeClr val="accent1"/>
+          </a:lnRef>
+          <a:fillRef idx="0">
+            <a:schemeClr val="accent1"/>
+          </a:fillRef>
+          <a:effectRef idx="1">
+            <a:schemeClr val="accent1"/>
+          </a:effectRef>
+          <a:fontRef idx="minor">
+            <a:schemeClr val="tx1"/>
+          </a:fontRef>
+        </p:style>
+      </p:cxnSp>
+    </p:spTree>
+    <p:extLst>
+      <p:ext uri="{BB962C8B-B14F-4D97-AF65-F5344CB8AC3E}">
+        <p14:creationId xmlns:p14="http://schemas.microsoft.com/office/powerpoint/2010/main" val="1419983021"/>
+      </p:ext>
+    </p:extLst>
+  </p:cSld>
+  <p:clrMapOvr>
+    <a:masterClrMapping/>
+  </p:clrMapOvr>
+</p:sld>
+</file>
+
+<file path=ppt/slides/slide122.xml><?xml version="1.0" encoding="utf-8"?>
+<p:sld xmlns:a="http://schemas.openxmlformats.org/drawingml/2006/main" xmlns:r="http://schemas.openxmlformats.org/officeDocument/2006/relationships" xmlns:p="http://schemas.openxmlformats.org/presentationml/2006/main">
+  <p:cSld>
+    <p:spTree>
+      <p:nvGrpSpPr>
+        <p:cNvPr id="1" name=""/>
+        <p:cNvGrpSpPr/>
+        <p:nvPr/>
+      </p:nvGrpSpPr>
+      <p:grpSpPr>
+        <a:xfrm>
+          <a:off x="0" y="0"/>
+          <a:ext cx="0" cy="0"/>
+          <a:chOff x="0" y="0"/>
+          <a:chExt cx="0" cy="0"/>
+        </a:xfrm>
+      </p:grpSpPr>
+      <p:sp>
+        <p:nvSpPr>
+          <p:cNvPr id="2" name="Title 1"/>
+          <p:cNvSpPr>
+            <a:spLocks noGrp="1"/>
+          </p:cNvSpPr>
+          <p:nvPr>
+            <p:ph type="title"/>
+          </p:nvPr>
+        </p:nvSpPr>
+        <p:spPr/>
+        <p:txBody>
+          <a:bodyPr/>
+          <a:lstStyle/>
+          <a:p>
+            <a:r>
+              <a:rPr lang="en-US" dirty="0"/>
+              <a:t>The </a:t>
+            </a:r>
+            <a:r>
+              <a:rPr lang="en-US" dirty="0" smtClean="0"/>
+              <a:t>‘switch’ </a:t>
+            </a:r>
+            <a:r>
+              <a:rPr lang="en-US" dirty="0"/>
+              <a:t>Statement</a:t>
+            </a:r>
+          </a:p>
+        </p:txBody>
+      </p:sp>
+      <p:sp>
+        <p:nvSpPr>
+          <p:cNvPr id="3" name="Content Placeholder 2"/>
+          <p:cNvSpPr>
+            <a:spLocks noGrp="1"/>
+          </p:cNvSpPr>
+          <p:nvPr>
+            <p:ph idx="1"/>
+          </p:nvPr>
+        </p:nvSpPr>
+        <p:spPr/>
+        <p:txBody>
+          <a:bodyPr>
+            <a:normAutofit fontScale="70000" lnSpcReduction="20000"/>
+          </a:bodyPr>
+          <a:lstStyle/>
+          <a:p>
+            <a:r>
+              <a:rPr lang="en-US" dirty="0" smtClean="0"/>
+              <a:t>Formal syntax:</a:t>
+            </a:r>
+          </a:p>
+          <a:p>
+            <a:pPr marL="0" indent="0">
+              <a:buNone/>
+            </a:pPr>
+            <a:r>
+              <a:rPr lang="en-US" dirty="0"/>
+              <a:t>	</a:t>
+            </a:r>
+            <a:r>
+              <a:rPr lang="en-US" i="1" dirty="0" smtClean="0">
+                <a:solidFill>
+                  <a:srgbClr val="0000FF"/>
+                </a:solidFill>
+              </a:rPr>
+              <a:t>switch</a:t>
+            </a:r>
+            <a:r>
+              <a:rPr lang="en-US" dirty="0" smtClean="0">
+                <a:solidFill>
+                  <a:srgbClr val="000000"/>
+                </a:solidFill>
+              </a:rPr>
+              <a:t>(</a:t>
+            </a:r>
+            <a:r>
+              <a:rPr lang="en-US" i="1" dirty="0" err="1" smtClean="0">
+                <a:solidFill>
+                  <a:srgbClr val="C0504D"/>
+                </a:solidFill>
+              </a:rPr>
+              <a:t>expressionA</a:t>
+            </a:r>
+            <a:r>
+              <a:rPr lang="en-US" i="1" dirty="0" smtClean="0">
+                <a:solidFill>
+                  <a:srgbClr val="000000"/>
+                </a:solidFill>
+              </a:rPr>
+              <a:t>)</a:t>
+            </a:r>
+            <a:r>
+              <a:rPr lang="en-US" dirty="0" smtClean="0">
+                <a:solidFill>
+                  <a:srgbClr val="C0504D"/>
+                </a:solidFill>
+              </a:rPr>
+              <a:t> </a:t>
+            </a:r>
+            <a:r>
+              <a:rPr lang="en-US" dirty="0" smtClean="0">
+                <a:solidFill>
+                  <a:srgbClr val="000000"/>
+                </a:solidFill>
+              </a:rPr>
+              <a:t>{</a:t>
+            </a:r>
+          </a:p>
+          <a:p>
+            <a:pPr marL="0" indent="0">
+              <a:buNone/>
+            </a:pPr>
+            <a:r>
+              <a:rPr lang="en-US" dirty="0">
+                <a:solidFill>
+                  <a:srgbClr val="C0504D"/>
+                </a:solidFill>
+              </a:rPr>
+              <a:t>	</a:t>
+            </a:r>
+            <a:r>
+              <a:rPr lang="en-US" dirty="0" smtClean="0">
+                <a:solidFill>
+                  <a:srgbClr val="C0504D"/>
+                </a:solidFill>
+              </a:rPr>
+              <a:t>	</a:t>
+            </a:r>
+            <a:r>
+              <a:rPr lang="en-US" i="1" dirty="0">
+                <a:solidFill>
+                  <a:srgbClr val="0000FF"/>
+                </a:solidFill>
+              </a:rPr>
+              <a:t>case </a:t>
+            </a:r>
+            <a:r>
+              <a:rPr lang="en-US" i="1" dirty="0" smtClean="0">
+                <a:solidFill>
+                  <a:srgbClr val="C0504D"/>
+                </a:solidFill>
+              </a:rPr>
+              <a:t>expression1</a:t>
+            </a:r>
+            <a:r>
+              <a:rPr lang="en-US" i="1" dirty="0" smtClean="0">
+                <a:solidFill>
+                  <a:srgbClr val="000000"/>
+                </a:solidFill>
+              </a:rPr>
+              <a:t>:</a:t>
+            </a:r>
+            <a:r>
+              <a:rPr lang="en-US" dirty="0" smtClean="0">
+                <a:solidFill>
+                  <a:srgbClr val="C0504D"/>
+                </a:solidFill>
+              </a:rPr>
+              <a:t> </a:t>
+            </a:r>
+            <a:endParaRPr lang="en-US" dirty="0" smtClean="0">
+              <a:solidFill>
+                <a:srgbClr val="C0504D"/>
+              </a:solidFill>
+            </a:endParaRPr>
+          </a:p>
+          <a:p>
+            <a:pPr marL="0" indent="0">
+              <a:buNone/>
+            </a:pPr>
+            <a:r>
+              <a:rPr lang="en-US" dirty="0">
+                <a:solidFill>
+                  <a:srgbClr val="C0504D"/>
+                </a:solidFill>
+              </a:rPr>
+              <a:t>	</a:t>
+            </a:r>
+            <a:r>
+              <a:rPr lang="en-US" dirty="0" smtClean="0">
+                <a:solidFill>
+                  <a:srgbClr val="C0504D"/>
+                </a:solidFill>
+              </a:rPr>
+              <a:t>		</a:t>
+            </a:r>
+            <a:r>
+              <a:rPr lang="en-US" dirty="0" smtClean="0">
+                <a:solidFill>
+                  <a:srgbClr val="008000"/>
+                </a:solidFill>
+              </a:rPr>
+              <a:t>Statement(s)</a:t>
+            </a:r>
+          </a:p>
+          <a:p>
+            <a:pPr marL="0" indent="0">
+              <a:buNone/>
+            </a:pPr>
+            <a:r>
+              <a:rPr lang="en-US" dirty="0">
+                <a:solidFill>
+                  <a:srgbClr val="008000"/>
+                </a:solidFill>
+              </a:rPr>
+              <a:t>		</a:t>
+            </a:r>
+            <a:r>
+              <a:rPr lang="en-US" dirty="0" smtClean="0">
+                <a:solidFill>
+                  <a:srgbClr val="008000"/>
+                </a:solidFill>
+              </a:rPr>
+              <a:t>	</a:t>
+            </a:r>
+            <a:r>
+              <a:rPr lang="en-US" dirty="0" smtClean="0">
+                <a:solidFill>
+                  <a:srgbClr val="FF0000"/>
+                </a:solidFill>
+              </a:rPr>
+              <a:t>break</a:t>
+            </a:r>
+            <a:endParaRPr lang="en-US" dirty="0">
+              <a:solidFill>
+                <a:srgbClr val="FF0000"/>
+              </a:solidFill>
+            </a:endParaRPr>
+          </a:p>
+          <a:p>
+            <a:pPr marL="0" indent="0">
+              <a:buNone/>
+            </a:pPr>
+            <a:r>
+              <a:rPr lang="en-US" dirty="0"/>
+              <a:t>	</a:t>
+            </a:r>
+            <a:r>
+              <a:rPr lang="en-US" dirty="0" smtClean="0"/>
+              <a:t>	</a:t>
+            </a:r>
+            <a:r>
+              <a:rPr lang="en-US" i="1" dirty="0" smtClean="0">
+                <a:solidFill>
+                  <a:srgbClr val="0000FF"/>
+                </a:solidFill>
+              </a:rPr>
+              <a:t>case </a:t>
+            </a:r>
+            <a:r>
+              <a:rPr lang="en-US" i="1" dirty="0" smtClean="0">
+                <a:solidFill>
+                  <a:srgbClr val="C0504D"/>
+                </a:solidFill>
+              </a:rPr>
+              <a:t>expression2</a:t>
+            </a:r>
+            <a:r>
+              <a:rPr lang="en-US" i="1" dirty="0" smtClean="0">
+                <a:solidFill>
+                  <a:srgbClr val="000000"/>
+                </a:solidFill>
+              </a:rPr>
+              <a:t>:</a:t>
+            </a:r>
+            <a:endParaRPr lang="en-US" dirty="0">
+              <a:solidFill>
+                <a:srgbClr val="C0504D"/>
+              </a:solidFill>
+            </a:endParaRPr>
+          </a:p>
+          <a:p>
+            <a:pPr marL="0" indent="0">
+              <a:buNone/>
+            </a:pPr>
+            <a:r>
+              <a:rPr lang="en-US" dirty="0" smtClean="0">
+                <a:solidFill>
+                  <a:srgbClr val="C0504D"/>
+                </a:solidFill>
+              </a:rPr>
+              <a:t>			</a:t>
+            </a:r>
+            <a:r>
+              <a:rPr lang="en-US" dirty="0" smtClean="0">
+                <a:solidFill>
+                  <a:srgbClr val="008000"/>
+                </a:solidFill>
+              </a:rPr>
+              <a:t>Statement(s)</a:t>
+            </a:r>
+          </a:p>
+          <a:p>
+            <a:pPr marL="0" indent="0">
+              <a:buNone/>
+            </a:pPr>
+            <a:r>
+              <a:rPr lang="en-US" dirty="0">
+                <a:solidFill>
+                  <a:srgbClr val="008000"/>
+                </a:solidFill>
+              </a:rPr>
+              <a:t>			</a:t>
+            </a:r>
+            <a:r>
+              <a:rPr lang="en-US" dirty="0">
+                <a:solidFill>
+                  <a:srgbClr val="FF0000"/>
+                </a:solidFill>
+              </a:rPr>
+              <a:t>break</a:t>
+            </a:r>
+          </a:p>
+          <a:p>
+            <a:pPr marL="0" indent="0">
+              <a:buNone/>
+            </a:pPr>
+            <a:r>
+              <a:rPr lang="en-US" dirty="0"/>
+              <a:t>	</a:t>
+            </a:r>
+            <a:r>
+              <a:rPr lang="en-US" dirty="0" smtClean="0"/>
+              <a:t>	</a:t>
+            </a:r>
+            <a:r>
+              <a:rPr lang="is-IS" dirty="0" smtClean="0"/>
+              <a:t>…</a:t>
+            </a:r>
+            <a:endParaRPr lang="en-US" dirty="0" smtClean="0"/>
+          </a:p>
+          <a:p>
+            <a:pPr marL="0" indent="0">
+              <a:buNone/>
+            </a:pPr>
+            <a:r>
+              <a:rPr lang="en-US" dirty="0"/>
+              <a:t>	</a:t>
+            </a:r>
+            <a:r>
+              <a:rPr lang="en-US" dirty="0" smtClean="0"/>
+              <a:t>	</a:t>
+            </a:r>
+            <a:r>
+              <a:rPr lang="en-US" i="1" dirty="0" smtClean="0">
+                <a:solidFill>
+                  <a:srgbClr val="0000FF"/>
+                </a:solidFill>
+              </a:rPr>
+              <a:t>default</a:t>
+            </a:r>
+            <a:r>
+              <a:rPr lang="en-US" i="1" dirty="0">
+                <a:solidFill>
+                  <a:srgbClr val="000000"/>
+                </a:solidFill>
+              </a:rPr>
+              <a:t>:</a:t>
+            </a:r>
+            <a:endParaRPr lang="en-US" dirty="0">
+              <a:solidFill>
+                <a:srgbClr val="C0504D"/>
+              </a:solidFill>
+            </a:endParaRPr>
+          </a:p>
+          <a:p>
+            <a:pPr marL="0" indent="0">
+              <a:buNone/>
+            </a:pPr>
+            <a:r>
+              <a:rPr lang="en-US" dirty="0" smtClean="0">
+                <a:solidFill>
+                  <a:srgbClr val="008000"/>
+                </a:solidFill>
+              </a:rPr>
+              <a:t>			Statement(s)</a:t>
+            </a:r>
+          </a:p>
+          <a:p>
+            <a:pPr marL="0" indent="0">
+              <a:buNone/>
+            </a:pPr>
+            <a:r>
+              <a:rPr lang="en-US" dirty="0">
+                <a:solidFill>
+                  <a:srgbClr val="008000"/>
+                </a:solidFill>
+              </a:rPr>
+              <a:t>			</a:t>
+            </a:r>
+            <a:r>
+              <a:rPr lang="en-US" dirty="0">
+                <a:solidFill>
+                  <a:srgbClr val="FF0000"/>
+                </a:solidFill>
+              </a:rPr>
+              <a:t>break</a:t>
+            </a:r>
+          </a:p>
+          <a:p>
+            <a:pPr marL="0" indent="0">
+              <a:buNone/>
+            </a:pPr>
+            <a:r>
+              <a:rPr lang="en-US" dirty="0">
+                <a:solidFill>
+                  <a:srgbClr val="008000"/>
+                </a:solidFill>
+              </a:rPr>
+              <a:t>	</a:t>
+            </a:r>
+            <a:r>
+              <a:rPr lang="en-US" dirty="0" smtClean="0">
+                <a:solidFill>
+                  <a:srgbClr val="000000"/>
+                </a:solidFill>
+              </a:rPr>
+              <a:t>}</a:t>
+            </a:r>
+          </a:p>
+          <a:p>
+            <a:pPr marL="0" indent="0">
+              <a:buNone/>
+            </a:pPr>
+            <a:endParaRPr lang="en-US" dirty="0" smtClean="0">
+              <a:solidFill>
+                <a:srgbClr val="000000"/>
+              </a:solidFill>
+            </a:endParaRPr>
+          </a:p>
+        </p:txBody>
+      </p:sp>
+    </p:spTree>
+    <p:extLst>
+      <p:ext uri="{BB962C8B-B14F-4D97-AF65-F5344CB8AC3E}">
+        <p14:creationId xmlns:p14="http://schemas.microsoft.com/office/powerpoint/2010/main" val="3458133791"/>
+      </p:ext>
+    </p:extLst>
+  </p:cSld>
+  <p:clrMapOvr>
+    <a:masterClrMapping/>
+  </p:clrMapOvr>
+</p:sld>
+</file>
+
+<file path=ppt/slides/slide123.xml><?xml version="1.0" encoding="utf-8"?>
+<p:sld xmlns:a="http://schemas.openxmlformats.org/drawingml/2006/main" xmlns:r="http://schemas.openxmlformats.org/officeDocument/2006/relationships" xmlns:p="http://schemas.openxmlformats.org/presentationml/2006/main">
+  <p:cSld>
+    <p:spTree>
+      <p:nvGrpSpPr>
+        <p:cNvPr id="1" name=""/>
+        <p:cNvGrpSpPr/>
+        <p:nvPr/>
+      </p:nvGrpSpPr>
+      <p:grpSpPr>
+        <a:xfrm>
+          <a:off x="0" y="0"/>
+          <a:ext cx="0" cy="0"/>
+          <a:chOff x="0" y="0"/>
+          <a:chExt cx="0" cy="0"/>
+        </a:xfrm>
+      </p:grpSpPr>
+      <p:sp>
+        <p:nvSpPr>
+          <p:cNvPr id="2" name="Title 1"/>
+          <p:cNvSpPr>
+            <a:spLocks noGrp="1"/>
+          </p:cNvSpPr>
+          <p:nvPr>
+            <p:ph type="title"/>
+          </p:nvPr>
+        </p:nvSpPr>
+        <p:spPr/>
+        <p:txBody>
+          <a:bodyPr/>
+          <a:lstStyle/>
+          <a:p>
+            <a:r>
+              <a:rPr lang="en-US" dirty="0" smtClean="0"/>
+              <a:t>‘if’ vs. ‘switch’ </a:t>
+            </a:r>
+            <a:r>
+              <a:rPr lang="en-US" dirty="0"/>
+              <a:t>Statement</a:t>
+            </a:r>
+          </a:p>
+        </p:txBody>
+      </p:sp>
+      <p:sp>
+        <p:nvSpPr>
+          <p:cNvPr id="3" name="Content Placeholder 2"/>
+          <p:cNvSpPr>
+            <a:spLocks noGrp="1"/>
+          </p:cNvSpPr>
+          <p:nvPr>
+            <p:ph idx="1"/>
+          </p:nvPr>
+        </p:nvSpPr>
+        <p:spPr>
+          <a:xfrm>
+            <a:off x="457200" y="1600200"/>
+            <a:ext cx="4113650" cy="4525963"/>
+          </a:xfrm>
+        </p:spPr>
+        <p:txBody>
+          <a:bodyPr>
+            <a:normAutofit fontScale="85000" lnSpcReduction="20000"/>
+          </a:bodyPr>
+          <a:lstStyle/>
+          <a:p>
+            <a:pPr marL="0" indent="0">
+              <a:buNone/>
+            </a:pPr>
+            <a:r>
+              <a:rPr lang="en-US" i="1" dirty="0" smtClean="0">
+                <a:solidFill>
+                  <a:srgbClr val="0000FF"/>
+                </a:solidFill>
+              </a:rPr>
+              <a:t>if</a:t>
+            </a:r>
+            <a:r>
+              <a:rPr lang="en-US" dirty="0" smtClean="0">
+                <a:solidFill>
+                  <a:srgbClr val="0000FF"/>
+                </a:solidFill>
+              </a:rPr>
+              <a:t> </a:t>
+            </a:r>
+            <a:r>
+              <a:rPr lang="en-US" dirty="0">
+                <a:solidFill>
+                  <a:srgbClr val="000000"/>
+                </a:solidFill>
+              </a:rPr>
+              <a:t>(</a:t>
+            </a:r>
+            <a:r>
+              <a:rPr lang="en-US" i="1" dirty="0">
+                <a:solidFill>
+                  <a:srgbClr val="C0504D"/>
+                </a:solidFill>
+              </a:rPr>
+              <a:t>condition</a:t>
+            </a:r>
+            <a:r>
+              <a:rPr lang="en-US" dirty="0" smtClean="0">
+                <a:solidFill>
+                  <a:srgbClr val="000000"/>
+                </a:solidFill>
+              </a:rPr>
+              <a:t>){</a:t>
+            </a:r>
+          </a:p>
+          <a:p>
+            <a:pPr marL="0" indent="0">
+              <a:buNone/>
+            </a:pPr>
+            <a:r>
+              <a:rPr lang="en-US" dirty="0">
+                <a:solidFill>
+                  <a:srgbClr val="C0504D"/>
+                </a:solidFill>
+              </a:rPr>
+              <a:t>	</a:t>
+            </a:r>
+            <a:r>
+              <a:rPr lang="en-US" dirty="0" smtClean="0">
+                <a:solidFill>
+                  <a:srgbClr val="008000"/>
+                </a:solidFill>
+              </a:rPr>
+              <a:t>Statement(s)</a:t>
+            </a:r>
+          </a:p>
+          <a:p>
+            <a:pPr marL="0" indent="0">
+              <a:buNone/>
+            </a:pPr>
+            <a:r>
+              <a:rPr lang="en-US" dirty="0" smtClean="0"/>
+              <a:t>}</a:t>
+            </a:r>
+            <a:endParaRPr lang="en-US" dirty="0"/>
+          </a:p>
+          <a:p>
+            <a:pPr marL="0" indent="0">
+              <a:buNone/>
+            </a:pPr>
+            <a:r>
+              <a:rPr lang="en-US" i="1" dirty="0" smtClean="0">
+                <a:solidFill>
+                  <a:srgbClr val="0000FF"/>
+                </a:solidFill>
+              </a:rPr>
+              <a:t>else </a:t>
+            </a:r>
+            <a:r>
+              <a:rPr lang="en-US" i="1" dirty="0">
+                <a:solidFill>
+                  <a:srgbClr val="0000FF"/>
+                </a:solidFill>
+              </a:rPr>
+              <a:t>if </a:t>
+            </a:r>
+            <a:r>
+              <a:rPr lang="en-US" dirty="0">
+                <a:solidFill>
+                  <a:srgbClr val="000000"/>
+                </a:solidFill>
+              </a:rPr>
+              <a:t>(</a:t>
+            </a:r>
+            <a:r>
+              <a:rPr lang="en-US" i="1" dirty="0">
+                <a:solidFill>
+                  <a:srgbClr val="C0504D"/>
+                </a:solidFill>
+              </a:rPr>
+              <a:t>condition</a:t>
+            </a:r>
+            <a:r>
+              <a:rPr lang="en-US" dirty="0">
+                <a:solidFill>
+                  <a:srgbClr val="000000"/>
+                </a:solidFill>
+              </a:rPr>
+              <a:t>)</a:t>
+            </a:r>
+            <a:r>
+              <a:rPr lang="en-US" dirty="0">
+                <a:solidFill>
+                  <a:srgbClr val="C0504D"/>
+                </a:solidFill>
+              </a:rPr>
+              <a:t> </a:t>
+            </a:r>
+            <a:r>
+              <a:rPr lang="en-US" dirty="0">
+                <a:solidFill>
+                  <a:srgbClr val="000000"/>
+                </a:solidFill>
+              </a:rPr>
+              <a:t>{</a:t>
+            </a:r>
+          </a:p>
+          <a:p>
+            <a:pPr marL="0" indent="0">
+              <a:buNone/>
+            </a:pPr>
+            <a:r>
+              <a:rPr lang="en-US" dirty="0">
+                <a:solidFill>
+                  <a:srgbClr val="C0504D"/>
+                </a:solidFill>
+              </a:rPr>
+              <a:t>	</a:t>
+            </a:r>
+            <a:r>
+              <a:rPr lang="en-US" dirty="0" smtClean="0">
+                <a:solidFill>
+                  <a:srgbClr val="008000"/>
+                </a:solidFill>
+              </a:rPr>
+              <a:t>Statement</a:t>
+            </a:r>
+            <a:r>
+              <a:rPr lang="en-US" dirty="0">
+                <a:solidFill>
+                  <a:srgbClr val="008000"/>
+                </a:solidFill>
+              </a:rPr>
+              <a:t>(s)</a:t>
+            </a:r>
+          </a:p>
+          <a:p>
+            <a:pPr marL="0" indent="0">
+              <a:buNone/>
+            </a:pPr>
+            <a:r>
+              <a:rPr lang="en-US" dirty="0" smtClean="0"/>
+              <a:t>}</a:t>
+            </a:r>
+            <a:endParaRPr lang="en-US" dirty="0"/>
+          </a:p>
+          <a:p>
+            <a:pPr marL="0" indent="0">
+              <a:buNone/>
+            </a:pPr>
+            <a:r>
+              <a:rPr lang="is-IS" dirty="0" smtClean="0"/>
+              <a:t>…</a:t>
+            </a:r>
+            <a:endParaRPr lang="en-US" dirty="0"/>
+          </a:p>
+          <a:p>
+            <a:pPr marL="0" indent="0">
+              <a:buNone/>
+            </a:pPr>
+            <a:r>
+              <a:rPr lang="en-US" i="1" dirty="0" smtClean="0">
+                <a:solidFill>
+                  <a:srgbClr val="0000FF"/>
+                </a:solidFill>
+              </a:rPr>
+              <a:t>else</a:t>
+            </a:r>
+            <a:r>
+              <a:rPr lang="en-US" dirty="0" smtClean="0">
+                <a:solidFill>
+                  <a:srgbClr val="0000FF"/>
+                </a:solidFill>
+              </a:rPr>
+              <a:t> </a:t>
+            </a:r>
+            <a:r>
+              <a:rPr lang="en-US" dirty="0">
+                <a:solidFill>
+                  <a:srgbClr val="000000"/>
+                </a:solidFill>
+              </a:rPr>
+              <a:t>{</a:t>
+            </a:r>
+          </a:p>
+          <a:p>
+            <a:pPr marL="0" indent="0">
+              <a:buNone/>
+            </a:pPr>
+            <a:r>
+              <a:rPr lang="en-US" dirty="0">
+                <a:solidFill>
+                  <a:srgbClr val="C0504D"/>
+                </a:solidFill>
+              </a:rPr>
+              <a:t>	</a:t>
+            </a:r>
+            <a:r>
+              <a:rPr lang="en-US" dirty="0">
+                <a:solidFill>
+                  <a:srgbClr val="008000"/>
+                </a:solidFill>
+              </a:rPr>
+              <a:t>Statement(s)</a:t>
+            </a:r>
+          </a:p>
+          <a:p>
+            <a:pPr marL="0" indent="0">
+              <a:buNone/>
+            </a:pPr>
+            <a:r>
+              <a:rPr lang="en-US" dirty="0" smtClean="0"/>
+              <a:t>}</a:t>
+            </a:r>
+            <a:endParaRPr lang="en-US" dirty="0"/>
+          </a:p>
+        </p:txBody>
+      </p:sp>
+      <p:sp>
+        <p:nvSpPr>
+          <p:cNvPr id="4" name="Content Placeholder 2"/>
+          <p:cNvSpPr txBox="1">
+            <a:spLocks/>
+          </p:cNvSpPr>
+          <p:nvPr/>
+        </p:nvSpPr>
+        <p:spPr>
+          <a:xfrm>
+            <a:off x="4723250" y="1752600"/>
+            <a:ext cx="4113650" cy="4525963"/>
+          </a:xfrm>
+          <a:prstGeom prst="rect">
+            <a:avLst/>
+          </a:prstGeom>
+        </p:spPr>
+        <p:txBody>
+          <a:bodyPr vert="horz" lIns="91440" tIns="45720" rIns="91440" bIns="45720" rtlCol="0">
+            <a:normAutofit fontScale="70000" lnSpcReduction="20000"/>
+          </a:bodyPr>
+          <a:lstStyle>
+            <a:lvl1pPr marL="342900" indent="-342900" algn="l" defTabSz="457200" rtl="0" eaLnBrk="1" latinLnBrk="0" hangingPunct="1">
+              <a:spcBef>
+                <a:spcPct val="20000"/>
+              </a:spcBef>
+              <a:buFont typeface="Arial"/>
+              <a:buChar char="•"/>
+              <a:defRPr sz="3200" kern="1200">
+                <a:solidFill>
+                  <a:schemeClr val="tx1"/>
+                </a:solidFill>
+                <a:latin typeface="+mn-lt"/>
+                <a:ea typeface="+mn-ea"/>
+                <a:cs typeface="+mn-cs"/>
+              </a:defRPr>
+            </a:lvl1pPr>
+            <a:lvl2pPr marL="742950" indent="-285750" algn="l" defTabSz="457200" rtl="0" eaLnBrk="1" latinLnBrk="0" hangingPunct="1">
+              <a:spcBef>
+                <a:spcPct val="20000"/>
+              </a:spcBef>
+              <a:buFont typeface="Arial"/>
+              <a:buChar char="–"/>
+              <a:defRPr sz="2800" kern="1200">
+                <a:solidFill>
+                  <a:schemeClr val="tx1"/>
+                </a:solidFill>
+                <a:latin typeface="+mn-lt"/>
+                <a:ea typeface="+mn-ea"/>
+                <a:cs typeface="+mn-cs"/>
+              </a:defRPr>
+            </a:lvl2pPr>
+            <a:lvl3pPr marL="1143000" indent="-228600" algn="l" defTabSz="457200" rtl="0" eaLnBrk="1" latinLnBrk="0" hangingPunct="1">
+              <a:spcBef>
+                <a:spcPct val="20000"/>
+              </a:spcBef>
+              <a:buFont typeface="Arial"/>
+              <a:buChar char="•"/>
+              <a:defRPr sz="2400" kern="1200">
+                <a:solidFill>
+                  <a:schemeClr val="tx1"/>
+                </a:solidFill>
+                <a:latin typeface="+mn-lt"/>
+                <a:ea typeface="+mn-ea"/>
+                <a:cs typeface="+mn-cs"/>
+              </a:defRPr>
+            </a:lvl3pPr>
+            <a:lvl4pPr marL="1600200" indent="-228600" algn="l" defTabSz="457200" rtl="0" eaLnBrk="1" latinLnBrk="0" hangingPunct="1">
+              <a:spcBef>
+                <a:spcPct val="20000"/>
+              </a:spcBef>
+              <a:buFont typeface="Arial"/>
+              <a:buChar char="–"/>
+              <a:defRPr sz="2000" kern="1200">
+                <a:solidFill>
+                  <a:schemeClr val="tx1"/>
+                </a:solidFill>
+                <a:latin typeface="+mn-lt"/>
+                <a:ea typeface="+mn-ea"/>
+                <a:cs typeface="+mn-cs"/>
+              </a:defRPr>
+            </a:lvl4pPr>
+            <a:lvl5pPr marL="2057400" indent="-228600" algn="l" defTabSz="457200" rtl="0" eaLnBrk="1" latinLnBrk="0" hangingPunct="1">
+              <a:spcBef>
+                <a:spcPct val="20000"/>
+              </a:spcBef>
+              <a:buFont typeface="Arial"/>
+              <a:buChar char="»"/>
+              <a:defRPr sz="2000" kern="1200">
+                <a:solidFill>
+                  <a:schemeClr val="tx1"/>
+                </a:solidFill>
+                <a:latin typeface="+mn-lt"/>
+                <a:ea typeface="+mn-ea"/>
+                <a:cs typeface="+mn-cs"/>
+              </a:defRPr>
+            </a:lvl5pPr>
+            <a:lvl6pPr marL="2514600" indent="-228600" algn="l" defTabSz="457200" rtl="0" eaLnBrk="1" latinLnBrk="0" hangingPunct="1">
+              <a:spcBef>
+                <a:spcPct val="20000"/>
+              </a:spcBef>
+              <a:buFont typeface="Arial"/>
+              <a:buChar char="•"/>
+              <a:defRPr sz="2000" kern="1200">
+                <a:solidFill>
+                  <a:schemeClr val="tx1"/>
+                </a:solidFill>
+                <a:latin typeface="+mn-lt"/>
+                <a:ea typeface="+mn-ea"/>
+                <a:cs typeface="+mn-cs"/>
+              </a:defRPr>
+            </a:lvl6pPr>
+            <a:lvl7pPr marL="2971800" indent="-228600" algn="l" defTabSz="457200" rtl="0" eaLnBrk="1" latinLnBrk="0" hangingPunct="1">
+              <a:spcBef>
+                <a:spcPct val="20000"/>
+              </a:spcBef>
+              <a:buFont typeface="Arial"/>
+              <a:buChar char="•"/>
+              <a:defRPr sz="2000" kern="1200">
+                <a:solidFill>
+                  <a:schemeClr val="tx1"/>
+                </a:solidFill>
+                <a:latin typeface="+mn-lt"/>
+                <a:ea typeface="+mn-ea"/>
+                <a:cs typeface="+mn-cs"/>
+              </a:defRPr>
+            </a:lvl7pPr>
+            <a:lvl8pPr marL="3429000" indent="-228600" algn="l" defTabSz="457200" rtl="0" eaLnBrk="1" latinLnBrk="0" hangingPunct="1">
+              <a:spcBef>
+                <a:spcPct val="20000"/>
+              </a:spcBef>
+              <a:buFont typeface="Arial"/>
+              <a:buChar char="•"/>
+              <a:defRPr sz="2000" kern="1200">
+                <a:solidFill>
+                  <a:schemeClr val="tx1"/>
+                </a:solidFill>
+                <a:latin typeface="+mn-lt"/>
+                <a:ea typeface="+mn-ea"/>
+                <a:cs typeface="+mn-cs"/>
+              </a:defRPr>
+            </a:lvl8pPr>
+            <a:lvl9pPr marL="3886200" indent="-228600" algn="l" defTabSz="457200" rtl="0" eaLnBrk="1" latinLnBrk="0" hangingPunct="1">
+              <a:spcBef>
+                <a:spcPct val="20000"/>
+              </a:spcBef>
+              <a:buFont typeface="Arial"/>
+              <a:buChar char="•"/>
+              <a:defRPr sz="2000" kern="1200">
+                <a:solidFill>
+                  <a:schemeClr val="tx1"/>
+                </a:solidFill>
+                <a:latin typeface="+mn-lt"/>
+                <a:ea typeface="+mn-ea"/>
+                <a:cs typeface="+mn-cs"/>
+              </a:defRPr>
+            </a:lvl9pPr>
+          </a:lstStyle>
+          <a:p>
+            <a:pPr marL="0" indent="0">
+              <a:buFont typeface="Arial"/>
+              <a:buNone/>
+            </a:pPr>
+            <a:r>
+              <a:rPr lang="en-US" i="1" dirty="0" smtClean="0">
+                <a:solidFill>
+                  <a:srgbClr val="0000FF"/>
+                </a:solidFill>
+              </a:rPr>
+              <a:t>switch</a:t>
+            </a:r>
+            <a:r>
+              <a:rPr lang="en-US" dirty="0" smtClean="0">
+                <a:solidFill>
+                  <a:srgbClr val="000000"/>
+                </a:solidFill>
+              </a:rPr>
+              <a:t>(</a:t>
+            </a:r>
+            <a:r>
+              <a:rPr lang="en-US" i="1" dirty="0" err="1" smtClean="0">
+                <a:solidFill>
+                  <a:srgbClr val="C0504D"/>
+                </a:solidFill>
+              </a:rPr>
+              <a:t>expressionA</a:t>
+            </a:r>
+            <a:r>
+              <a:rPr lang="en-US" dirty="0" smtClean="0">
+                <a:solidFill>
+                  <a:srgbClr val="000000"/>
+                </a:solidFill>
+              </a:rPr>
+              <a:t>)</a:t>
+            </a:r>
+            <a:r>
+              <a:rPr lang="en-US" dirty="0" smtClean="0">
+                <a:solidFill>
+                  <a:srgbClr val="C0504D"/>
+                </a:solidFill>
+              </a:rPr>
+              <a:t> </a:t>
+            </a:r>
+            <a:r>
+              <a:rPr lang="en-US" dirty="0" smtClean="0">
+                <a:solidFill>
+                  <a:srgbClr val="000000"/>
+                </a:solidFill>
+              </a:rPr>
+              <a:t>{</a:t>
+            </a:r>
+          </a:p>
+          <a:p>
+            <a:pPr marL="0" indent="0">
+              <a:buFont typeface="Arial"/>
+              <a:buNone/>
+            </a:pPr>
+            <a:r>
+              <a:rPr lang="en-US" dirty="0" smtClean="0">
+                <a:solidFill>
+                  <a:srgbClr val="C0504D"/>
+                </a:solidFill>
+              </a:rPr>
+              <a:t>	</a:t>
+            </a:r>
+            <a:r>
+              <a:rPr lang="en-US" i="1" dirty="0" smtClean="0">
+                <a:solidFill>
+                  <a:srgbClr val="0000FF"/>
+                </a:solidFill>
+              </a:rPr>
+              <a:t>case </a:t>
+            </a:r>
+            <a:r>
+              <a:rPr lang="en-US" i="1" dirty="0" smtClean="0">
+                <a:solidFill>
+                  <a:srgbClr val="C0504D"/>
+                </a:solidFill>
+              </a:rPr>
+              <a:t>expression1</a:t>
+            </a:r>
+            <a:r>
+              <a:rPr lang="en-US" i="1" dirty="0" smtClean="0">
+                <a:solidFill>
+                  <a:srgbClr val="000000"/>
+                </a:solidFill>
+              </a:rPr>
+              <a:t>:</a:t>
+            </a:r>
+            <a:r>
+              <a:rPr lang="en-US" dirty="0" smtClean="0">
+                <a:solidFill>
+                  <a:srgbClr val="C0504D"/>
+                </a:solidFill>
+              </a:rPr>
+              <a:t> </a:t>
+            </a:r>
+            <a:endParaRPr lang="en-US" dirty="0" smtClean="0">
+              <a:solidFill>
+                <a:srgbClr val="C0504D"/>
+              </a:solidFill>
+            </a:endParaRPr>
+          </a:p>
+          <a:p>
+            <a:pPr marL="0" indent="0">
+              <a:buFont typeface="Arial"/>
+              <a:buNone/>
+            </a:pPr>
+            <a:r>
+              <a:rPr lang="en-US" dirty="0" smtClean="0">
+                <a:solidFill>
+                  <a:srgbClr val="C0504D"/>
+                </a:solidFill>
+              </a:rPr>
+              <a:t>		</a:t>
+            </a:r>
+            <a:r>
+              <a:rPr lang="en-US" dirty="0" smtClean="0">
+                <a:solidFill>
+                  <a:srgbClr val="008000"/>
+                </a:solidFill>
+              </a:rPr>
+              <a:t>Statement(s)</a:t>
+            </a:r>
+          </a:p>
+          <a:p>
+            <a:pPr marL="0" indent="0">
+              <a:buFont typeface="Arial"/>
+              <a:buNone/>
+            </a:pPr>
+            <a:r>
+              <a:rPr lang="en-US" dirty="0">
+                <a:solidFill>
+                  <a:srgbClr val="008000"/>
+                </a:solidFill>
+              </a:rPr>
+              <a:t>	</a:t>
+            </a:r>
+            <a:r>
+              <a:rPr lang="en-US" dirty="0" smtClean="0">
+                <a:solidFill>
+                  <a:srgbClr val="008000"/>
+                </a:solidFill>
+              </a:rPr>
+              <a:t>	</a:t>
+            </a:r>
+            <a:r>
+              <a:rPr lang="en-US" dirty="0" smtClean="0">
+                <a:solidFill>
+                  <a:srgbClr val="FF0000"/>
+                </a:solidFill>
+              </a:rPr>
+              <a:t>break</a:t>
+            </a:r>
+          </a:p>
+          <a:p>
+            <a:pPr marL="0" indent="0">
+              <a:buFont typeface="Arial"/>
+              <a:buNone/>
+            </a:pPr>
+            <a:r>
+              <a:rPr lang="en-US" dirty="0"/>
+              <a:t>	</a:t>
+            </a:r>
+            <a:r>
+              <a:rPr lang="en-US" i="1" dirty="0" smtClean="0">
+                <a:solidFill>
+                  <a:srgbClr val="0000FF"/>
+                </a:solidFill>
+              </a:rPr>
+              <a:t>case </a:t>
+            </a:r>
+            <a:r>
+              <a:rPr lang="en-US" i="1" dirty="0" smtClean="0">
+                <a:solidFill>
+                  <a:srgbClr val="C0504D"/>
+                </a:solidFill>
+              </a:rPr>
+              <a:t>expression2</a:t>
+            </a:r>
+            <a:r>
+              <a:rPr lang="en-US" i="1" dirty="0" smtClean="0">
+                <a:solidFill>
+                  <a:srgbClr val="000000"/>
+                </a:solidFill>
+              </a:rPr>
+              <a:t>:</a:t>
+            </a:r>
+            <a:endParaRPr lang="en-US" dirty="0" smtClean="0">
+              <a:solidFill>
+                <a:srgbClr val="C0504D"/>
+              </a:solidFill>
+            </a:endParaRPr>
+          </a:p>
+          <a:p>
+            <a:pPr marL="0" indent="0">
+              <a:buFont typeface="Arial"/>
+              <a:buNone/>
+            </a:pPr>
+            <a:r>
+              <a:rPr lang="en-US" dirty="0" smtClean="0">
+                <a:solidFill>
+                  <a:srgbClr val="C0504D"/>
+                </a:solidFill>
+              </a:rPr>
+              <a:t>		</a:t>
+            </a:r>
+            <a:r>
+              <a:rPr lang="en-US" dirty="0" smtClean="0">
+                <a:solidFill>
+                  <a:srgbClr val="008000"/>
+                </a:solidFill>
+              </a:rPr>
+              <a:t>Statement(s)</a:t>
+            </a:r>
+          </a:p>
+          <a:p>
+            <a:pPr marL="0" indent="0">
+              <a:buNone/>
+            </a:pPr>
+            <a:r>
+              <a:rPr lang="en-US" dirty="0">
+                <a:solidFill>
+                  <a:srgbClr val="008000"/>
+                </a:solidFill>
+              </a:rPr>
+              <a:t>		</a:t>
+            </a:r>
+            <a:r>
+              <a:rPr lang="en-US" dirty="0">
+                <a:solidFill>
+                  <a:srgbClr val="FF0000"/>
+                </a:solidFill>
+              </a:rPr>
+              <a:t>break</a:t>
+            </a:r>
+          </a:p>
+          <a:p>
+            <a:pPr marL="0" indent="0">
+              <a:buFont typeface="Arial"/>
+              <a:buNone/>
+            </a:pPr>
+            <a:r>
+              <a:rPr lang="en-US" dirty="0" smtClean="0"/>
+              <a:t>	</a:t>
+            </a:r>
+            <a:r>
+              <a:rPr lang="is-IS" dirty="0" smtClean="0"/>
+              <a:t>…</a:t>
+            </a:r>
+            <a:endParaRPr lang="en-US" dirty="0" smtClean="0"/>
+          </a:p>
+          <a:p>
+            <a:pPr marL="0" indent="0">
+              <a:buFont typeface="Arial"/>
+              <a:buNone/>
+            </a:pPr>
+            <a:r>
+              <a:rPr lang="en-US" dirty="0" smtClean="0"/>
+              <a:t>	</a:t>
+            </a:r>
+            <a:r>
+              <a:rPr lang="en-US" i="1" dirty="0" smtClean="0">
+                <a:solidFill>
+                  <a:srgbClr val="0000FF"/>
+                </a:solidFill>
+              </a:rPr>
+              <a:t>default</a:t>
+            </a:r>
+            <a:r>
+              <a:rPr lang="en-US" i="1" dirty="0" smtClean="0">
+                <a:solidFill>
+                  <a:srgbClr val="000000"/>
+                </a:solidFill>
+              </a:rPr>
+              <a:t>:</a:t>
+            </a:r>
+            <a:endParaRPr lang="en-US" dirty="0" smtClean="0">
+              <a:solidFill>
+                <a:srgbClr val="C0504D"/>
+              </a:solidFill>
+            </a:endParaRPr>
+          </a:p>
+          <a:p>
+            <a:pPr marL="0" indent="0">
+              <a:buFont typeface="Arial"/>
+              <a:buNone/>
+            </a:pPr>
+            <a:r>
+              <a:rPr lang="en-US" dirty="0" smtClean="0">
+                <a:solidFill>
+                  <a:srgbClr val="008000"/>
+                </a:solidFill>
+              </a:rPr>
+              <a:t>		Statement(s)</a:t>
+            </a:r>
+          </a:p>
+          <a:p>
+            <a:pPr marL="0" indent="0">
+              <a:buNone/>
+            </a:pPr>
+            <a:r>
+              <a:rPr lang="en-US" dirty="0">
+                <a:solidFill>
+                  <a:srgbClr val="008000"/>
+                </a:solidFill>
+              </a:rPr>
+              <a:t>		</a:t>
+            </a:r>
+            <a:r>
+              <a:rPr lang="en-US" dirty="0">
+                <a:solidFill>
+                  <a:srgbClr val="FF0000"/>
+                </a:solidFill>
+              </a:rPr>
+              <a:t>break</a:t>
+            </a:r>
+          </a:p>
+          <a:p>
+            <a:pPr marL="0" indent="0">
+              <a:buFont typeface="Arial"/>
+              <a:buNone/>
+            </a:pPr>
+            <a:r>
+              <a:rPr lang="en-US" dirty="0" smtClean="0">
+                <a:solidFill>
+                  <a:srgbClr val="000000"/>
+                </a:solidFill>
+              </a:rPr>
+              <a:t>}</a:t>
+            </a:r>
+          </a:p>
+        </p:txBody>
+      </p:sp>
+    </p:spTree>
+    <p:extLst>
+      <p:ext uri="{BB962C8B-B14F-4D97-AF65-F5344CB8AC3E}">
+        <p14:creationId xmlns:p14="http://schemas.microsoft.com/office/powerpoint/2010/main" val="3081964830"/>
+      </p:ext>
+    </p:extLst>
+  </p:cSld>
+  <p:clrMapOvr>
+    <a:masterClrMapping/>
+  </p:clrMapOvr>
+</p:sld>
+</file>
+
+<file path=ppt/slides/slide124.xml><?xml version="1.0" encoding="utf-8"?>
+<p:sld xmlns:a="http://schemas.openxmlformats.org/drawingml/2006/main" xmlns:r="http://schemas.openxmlformats.org/officeDocument/2006/relationships" xmlns:p="http://schemas.openxmlformats.org/presentationml/2006/main">
+  <p:cSld>
+    <p:spTree>
+      <p:nvGrpSpPr>
+        <p:cNvPr id="1" name=""/>
+        <p:cNvGrpSpPr/>
+        <p:nvPr/>
+      </p:nvGrpSpPr>
+      <p:grpSpPr>
+        <a:xfrm>
+          <a:off x="0" y="0"/>
+          <a:ext cx="0" cy="0"/>
+          <a:chOff x="0" y="0"/>
+          <a:chExt cx="0" cy="0"/>
+        </a:xfrm>
+      </p:grpSpPr>
+      <p:sp>
+        <p:nvSpPr>
+          <p:cNvPr id="74" name="Rectangle 73"/>
+          <p:cNvSpPr/>
+          <p:nvPr/>
+        </p:nvSpPr>
+        <p:spPr>
+          <a:xfrm>
+            <a:off x="3768053" y="4688430"/>
+            <a:ext cx="1563077" cy="227949"/>
+          </a:xfrm>
+          <a:prstGeom prst="rect">
+            <a:avLst/>
+          </a:prstGeom>
+        </p:spPr>
+        <p:style>
+          <a:lnRef idx="1">
+            <a:schemeClr val="dk1"/>
+          </a:lnRef>
+          <a:fillRef idx="2">
+            <a:schemeClr val="dk1"/>
+          </a:fillRef>
+          <a:effectRef idx="1">
+            <a:schemeClr val="dk1"/>
+          </a:effectRef>
+          <a:fontRef idx="minor">
+            <a:schemeClr val="dk1"/>
+          </a:fontRef>
+        </p:style>
+        <p:txBody>
+          <a:bodyPr rtlCol="0" anchor="ctr"/>
+          <a:lstStyle/>
+          <a:p>
+            <a:pPr algn="ctr"/>
+            <a:r>
+              <a:rPr lang="en-US" sz="1600" dirty="0" smtClean="0"/>
+              <a:t>Statement </a:t>
+            </a:r>
+            <a:r>
+              <a:rPr lang="is-IS" sz="1600" dirty="0" smtClean="0"/>
+              <a:t>…</a:t>
+            </a:r>
+            <a:endParaRPr lang="en-US" sz="1600" dirty="0"/>
+          </a:p>
+        </p:txBody>
+      </p:sp>
+      <p:sp>
+        <p:nvSpPr>
+          <p:cNvPr id="109" name="Rectangle 108"/>
+          <p:cNvSpPr/>
+          <p:nvPr/>
+        </p:nvSpPr>
+        <p:spPr>
+          <a:xfrm>
+            <a:off x="3768053" y="3890289"/>
+            <a:ext cx="1563077" cy="227949"/>
+          </a:xfrm>
+          <a:prstGeom prst="rect">
+            <a:avLst/>
+          </a:prstGeom>
+        </p:spPr>
+        <p:style>
+          <a:lnRef idx="1">
+            <a:schemeClr val="dk1"/>
+          </a:lnRef>
+          <a:fillRef idx="2">
+            <a:schemeClr val="dk1"/>
+          </a:fillRef>
+          <a:effectRef idx="1">
+            <a:schemeClr val="dk1"/>
+          </a:effectRef>
+          <a:fontRef idx="minor">
+            <a:schemeClr val="dk1"/>
+          </a:fontRef>
+        </p:style>
+        <p:txBody>
+          <a:bodyPr rtlCol="0" anchor="ctr"/>
+          <a:lstStyle/>
+          <a:p>
+            <a:pPr algn="ctr"/>
+            <a:r>
+              <a:rPr lang="en-US" sz="1600" dirty="0" smtClean="0"/>
+              <a:t>Statement </a:t>
+            </a:r>
+            <a:r>
+              <a:rPr lang="is-IS" sz="1600" dirty="0" smtClean="0"/>
+              <a:t>…</a:t>
+            </a:r>
+            <a:endParaRPr lang="en-US" sz="1600" dirty="0"/>
+          </a:p>
+        </p:txBody>
+      </p:sp>
+      <p:sp>
+        <p:nvSpPr>
+          <p:cNvPr id="110" name="Rectangle 109"/>
+          <p:cNvSpPr/>
+          <p:nvPr/>
+        </p:nvSpPr>
+        <p:spPr>
+          <a:xfrm>
+            <a:off x="3768053" y="3066195"/>
+            <a:ext cx="1563077" cy="227949"/>
+          </a:xfrm>
+          <a:prstGeom prst="rect">
+            <a:avLst/>
+          </a:prstGeom>
+        </p:spPr>
+        <p:style>
+          <a:lnRef idx="1">
+            <a:schemeClr val="dk1"/>
+          </a:lnRef>
+          <a:fillRef idx="2">
+            <a:schemeClr val="dk1"/>
+          </a:fillRef>
+          <a:effectRef idx="1">
+            <a:schemeClr val="dk1"/>
+          </a:effectRef>
+          <a:fontRef idx="minor">
+            <a:schemeClr val="dk1"/>
+          </a:fontRef>
+        </p:style>
+        <p:txBody>
+          <a:bodyPr rtlCol="0" anchor="ctr"/>
+          <a:lstStyle/>
+          <a:p>
+            <a:pPr algn="ctr"/>
+            <a:r>
+              <a:rPr lang="en-US" sz="1600" dirty="0" smtClean="0"/>
+              <a:t>Statement </a:t>
+            </a:r>
+            <a:r>
+              <a:rPr lang="is-IS" sz="1600" dirty="0" smtClean="0"/>
+              <a:t>…</a:t>
+            </a:r>
+            <a:endParaRPr lang="en-US" sz="1600" dirty="0"/>
+          </a:p>
+        </p:txBody>
+      </p:sp>
+      <p:sp>
+        <p:nvSpPr>
+          <p:cNvPr id="2" name="Title 1"/>
+          <p:cNvSpPr>
+            <a:spLocks noGrp="1"/>
+          </p:cNvSpPr>
+          <p:nvPr>
+            <p:ph type="title"/>
+          </p:nvPr>
+        </p:nvSpPr>
+        <p:spPr/>
+        <p:txBody>
+          <a:bodyPr/>
+          <a:lstStyle/>
+          <a:p>
+            <a:r>
+              <a:rPr lang="en-US" dirty="0" smtClean="0"/>
+              <a:t>Case ‘fall-through’</a:t>
+            </a:r>
+            <a:endParaRPr lang="en-US" dirty="0"/>
+          </a:p>
+        </p:txBody>
+      </p:sp>
+      <p:sp>
+        <p:nvSpPr>
+          <p:cNvPr id="5" name="Rectangle 4"/>
+          <p:cNvSpPr/>
+          <p:nvPr/>
+        </p:nvSpPr>
+        <p:spPr>
+          <a:xfrm>
+            <a:off x="3768053" y="1917120"/>
+            <a:ext cx="1563077" cy="227949"/>
+          </a:xfrm>
+          <a:prstGeom prst="rect">
+            <a:avLst/>
+          </a:prstGeom>
+        </p:spPr>
+        <p:style>
+          <a:lnRef idx="1">
+            <a:schemeClr val="dk1"/>
+          </a:lnRef>
+          <a:fillRef idx="2">
+            <a:schemeClr val="dk1"/>
+          </a:fillRef>
+          <a:effectRef idx="1">
+            <a:schemeClr val="dk1"/>
+          </a:effectRef>
+          <a:fontRef idx="minor">
+            <a:schemeClr val="dk1"/>
+          </a:fontRef>
+        </p:style>
+        <p:txBody>
+          <a:bodyPr rtlCol="0" anchor="ctr"/>
+          <a:lstStyle/>
+          <a:p>
+            <a:pPr algn="ctr"/>
+            <a:r>
+              <a:rPr lang="en-US" sz="1600" dirty="0" smtClean="0"/>
+              <a:t>Statement 1</a:t>
+            </a:r>
+            <a:endParaRPr lang="en-US" sz="1600" dirty="0"/>
+          </a:p>
+        </p:txBody>
+      </p:sp>
+      <p:sp>
+        <p:nvSpPr>
+          <p:cNvPr id="6" name="Rectangle 5"/>
+          <p:cNvSpPr/>
+          <p:nvPr/>
+        </p:nvSpPr>
+        <p:spPr>
+          <a:xfrm>
+            <a:off x="3515782" y="2783995"/>
+            <a:ext cx="2067619" cy="529197"/>
+          </a:xfrm>
+          <a:prstGeom prst="rect">
+            <a:avLst/>
+          </a:prstGeom>
+          <a:solidFill>
+            <a:schemeClr val="accent2">
+              <a:lumMod val="60000"/>
+              <a:lumOff val="40000"/>
+              <a:alpha val="27000"/>
+            </a:schemeClr>
+          </a:solidFill>
+        </p:spPr>
+        <p:style>
+          <a:lnRef idx="1">
+            <a:schemeClr val="accent2"/>
+          </a:lnRef>
+          <a:fillRef idx="2">
+            <a:schemeClr val="accent2"/>
+          </a:fillRef>
+          <a:effectRef idx="1">
+            <a:schemeClr val="accent2"/>
+          </a:effectRef>
+          <a:fontRef idx="minor">
+            <a:schemeClr val="dk1"/>
+          </a:fontRef>
+        </p:style>
+        <p:txBody>
+          <a:bodyPr rtlCol="0" anchor="t"/>
+          <a:lstStyle/>
+          <a:p>
+            <a:pPr algn="ctr"/>
+            <a:r>
+              <a:rPr lang="en-US" sz="1600" dirty="0" smtClean="0"/>
+              <a:t>Case A</a:t>
+            </a:r>
+            <a:endParaRPr lang="en-US" sz="1600" dirty="0"/>
+          </a:p>
+        </p:txBody>
+      </p:sp>
+      <p:sp>
+        <p:nvSpPr>
+          <p:cNvPr id="7" name="Rectangle 6"/>
+          <p:cNvSpPr/>
+          <p:nvPr/>
+        </p:nvSpPr>
+        <p:spPr>
+          <a:xfrm>
+            <a:off x="3515782" y="3615352"/>
+            <a:ext cx="2067619" cy="529197"/>
+          </a:xfrm>
+          <a:prstGeom prst="rect">
+            <a:avLst/>
+          </a:prstGeom>
+          <a:solidFill>
+            <a:schemeClr val="accent2">
+              <a:lumMod val="60000"/>
+              <a:lumOff val="40000"/>
+              <a:alpha val="27000"/>
+            </a:schemeClr>
+          </a:solidFill>
+        </p:spPr>
+        <p:style>
+          <a:lnRef idx="1">
+            <a:schemeClr val="accent2"/>
+          </a:lnRef>
+          <a:fillRef idx="2">
+            <a:schemeClr val="accent2"/>
+          </a:fillRef>
+          <a:effectRef idx="1">
+            <a:schemeClr val="accent2"/>
+          </a:effectRef>
+          <a:fontRef idx="minor">
+            <a:schemeClr val="dk1"/>
+          </a:fontRef>
+        </p:style>
+        <p:txBody>
+          <a:bodyPr rtlCol="0" anchor="t"/>
+          <a:lstStyle/>
+          <a:p>
+            <a:pPr algn="ctr"/>
+            <a:r>
+              <a:rPr lang="en-US" sz="1600" dirty="0" smtClean="0"/>
+              <a:t>Case B</a:t>
+            </a:r>
+            <a:endParaRPr lang="en-US" sz="1600" dirty="0"/>
+          </a:p>
+        </p:txBody>
+      </p:sp>
+      <p:sp>
+        <p:nvSpPr>
+          <p:cNvPr id="9" name="Rectangle 8"/>
+          <p:cNvSpPr/>
+          <p:nvPr/>
+        </p:nvSpPr>
+        <p:spPr>
+          <a:xfrm>
+            <a:off x="3768053" y="5594294"/>
+            <a:ext cx="1563077" cy="227949"/>
+          </a:xfrm>
+          <a:prstGeom prst="rect">
+            <a:avLst/>
+          </a:prstGeom>
+        </p:spPr>
+        <p:style>
+          <a:lnRef idx="1">
+            <a:schemeClr val="dk1"/>
+          </a:lnRef>
+          <a:fillRef idx="2">
+            <a:schemeClr val="dk1"/>
+          </a:fillRef>
+          <a:effectRef idx="1">
+            <a:schemeClr val="dk1"/>
+          </a:effectRef>
+          <a:fontRef idx="minor">
+            <a:schemeClr val="dk1"/>
+          </a:fontRef>
+        </p:style>
+        <p:txBody>
+          <a:bodyPr rtlCol="0" anchor="ctr"/>
+          <a:lstStyle/>
+          <a:p>
+            <a:pPr algn="ctr"/>
+            <a:r>
+              <a:rPr lang="en-US" sz="1600" dirty="0" smtClean="0"/>
+              <a:t>Statement N</a:t>
+            </a:r>
+            <a:endParaRPr lang="en-US" sz="1600" dirty="0"/>
+          </a:p>
+        </p:txBody>
+      </p:sp>
+      <p:sp>
+        <p:nvSpPr>
+          <p:cNvPr id="10" name="Rectangle 9"/>
+          <p:cNvSpPr/>
+          <p:nvPr/>
+        </p:nvSpPr>
+        <p:spPr>
+          <a:xfrm>
+            <a:off x="3768053" y="6065822"/>
+            <a:ext cx="1563077" cy="227949"/>
+          </a:xfrm>
+          <a:prstGeom prst="rect">
+            <a:avLst/>
+          </a:prstGeom>
+        </p:spPr>
+        <p:style>
+          <a:lnRef idx="3">
+            <a:schemeClr val="lt1"/>
+          </a:lnRef>
+          <a:fillRef idx="1">
+            <a:schemeClr val="accent1"/>
+          </a:fillRef>
+          <a:effectRef idx="1">
+            <a:schemeClr val="accent1"/>
+          </a:effectRef>
+          <a:fontRef idx="minor">
+            <a:schemeClr val="lt1"/>
+          </a:fontRef>
+        </p:style>
+        <p:txBody>
+          <a:bodyPr rtlCol="0" anchor="ctr"/>
+          <a:lstStyle/>
+          <a:p>
+            <a:pPr algn="ctr"/>
+            <a:r>
+              <a:rPr lang="en-US" sz="1600" dirty="0" smtClean="0"/>
+              <a:t>End</a:t>
+            </a:r>
+            <a:endParaRPr lang="en-US" sz="1600" dirty="0"/>
+          </a:p>
+        </p:txBody>
+      </p:sp>
+      <p:sp>
+        <p:nvSpPr>
+          <p:cNvPr id="11" name="Rectangle 10"/>
+          <p:cNvSpPr/>
+          <p:nvPr/>
+        </p:nvSpPr>
+        <p:spPr>
+          <a:xfrm>
+            <a:off x="3768053" y="1510716"/>
+            <a:ext cx="1563077" cy="227949"/>
+          </a:xfrm>
+          <a:prstGeom prst="rect">
+            <a:avLst/>
+          </a:prstGeom>
+        </p:spPr>
+        <p:style>
+          <a:lnRef idx="3">
+            <a:schemeClr val="lt1"/>
+          </a:lnRef>
+          <a:fillRef idx="1">
+            <a:schemeClr val="accent1"/>
+          </a:fillRef>
+          <a:effectRef idx="1">
+            <a:schemeClr val="accent1"/>
+          </a:effectRef>
+          <a:fontRef idx="minor">
+            <a:schemeClr val="lt1"/>
+          </a:fontRef>
+        </p:style>
+        <p:txBody>
+          <a:bodyPr rtlCol="0" anchor="ctr"/>
+          <a:lstStyle/>
+          <a:p>
+            <a:pPr algn="ctr"/>
+            <a:r>
+              <a:rPr lang="en-US" sz="1600" dirty="0" smtClean="0"/>
+              <a:t>Start</a:t>
+            </a:r>
+            <a:endParaRPr lang="en-US" sz="1600" dirty="0"/>
+          </a:p>
+        </p:txBody>
+      </p:sp>
+      <p:cxnSp>
+        <p:nvCxnSpPr>
+          <p:cNvPr id="26" name="Straight Arrow Connector 25"/>
+          <p:cNvCxnSpPr/>
+          <p:nvPr/>
+        </p:nvCxnSpPr>
+        <p:spPr>
+          <a:xfrm>
+            <a:off x="4541562" y="2145069"/>
+            <a:ext cx="16059" cy="238189"/>
+          </a:xfrm>
+          <a:prstGeom prst="straightConnector1">
+            <a:avLst/>
+          </a:prstGeom>
+          <a:ln>
+            <a:tailEnd type="arrow"/>
+          </a:ln>
+        </p:spPr>
+        <p:style>
+          <a:lnRef idx="2">
+            <a:schemeClr val="accent1"/>
+          </a:lnRef>
+          <a:fillRef idx="0">
+            <a:schemeClr val="accent1"/>
+          </a:fillRef>
+          <a:effectRef idx="1">
+            <a:schemeClr val="accent1"/>
+          </a:effectRef>
+          <a:fontRef idx="minor">
+            <a:schemeClr val="tx1"/>
+          </a:fontRef>
+        </p:style>
+      </p:cxnSp>
+      <p:cxnSp>
+        <p:nvCxnSpPr>
+          <p:cNvPr id="33" name="Elbow Connector 32"/>
+          <p:cNvCxnSpPr/>
+          <p:nvPr/>
+        </p:nvCxnSpPr>
+        <p:spPr>
+          <a:xfrm rot="5400000">
+            <a:off x="4398511" y="3464272"/>
+            <a:ext cx="302160" cy="12700"/>
+          </a:xfrm>
+          <a:prstGeom prst="bentConnector3">
+            <a:avLst>
+              <a:gd name="adj1" fmla="val 50000"/>
+            </a:avLst>
+          </a:prstGeom>
+          <a:ln>
+            <a:solidFill>
+              <a:schemeClr val="accent3">
+                <a:lumMod val="75000"/>
+              </a:schemeClr>
+            </a:solidFill>
+            <a:tailEnd type="arrow"/>
+          </a:ln>
+        </p:spPr>
+        <p:style>
+          <a:lnRef idx="2">
+            <a:schemeClr val="accent1"/>
+          </a:lnRef>
+          <a:fillRef idx="0">
+            <a:schemeClr val="accent1"/>
+          </a:fillRef>
+          <a:effectRef idx="1">
+            <a:schemeClr val="accent1"/>
+          </a:effectRef>
+          <a:fontRef idx="minor">
+            <a:schemeClr val="tx1"/>
+          </a:fontRef>
+        </p:style>
+      </p:cxnSp>
+      <p:cxnSp>
+        <p:nvCxnSpPr>
+          <p:cNvPr id="35" name="Elbow Connector 34"/>
+          <p:cNvCxnSpPr/>
+          <p:nvPr/>
+        </p:nvCxnSpPr>
+        <p:spPr>
+          <a:xfrm rot="16200000" flipH="1">
+            <a:off x="4412546" y="4278418"/>
+            <a:ext cx="274091" cy="6351"/>
+          </a:xfrm>
+          <a:prstGeom prst="bentConnector3">
+            <a:avLst>
+              <a:gd name="adj1" fmla="val 50000"/>
+            </a:avLst>
+          </a:prstGeom>
+          <a:ln>
+            <a:solidFill>
+              <a:schemeClr val="accent2">
+                <a:lumMod val="75000"/>
+              </a:schemeClr>
+            </a:solidFill>
+            <a:tailEnd type="arrow"/>
+          </a:ln>
+        </p:spPr>
+        <p:style>
+          <a:lnRef idx="2">
+            <a:schemeClr val="accent1"/>
+          </a:lnRef>
+          <a:fillRef idx="0">
+            <a:schemeClr val="accent1"/>
+          </a:fillRef>
+          <a:effectRef idx="1">
+            <a:schemeClr val="accent1"/>
+          </a:effectRef>
+          <a:fontRef idx="minor">
+            <a:schemeClr val="tx1"/>
+          </a:fontRef>
+        </p:style>
+      </p:cxnSp>
+      <p:cxnSp>
+        <p:nvCxnSpPr>
+          <p:cNvPr id="42" name="Straight Arrow Connector 41"/>
+          <p:cNvCxnSpPr/>
+          <p:nvPr/>
+        </p:nvCxnSpPr>
+        <p:spPr>
+          <a:xfrm>
+            <a:off x="4549591" y="1738665"/>
+            <a:ext cx="0" cy="178455"/>
+          </a:xfrm>
+          <a:prstGeom prst="straightConnector1">
+            <a:avLst/>
+          </a:prstGeom>
+          <a:ln>
+            <a:tailEnd type="arrow"/>
+          </a:ln>
+        </p:spPr>
+        <p:style>
+          <a:lnRef idx="2">
+            <a:schemeClr val="accent1"/>
+          </a:lnRef>
+          <a:fillRef idx="0">
+            <a:schemeClr val="accent1"/>
+          </a:fillRef>
+          <a:effectRef idx="1">
+            <a:schemeClr val="accent1"/>
+          </a:effectRef>
+          <a:fontRef idx="minor">
+            <a:schemeClr val="tx1"/>
+          </a:fontRef>
+        </p:style>
+      </p:cxnSp>
+      <p:cxnSp>
+        <p:nvCxnSpPr>
+          <p:cNvPr id="46" name="Straight Arrow Connector 45"/>
+          <p:cNvCxnSpPr/>
+          <p:nvPr/>
+        </p:nvCxnSpPr>
+        <p:spPr>
+          <a:xfrm>
+            <a:off x="4549591" y="5822243"/>
+            <a:ext cx="0" cy="243579"/>
+          </a:xfrm>
+          <a:prstGeom prst="straightConnector1">
+            <a:avLst/>
+          </a:prstGeom>
+          <a:ln>
+            <a:tailEnd type="arrow"/>
+          </a:ln>
+        </p:spPr>
+        <p:style>
+          <a:lnRef idx="2">
+            <a:schemeClr val="accent1"/>
+          </a:lnRef>
+          <a:fillRef idx="0">
+            <a:schemeClr val="accent1"/>
+          </a:fillRef>
+          <a:effectRef idx="1">
+            <a:schemeClr val="accent1"/>
+          </a:effectRef>
+          <a:fontRef idx="minor">
+            <a:schemeClr val="tx1"/>
+          </a:fontRef>
+        </p:style>
+      </p:cxnSp>
+      <p:sp>
+        <p:nvSpPr>
+          <p:cNvPr id="21" name="Rectangle 20"/>
+          <p:cNvSpPr/>
+          <p:nvPr/>
+        </p:nvSpPr>
+        <p:spPr>
+          <a:xfrm>
+            <a:off x="3515782" y="4418640"/>
+            <a:ext cx="2067619" cy="529197"/>
+          </a:xfrm>
+          <a:prstGeom prst="rect">
+            <a:avLst/>
+          </a:prstGeom>
+          <a:solidFill>
+            <a:schemeClr val="accent2">
+              <a:lumMod val="60000"/>
+              <a:lumOff val="40000"/>
+              <a:alpha val="27000"/>
+            </a:schemeClr>
+          </a:solidFill>
+        </p:spPr>
+        <p:style>
+          <a:lnRef idx="1">
+            <a:schemeClr val="accent2"/>
+          </a:lnRef>
+          <a:fillRef idx="2">
+            <a:schemeClr val="accent2"/>
+          </a:fillRef>
+          <a:effectRef idx="1">
+            <a:schemeClr val="accent2"/>
+          </a:effectRef>
+          <a:fontRef idx="minor">
+            <a:schemeClr val="dk1"/>
+          </a:fontRef>
+        </p:style>
+        <p:txBody>
+          <a:bodyPr rtlCol="0" anchor="t"/>
+          <a:lstStyle/>
+          <a:p>
+            <a:pPr algn="ctr"/>
+            <a:r>
+              <a:rPr lang="en-US" sz="1600" dirty="0" smtClean="0"/>
+              <a:t>Case C</a:t>
+            </a:r>
+            <a:endParaRPr lang="en-US" sz="1600" dirty="0"/>
+          </a:p>
+        </p:txBody>
+      </p:sp>
+      <p:cxnSp>
+        <p:nvCxnSpPr>
+          <p:cNvPr id="30" name="Elbow Connector 29"/>
+          <p:cNvCxnSpPr/>
+          <p:nvPr/>
+        </p:nvCxnSpPr>
+        <p:spPr>
+          <a:xfrm rot="5400000">
+            <a:off x="4226363" y="5271065"/>
+            <a:ext cx="646457" cy="12700"/>
+          </a:xfrm>
+          <a:prstGeom prst="bentConnector3">
+            <a:avLst>
+              <a:gd name="adj1" fmla="val 50000"/>
+            </a:avLst>
+          </a:prstGeom>
+          <a:ln>
+            <a:solidFill>
+              <a:srgbClr val="604A7B"/>
+            </a:solidFill>
+            <a:tailEnd type="arrow"/>
+          </a:ln>
+        </p:spPr>
+        <p:style>
+          <a:lnRef idx="2">
+            <a:schemeClr val="accent1"/>
+          </a:lnRef>
+          <a:fillRef idx="0">
+            <a:schemeClr val="accent1"/>
+          </a:fillRef>
+          <a:effectRef idx="1">
+            <a:schemeClr val="accent1"/>
+          </a:effectRef>
+          <a:fontRef idx="minor">
+            <a:schemeClr val="tx1"/>
+          </a:fontRef>
+        </p:style>
+      </p:cxnSp>
+      <p:cxnSp>
+        <p:nvCxnSpPr>
+          <p:cNvPr id="47" name="Elbow Connector 46"/>
+          <p:cNvCxnSpPr>
+            <a:stCxn id="16" idx="1"/>
+            <a:endCxn id="21" idx="1"/>
+          </p:cNvCxnSpPr>
+          <p:nvPr/>
+        </p:nvCxnSpPr>
+        <p:spPr>
+          <a:xfrm rot="10800000" flipV="1">
+            <a:off x="3515783" y="2478019"/>
+            <a:ext cx="870989" cy="2205220"/>
+          </a:xfrm>
+          <a:prstGeom prst="bentConnector3">
+            <a:avLst>
+              <a:gd name="adj1" fmla="val 126246"/>
+            </a:avLst>
+          </a:prstGeom>
+          <a:ln>
+            <a:solidFill>
+              <a:srgbClr val="604A7B"/>
+            </a:solidFill>
+            <a:tailEnd type="arrow"/>
+          </a:ln>
+        </p:spPr>
+        <p:style>
+          <a:lnRef idx="2">
+            <a:schemeClr val="accent1"/>
+          </a:lnRef>
+          <a:fillRef idx="0">
+            <a:schemeClr val="accent1"/>
+          </a:fillRef>
+          <a:effectRef idx="1">
+            <a:schemeClr val="accent1"/>
+          </a:effectRef>
+          <a:fontRef idx="minor">
+            <a:schemeClr val="tx1"/>
+          </a:fontRef>
+        </p:style>
+      </p:cxnSp>
+      <p:cxnSp>
+        <p:nvCxnSpPr>
+          <p:cNvPr id="52" name="Elbow Connector 51"/>
+          <p:cNvCxnSpPr>
+            <a:stCxn id="16" idx="3"/>
+            <a:endCxn id="7" idx="3"/>
+          </p:cNvCxnSpPr>
+          <p:nvPr/>
+        </p:nvCxnSpPr>
+        <p:spPr>
+          <a:xfrm>
+            <a:off x="4712412" y="2478019"/>
+            <a:ext cx="870989" cy="1401932"/>
+          </a:xfrm>
+          <a:prstGeom prst="bentConnector3">
+            <a:avLst>
+              <a:gd name="adj1" fmla="val 126246"/>
+            </a:avLst>
+          </a:prstGeom>
+          <a:ln>
+            <a:solidFill>
+              <a:schemeClr val="accent2">
+                <a:lumMod val="75000"/>
+              </a:schemeClr>
+            </a:solidFill>
+            <a:tailEnd type="arrow"/>
+          </a:ln>
+        </p:spPr>
+        <p:style>
+          <a:lnRef idx="2">
+            <a:schemeClr val="accent1"/>
+          </a:lnRef>
+          <a:fillRef idx="0">
+            <a:schemeClr val="accent1"/>
+          </a:fillRef>
+          <a:effectRef idx="1">
+            <a:schemeClr val="accent1"/>
+          </a:effectRef>
+          <a:fontRef idx="minor">
+            <a:schemeClr val="tx1"/>
+          </a:fontRef>
+        </p:style>
+      </p:cxnSp>
+      <p:cxnSp>
+        <p:nvCxnSpPr>
+          <p:cNvPr id="59" name="Elbow Connector 58"/>
+          <p:cNvCxnSpPr/>
+          <p:nvPr/>
+        </p:nvCxnSpPr>
+        <p:spPr>
+          <a:xfrm rot="5400000">
+            <a:off x="4443983" y="2670358"/>
+            <a:ext cx="211216" cy="16059"/>
+          </a:xfrm>
+          <a:prstGeom prst="bentConnector3">
+            <a:avLst>
+              <a:gd name="adj1" fmla="val 50000"/>
+            </a:avLst>
+          </a:prstGeom>
+          <a:ln>
+            <a:solidFill>
+              <a:schemeClr val="accent3">
+                <a:lumMod val="75000"/>
+              </a:schemeClr>
+            </a:solidFill>
+            <a:tailEnd type="arrow"/>
+          </a:ln>
+        </p:spPr>
+        <p:style>
+          <a:lnRef idx="2">
+            <a:schemeClr val="accent1"/>
+          </a:lnRef>
+          <a:fillRef idx="0">
+            <a:schemeClr val="accent1"/>
+          </a:fillRef>
+          <a:effectRef idx="1">
+            <a:schemeClr val="accent1"/>
+          </a:effectRef>
+          <a:fontRef idx="minor">
+            <a:schemeClr val="tx1"/>
+          </a:fontRef>
+        </p:style>
+      </p:cxnSp>
+      <p:sp>
+        <p:nvSpPr>
+          <p:cNvPr id="16" name="Decision 15"/>
+          <p:cNvSpPr/>
+          <p:nvPr/>
+        </p:nvSpPr>
+        <p:spPr>
+          <a:xfrm>
+            <a:off x="4386771" y="2383258"/>
+            <a:ext cx="325641" cy="189521"/>
+          </a:xfrm>
+          <a:prstGeom prst="flowChartDecision">
+            <a:avLst/>
+          </a:prstGeom>
+        </p:spPr>
+        <p:style>
+          <a:lnRef idx="1">
+            <a:schemeClr val="accent1"/>
+          </a:lnRef>
+          <a:fillRef idx="3">
+            <a:schemeClr val="accent1"/>
+          </a:fillRef>
+          <a:effectRef idx="2">
+            <a:schemeClr val="accent1"/>
+          </a:effectRef>
+          <a:fontRef idx="minor">
+            <a:schemeClr val="lt1"/>
+          </a:fontRef>
+        </p:style>
+        <p:txBody>
+          <a:bodyPr rtlCol="0" anchor="ctr"/>
+          <a:lstStyle/>
+          <a:p>
+            <a:pPr algn="ctr"/>
+            <a:endParaRPr lang="en-US"/>
+          </a:p>
+        </p:txBody>
+      </p:sp>
+    </p:spTree>
+    <p:extLst>
+      <p:ext uri="{BB962C8B-B14F-4D97-AF65-F5344CB8AC3E}">
+        <p14:creationId xmlns:p14="http://schemas.microsoft.com/office/powerpoint/2010/main" val="659574855"/>
+      </p:ext>
+    </p:extLst>
+  </p:cSld>
+  <p:clrMapOvr>
+    <a:masterClrMapping/>
+  </p:clrMapOvr>
+</p:sld>
+</file>
+
+<file path=ppt/slides/slide125.xml><?xml version="1.0" encoding="utf-8"?>
+<p:sld xmlns:a="http://schemas.openxmlformats.org/drawingml/2006/main" xmlns:r="http://schemas.openxmlformats.org/officeDocument/2006/relationships" xmlns:p="http://schemas.openxmlformats.org/presentationml/2006/main">
+  <p:cSld>
+    <p:spTree>
+      <p:nvGrpSpPr>
+        <p:cNvPr id="1" name=""/>
+        <p:cNvGrpSpPr/>
+        <p:nvPr/>
+      </p:nvGrpSpPr>
+      <p:grpSpPr>
+        <a:xfrm>
+          <a:off x="0" y="0"/>
+          <a:ext cx="0" cy="0"/>
+          <a:chOff x="0" y="0"/>
+          <a:chExt cx="0" cy="0"/>
+        </a:xfrm>
+      </p:grpSpPr>
+      <p:sp>
+        <p:nvSpPr>
+          <p:cNvPr id="2" name="Title 1"/>
+          <p:cNvSpPr>
+            <a:spLocks noGrp="1"/>
+          </p:cNvSpPr>
+          <p:nvPr>
+            <p:ph type="title"/>
+          </p:nvPr>
+        </p:nvSpPr>
+        <p:spPr/>
+        <p:txBody>
+          <a:bodyPr/>
+          <a:lstStyle/>
+          <a:p>
+            <a:r>
+              <a:rPr lang="en-US" dirty="0" smtClean="0"/>
+              <a:t>Conclusion</a:t>
+            </a:r>
+            <a:endParaRPr lang="en-US" dirty="0"/>
+          </a:p>
+        </p:txBody>
+      </p:sp>
+      <p:sp>
+        <p:nvSpPr>
+          <p:cNvPr id="3" name="Content Placeholder 2"/>
+          <p:cNvSpPr>
+            <a:spLocks noGrp="1"/>
+          </p:cNvSpPr>
+          <p:nvPr>
+            <p:ph idx="1"/>
+          </p:nvPr>
+        </p:nvSpPr>
+        <p:spPr/>
+        <p:txBody>
+          <a:bodyPr>
+            <a:normAutofit/>
+          </a:bodyPr>
+          <a:lstStyle/>
+          <a:p>
+            <a:pPr marL="514350" indent="-514350">
+              <a:buFont typeface="+mj-lt"/>
+              <a:buAutoNum type="arabicPeriod"/>
+            </a:pPr>
+            <a:r>
+              <a:rPr lang="en-US" dirty="0" smtClean="0"/>
+              <a:t>A ‘switch’ statement can be used in place of a multi-condition ‘if’ statement</a:t>
+            </a:r>
+          </a:p>
+          <a:p>
+            <a:pPr marL="514350" indent="-514350">
+              <a:buFont typeface="+mj-lt"/>
+              <a:buAutoNum type="arabicPeriod"/>
+            </a:pPr>
+            <a:r>
+              <a:rPr lang="en-US" dirty="0" smtClean="0"/>
+              <a:t>The ‘switch’ statement provides ‘fall through’, but it must be used </a:t>
+            </a:r>
+            <a:r>
+              <a:rPr lang="en-US" smtClean="0"/>
+              <a:t>with </a:t>
+            </a:r>
+            <a:r>
+              <a:rPr lang="en-US" smtClean="0"/>
+              <a:t>care</a:t>
+            </a:r>
+            <a:endParaRPr lang="en-US" dirty="0" smtClean="0"/>
+          </a:p>
+        </p:txBody>
+      </p:sp>
+    </p:spTree>
+    <p:extLst>
+      <p:ext uri="{BB962C8B-B14F-4D97-AF65-F5344CB8AC3E}">
+        <p14:creationId xmlns:p14="http://schemas.microsoft.com/office/powerpoint/2010/main" val="2576117139"/>
+      </p:ext>
+    </p:extLst>
+  </p:cSld>
+  <p:clrMapOvr>
+    <a:masterClrMapping/>
+  </p:clrMapOvr>
 </p:sld>
 </file>
 

</xml_diff>

<commit_message>
Updated docs, slides and code sample for c05s18 - JavaScript - Part 18
</commit_message>
<xml_diff>
--- a/docs/learn-computer-programming.pptx
+++ b/docs/learn-computer-programming.pptx
@@ -130,6 +130,24 @@
     <p:sldId id="400" r:id="rId124"/>
     <p:sldId id="401" r:id="rId125"/>
     <p:sldId id="402" r:id="rId126"/>
+    <p:sldId id="403" r:id="rId127"/>
+    <p:sldId id="405" r:id="rId128"/>
+    <p:sldId id="404" r:id="rId129"/>
+    <p:sldId id="406" r:id="rId130"/>
+    <p:sldId id="408" r:id="rId131"/>
+    <p:sldId id="409" r:id="rId132"/>
+    <p:sldId id="410" r:id="rId133"/>
+    <p:sldId id="407" r:id="rId134"/>
+    <p:sldId id="411" r:id="rId135"/>
+    <p:sldId id="413" r:id="rId136"/>
+    <p:sldId id="412" r:id="rId137"/>
+    <p:sldId id="416" r:id="rId138"/>
+    <p:sldId id="414" r:id="rId139"/>
+    <p:sldId id="415" r:id="rId140"/>
+    <p:sldId id="417" r:id="rId141"/>
+    <p:sldId id="418" r:id="rId142"/>
+    <p:sldId id="419" r:id="rId143"/>
+    <p:sldId id="420" r:id="rId144"/>
   </p:sldIdLst>
   <p:sldSz cx="9144000" cy="6858000" type="screen4x3"/>
   <p:notesSz cx="6858000" cy="9144000"/>
@@ -5296,42 +5314,42 @@
     </dgm:pt>
   </dgm:ptLst>
   <dgm:cxnLst>
-    <dgm:cxn modelId="{0A19088C-A894-A349-B6F2-D0CA96CD47FA}" srcId="{960CE163-DF35-2B44-83E7-B9153BC66084}" destId="{1AD1EA1C-020E-5744-81BA-AEEC1A7A11F3}" srcOrd="2" destOrd="0" parTransId="{12CF4121-F3B4-5C45-B72F-C1FB37DD3C0D}" sibTransId="{E7356A86-2BC1-2844-87C1-0F4142A0BACE}"/>
-    <dgm:cxn modelId="{A5EF75CA-949B-FB42-A967-633DBF9C5416}" srcId="{67DF074B-DE05-B24C-9E35-CDBF726DC2DD}" destId="{2CF1C699-9046-8C42-87E6-2861BF37D660}" srcOrd="1" destOrd="0" parTransId="{F9A1264F-2EB8-8148-8E8F-B74886C30473}" sibTransId="{2B88B2F7-3FE5-E743-A3EF-F1DB3821C219}"/>
-    <dgm:cxn modelId="{1BB5FA34-3C64-DD46-93EA-B2497E30C558}" type="presOf" srcId="{0C3731E6-7189-414B-8AA4-AA411ADE82DC}" destId="{F42357F4-6E12-A041-A7D6-81713E5E517B}" srcOrd="0" destOrd="0" presId="urn:microsoft.com/office/officeart/2005/8/layout/hierarchy1"/>
-    <dgm:cxn modelId="{4143E40A-3339-5746-9665-4720B7275017}" type="presOf" srcId="{4261D7F4-A7D0-3F49-B78A-20CFB380B683}" destId="{C2C1A37D-940A-6743-AC99-D92FAAA879A9}" srcOrd="0" destOrd="0" presId="urn:microsoft.com/office/officeart/2005/8/layout/hierarchy1"/>
-    <dgm:cxn modelId="{62868263-8B87-BF41-9DB1-C409701EE1E3}" type="presOf" srcId="{184A7FBE-4658-3046-B4A7-4EBDDC670AD1}" destId="{2E4A94D1-71F0-A046-B95F-18095848F38A}" srcOrd="0" destOrd="0" presId="urn:microsoft.com/office/officeart/2005/8/layout/hierarchy1"/>
-    <dgm:cxn modelId="{56B8DE62-0A59-E34F-BA89-ACA8FE07FD37}" type="presOf" srcId="{A215CF19-F4EB-414A-A10F-B2A96141FE91}" destId="{0B86410B-498D-AB4D-9967-4C4AEDB1DF45}" srcOrd="0" destOrd="0" presId="urn:microsoft.com/office/officeart/2005/8/layout/hierarchy1"/>
-    <dgm:cxn modelId="{4CC6FB2A-BDF9-2948-B3E8-8BFD444DE0F5}" srcId="{67DF074B-DE05-B24C-9E35-CDBF726DC2DD}" destId="{632DBD1E-A080-C14D-89CD-94A8C0F3CF25}" srcOrd="0" destOrd="0" parTransId="{563BE0E2-35F1-EA43-92A4-487E8781D214}" sibTransId="{BC85FB81-59E3-3246-A1DB-AA9BCA174B1A}"/>
-    <dgm:cxn modelId="{7E833AC7-C906-EC48-8CF2-050B2E9E6DD6}" type="presOf" srcId="{632DBD1E-A080-C14D-89CD-94A8C0F3CF25}" destId="{2246CDBD-2CA8-A34C-A89B-E32ACB07E97A}" srcOrd="0" destOrd="0" presId="urn:microsoft.com/office/officeart/2005/8/layout/hierarchy1"/>
-    <dgm:cxn modelId="{48C3CFE4-65EB-9D4E-A0CE-F9F821B5D78C}" srcId="{FE86CB60-E462-414C-BF0E-606A57D7AD93}" destId="{9C7D04B1-85B2-3F41-9343-3724449F75B3}" srcOrd="0" destOrd="0" parTransId="{184A7FBE-4658-3046-B4A7-4EBDDC670AD1}" sibTransId="{5D03D28D-4580-AA4E-B725-784F886C6797}"/>
-    <dgm:cxn modelId="{5125BE48-CBDA-9E46-A5EC-A00E5922E856}" type="presOf" srcId="{8C382D6E-A069-234E-96CC-A5A865E2BBBD}" destId="{C6BA431E-FA40-1D4E-A3D8-2A8BD37A2453}" srcOrd="0" destOrd="0" presId="urn:microsoft.com/office/officeart/2005/8/layout/hierarchy1"/>
-    <dgm:cxn modelId="{FFC55F0E-24F0-0940-B0B5-F6820B65D7C7}" type="presOf" srcId="{E5C8F682-32CD-424A-896C-91EAD3E64C45}" destId="{76B33B1D-4CA5-544F-BF28-B308B507EF10}" srcOrd="0" destOrd="0" presId="urn:microsoft.com/office/officeart/2005/8/layout/hierarchy1"/>
-    <dgm:cxn modelId="{BE4A5523-AA4B-D244-80FB-A948E67617FE}" srcId="{AE7EA77A-1D8E-3F42-95E1-4EB11A443A81}" destId="{4261D7F4-A7D0-3F49-B78A-20CFB380B683}" srcOrd="0" destOrd="0" parTransId="{8C382D6E-A069-234E-96CC-A5A865E2BBBD}" sibTransId="{BFE6C573-BEC1-BB44-914C-4A90CDE91A1A}"/>
-    <dgm:cxn modelId="{BD876DF4-FBEE-9943-863F-7B7F61CBAEA9}" srcId="{960CE163-DF35-2B44-83E7-B9153BC66084}" destId="{FE86CB60-E462-414C-BF0E-606A57D7AD93}" srcOrd="3" destOrd="0" parTransId="{70F0D127-9705-B346-8456-2EA73B6E30CF}" sibTransId="{B2965BF0-14E0-474E-A2AB-CCA4521513DD}"/>
-    <dgm:cxn modelId="{7B0EFE83-8F7C-2148-A812-1F8ACB477747}" type="presOf" srcId="{F9A1264F-2EB8-8148-8E8F-B74886C30473}" destId="{9541F663-17CE-1449-B545-4E9F3C558C3A}" srcOrd="0" destOrd="0" presId="urn:microsoft.com/office/officeart/2005/8/layout/hierarchy1"/>
-    <dgm:cxn modelId="{1FDA42F0-000F-6E4D-ACBD-DD297AF16C8B}" type="presOf" srcId="{960CE163-DF35-2B44-83E7-B9153BC66084}" destId="{923B0C63-79B7-9B4A-94B9-19130FBE5D7B}" srcOrd="0" destOrd="0" presId="urn:microsoft.com/office/officeart/2005/8/layout/hierarchy1"/>
-    <dgm:cxn modelId="{C885BB5D-362B-1847-87CF-E1B639313EA0}" srcId="{FE86CB60-E462-414C-BF0E-606A57D7AD93}" destId="{E5C8F682-32CD-424A-896C-91EAD3E64C45}" srcOrd="2" destOrd="0" parTransId="{E3372A67-8AD5-414E-9A1F-4D9E3CFF6332}" sibTransId="{B77BD5BE-E444-A847-B5CA-1B150064119C}"/>
-    <dgm:cxn modelId="{68A68B6C-C4A2-404D-9619-7E596F60AE28}" srcId="{FE86CB60-E462-414C-BF0E-606A57D7AD93}" destId="{67DF074B-DE05-B24C-9E35-CDBF726DC2DD}" srcOrd="1" destOrd="0" parTransId="{0C3731E6-7189-414B-8AA4-AA411ADE82DC}" sibTransId="{4A343348-5A18-A64D-B967-67FF94A2182D}"/>
-    <dgm:cxn modelId="{E1A0809A-BAEA-BF42-92A8-DDEE32055693}" type="presOf" srcId="{9C7D04B1-85B2-3F41-9343-3724449F75B3}" destId="{AD6B8219-1F5B-DA4F-B261-22B5D0551A94}" srcOrd="0" destOrd="0" presId="urn:microsoft.com/office/officeart/2005/8/layout/hierarchy1"/>
-    <dgm:cxn modelId="{74C3DF55-2571-4A42-A3D4-79D2D7286452}" type="presOf" srcId="{12CF4121-F3B4-5C45-B72F-C1FB37DD3C0D}" destId="{800FD04D-B3AC-0B4A-955F-2E2198D77D53}" srcOrd="0" destOrd="0" presId="urn:microsoft.com/office/officeart/2005/8/layout/hierarchy1"/>
-    <dgm:cxn modelId="{7DFEC403-3D07-E147-94A7-6948508849D0}" type="presOf" srcId="{563BE0E2-35F1-EA43-92A4-487E8781D214}" destId="{1F5FFC55-2839-634C-8F0C-96EACF5BE3CB}" srcOrd="0" destOrd="0" presId="urn:microsoft.com/office/officeart/2005/8/layout/hierarchy1"/>
-    <dgm:cxn modelId="{D2D6BF3A-81D0-9346-B33A-086AABA7D7D7}" type="presOf" srcId="{D0F565E7-5D70-054E-90E0-C19FE13B6790}" destId="{6B84F89A-BB62-184B-ACA8-8A1AAAE34DE1}" srcOrd="0" destOrd="0" presId="urn:microsoft.com/office/officeart/2005/8/layout/hierarchy1"/>
-    <dgm:cxn modelId="{FE6DB9C5-C848-C041-9BAC-D3D409ECA3D7}" type="presOf" srcId="{67DF074B-DE05-B24C-9E35-CDBF726DC2DD}" destId="{EBC8209D-BB74-B44A-A57A-C51ABEDBBAE8}" srcOrd="0" destOrd="0" presId="urn:microsoft.com/office/officeart/2005/8/layout/hierarchy1"/>
-    <dgm:cxn modelId="{09A4557F-E6E3-CA46-A390-4566B55E38CE}" srcId="{AE7EA77A-1D8E-3F42-95E1-4EB11A443A81}" destId="{A215CF19-F4EB-414A-A10F-B2A96141FE91}" srcOrd="1" destOrd="0" parTransId="{4810192D-B607-5A42-8DCE-8CFCF1A82427}" sibTransId="{466C1D3C-619E-C448-BF54-2F35FBFACADE}"/>
-    <dgm:cxn modelId="{8BD052AF-949A-F948-A12A-2F16C08A8BAA}" type="presOf" srcId="{4810192D-B607-5A42-8DCE-8CFCF1A82427}" destId="{28156514-4C64-AE45-A406-98283D6076D6}" srcOrd="0" destOrd="0" presId="urn:microsoft.com/office/officeart/2005/8/layout/hierarchy1"/>
-    <dgm:cxn modelId="{629969CD-5D04-2A43-B3AF-FE8A98094A86}" type="presOf" srcId="{6C0275DE-9DFE-0E43-8DDA-D28DD222D71F}" destId="{8CFA3E84-678E-C345-8D46-63E85CF195E2}" srcOrd="0" destOrd="0" presId="urn:microsoft.com/office/officeart/2005/8/layout/hierarchy1"/>
     <dgm:cxn modelId="{250B2BE2-FEC5-CD47-89C4-F8108BC7D53A}" type="presOf" srcId="{FE86CB60-E462-414C-BF0E-606A57D7AD93}" destId="{6603764C-B415-664F-8885-A7DAA8CAF3E7}" srcOrd="0" destOrd="0" presId="urn:microsoft.com/office/officeart/2005/8/layout/hierarchy1"/>
     <dgm:cxn modelId="{1D703EA7-18EF-A644-AD84-6BA0E7A84E48}" srcId="{960CE163-DF35-2B44-83E7-B9153BC66084}" destId="{AE7EA77A-1D8E-3F42-95E1-4EB11A443A81}" srcOrd="0" destOrd="0" parTransId="{D0F565E7-5D70-054E-90E0-C19FE13B6790}" sibTransId="{A9860EA9-F28C-E04C-8CCC-2E75895ED615}"/>
+    <dgm:cxn modelId="{BD876DF4-FBEE-9943-863F-7B7F61CBAEA9}" srcId="{960CE163-DF35-2B44-83E7-B9153BC66084}" destId="{FE86CB60-E462-414C-BF0E-606A57D7AD93}" srcOrd="3" destOrd="0" parTransId="{70F0D127-9705-B346-8456-2EA73B6E30CF}" sibTransId="{B2965BF0-14E0-474E-A2AB-CCA4521513DD}"/>
+    <dgm:cxn modelId="{BDB62AEF-004A-3E4A-BA04-15FFC883C6DC}" type="presOf" srcId="{1AD1EA1C-020E-5744-81BA-AEEC1A7A11F3}" destId="{D86CCABB-994E-2B44-9B36-549A167DC946}" srcOrd="0" destOrd="0" presId="urn:microsoft.com/office/officeart/2005/8/layout/hierarchy1"/>
+    <dgm:cxn modelId="{E1A0809A-BAEA-BF42-92A8-DDEE32055693}" type="presOf" srcId="{9C7D04B1-85B2-3F41-9343-3724449F75B3}" destId="{AD6B8219-1F5B-DA4F-B261-22B5D0551A94}" srcOrd="0" destOrd="0" presId="urn:microsoft.com/office/officeart/2005/8/layout/hierarchy1"/>
+    <dgm:cxn modelId="{56B8DE62-0A59-E34F-BA89-ACA8FE07FD37}" type="presOf" srcId="{A215CF19-F4EB-414A-A10F-B2A96141FE91}" destId="{0B86410B-498D-AB4D-9967-4C4AEDB1DF45}" srcOrd="0" destOrd="0" presId="urn:microsoft.com/office/officeart/2005/8/layout/hierarchy1"/>
+    <dgm:cxn modelId="{D2D6BF3A-81D0-9346-B33A-086AABA7D7D7}" type="presOf" srcId="{D0F565E7-5D70-054E-90E0-C19FE13B6790}" destId="{6B84F89A-BB62-184B-ACA8-8A1AAAE34DE1}" srcOrd="0" destOrd="0" presId="urn:microsoft.com/office/officeart/2005/8/layout/hierarchy1"/>
+    <dgm:cxn modelId="{62868263-8B87-BF41-9DB1-C409701EE1E3}" type="presOf" srcId="{184A7FBE-4658-3046-B4A7-4EBDDC670AD1}" destId="{2E4A94D1-71F0-A046-B95F-18095848F38A}" srcOrd="0" destOrd="0" presId="urn:microsoft.com/office/officeart/2005/8/layout/hierarchy1"/>
+    <dgm:cxn modelId="{1BB5FA34-3C64-DD46-93EA-B2497E30C558}" type="presOf" srcId="{0C3731E6-7189-414B-8AA4-AA411ADE82DC}" destId="{F42357F4-6E12-A041-A7D6-81713E5E517B}" srcOrd="0" destOrd="0" presId="urn:microsoft.com/office/officeart/2005/8/layout/hierarchy1"/>
+    <dgm:cxn modelId="{4CC6FB2A-BDF9-2948-B3E8-8BFD444DE0F5}" srcId="{67DF074B-DE05-B24C-9E35-CDBF726DC2DD}" destId="{632DBD1E-A080-C14D-89CD-94A8C0F3CF25}" srcOrd="0" destOrd="0" parTransId="{563BE0E2-35F1-EA43-92A4-487E8781D214}" sibTransId="{BC85FB81-59E3-3246-A1DB-AA9BCA174B1A}"/>
+    <dgm:cxn modelId="{48C3CFE4-65EB-9D4E-A0CE-F9F821B5D78C}" srcId="{FE86CB60-E462-414C-BF0E-606A57D7AD93}" destId="{9C7D04B1-85B2-3F41-9343-3724449F75B3}" srcOrd="0" destOrd="0" parTransId="{184A7FBE-4658-3046-B4A7-4EBDDC670AD1}" sibTransId="{5D03D28D-4580-AA4E-B725-784F886C6797}"/>
+    <dgm:cxn modelId="{89EEE784-3EED-8F43-8217-BBD1C237CA84}" type="presOf" srcId="{2CF1C699-9046-8C42-87E6-2861BF37D660}" destId="{9152FE1E-3F9F-1945-845B-196FD4FE9E7F}" srcOrd="0" destOrd="0" presId="urn:microsoft.com/office/officeart/2005/8/layout/hierarchy1"/>
+    <dgm:cxn modelId="{68A68B6C-C4A2-404D-9619-7E596F60AE28}" srcId="{FE86CB60-E462-414C-BF0E-606A57D7AD93}" destId="{67DF074B-DE05-B24C-9E35-CDBF726DC2DD}" srcOrd="1" destOrd="0" parTransId="{0C3731E6-7189-414B-8AA4-AA411ADE82DC}" sibTransId="{4A343348-5A18-A64D-B967-67FF94A2182D}"/>
+    <dgm:cxn modelId="{80E2C3F7-058F-1C40-8356-C15390BA6FDF}" type="presOf" srcId="{70F0D127-9705-B346-8456-2EA73B6E30CF}" destId="{201C7CC6-525A-FE42-B4FF-8C5914387024}" srcOrd="0" destOrd="0" presId="urn:microsoft.com/office/officeart/2005/8/layout/hierarchy1"/>
+    <dgm:cxn modelId="{8BD052AF-949A-F948-A12A-2F16C08A8BAA}" type="presOf" srcId="{4810192D-B607-5A42-8DCE-8CFCF1A82427}" destId="{28156514-4C64-AE45-A406-98283D6076D6}" srcOrd="0" destOrd="0" presId="urn:microsoft.com/office/officeart/2005/8/layout/hierarchy1"/>
+    <dgm:cxn modelId="{A5EF75CA-949B-FB42-A967-633DBF9C5416}" srcId="{67DF074B-DE05-B24C-9E35-CDBF726DC2DD}" destId="{2CF1C699-9046-8C42-87E6-2861BF37D660}" srcOrd="1" destOrd="0" parTransId="{F9A1264F-2EB8-8148-8E8F-B74886C30473}" sibTransId="{2B88B2F7-3FE5-E743-A3EF-F1DB3821C219}"/>
+    <dgm:cxn modelId="{FFC55F0E-24F0-0940-B0B5-F6820B65D7C7}" type="presOf" srcId="{E5C8F682-32CD-424A-896C-91EAD3E64C45}" destId="{76B33B1D-4CA5-544F-BF28-B308B507EF10}" srcOrd="0" destOrd="0" presId="urn:microsoft.com/office/officeart/2005/8/layout/hierarchy1"/>
+    <dgm:cxn modelId="{F97734D8-6CBC-804D-B286-FA60DFC694E9}" type="presOf" srcId="{84B85FB8-CE49-454E-AFD0-26748DF588CB}" destId="{39E9CE6E-1476-7F49-AD48-00E9588CC1FC}" srcOrd="0" destOrd="0" presId="urn:microsoft.com/office/officeart/2005/8/layout/hierarchy1"/>
+    <dgm:cxn modelId="{1FDA42F0-000F-6E4D-ACBD-DD297AF16C8B}" type="presOf" srcId="{960CE163-DF35-2B44-83E7-B9153BC66084}" destId="{923B0C63-79B7-9B4A-94B9-19130FBE5D7B}" srcOrd="0" destOrd="0" presId="urn:microsoft.com/office/officeart/2005/8/layout/hierarchy1"/>
+    <dgm:cxn modelId="{E7733746-4C87-234A-9D3E-4005D8B583BC}" srcId="{84B85FB8-CE49-454E-AFD0-26748DF588CB}" destId="{960CE163-DF35-2B44-83E7-B9153BC66084}" srcOrd="0" destOrd="0" parTransId="{15F9C8B3-0868-F148-A166-96327192876A}" sibTransId="{AE4D7356-6DD9-B04F-A5BC-257D53ADE85C}"/>
+    <dgm:cxn modelId="{7DFEC403-3D07-E147-94A7-6948508849D0}" type="presOf" srcId="{563BE0E2-35F1-EA43-92A4-487E8781D214}" destId="{1F5FFC55-2839-634C-8F0C-96EACF5BE3CB}" srcOrd="0" destOrd="0" presId="urn:microsoft.com/office/officeart/2005/8/layout/hierarchy1"/>
+    <dgm:cxn modelId="{74C3DF55-2571-4A42-A3D4-79D2D7286452}" type="presOf" srcId="{12CF4121-F3B4-5C45-B72F-C1FB37DD3C0D}" destId="{800FD04D-B3AC-0B4A-955F-2E2198D77D53}" srcOrd="0" destOrd="0" presId="urn:microsoft.com/office/officeart/2005/8/layout/hierarchy1"/>
+    <dgm:cxn modelId="{C885BB5D-362B-1847-87CF-E1B639313EA0}" srcId="{FE86CB60-E462-414C-BF0E-606A57D7AD93}" destId="{E5C8F682-32CD-424A-896C-91EAD3E64C45}" srcOrd="2" destOrd="0" parTransId="{E3372A67-8AD5-414E-9A1F-4D9E3CFF6332}" sibTransId="{B77BD5BE-E444-A847-B5CA-1B150064119C}"/>
+    <dgm:cxn modelId="{BE4A5523-AA4B-D244-80FB-A948E67617FE}" srcId="{AE7EA77A-1D8E-3F42-95E1-4EB11A443A81}" destId="{4261D7F4-A7D0-3F49-B78A-20CFB380B683}" srcOrd="0" destOrd="0" parTransId="{8C382D6E-A069-234E-96CC-A5A865E2BBBD}" sibTransId="{BFE6C573-BEC1-BB44-914C-4A90CDE91A1A}"/>
+    <dgm:cxn modelId="{FBC04F02-4804-8C4A-8D64-8D7E596D7783}" type="presOf" srcId="{AE7EA77A-1D8E-3F42-95E1-4EB11A443A81}" destId="{BBF408DD-FB71-6449-9993-DDA736E8D58A}" srcOrd="0" destOrd="0" presId="urn:microsoft.com/office/officeart/2005/8/layout/hierarchy1"/>
+    <dgm:cxn modelId="{7E833AC7-C906-EC48-8CF2-050B2E9E6DD6}" type="presOf" srcId="{632DBD1E-A080-C14D-89CD-94A8C0F3CF25}" destId="{2246CDBD-2CA8-A34C-A89B-E32ACB07E97A}" srcOrd="0" destOrd="0" presId="urn:microsoft.com/office/officeart/2005/8/layout/hierarchy1"/>
+    <dgm:cxn modelId="{09A4557F-E6E3-CA46-A390-4566B55E38CE}" srcId="{AE7EA77A-1D8E-3F42-95E1-4EB11A443A81}" destId="{A215CF19-F4EB-414A-A10F-B2A96141FE91}" srcOrd="1" destOrd="0" parTransId="{4810192D-B607-5A42-8DCE-8CFCF1A82427}" sibTransId="{466C1D3C-619E-C448-BF54-2F35FBFACADE}"/>
+    <dgm:cxn modelId="{FE6DB9C5-C848-C041-9BAC-D3D409ECA3D7}" type="presOf" srcId="{67DF074B-DE05-B24C-9E35-CDBF726DC2DD}" destId="{EBC8209D-BB74-B44A-A57A-C51ABEDBBAE8}" srcOrd="0" destOrd="0" presId="urn:microsoft.com/office/officeart/2005/8/layout/hierarchy1"/>
+    <dgm:cxn modelId="{629969CD-5D04-2A43-B3AF-FE8A98094A86}" type="presOf" srcId="{6C0275DE-9DFE-0E43-8DDA-D28DD222D71F}" destId="{8CFA3E84-678E-C345-8D46-63E85CF195E2}" srcOrd="0" destOrd="0" presId="urn:microsoft.com/office/officeart/2005/8/layout/hierarchy1"/>
+    <dgm:cxn modelId="{517E7342-1ED5-B24E-84A1-2A79CCE5BC2A}" type="presOf" srcId="{4D875376-E6B9-804F-AC85-A1D4337BBC8A}" destId="{0FEFC8CB-58CB-4A43-9867-EED6738F0C0F}" srcOrd="0" destOrd="0" presId="urn:microsoft.com/office/officeart/2005/8/layout/hierarchy1"/>
+    <dgm:cxn modelId="{0A19088C-A894-A349-B6F2-D0CA96CD47FA}" srcId="{960CE163-DF35-2B44-83E7-B9153BC66084}" destId="{1AD1EA1C-020E-5744-81BA-AEEC1A7A11F3}" srcOrd="2" destOrd="0" parTransId="{12CF4121-F3B4-5C45-B72F-C1FB37DD3C0D}" sibTransId="{E7356A86-2BC1-2844-87C1-0F4142A0BACE}"/>
+    <dgm:cxn modelId="{FB5948D5-A112-7E4F-A7A4-599731141072}" type="presOf" srcId="{E3372A67-8AD5-414E-9A1F-4D9E3CFF6332}" destId="{BA61A876-7050-3746-8DAE-0686A0FD0957}" srcOrd="0" destOrd="0" presId="urn:microsoft.com/office/officeart/2005/8/layout/hierarchy1"/>
+    <dgm:cxn modelId="{7B0EFE83-8F7C-2148-A812-1F8ACB477747}" type="presOf" srcId="{F9A1264F-2EB8-8148-8E8F-B74886C30473}" destId="{9541F663-17CE-1449-B545-4E9F3C558C3A}" srcOrd="0" destOrd="0" presId="urn:microsoft.com/office/officeart/2005/8/layout/hierarchy1"/>
+    <dgm:cxn modelId="{5125BE48-CBDA-9E46-A5EC-A00E5922E856}" type="presOf" srcId="{8C382D6E-A069-234E-96CC-A5A865E2BBBD}" destId="{C6BA431E-FA40-1D4E-A3D8-2A8BD37A2453}" srcOrd="0" destOrd="0" presId="urn:microsoft.com/office/officeart/2005/8/layout/hierarchy1"/>
     <dgm:cxn modelId="{8FC20289-4F63-9E49-BD79-567030E07E0D}" srcId="{960CE163-DF35-2B44-83E7-B9153BC66084}" destId="{4D875376-E6B9-804F-AC85-A1D4337BBC8A}" srcOrd="1" destOrd="0" parTransId="{6C0275DE-9DFE-0E43-8DDA-D28DD222D71F}" sibTransId="{5CBDE70F-8F73-B144-BE9A-D54839868342}"/>
-    <dgm:cxn modelId="{E7733746-4C87-234A-9D3E-4005D8B583BC}" srcId="{84B85FB8-CE49-454E-AFD0-26748DF588CB}" destId="{960CE163-DF35-2B44-83E7-B9153BC66084}" srcOrd="0" destOrd="0" parTransId="{15F9C8B3-0868-F148-A166-96327192876A}" sibTransId="{AE4D7356-6DD9-B04F-A5BC-257D53ADE85C}"/>
-    <dgm:cxn modelId="{89EEE784-3EED-8F43-8217-BBD1C237CA84}" type="presOf" srcId="{2CF1C699-9046-8C42-87E6-2861BF37D660}" destId="{9152FE1E-3F9F-1945-845B-196FD4FE9E7F}" srcOrd="0" destOrd="0" presId="urn:microsoft.com/office/officeart/2005/8/layout/hierarchy1"/>
-    <dgm:cxn modelId="{517E7342-1ED5-B24E-84A1-2A79CCE5BC2A}" type="presOf" srcId="{4D875376-E6B9-804F-AC85-A1D4337BBC8A}" destId="{0FEFC8CB-58CB-4A43-9867-EED6738F0C0F}" srcOrd="0" destOrd="0" presId="urn:microsoft.com/office/officeart/2005/8/layout/hierarchy1"/>
-    <dgm:cxn modelId="{FB5948D5-A112-7E4F-A7A4-599731141072}" type="presOf" srcId="{E3372A67-8AD5-414E-9A1F-4D9E3CFF6332}" destId="{BA61A876-7050-3746-8DAE-0686A0FD0957}" srcOrd="0" destOrd="0" presId="urn:microsoft.com/office/officeart/2005/8/layout/hierarchy1"/>
-    <dgm:cxn modelId="{BDB62AEF-004A-3E4A-BA04-15FFC883C6DC}" type="presOf" srcId="{1AD1EA1C-020E-5744-81BA-AEEC1A7A11F3}" destId="{D86CCABB-994E-2B44-9B36-549A167DC946}" srcOrd="0" destOrd="0" presId="urn:microsoft.com/office/officeart/2005/8/layout/hierarchy1"/>
-    <dgm:cxn modelId="{80E2C3F7-058F-1C40-8356-C15390BA6FDF}" type="presOf" srcId="{70F0D127-9705-B346-8456-2EA73B6E30CF}" destId="{201C7CC6-525A-FE42-B4FF-8C5914387024}" srcOrd="0" destOrd="0" presId="urn:microsoft.com/office/officeart/2005/8/layout/hierarchy1"/>
-    <dgm:cxn modelId="{FBC04F02-4804-8C4A-8D64-8D7E596D7783}" type="presOf" srcId="{AE7EA77A-1D8E-3F42-95E1-4EB11A443A81}" destId="{BBF408DD-FB71-6449-9993-DDA736E8D58A}" srcOrd="0" destOrd="0" presId="urn:microsoft.com/office/officeart/2005/8/layout/hierarchy1"/>
-    <dgm:cxn modelId="{F97734D8-6CBC-804D-B286-FA60DFC694E9}" type="presOf" srcId="{84B85FB8-CE49-454E-AFD0-26748DF588CB}" destId="{39E9CE6E-1476-7F49-AD48-00E9588CC1FC}" srcOrd="0" destOrd="0" presId="urn:microsoft.com/office/officeart/2005/8/layout/hierarchy1"/>
+    <dgm:cxn modelId="{4143E40A-3339-5746-9665-4720B7275017}" type="presOf" srcId="{4261D7F4-A7D0-3F49-B78A-20CFB380B683}" destId="{C2C1A37D-940A-6743-AC99-D92FAAA879A9}" srcOrd="0" destOrd="0" presId="urn:microsoft.com/office/officeart/2005/8/layout/hierarchy1"/>
     <dgm:cxn modelId="{DF469E1B-C306-5F4B-B680-7ACFEA169B9B}" type="presParOf" srcId="{39E9CE6E-1476-7F49-AD48-00E9588CC1FC}" destId="{AFBF1B26-876E-5B4F-868D-ECF533517B41}" srcOrd="0" destOrd="0" presId="urn:microsoft.com/office/officeart/2005/8/layout/hierarchy1"/>
     <dgm:cxn modelId="{9BD7EE58-09E0-D144-8D85-070D725F1603}" type="presParOf" srcId="{AFBF1B26-876E-5B4F-868D-ECF533517B41}" destId="{80FDFEA5-D276-C44B-902D-D2E8A937A02A}" srcOrd="0" destOrd="0" presId="urn:microsoft.com/office/officeart/2005/8/layout/hierarchy1"/>
     <dgm:cxn modelId="{8C3AC7B7-A647-D047-8BDB-5F00B4604513}" type="presParOf" srcId="{80FDFEA5-D276-C44B-902D-D2E8A937A02A}" destId="{DE9E6D4B-E798-AA47-81C3-1E545DF4DB5B}" srcOrd="0" destOrd="0" presId="urn:microsoft.com/office/officeart/2005/8/layout/hierarchy1"/>
@@ -12979,7 +12997,7 @@
           <a:p>
             <a:fld id="{6483C26A-63A4-F547-BB74-146C3D288EFD}" type="datetimeFigureOut">
               <a:rPr lang="en-US" smtClean="0"/>
-              <a:t>3/23/16</a:t>
+              <a:t>4/2/16</a:t>
             </a:fld>
             <a:endParaRPr lang="en-US"/>
           </a:p>
@@ -13149,7 +13167,7 @@
           <a:p>
             <a:fld id="{6483C26A-63A4-F547-BB74-146C3D288EFD}" type="datetimeFigureOut">
               <a:rPr lang="en-US" smtClean="0"/>
-              <a:t>3/23/16</a:t>
+              <a:t>4/2/16</a:t>
             </a:fld>
             <a:endParaRPr lang="en-US"/>
           </a:p>
@@ -13329,7 +13347,7 @@
           <a:p>
             <a:fld id="{6483C26A-63A4-F547-BB74-146C3D288EFD}" type="datetimeFigureOut">
               <a:rPr lang="en-US" smtClean="0"/>
-              <a:t>3/23/16</a:t>
+              <a:t>4/2/16</a:t>
             </a:fld>
             <a:endParaRPr lang="en-US"/>
           </a:p>
@@ -13499,7 +13517,7 @@
           <a:p>
             <a:fld id="{6483C26A-63A4-F547-BB74-146C3D288EFD}" type="datetimeFigureOut">
               <a:rPr lang="en-US" smtClean="0"/>
-              <a:t>3/23/16</a:t>
+              <a:t>4/2/16</a:t>
             </a:fld>
             <a:endParaRPr lang="en-US"/>
           </a:p>
@@ -13745,7 +13763,7 @@
           <a:p>
             <a:fld id="{6483C26A-63A4-F547-BB74-146C3D288EFD}" type="datetimeFigureOut">
               <a:rPr lang="en-US" smtClean="0"/>
-              <a:t>3/23/16</a:t>
+              <a:t>4/2/16</a:t>
             </a:fld>
             <a:endParaRPr lang="en-US"/>
           </a:p>
@@ -14033,7 +14051,7 @@
           <a:p>
             <a:fld id="{6483C26A-63A4-F547-BB74-146C3D288EFD}" type="datetimeFigureOut">
               <a:rPr lang="en-US" smtClean="0"/>
-              <a:t>3/23/16</a:t>
+              <a:t>4/2/16</a:t>
             </a:fld>
             <a:endParaRPr lang="en-US"/>
           </a:p>
@@ -14455,7 +14473,7 @@
           <a:p>
             <a:fld id="{6483C26A-63A4-F547-BB74-146C3D288EFD}" type="datetimeFigureOut">
               <a:rPr lang="en-US" smtClean="0"/>
-              <a:t>3/23/16</a:t>
+              <a:t>4/2/16</a:t>
             </a:fld>
             <a:endParaRPr lang="en-US"/>
           </a:p>
@@ -14573,7 +14591,7 @@
           <a:p>
             <a:fld id="{6483C26A-63A4-F547-BB74-146C3D288EFD}" type="datetimeFigureOut">
               <a:rPr lang="en-US" smtClean="0"/>
-              <a:t>3/23/16</a:t>
+              <a:t>4/2/16</a:t>
             </a:fld>
             <a:endParaRPr lang="en-US"/>
           </a:p>
@@ -14668,7 +14686,7 @@
           <a:p>
             <a:fld id="{6483C26A-63A4-F547-BB74-146C3D288EFD}" type="datetimeFigureOut">
               <a:rPr lang="en-US" smtClean="0"/>
-              <a:t>3/23/16</a:t>
+              <a:t>4/2/16</a:t>
             </a:fld>
             <a:endParaRPr lang="en-US"/>
           </a:p>
@@ -14945,7 +14963,7 @@
           <a:p>
             <a:fld id="{6483C26A-63A4-F547-BB74-146C3D288EFD}" type="datetimeFigureOut">
               <a:rPr lang="en-US" smtClean="0"/>
-              <a:t>3/23/16</a:t>
+              <a:t>4/2/16</a:t>
             </a:fld>
             <a:endParaRPr lang="en-US"/>
           </a:p>
@@ -15198,7 +15216,7 @@
           <a:p>
             <a:fld id="{6483C26A-63A4-F547-BB74-146C3D288EFD}" type="datetimeFigureOut">
               <a:rPr lang="en-US" smtClean="0"/>
-              <a:t>3/23/16</a:t>
+              <a:t>4/2/16</a:t>
             </a:fld>
             <a:endParaRPr lang="en-US"/>
           </a:p>
@@ -15411,7 +15429,7 @@
           <a:p>
             <a:fld id="{6483C26A-63A4-F547-BB74-146C3D288EFD}" type="datetimeFigureOut">
               <a:rPr lang="en-US" smtClean="0"/>
-              <a:t>3/23/16</a:t>
+              <a:t>4/2/16</a:t>
             </a:fld>
             <a:endParaRPr lang="en-US"/>
           </a:p>
@@ -23516,11 +23534,6 @@
               </a:rPr>
               <a:t> </a:t>
             </a:r>
-            <a:endParaRPr lang="en-US" dirty="0" smtClean="0">
-              <a:solidFill>
-                <a:srgbClr val="C0504D"/>
-              </a:solidFill>
-            </a:endParaRPr>
           </a:p>
           <a:p>
             <a:pPr marL="0" indent="0">
@@ -24370,11 +24383,6 @@
               </a:rPr>
               <a:t> </a:t>
             </a:r>
-            <a:endParaRPr lang="en-US" dirty="0" smtClean="0">
-              <a:solidFill>
-                <a:srgbClr val="C0504D"/>
-              </a:solidFill>
-            </a:endParaRPr>
           </a:p>
           <a:p>
             <a:pPr marL="0" indent="0">
@@ -25582,11 +25590,7 @@
             </a:r>
             <a:r>
               <a:rPr lang="en-US" smtClean="0"/>
-              <a:t>with </a:t>
-            </a:r>
-            <a:r>
-              <a:rPr lang="en-US" smtClean="0"/>
-              <a:t>care</a:t>
+              <a:t>with care</a:t>
             </a:r>
             <a:endParaRPr lang="en-US" dirty="0" smtClean="0"/>
           </a:p>
@@ -25596,6 +25600,1170 @@
     <p:extLst>
       <p:ext uri="{BB962C8B-B14F-4D97-AF65-F5344CB8AC3E}">
         <p14:creationId xmlns:p14="http://schemas.microsoft.com/office/powerpoint/2010/main" val="2576117139"/>
+      </p:ext>
+    </p:extLst>
+  </p:cSld>
+  <p:clrMapOvr>
+    <a:masterClrMapping/>
+  </p:clrMapOvr>
+</p:sld>
+</file>
+
+<file path=ppt/slides/slide126.xml><?xml version="1.0" encoding="utf-8"?>
+<p:sld xmlns:a="http://schemas.openxmlformats.org/drawingml/2006/main" xmlns:r="http://schemas.openxmlformats.org/officeDocument/2006/relationships" xmlns:p="http://schemas.openxmlformats.org/presentationml/2006/main">
+  <p:cSld>
+    <p:spTree>
+      <p:nvGrpSpPr>
+        <p:cNvPr id="1" name=""/>
+        <p:cNvGrpSpPr/>
+        <p:nvPr/>
+      </p:nvGrpSpPr>
+      <p:grpSpPr>
+        <a:xfrm>
+          <a:off x="0" y="0"/>
+          <a:ext cx="0" cy="0"/>
+          <a:chOff x="0" y="0"/>
+          <a:chExt cx="0" cy="0"/>
+        </a:xfrm>
+      </p:grpSpPr>
+      <p:sp>
+        <p:nvSpPr>
+          <p:cNvPr id="2" name="Title 1"/>
+          <p:cNvSpPr>
+            <a:spLocks noGrp="1"/>
+          </p:cNvSpPr>
+          <p:nvPr>
+            <p:ph type="ctrTitle"/>
+          </p:nvPr>
+        </p:nvSpPr>
+        <p:spPr/>
+        <p:txBody>
+          <a:bodyPr/>
+          <a:lstStyle/>
+          <a:p>
+            <a:r>
+              <a:rPr lang="en-US" dirty="0" smtClean="0"/>
+              <a:t>Chapter 5 – JavaScript</a:t>
+            </a:r>
+            <a:endParaRPr lang="en-US" dirty="0"/>
+          </a:p>
+        </p:txBody>
+      </p:sp>
+      <p:sp>
+        <p:nvSpPr>
+          <p:cNvPr id="3" name="Subtitle 2"/>
+          <p:cNvSpPr>
+            <a:spLocks noGrp="1"/>
+          </p:cNvSpPr>
+          <p:nvPr>
+            <p:ph type="subTitle" idx="1"/>
+          </p:nvPr>
+        </p:nvSpPr>
+        <p:spPr/>
+        <p:txBody>
+          <a:bodyPr/>
+          <a:lstStyle/>
+          <a:p>
+            <a:r>
+              <a:rPr lang="en-US" dirty="0" smtClean="0"/>
+              <a:t>#42 – Section 18</a:t>
+            </a:r>
+            <a:endParaRPr lang="en-US" dirty="0"/>
+          </a:p>
+          <a:p>
+            <a:r>
+              <a:rPr lang="en-US" dirty="0" smtClean="0"/>
+              <a:t>Control Flow: For and While Loops</a:t>
+            </a:r>
+          </a:p>
+        </p:txBody>
+      </p:sp>
+    </p:spTree>
+    <p:extLst>
+      <p:ext uri="{BB962C8B-B14F-4D97-AF65-F5344CB8AC3E}">
+        <p14:creationId xmlns:p14="http://schemas.microsoft.com/office/powerpoint/2010/main" val="3214490886"/>
+      </p:ext>
+    </p:extLst>
+  </p:cSld>
+  <p:clrMapOvr>
+    <a:masterClrMapping/>
+  </p:clrMapOvr>
+  <p:timing>
+    <p:tnLst>
+      <p:par>
+        <p:cTn xmlns:p14="http://schemas.microsoft.com/office/powerpoint/2010/main" id="1" dur="indefinite" restart="never" nodeType="tmRoot"/>
+      </p:par>
+    </p:tnLst>
+  </p:timing>
+</p:sld>
+</file>
+
+<file path=ppt/slides/slide127.xml><?xml version="1.0" encoding="utf-8"?>
+<p:sld xmlns:a="http://schemas.openxmlformats.org/drawingml/2006/main" xmlns:r="http://schemas.openxmlformats.org/officeDocument/2006/relationships" xmlns:p="http://schemas.openxmlformats.org/presentationml/2006/main">
+  <p:cSld>
+    <p:spTree>
+      <p:nvGrpSpPr>
+        <p:cNvPr id="1" name=""/>
+        <p:cNvGrpSpPr/>
+        <p:nvPr/>
+      </p:nvGrpSpPr>
+      <p:grpSpPr>
+        <a:xfrm>
+          <a:off x="0" y="0"/>
+          <a:ext cx="0" cy="0"/>
+          <a:chOff x="0" y="0"/>
+          <a:chExt cx="0" cy="0"/>
+        </a:xfrm>
+      </p:grpSpPr>
+      <p:sp>
+        <p:nvSpPr>
+          <p:cNvPr id="2" name="Title 1"/>
+          <p:cNvSpPr>
+            <a:spLocks noGrp="1"/>
+          </p:cNvSpPr>
+          <p:nvPr>
+            <p:ph type="title"/>
+          </p:nvPr>
+        </p:nvSpPr>
+        <p:spPr/>
+        <p:txBody>
+          <a:bodyPr/>
+          <a:lstStyle/>
+          <a:p>
+            <a:r>
+              <a:rPr lang="en-US" dirty="0" smtClean="0"/>
+              <a:t>Repeat/Loop</a:t>
+            </a:r>
+            <a:endParaRPr lang="en-US" dirty="0"/>
+          </a:p>
+        </p:txBody>
+      </p:sp>
+      <p:sp>
+        <p:nvSpPr>
+          <p:cNvPr id="5" name="Rectangle 4"/>
+          <p:cNvSpPr/>
+          <p:nvPr/>
+        </p:nvSpPr>
+        <p:spPr>
+          <a:xfrm>
+            <a:off x="3797056" y="2313074"/>
+            <a:ext cx="1563077" cy="227949"/>
+          </a:xfrm>
+          <a:prstGeom prst="rect">
+            <a:avLst/>
+          </a:prstGeom>
+        </p:spPr>
+        <p:style>
+          <a:lnRef idx="1">
+            <a:schemeClr val="dk1"/>
+          </a:lnRef>
+          <a:fillRef idx="2">
+            <a:schemeClr val="dk1"/>
+          </a:fillRef>
+          <a:effectRef idx="1">
+            <a:schemeClr val="dk1"/>
+          </a:effectRef>
+          <a:fontRef idx="minor">
+            <a:schemeClr val="dk1"/>
+          </a:fontRef>
+        </p:style>
+        <p:txBody>
+          <a:bodyPr rtlCol="0" anchor="ctr"/>
+          <a:lstStyle/>
+          <a:p>
+            <a:pPr algn="ctr"/>
+            <a:r>
+              <a:rPr lang="en-US" sz="1600" dirty="0" smtClean="0"/>
+              <a:t>Statement 1</a:t>
+            </a:r>
+            <a:endParaRPr lang="en-US" sz="1600" dirty="0"/>
+          </a:p>
+        </p:txBody>
+      </p:sp>
+      <p:sp>
+        <p:nvSpPr>
+          <p:cNvPr id="6" name="Rectangle 5"/>
+          <p:cNvSpPr/>
+          <p:nvPr/>
+        </p:nvSpPr>
+        <p:spPr>
+          <a:xfrm>
+            <a:off x="3797056" y="3273156"/>
+            <a:ext cx="1563077" cy="227949"/>
+          </a:xfrm>
+          <a:prstGeom prst="rect">
+            <a:avLst/>
+          </a:prstGeom>
+        </p:spPr>
+        <p:style>
+          <a:lnRef idx="1">
+            <a:schemeClr val="accent2"/>
+          </a:lnRef>
+          <a:fillRef idx="2">
+            <a:schemeClr val="accent2"/>
+          </a:fillRef>
+          <a:effectRef idx="1">
+            <a:schemeClr val="accent2"/>
+          </a:effectRef>
+          <a:fontRef idx="minor">
+            <a:schemeClr val="dk1"/>
+          </a:fontRef>
+        </p:style>
+        <p:txBody>
+          <a:bodyPr rtlCol="0" anchor="ctr"/>
+          <a:lstStyle/>
+          <a:p>
+            <a:pPr algn="ctr"/>
+            <a:r>
+              <a:rPr lang="en-US" sz="1600" dirty="0" smtClean="0"/>
+              <a:t>Statement </a:t>
+            </a:r>
+            <a:r>
+              <a:rPr lang="is-IS" sz="1600" dirty="0" smtClean="0"/>
+              <a:t>…</a:t>
+            </a:r>
+            <a:endParaRPr lang="en-US" sz="1600" dirty="0"/>
+          </a:p>
+        </p:txBody>
+      </p:sp>
+      <p:sp>
+        <p:nvSpPr>
+          <p:cNvPr id="8" name="Rectangle 7"/>
+          <p:cNvSpPr/>
+          <p:nvPr/>
+        </p:nvSpPr>
+        <p:spPr>
+          <a:xfrm>
+            <a:off x="3797056" y="3952594"/>
+            <a:ext cx="1563077" cy="227949"/>
+          </a:xfrm>
+          <a:prstGeom prst="rect">
+            <a:avLst/>
+          </a:prstGeom>
+        </p:spPr>
+        <p:style>
+          <a:lnRef idx="1">
+            <a:schemeClr val="dk1"/>
+          </a:lnRef>
+          <a:fillRef idx="2">
+            <a:schemeClr val="dk1"/>
+          </a:fillRef>
+          <a:effectRef idx="1">
+            <a:schemeClr val="dk1"/>
+          </a:effectRef>
+          <a:fontRef idx="minor">
+            <a:schemeClr val="dk1"/>
+          </a:fontRef>
+        </p:style>
+        <p:txBody>
+          <a:bodyPr rtlCol="0" anchor="ctr"/>
+          <a:lstStyle/>
+          <a:p>
+            <a:pPr algn="ctr"/>
+            <a:r>
+              <a:rPr lang="en-US" sz="1600" dirty="0" smtClean="0"/>
+              <a:t>Statement </a:t>
+            </a:r>
+            <a:r>
+              <a:rPr lang="is-IS" sz="1600" dirty="0" smtClean="0"/>
+              <a:t>…</a:t>
+            </a:r>
+            <a:endParaRPr lang="en-US" sz="1600" dirty="0"/>
+          </a:p>
+        </p:txBody>
+      </p:sp>
+      <p:sp>
+        <p:nvSpPr>
+          <p:cNvPr id="9" name="Rectangle 8"/>
+          <p:cNvSpPr/>
+          <p:nvPr/>
+        </p:nvSpPr>
+        <p:spPr>
+          <a:xfrm>
+            <a:off x="3797056" y="4451849"/>
+            <a:ext cx="1563077" cy="227949"/>
+          </a:xfrm>
+          <a:prstGeom prst="rect">
+            <a:avLst/>
+          </a:prstGeom>
+        </p:spPr>
+        <p:style>
+          <a:lnRef idx="1">
+            <a:schemeClr val="dk1"/>
+          </a:lnRef>
+          <a:fillRef idx="2">
+            <a:schemeClr val="dk1"/>
+          </a:fillRef>
+          <a:effectRef idx="1">
+            <a:schemeClr val="dk1"/>
+          </a:effectRef>
+          <a:fontRef idx="minor">
+            <a:schemeClr val="dk1"/>
+          </a:fontRef>
+        </p:style>
+        <p:txBody>
+          <a:bodyPr rtlCol="0" anchor="ctr"/>
+          <a:lstStyle/>
+          <a:p>
+            <a:pPr algn="ctr"/>
+            <a:r>
+              <a:rPr lang="en-US" sz="1600" dirty="0" smtClean="0"/>
+              <a:t>Statement N</a:t>
+            </a:r>
+            <a:endParaRPr lang="en-US" sz="1600" dirty="0"/>
+          </a:p>
+        </p:txBody>
+      </p:sp>
+      <p:sp>
+        <p:nvSpPr>
+          <p:cNvPr id="10" name="Rectangle 9"/>
+          <p:cNvSpPr/>
+          <p:nvPr/>
+        </p:nvSpPr>
+        <p:spPr>
+          <a:xfrm>
+            <a:off x="3797056" y="4951104"/>
+            <a:ext cx="1563077" cy="227949"/>
+          </a:xfrm>
+          <a:prstGeom prst="rect">
+            <a:avLst/>
+          </a:prstGeom>
+        </p:spPr>
+        <p:style>
+          <a:lnRef idx="3">
+            <a:schemeClr val="lt1"/>
+          </a:lnRef>
+          <a:fillRef idx="1">
+            <a:schemeClr val="accent1"/>
+          </a:fillRef>
+          <a:effectRef idx="1">
+            <a:schemeClr val="accent1"/>
+          </a:effectRef>
+          <a:fontRef idx="minor">
+            <a:schemeClr val="lt1"/>
+          </a:fontRef>
+        </p:style>
+        <p:txBody>
+          <a:bodyPr rtlCol="0" anchor="ctr"/>
+          <a:lstStyle/>
+          <a:p>
+            <a:pPr algn="ctr"/>
+            <a:r>
+              <a:rPr lang="en-US" sz="1600" dirty="0" smtClean="0"/>
+              <a:t>End</a:t>
+            </a:r>
+            <a:endParaRPr lang="en-US" sz="1600" dirty="0"/>
+          </a:p>
+        </p:txBody>
+      </p:sp>
+      <p:sp>
+        <p:nvSpPr>
+          <p:cNvPr id="11" name="Rectangle 10"/>
+          <p:cNvSpPr/>
+          <p:nvPr/>
+        </p:nvSpPr>
+        <p:spPr>
+          <a:xfrm>
+            <a:off x="3797056" y="1813819"/>
+            <a:ext cx="1563077" cy="227949"/>
+          </a:xfrm>
+          <a:prstGeom prst="rect">
+            <a:avLst/>
+          </a:prstGeom>
+        </p:spPr>
+        <p:style>
+          <a:lnRef idx="3">
+            <a:schemeClr val="lt1"/>
+          </a:lnRef>
+          <a:fillRef idx="1">
+            <a:schemeClr val="accent1"/>
+          </a:fillRef>
+          <a:effectRef idx="1">
+            <a:schemeClr val="accent1"/>
+          </a:effectRef>
+          <a:fontRef idx="minor">
+            <a:schemeClr val="lt1"/>
+          </a:fontRef>
+        </p:style>
+        <p:txBody>
+          <a:bodyPr rtlCol="0" anchor="ctr"/>
+          <a:lstStyle/>
+          <a:p>
+            <a:pPr algn="ctr"/>
+            <a:r>
+              <a:rPr lang="en-US" sz="1600" dirty="0" smtClean="0"/>
+              <a:t>Start</a:t>
+            </a:r>
+            <a:endParaRPr lang="en-US" sz="1600" dirty="0"/>
+          </a:p>
+        </p:txBody>
+      </p:sp>
+      <p:sp>
+        <p:nvSpPr>
+          <p:cNvPr id="16" name="Decision 15"/>
+          <p:cNvSpPr/>
+          <p:nvPr/>
+        </p:nvSpPr>
+        <p:spPr>
+          <a:xfrm>
+            <a:off x="4415774" y="2812329"/>
+            <a:ext cx="325641" cy="189521"/>
+          </a:xfrm>
+          <a:prstGeom prst="flowChartDecision">
+            <a:avLst/>
+          </a:prstGeom>
+        </p:spPr>
+        <p:style>
+          <a:lnRef idx="1">
+            <a:schemeClr val="accent1"/>
+          </a:lnRef>
+          <a:fillRef idx="3">
+            <a:schemeClr val="accent1"/>
+          </a:fillRef>
+          <a:effectRef idx="2">
+            <a:schemeClr val="accent1"/>
+          </a:effectRef>
+          <a:fontRef idx="minor">
+            <a:schemeClr val="lt1"/>
+          </a:fontRef>
+        </p:style>
+        <p:txBody>
+          <a:bodyPr rtlCol="0" anchor="ctr"/>
+          <a:lstStyle/>
+          <a:p>
+            <a:pPr algn="ctr"/>
+            <a:endParaRPr lang="en-US"/>
+          </a:p>
+        </p:txBody>
+      </p:sp>
+      <p:cxnSp>
+        <p:nvCxnSpPr>
+          <p:cNvPr id="26" name="Straight Arrow Connector 25"/>
+          <p:cNvCxnSpPr>
+            <a:stCxn id="5" idx="2"/>
+            <a:endCxn id="16" idx="0"/>
+          </p:cNvCxnSpPr>
+          <p:nvPr/>
+        </p:nvCxnSpPr>
+        <p:spPr>
+          <a:xfrm>
+            <a:off x="4578595" y="2541023"/>
+            <a:ext cx="0" cy="271306"/>
+          </a:xfrm>
+          <a:prstGeom prst="straightConnector1">
+            <a:avLst/>
+          </a:prstGeom>
+          <a:ln>
+            <a:tailEnd type="arrow"/>
+          </a:ln>
+        </p:spPr>
+        <p:style>
+          <a:lnRef idx="2">
+            <a:schemeClr val="accent1"/>
+          </a:lnRef>
+          <a:fillRef idx="0">
+            <a:schemeClr val="accent1"/>
+          </a:fillRef>
+          <a:effectRef idx="1">
+            <a:schemeClr val="accent1"/>
+          </a:effectRef>
+          <a:fontRef idx="minor">
+            <a:schemeClr val="tx1"/>
+          </a:fontRef>
+        </p:style>
+      </p:cxnSp>
+      <p:cxnSp>
+        <p:nvCxnSpPr>
+          <p:cNvPr id="33" name="Elbow Connector 32"/>
+          <p:cNvCxnSpPr>
+            <a:stCxn id="6" idx="2"/>
+            <a:endCxn id="16" idx="1"/>
+          </p:cNvCxnSpPr>
+          <p:nvPr/>
+        </p:nvCxnSpPr>
+        <p:spPr>
+          <a:xfrm rot="5400000" flipH="1">
+            <a:off x="4200177" y="3122688"/>
+            <a:ext cx="594015" cy="162821"/>
+          </a:xfrm>
+          <a:prstGeom prst="bentConnector4">
+            <a:avLst>
+              <a:gd name="adj1" fmla="val -38484"/>
+              <a:gd name="adj2" fmla="val 620398"/>
+            </a:avLst>
+          </a:prstGeom>
+          <a:ln>
+            <a:solidFill>
+              <a:srgbClr val="800000"/>
+            </a:solidFill>
+            <a:tailEnd type="arrow"/>
+          </a:ln>
+        </p:spPr>
+        <p:style>
+          <a:lnRef idx="2">
+            <a:schemeClr val="accent1"/>
+          </a:lnRef>
+          <a:fillRef idx="0">
+            <a:schemeClr val="accent1"/>
+          </a:fillRef>
+          <a:effectRef idx="1">
+            <a:schemeClr val="accent1"/>
+          </a:effectRef>
+          <a:fontRef idx="minor">
+            <a:schemeClr val="tx1"/>
+          </a:fontRef>
+        </p:style>
+      </p:cxnSp>
+      <p:cxnSp>
+        <p:nvCxnSpPr>
+          <p:cNvPr id="35" name="Elbow Connector 34"/>
+          <p:cNvCxnSpPr>
+            <a:stCxn id="6" idx="2"/>
+            <a:endCxn id="8" idx="0"/>
+          </p:cNvCxnSpPr>
+          <p:nvPr/>
+        </p:nvCxnSpPr>
+        <p:spPr>
+          <a:xfrm rot="5400000">
+            <a:off x="4352851" y="3726849"/>
+            <a:ext cx="451489" cy="12700"/>
+          </a:xfrm>
+          <a:prstGeom prst="bentConnector3">
+            <a:avLst>
+              <a:gd name="adj1" fmla="val 50000"/>
+            </a:avLst>
+          </a:prstGeom>
+          <a:ln>
+            <a:tailEnd type="arrow"/>
+          </a:ln>
+        </p:spPr>
+        <p:style>
+          <a:lnRef idx="2">
+            <a:schemeClr val="accent1"/>
+          </a:lnRef>
+          <a:fillRef idx="0">
+            <a:schemeClr val="accent1"/>
+          </a:fillRef>
+          <a:effectRef idx="1">
+            <a:schemeClr val="accent1"/>
+          </a:effectRef>
+          <a:fontRef idx="minor">
+            <a:schemeClr val="tx1"/>
+          </a:fontRef>
+        </p:style>
+      </p:cxnSp>
+      <p:cxnSp>
+        <p:nvCxnSpPr>
+          <p:cNvPr id="42" name="Straight Arrow Connector 41"/>
+          <p:cNvCxnSpPr>
+            <a:stCxn id="11" idx="2"/>
+            <a:endCxn id="5" idx="0"/>
+          </p:cNvCxnSpPr>
+          <p:nvPr/>
+        </p:nvCxnSpPr>
+        <p:spPr>
+          <a:xfrm>
+            <a:off x="4578595" y="2041768"/>
+            <a:ext cx="0" cy="271306"/>
+          </a:xfrm>
+          <a:prstGeom prst="straightConnector1">
+            <a:avLst/>
+          </a:prstGeom>
+          <a:ln>
+            <a:tailEnd type="arrow"/>
+          </a:ln>
+        </p:spPr>
+        <p:style>
+          <a:lnRef idx="2">
+            <a:schemeClr val="accent1"/>
+          </a:lnRef>
+          <a:fillRef idx="0">
+            <a:schemeClr val="accent1"/>
+          </a:fillRef>
+          <a:effectRef idx="1">
+            <a:schemeClr val="accent1"/>
+          </a:effectRef>
+          <a:fontRef idx="minor">
+            <a:schemeClr val="tx1"/>
+          </a:fontRef>
+        </p:style>
+      </p:cxnSp>
+      <p:cxnSp>
+        <p:nvCxnSpPr>
+          <p:cNvPr id="43" name="Straight Arrow Connector 42"/>
+          <p:cNvCxnSpPr>
+            <a:stCxn id="8" idx="2"/>
+            <a:endCxn id="9" idx="0"/>
+          </p:cNvCxnSpPr>
+          <p:nvPr/>
+        </p:nvCxnSpPr>
+        <p:spPr>
+          <a:xfrm>
+            <a:off x="4578595" y="4180543"/>
+            <a:ext cx="0" cy="271306"/>
+          </a:xfrm>
+          <a:prstGeom prst="straightConnector1">
+            <a:avLst/>
+          </a:prstGeom>
+          <a:ln>
+            <a:tailEnd type="arrow"/>
+          </a:ln>
+        </p:spPr>
+        <p:style>
+          <a:lnRef idx="2">
+            <a:schemeClr val="accent1"/>
+          </a:lnRef>
+          <a:fillRef idx="0">
+            <a:schemeClr val="accent1"/>
+          </a:fillRef>
+          <a:effectRef idx="1">
+            <a:schemeClr val="accent1"/>
+          </a:effectRef>
+          <a:fontRef idx="minor">
+            <a:schemeClr val="tx1"/>
+          </a:fontRef>
+        </p:style>
+      </p:cxnSp>
+      <p:cxnSp>
+        <p:nvCxnSpPr>
+          <p:cNvPr id="46" name="Straight Arrow Connector 45"/>
+          <p:cNvCxnSpPr>
+            <a:stCxn id="9" idx="2"/>
+            <a:endCxn id="10" idx="0"/>
+          </p:cNvCxnSpPr>
+          <p:nvPr/>
+        </p:nvCxnSpPr>
+        <p:spPr>
+          <a:xfrm>
+            <a:off x="4578595" y="4679798"/>
+            <a:ext cx="0" cy="271306"/>
+          </a:xfrm>
+          <a:prstGeom prst="straightConnector1">
+            <a:avLst/>
+          </a:prstGeom>
+          <a:ln>
+            <a:tailEnd type="arrow"/>
+          </a:ln>
+        </p:spPr>
+        <p:style>
+          <a:lnRef idx="2">
+            <a:schemeClr val="accent1"/>
+          </a:lnRef>
+          <a:fillRef idx="0">
+            <a:schemeClr val="accent1"/>
+          </a:fillRef>
+          <a:effectRef idx="1">
+            <a:schemeClr val="accent1"/>
+          </a:effectRef>
+          <a:fontRef idx="minor">
+            <a:schemeClr val="tx1"/>
+          </a:fontRef>
+        </p:style>
+      </p:cxnSp>
+      <p:cxnSp>
+        <p:nvCxnSpPr>
+          <p:cNvPr id="55" name="Elbow Connector 54"/>
+          <p:cNvCxnSpPr>
+            <a:stCxn id="16" idx="2"/>
+            <a:endCxn id="6" idx="0"/>
+          </p:cNvCxnSpPr>
+          <p:nvPr/>
+        </p:nvCxnSpPr>
+        <p:spPr>
+          <a:xfrm rot="5400000">
+            <a:off x="4442942" y="3137503"/>
+            <a:ext cx="271306" cy="12700"/>
+          </a:xfrm>
+          <a:prstGeom prst="bentConnector3">
+            <a:avLst/>
+          </a:prstGeom>
+          <a:ln>
+            <a:solidFill>
+              <a:schemeClr val="tx2">
+                <a:lumMod val="60000"/>
+                <a:lumOff val="40000"/>
+              </a:schemeClr>
+            </a:solidFill>
+            <a:tailEnd type="arrow"/>
+          </a:ln>
+        </p:spPr>
+        <p:style>
+          <a:lnRef idx="2">
+            <a:schemeClr val="accent1"/>
+          </a:lnRef>
+          <a:fillRef idx="0">
+            <a:schemeClr val="accent1"/>
+          </a:fillRef>
+          <a:effectRef idx="1">
+            <a:schemeClr val="accent1"/>
+          </a:effectRef>
+          <a:fontRef idx="minor">
+            <a:schemeClr val="tx1"/>
+          </a:fontRef>
+        </p:style>
+      </p:cxnSp>
+      <p:cxnSp>
+        <p:nvCxnSpPr>
+          <p:cNvPr id="59" name="Elbow Connector 58"/>
+          <p:cNvCxnSpPr>
+            <a:stCxn id="16" idx="3"/>
+            <a:endCxn id="8" idx="3"/>
+          </p:cNvCxnSpPr>
+          <p:nvPr/>
+        </p:nvCxnSpPr>
+        <p:spPr>
+          <a:xfrm>
+            <a:off x="4741415" y="2907090"/>
+            <a:ext cx="618718" cy="1159479"/>
+          </a:xfrm>
+          <a:prstGeom prst="bentConnector3">
+            <a:avLst>
+              <a:gd name="adj1" fmla="val 136947"/>
+            </a:avLst>
+          </a:prstGeom>
+          <a:ln>
+            <a:solidFill>
+              <a:srgbClr val="008000"/>
+            </a:solidFill>
+            <a:tailEnd type="arrow"/>
+          </a:ln>
+        </p:spPr>
+        <p:style>
+          <a:lnRef idx="2">
+            <a:schemeClr val="accent1"/>
+          </a:lnRef>
+          <a:fillRef idx="0">
+            <a:schemeClr val="accent1"/>
+          </a:fillRef>
+          <a:effectRef idx="1">
+            <a:schemeClr val="accent1"/>
+          </a:effectRef>
+          <a:fontRef idx="minor">
+            <a:schemeClr val="tx1"/>
+          </a:fontRef>
+        </p:style>
+      </p:cxnSp>
+    </p:spTree>
+    <p:extLst>
+      <p:ext uri="{BB962C8B-B14F-4D97-AF65-F5344CB8AC3E}">
+        <p14:creationId xmlns:p14="http://schemas.microsoft.com/office/powerpoint/2010/main" val="2769776558"/>
+      </p:ext>
+    </p:extLst>
+  </p:cSld>
+  <p:clrMapOvr>
+    <a:masterClrMapping/>
+  </p:clrMapOvr>
+</p:sld>
+</file>
+
+<file path=ppt/slides/slide128.xml><?xml version="1.0" encoding="utf-8"?>
+<p:sld xmlns:a="http://schemas.openxmlformats.org/drawingml/2006/main" xmlns:r="http://schemas.openxmlformats.org/officeDocument/2006/relationships" xmlns:p="http://schemas.openxmlformats.org/presentationml/2006/main">
+  <p:cSld>
+    <p:spTree>
+      <p:nvGrpSpPr>
+        <p:cNvPr id="1" name=""/>
+        <p:cNvGrpSpPr/>
+        <p:nvPr/>
+      </p:nvGrpSpPr>
+      <p:grpSpPr>
+        <a:xfrm>
+          <a:off x="0" y="0"/>
+          <a:ext cx="0" cy="0"/>
+          <a:chOff x="0" y="0"/>
+          <a:chExt cx="0" cy="0"/>
+        </a:xfrm>
+      </p:grpSpPr>
+      <p:sp>
+        <p:nvSpPr>
+          <p:cNvPr id="2" name="Title 1"/>
+          <p:cNvSpPr>
+            <a:spLocks noGrp="1"/>
+          </p:cNvSpPr>
+          <p:nvPr>
+            <p:ph type="title"/>
+          </p:nvPr>
+        </p:nvSpPr>
+        <p:spPr/>
+        <p:txBody>
+          <a:bodyPr/>
+          <a:lstStyle/>
+          <a:p>
+            <a:r>
+              <a:rPr lang="en-US" dirty="0" smtClean="0"/>
+              <a:t>Topics</a:t>
+            </a:r>
+            <a:endParaRPr lang="en-US" dirty="0"/>
+          </a:p>
+        </p:txBody>
+      </p:sp>
+      <p:sp>
+        <p:nvSpPr>
+          <p:cNvPr id="3" name="Content Placeholder 2"/>
+          <p:cNvSpPr>
+            <a:spLocks noGrp="1"/>
+          </p:cNvSpPr>
+          <p:nvPr>
+            <p:ph idx="1"/>
+          </p:nvPr>
+        </p:nvSpPr>
+        <p:spPr/>
+        <p:txBody>
+          <a:bodyPr>
+            <a:normAutofit/>
+          </a:bodyPr>
+          <a:lstStyle/>
+          <a:p>
+            <a:pPr marL="514350" indent="-514350">
+              <a:buFont typeface="+mj-lt"/>
+              <a:buAutoNum type="arabicPeriod"/>
+            </a:pPr>
+            <a:r>
+              <a:rPr lang="en-US" dirty="0" smtClean="0"/>
+              <a:t>The ‘while’ </a:t>
+            </a:r>
+            <a:r>
+              <a:rPr lang="en-US" dirty="0"/>
+              <a:t>Loop Statement</a:t>
+            </a:r>
+          </a:p>
+          <a:p>
+            <a:pPr marL="514350" indent="-514350">
+              <a:buFont typeface="+mj-lt"/>
+              <a:buAutoNum type="arabicPeriod"/>
+            </a:pPr>
+            <a:r>
+              <a:rPr lang="en-US" dirty="0"/>
+              <a:t>The </a:t>
+            </a:r>
+            <a:r>
+              <a:rPr lang="en-US" dirty="0" smtClean="0"/>
+              <a:t>‘for’ </a:t>
+            </a:r>
+            <a:r>
+              <a:rPr lang="en-US" dirty="0"/>
+              <a:t>Loop Statement</a:t>
+            </a:r>
+          </a:p>
+          <a:p>
+            <a:pPr marL="514350" indent="-514350">
+              <a:buFont typeface="+mj-lt"/>
+              <a:buAutoNum type="arabicPeriod"/>
+            </a:pPr>
+            <a:endParaRPr lang="en-US" dirty="0" smtClean="0"/>
+          </a:p>
+        </p:txBody>
+      </p:sp>
+    </p:spTree>
+    <p:extLst>
+      <p:ext uri="{BB962C8B-B14F-4D97-AF65-F5344CB8AC3E}">
+        <p14:creationId xmlns:p14="http://schemas.microsoft.com/office/powerpoint/2010/main" val="355014664"/>
+      </p:ext>
+    </p:extLst>
+  </p:cSld>
+  <p:clrMapOvr>
+    <a:masterClrMapping/>
+  </p:clrMapOvr>
+</p:sld>
+</file>
+
+<file path=ppt/slides/slide129.xml><?xml version="1.0" encoding="utf-8"?>
+<p:sld xmlns:a="http://schemas.openxmlformats.org/drawingml/2006/main" xmlns:r="http://schemas.openxmlformats.org/officeDocument/2006/relationships" xmlns:p="http://schemas.openxmlformats.org/presentationml/2006/main">
+  <p:cSld>
+    <p:spTree>
+      <p:nvGrpSpPr>
+        <p:cNvPr id="1" name=""/>
+        <p:cNvGrpSpPr/>
+        <p:nvPr/>
+      </p:nvGrpSpPr>
+      <p:grpSpPr>
+        <a:xfrm>
+          <a:off x="0" y="0"/>
+          <a:ext cx="0" cy="0"/>
+          <a:chOff x="0" y="0"/>
+          <a:chExt cx="0" cy="0"/>
+        </a:xfrm>
+      </p:grpSpPr>
+      <p:sp>
+        <p:nvSpPr>
+          <p:cNvPr id="2" name="Title 1"/>
+          <p:cNvSpPr>
+            <a:spLocks noGrp="1"/>
+          </p:cNvSpPr>
+          <p:nvPr>
+            <p:ph type="title"/>
+          </p:nvPr>
+        </p:nvSpPr>
+        <p:spPr/>
+        <p:txBody>
+          <a:bodyPr/>
+          <a:lstStyle/>
+          <a:p>
+            <a:r>
+              <a:rPr lang="en-US" dirty="0"/>
+              <a:t>The </a:t>
+            </a:r>
+            <a:r>
+              <a:rPr lang="en-US" dirty="0" smtClean="0"/>
+              <a:t>‘while’ </a:t>
+            </a:r>
+            <a:r>
+              <a:rPr lang="en-US" dirty="0"/>
+              <a:t>Statement</a:t>
+            </a:r>
+          </a:p>
+        </p:txBody>
+      </p:sp>
+      <p:sp>
+        <p:nvSpPr>
+          <p:cNvPr id="3" name="Content Placeholder 2"/>
+          <p:cNvSpPr>
+            <a:spLocks noGrp="1"/>
+          </p:cNvSpPr>
+          <p:nvPr>
+            <p:ph idx="1"/>
+          </p:nvPr>
+        </p:nvSpPr>
+        <p:spPr/>
+        <p:txBody>
+          <a:bodyPr>
+            <a:normAutofit fontScale="92500" lnSpcReduction="20000"/>
+          </a:bodyPr>
+          <a:lstStyle/>
+          <a:p>
+            <a:r>
+              <a:rPr lang="en-US" dirty="0" smtClean="0"/>
+              <a:t>Formal syntax:</a:t>
+            </a:r>
+          </a:p>
+          <a:p>
+            <a:pPr marL="0" indent="0">
+              <a:buNone/>
+            </a:pPr>
+            <a:r>
+              <a:rPr lang="en-US" dirty="0"/>
+              <a:t>	</a:t>
+            </a:r>
+            <a:r>
+              <a:rPr lang="en-US" i="1" dirty="0" smtClean="0">
+                <a:solidFill>
+                  <a:srgbClr val="0000FF"/>
+                </a:solidFill>
+              </a:rPr>
+              <a:t>while</a:t>
+            </a:r>
+            <a:r>
+              <a:rPr lang="en-US" dirty="0" smtClean="0">
+                <a:solidFill>
+                  <a:srgbClr val="000000"/>
+                </a:solidFill>
+              </a:rPr>
+              <a:t>(</a:t>
+            </a:r>
+            <a:r>
+              <a:rPr lang="en-US" i="1" dirty="0" smtClean="0">
+                <a:solidFill>
+                  <a:srgbClr val="C0504D"/>
+                </a:solidFill>
+              </a:rPr>
+              <a:t>condition</a:t>
+            </a:r>
+            <a:r>
+              <a:rPr lang="en-US" dirty="0" smtClean="0">
+                <a:solidFill>
+                  <a:srgbClr val="000000"/>
+                </a:solidFill>
+              </a:rPr>
+              <a:t>){</a:t>
+            </a:r>
+            <a:endParaRPr lang="en-US" dirty="0">
+              <a:solidFill>
+                <a:srgbClr val="C0504D"/>
+              </a:solidFill>
+            </a:endParaRPr>
+          </a:p>
+          <a:p>
+            <a:pPr marL="0" indent="0">
+              <a:buNone/>
+            </a:pPr>
+            <a:r>
+              <a:rPr lang="en-US" dirty="0" smtClean="0">
+                <a:solidFill>
+                  <a:srgbClr val="C0504D"/>
+                </a:solidFill>
+              </a:rPr>
+              <a:t>		</a:t>
+            </a:r>
+            <a:r>
+              <a:rPr lang="en-US" dirty="0" smtClean="0">
+                <a:solidFill>
+                  <a:srgbClr val="008000"/>
+                </a:solidFill>
+              </a:rPr>
+              <a:t>Statement 1</a:t>
+            </a:r>
+          </a:p>
+          <a:p>
+            <a:pPr marL="0" indent="0">
+              <a:buNone/>
+            </a:pPr>
+            <a:r>
+              <a:rPr lang="en-US" dirty="0">
+                <a:solidFill>
+                  <a:srgbClr val="008000"/>
+                </a:solidFill>
+              </a:rPr>
+              <a:t>	</a:t>
+            </a:r>
+            <a:r>
+              <a:rPr lang="en-US" dirty="0" smtClean="0">
+                <a:solidFill>
+                  <a:srgbClr val="008000"/>
+                </a:solidFill>
+              </a:rPr>
+              <a:t>	..</a:t>
+            </a:r>
+            <a:endParaRPr lang="en-US" dirty="0">
+              <a:solidFill>
+                <a:srgbClr val="008000"/>
+              </a:solidFill>
+            </a:endParaRPr>
+          </a:p>
+          <a:p>
+            <a:pPr marL="0" indent="0">
+              <a:buNone/>
+            </a:pPr>
+            <a:r>
+              <a:rPr lang="en-US" dirty="0" smtClean="0">
+                <a:solidFill>
+                  <a:srgbClr val="008000"/>
+                </a:solidFill>
+              </a:rPr>
+              <a:t>		Statement N</a:t>
+            </a:r>
+          </a:p>
+          <a:p>
+            <a:pPr marL="0" indent="0">
+              <a:buNone/>
+            </a:pPr>
+            <a:r>
+              <a:rPr lang="en-US" dirty="0"/>
+              <a:t>	</a:t>
+            </a:r>
+            <a:r>
+              <a:rPr lang="en-US" i="1" dirty="0" smtClean="0">
+                <a:solidFill>
+                  <a:srgbClr val="0000FF"/>
+                </a:solidFill>
+              </a:rPr>
+              <a:t> </a:t>
+            </a:r>
+            <a:r>
+              <a:rPr lang="en-US" dirty="0" smtClean="0">
+                <a:solidFill>
+                  <a:srgbClr val="000000"/>
+                </a:solidFill>
+              </a:rPr>
+              <a:t>}</a:t>
+            </a:r>
+          </a:p>
+          <a:p>
+            <a:r>
+              <a:rPr lang="en-US" dirty="0" smtClean="0">
+                <a:solidFill>
+                  <a:srgbClr val="000000"/>
+                </a:solidFill>
+              </a:rPr>
+              <a:t>Where:</a:t>
+            </a:r>
+          </a:p>
+          <a:p>
+            <a:pPr lvl="1"/>
+            <a:r>
+              <a:rPr lang="en-US" dirty="0" smtClean="0">
+                <a:solidFill>
+                  <a:srgbClr val="000000"/>
+                </a:solidFill>
+              </a:rPr>
+              <a:t>Condition is an expression that evaluates to the </a:t>
+            </a:r>
+            <a:r>
+              <a:rPr lang="en-US" dirty="0" err="1" smtClean="0">
+                <a:solidFill>
+                  <a:srgbClr val="000000"/>
+                </a:solidFill>
+              </a:rPr>
+              <a:t>boolean</a:t>
+            </a:r>
+            <a:r>
+              <a:rPr lang="en-US" dirty="0" smtClean="0">
+                <a:solidFill>
+                  <a:srgbClr val="000000"/>
+                </a:solidFill>
+              </a:rPr>
+              <a:t> type </a:t>
+            </a:r>
+            <a:r>
+              <a:rPr lang="en-US" i="1" dirty="0" smtClean="0">
+                <a:solidFill>
+                  <a:srgbClr val="FF6600"/>
+                </a:solidFill>
+              </a:rPr>
+              <a:t>true</a:t>
+            </a:r>
+            <a:r>
+              <a:rPr lang="en-US" dirty="0" smtClean="0">
+                <a:solidFill>
+                  <a:srgbClr val="FF6600"/>
+                </a:solidFill>
+              </a:rPr>
+              <a:t> </a:t>
+            </a:r>
+            <a:r>
+              <a:rPr lang="en-US" dirty="0" smtClean="0">
+                <a:solidFill>
+                  <a:srgbClr val="000000"/>
+                </a:solidFill>
+              </a:rPr>
+              <a:t>or </a:t>
+            </a:r>
+            <a:r>
+              <a:rPr lang="en-US" i="1" dirty="0" smtClean="0">
+                <a:solidFill>
+                  <a:srgbClr val="FF6600"/>
+                </a:solidFill>
+              </a:rPr>
+              <a:t>false</a:t>
+            </a:r>
+          </a:p>
+          <a:p>
+            <a:pPr lvl="2"/>
+            <a:r>
+              <a:rPr lang="en-US" i="1" dirty="0" smtClean="0">
+                <a:solidFill>
+                  <a:srgbClr val="FF0000"/>
+                </a:solidFill>
+              </a:rPr>
+              <a:t>NOTE</a:t>
+            </a:r>
+            <a:r>
+              <a:rPr lang="en-US" i="1" dirty="0" smtClean="0">
+                <a:solidFill>
+                  <a:srgbClr val="FF6600"/>
+                </a:solidFill>
+              </a:rPr>
+              <a:t>: </a:t>
+            </a:r>
+            <a:r>
+              <a:rPr lang="en-US" i="1" dirty="0" smtClean="0"/>
+              <a:t>If the ‘condition’ for the ‘while’ loop is not updated within the loop, it will be an infinite loop</a:t>
+            </a:r>
+          </a:p>
+        </p:txBody>
+      </p:sp>
+    </p:spTree>
+    <p:extLst>
+      <p:ext uri="{BB962C8B-B14F-4D97-AF65-F5344CB8AC3E}">
+        <p14:creationId xmlns:p14="http://schemas.microsoft.com/office/powerpoint/2010/main" val="4162874821"/>
       </p:ext>
     </p:extLst>
   </p:cSld>
@@ -25694,6 +26862,1258 @@
 </p:sld>
 </file>
 
+<file path=ppt/slides/slide130.xml><?xml version="1.0" encoding="utf-8"?>
+<p:sld xmlns:a="http://schemas.openxmlformats.org/drawingml/2006/main" xmlns:r="http://schemas.openxmlformats.org/officeDocument/2006/relationships" xmlns:p="http://schemas.openxmlformats.org/presentationml/2006/main">
+  <p:cSld>
+    <p:spTree>
+      <p:nvGrpSpPr>
+        <p:cNvPr id="1" name=""/>
+        <p:cNvGrpSpPr/>
+        <p:nvPr/>
+      </p:nvGrpSpPr>
+      <p:grpSpPr>
+        <a:xfrm>
+          <a:off x="0" y="0"/>
+          <a:ext cx="0" cy="0"/>
+          <a:chOff x="0" y="0"/>
+          <a:chExt cx="0" cy="0"/>
+        </a:xfrm>
+      </p:grpSpPr>
+      <p:sp>
+        <p:nvSpPr>
+          <p:cNvPr id="2" name="Title 1"/>
+          <p:cNvSpPr>
+            <a:spLocks noGrp="1"/>
+          </p:cNvSpPr>
+          <p:nvPr>
+            <p:ph type="title"/>
+          </p:nvPr>
+        </p:nvSpPr>
+        <p:spPr/>
+        <p:txBody>
+          <a:bodyPr/>
+          <a:lstStyle/>
+          <a:p>
+            <a:r>
+              <a:rPr lang="en-US" dirty="0" smtClean="0"/>
+              <a:t>Example-01.js</a:t>
+            </a:r>
+            <a:endParaRPr lang="en-US" dirty="0"/>
+          </a:p>
+        </p:txBody>
+      </p:sp>
+      <p:pic>
+        <p:nvPicPr>
+          <p:cNvPr id="4" name="Content Placeholder 3"/>
+          <p:cNvPicPr>
+            <a:picLocks noGrp="1" noChangeAspect="1"/>
+          </p:cNvPicPr>
+          <p:nvPr>
+            <p:ph idx="1"/>
+          </p:nvPr>
+        </p:nvPicPr>
+        <p:blipFill>
+          <a:blip r:embed="rId2"/>
+          <a:srcRect l="-19292" r="-19292"/>
+          <a:stretch>
+            <a:fillRect/>
+          </a:stretch>
+        </p:blipFill>
+        <p:spPr/>
+      </p:pic>
+    </p:spTree>
+    <p:extLst>
+      <p:ext uri="{BB962C8B-B14F-4D97-AF65-F5344CB8AC3E}">
+        <p14:creationId xmlns:p14="http://schemas.microsoft.com/office/powerpoint/2010/main" val="1111470891"/>
+      </p:ext>
+    </p:extLst>
+  </p:cSld>
+  <p:clrMapOvr>
+    <a:masterClrMapping/>
+  </p:clrMapOvr>
+</p:sld>
+</file>
+
+<file path=ppt/slides/slide131.xml><?xml version="1.0" encoding="utf-8"?>
+<p:sld xmlns:a="http://schemas.openxmlformats.org/drawingml/2006/main" xmlns:r="http://schemas.openxmlformats.org/officeDocument/2006/relationships" xmlns:p="http://schemas.openxmlformats.org/presentationml/2006/main">
+  <p:cSld>
+    <p:spTree>
+      <p:nvGrpSpPr>
+        <p:cNvPr id="1" name=""/>
+        <p:cNvGrpSpPr/>
+        <p:nvPr/>
+      </p:nvGrpSpPr>
+      <p:grpSpPr>
+        <a:xfrm>
+          <a:off x="0" y="0"/>
+          <a:ext cx="0" cy="0"/>
+          <a:chOff x="0" y="0"/>
+          <a:chExt cx="0" cy="0"/>
+        </a:xfrm>
+      </p:grpSpPr>
+      <p:sp>
+        <p:nvSpPr>
+          <p:cNvPr id="2" name="Title 1"/>
+          <p:cNvSpPr>
+            <a:spLocks noGrp="1"/>
+          </p:cNvSpPr>
+          <p:nvPr>
+            <p:ph type="title"/>
+          </p:nvPr>
+        </p:nvSpPr>
+        <p:spPr/>
+        <p:txBody>
+          <a:bodyPr/>
+          <a:lstStyle/>
+          <a:p>
+            <a:r>
+              <a:rPr lang="en-US" dirty="0" smtClean="0"/>
+              <a:t>Example-02.js</a:t>
+            </a:r>
+            <a:endParaRPr lang="en-US" dirty="0"/>
+          </a:p>
+        </p:txBody>
+      </p:sp>
+      <p:pic>
+        <p:nvPicPr>
+          <p:cNvPr id="4" name="Content Placeholder 3"/>
+          <p:cNvPicPr>
+            <a:picLocks noGrp="1" noChangeAspect="1"/>
+          </p:cNvPicPr>
+          <p:nvPr>
+            <p:ph idx="1"/>
+          </p:nvPr>
+        </p:nvPicPr>
+        <p:blipFill>
+          <a:blip r:embed="rId2"/>
+          <a:srcRect l="-15419" r="-15419"/>
+          <a:stretch>
+            <a:fillRect/>
+          </a:stretch>
+        </p:blipFill>
+        <p:spPr/>
+      </p:pic>
+    </p:spTree>
+    <p:extLst>
+      <p:ext uri="{BB962C8B-B14F-4D97-AF65-F5344CB8AC3E}">
+        <p14:creationId xmlns:p14="http://schemas.microsoft.com/office/powerpoint/2010/main" val="3165048977"/>
+      </p:ext>
+    </p:extLst>
+  </p:cSld>
+  <p:clrMapOvr>
+    <a:masterClrMapping/>
+  </p:clrMapOvr>
+</p:sld>
+</file>
+
+<file path=ppt/slides/slide132.xml><?xml version="1.0" encoding="utf-8"?>
+<p:sld xmlns:a="http://schemas.openxmlformats.org/drawingml/2006/main" xmlns:r="http://schemas.openxmlformats.org/officeDocument/2006/relationships" xmlns:p="http://schemas.openxmlformats.org/presentationml/2006/main">
+  <p:cSld>
+    <p:spTree>
+      <p:nvGrpSpPr>
+        <p:cNvPr id="1" name=""/>
+        <p:cNvGrpSpPr/>
+        <p:nvPr/>
+      </p:nvGrpSpPr>
+      <p:grpSpPr>
+        <a:xfrm>
+          <a:off x="0" y="0"/>
+          <a:ext cx="0" cy="0"/>
+          <a:chOff x="0" y="0"/>
+          <a:chExt cx="0" cy="0"/>
+        </a:xfrm>
+      </p:grpSpPr>
+      <p:sp>
+        <p:nvSpPr>
+          <p:cNvPr id="2" name="Title 1"/>
+          <p:cNvSpPr>
+            <a:spLocks noGrp="1"/>
+          </p:cNvSpPr>
+          <p:nvPr>
+            <p:ph type="title"/>
+          </p:nvPr>
+        </p:nvSpPr>
+        <p:spPr/>
+        <p:txBody>
+          <a:bodyPr/>
+          <a:lstStyle/>
+          <a:p>
+            <a:r>
+              <a:rPr lang="en-US" dirty="0" smtClean="0"/>
+              <a:t>Loop Breakdown</a:t>
+            </a:r>
+            <a:endParaRPr lang="en-US" dirty="0"/>
+          </a:p>
+        </p:txBody>
+      </p:sp>
+      <p:pic>
+        <p:nvPicPr>
+          <p:cNvPr id="4" name="Content Placeholder 3"/>
+          <p:cNvPicPr>
+            <a:picLocks noGrp="1" noChangeAspect="1"/>
+          </p:cNvPicPr>
+          <p:nvPr>
+            <p:ph idx="1"/>
+          </p:nvPr>
+        </p:nvPicPr>
+        <p:blipFill>
+          <a:blip r:embed="rId2"/>
+          <a:srcRect l="-15419" r="-15419"/>
+          <a:stretch>
+            <a:fillRect/>
+          </a:stretch>
+        </p:blipFill>
+        <p:spPr/>
+      </p:pic>
+      <p:sp>
+        <p:nvSpPr>
+          <p:cNvPr id="3" name="Rounded Rectangle 2"/>
+          <p:cNvSpPr/>
+          <p:nvPr/>
+        </p:nvSpPr>
+        <p:spPr>
+          <a:xfrm>
+            <a:off x="1867243" y="2806037"/>
+            <a:ext cx="1424000" cy="187044"/>
+          </a:xfrm>
+          <a:prstGeom prst="roundRect">
+            <a:avLst/>
+          </a:prstGeom>
+          <a:solidFill>
+            <a:schemeClr val="accent6">
+              <a:lumMod val="60000"/>
+              <a:lumOff val="40000"/>
+              <a:alpha val="30000"/>
+            </a:schemeClr>
+          </a:solidFill>
+        </p:spPr>
+        <p:style>
+          <a:lnRef idx="1">
+            <a:schemeClr val="accent1"/>
+          </a:lnRef>
+          <a:fillRef idx="3">
+            <a:schemeClr val="accent1"/>
+          </a:fillRef>
+          <a:effectRef idx="2">
+            <a:schemeClr val="accent1"/>
+          </a:effectRef>
+          <a:fontRef idx="minor">
+            <a:schemeClr val="lt1"/>
+          </a:fontRef>
+        </p:style>
+        <p:txBody>
+          <a:bodyPr rtlCol="0" anchor="ctr"/>
+          <a:lstStyle/>
+          <a:p>
+            <a:pPr algn="ctr"/>
+            <a:endParaRPr lang="en-US"/>
+          </a:p>
+        </p:txBody>
+      </p:sp>
+      <p:sp>
+        <p:nvSpPr>
+          <p:cNvPr id="5" name="Rounded Rectangle 4"/>
+          <p:cNvSpPr/>
+          <p:nvPr/>
+        </p:nvSpPr>
+        <p:spPr>
+          <a:xfrm>
+            <a:off x="2507047" y="3192162"/>
+            <a:ext cx="2107515" cy="227914"/>
+          </a:xfrm>
+          <a:prstGeom prst="roundRect">
+            <a:avLst/>
+          </a:prstGeom>
+          <a:solidFill>
+            <a:schemeClr val="accent5">
+              <a:lumMod val="60000"/>
+              <a:lumOff val="40000"/>
+              <a:alpha val="30000"/>
+            </a:schemeClr>
+          </a:solidFill>
+        </p:spPr>
+        <p:style>
+          <a:lnRef idx="1">
+            <a:schemeClr val="accent1"/>
+          </a:lnRef>
+          <a:fillRef idx="3">
+            <a:schemeClr val="accent1"/>
+          </a:fillRef>
+          <a:effectRef idx="2">
+            <a:schemeClr val="accent1"/>
+          </a:effectRef>
+          <a:fontRef idx="minor">
+            <a:schemeClr val="lt1"/>
+          </a:fontRef>
+        </p:style>
+        <p:txBody>
+          <a:bodyPr rtlCol="0" anchor="ctr"/>
+          <a:lstStyle/>
+          <a:p>
+            <a:pPr algn="ctr"/>
+            <a:endParaRPr lang="en-US"/>
+          </a:p>
+        </p:txBody>
+      </p:sp>
+      <p:sp>
+        <p:nvSpPr>
+          <p:cNvPr id="6" name="Rounded Rectangle 5"/>
+          <p:cNvSpPr/>
+          <p:nvPr/>
+        </p:nvSpPr>
+        <p:spPr>
+          <a:xfrm>
+            <a:off x="2307966" y="3612292"/>
+            <a:ext cx="1666791" cy="211438"/>
+          </a:xfrm>
+          <a:prstGeom prst="roundRect">
+            <a:avLst/>
+          </a:prstGeom>
+          <a:solidFill>
+            <a:schemeClr val="accent3">
+              <a:lumMod val="60000"/>
+              <a:lumOff val="40000"/>
+              <a:alpha val="30000"/>
+            </a:schemeClr>
+          </a:solidFill>
+        </p:spPr>
+        <p:style>
+          <a:lnRef idx="1">
+            <a:schemeClr val="accent1"/>
+          </a:lnRef>
+          <a:fillRef idx="3">
+            <a:schemeClr val="accent1"/>
+          </a:fillRef>
+          <a:effectRef idx="2">
+            <a:schemeClr val="accent1"/>
+          </a:effectRef>
+          <a:fontRef idx="minor">
+            <a:schemeClr val="lt1"/>
+          </a:fontRef>
+        </p:style>
+        <p:txBody>
+          <a:bodyPr rtlCol="0" anchor="ctr"/>
+          <a:lstStyle/>
+          <a:p>
+            <a:pPr algn="ctr"/>
+            <a:endParaRPr lang="en-US"/>
+          </a:p>
+        </p:txBody>
+      </p:sp>
+    </p:spTree>
+    <p:extLst>
+      <p:ext uri="{BB962C8B-B14F-4D97-AF65-F5344CB8AC3E}">
+        <p14:creationId xmlns:p14="http://schemas.microsoft.com/office/powerpoint/2010/main" val="2115709436"/>
+      </p:ext>
+    </p:extLst>
+  </p:cSld>
+  <p:clrMapOvr>
+    <a:masterClrMapping/>
+  </p:clrMapOvr>
+</p:sld>
+</file>
+
+<file path=ppt/slides/slide133.xml><?xml version="1.0" encoding="utf-8"?>
+<p:sld xmlns:a="http://schemas.openxmlformats.org/drawingml/2006/main" xmlns:r="http://schemas.openxmlformats.org/officeDocument/2006/relationships" xmlns:p="http://schemas.openxmlformats.org/presentationml/2006/main">
+  <p:cSld>
+    <p:spTree>
+      <p:nvGrpSpPr>
+        <p:cNvPr id="1" name=""/>
+        <p:cNvGrpSpPr/>
+        <p:nvPr/>
+      </p:nvGrpSpPr>
+      <p:grpSpPr>
+        <a:xfrm>
+          <a:off x="0" y="0"/>
+          <a:ext cx="0" cy="0"/>
+          <a:chOff x="0" y="0"/>
+          <a:chExt cx="0" cy="0"/>
+        </a:xfrm>
+      </p:grpSpPr>
+      <p:sp>
+        <p:nvSpPr>
+          <p:cNvPr id="2" name="Title 1"/>
+          <p:cNvSpPr>
+            <a:spLocks noGrp="1"/>
+          </p:cNvSpPr>
+          <p:nvPr>
+            <p:ph type="title"/>
+          </p:nvPr>
+        </p:nvSpPr>
+        <p:spPr/>
+        <p:txBody>
+          <a:bodyPr/>
+          <a:lstStyle/>
+          <a:p>
+            <a:r>
+              <a:rPr lang="en-US" dirty="0"/>
+              <a:t>The </a:t>
+            </a:r>
+            <a:r>
+              <a:rPr lang="en-US" dirty="0" smtClean="0"/>
+              <a:t>‘for’ </a:t>
+            </a:r>
+            <a:r>
+              <a:rPr lang="en-US" dirty="0"/>
+              <a:t>Statement</a:t>
+            </a:r>
+          </a:p>
+        </p:txBody>
+      </p:sp>
+      <p:sp>
+        <p:nvSpPr>
+          <p:cNvPr id="3" name="Content Placeholder 2"/>
+          <p:cNvSpPr>
+            <a:spLocks noGrp="1"/>
+          </p:cNvSpPr>
+          <p:nvPr>
+            <p:ph idx="1"/>
+          </p:nvPr>
+        </p:nvSpPr>
+        <p:spPr/>
+        <p:txBody>
+          <a:bodyPr>
+            <a:normAutofit fontScale="77500" lnSpcReduction="20000"/>
+          </a:bodyPr>
+          <a:lstStyle/>
+          <a:p>
+            <a:r>
+              <a:rPr lang="en-US" dirty="0" smtClean="0"/>
+              <a:t>Formal syntax:</a:t>
+            </a:r>
+          </a:p>
+          <a:p>
+            <a:pPr marL="0" indent="0">
+              <a:buNone/>
+            </a:pPr>
+            <a:r>
+              <a:rPr lang="en-US" dirty="0"/>
+              <a:t>	</a:t>
+            </a:r>
+            <a:r>
+              <a:rPr lang="en-US" i="1" dirty="0" smtClean="0">
+                <a:solidFill>
+                  <a:srgbClr val="0000FF"/>
+                </a:solidFill>
+              </a:rPr>
+              <a:t>for</a:t>
+            </a:r>
+            <a:r>
+              <a:rPr lang="en-US" dirty="0" smtClean="0">
+                <a:solidFill>
+                  <a:srgbClr val="000000"/>
+                </a:solidFill>
+              </a:rPr>
+              <a:t>(</a:t>
+            </a:r>
+            <a:r>
+              <a:rPr lang="en-US" i="1" dirty="0" smtClean="0">
+                <a:solidFill>
+                  <a:srgbClr val="C0504D"/>
+                </a:solidFill>
+              </a:rPr>
+              <a:t>initialization; condition; update</a:t>
+            </a:r>
+            <a:r>
+              <a:rPr lang="en-US" dirty="0" smtClean="0">
+                <a:solidFill>
+                  <a:srgbClr val="000000"/>
+                </a:solidFill>
+              </a:rPr>
+              <a:t>){</a:t>
+            </a:r>
+            <a:endParaRPr lang="en-US" dirty="0">
+              <a:solidFill>
+                <a:srgbClr val="C0504D"/>
+              </a:solidFill>
+            </a:endParaRPr>
+          </a:p>
+          <a:p>
+            <a:pPr marL="0" indent="0">
+              <a:buNone/>
+            </a:pPr>
+            <a:r>
+              <a:rPr lang="en-US" dirty="0" smtClean="0">
+                <a:solidFill>
+                  <a:srgbClr val="008000"/>
+                </a:solidFill>
+              </a:rPr>
+              <a:t>		Statement </a:t>
+            </a:r>
+            <a:r>
+              <a:rPr lang="en-US" dirty="0">
+                <a:solidFill>
+                  <a:srgbClr val="008000"/>
+                </a:solidFill>
+              </a:rPr>
+              <a:t>1</a:t>
+            </a:r>
+          </a:p>
+          <a:p>
+            <a:pPr marL="0" indent="0">
+              <a:buNone/>
+            </a:pPr>
+            <a:r>
+              <a:rPr lang="en-US" dirty="0">
+                <a:solidFill>
+                  <a:srgbClr val="008000"/>
+                </a:solidFill>
+              </a:rPr>
+              <a:t>		..</a:t>
+            </a:r>
+          </a:p>
+          <a:p>
+            <a:pPr marL="0" indent="0">
+              <a:buNone/>
+            </a:pPr>
+            <a:r>
+              <a:rPr lang="en-US" dirty="0">
+                <a:solidFill>
+                  <a:srgbClr val="008000"/>
+                </a:solidFill>
+              </a:rPr>
+              <a:t>		Statement N</a:t>
+            </a:r>
+          </a:p>
+          <a:p>
+            <a:pPr marL="0" indent="0">
+              <a:buNone/>
+            </a:pPr>
+            <a:r>
+              <a:rPr lang="en-US" dirty="0"/>
+              <a:t>	</a:t>
+            </a:r>
+            <a:r>
+              <a:rPr lang="en-US" i="1" dirty="0" smtClean="0">
+                <a:solidFill>
+                  <a:srgbClr val="0000FF"/>
+                </a:solidFill>
+              </a:rPr>
+              <a:t> </a:t>
+            </a:r>
+            <a:r>
+              <a:rPr lang="en-US" dirty="0" smtClean="0">
+                <a:solidFill>
+                  <a:srgbClr val="000000"/>
+                </a:solidFill>
+              </a:rPr>
+              <a:t>}</a:t>
+            </a:r>
+          </a:p>
+          <a:p>
+            <a:r>
+              <a:rPr lang="en-US" dirty="0" smtClean="0">
+                <a:solidFill>
+                  <a:srgbClr val="000000"/>
+                </a:solidFill>
+              </a:rPr>
+              <a:t>Where:</a:t>
+            </a:r>
+          </a:p>
+          <a:p>
+            <a:pPr lvl="1"/>
+            <a:r>
+              <a:rPr lang="en-US" dirty="0" smtClean="0">
+                <a:solidFill>
+                  <a:srgbClr val="000000"/>
+                </a:solidFill>
+              </a:rPr>
+              <a:t>‘</a:t>
+            </a:r>
+            <a:r>
+              <a:rPr lang="en-US" i="1" dirty="0" smtClean="0">
+                <a:solidFill>
+                  <a:srgbClr val="000000"/>
+                </a:solidFill>
+              </a:rPr>
+              <a:t>initialization</a:t>
+            </a:r>
+            <a:r>
+              <a:rPr lang="en-US" dirty="0" smtClean="0">
+                <a:solidFill>
+                  <a:srgbClr val="000000"/>
+                </a:solidFill>
+              </a:rPr>
+              <a:t>’ gets executed ONLY once at the beginning of the ‘</a:t>
+            </a:r>
+            <a:r>
+              <a:rPr lang="en-US" i="1" dirty="0" smtClean="0">
+                <a:solidFill>
+                  <a:srgbClr val="000000"/>
+                </a:solidFill>
+              </a:rPr>
+              <a:t>for</a:t>
+            </a:r>
+            <a:r>
+              <a:rPr lang="en-US" dirty="0" smtClean="0">
+                <a:solidFill>
+                  <a:srgbClr val="000000"/>
+                </a:solidFill>
+              </a:rPr>
+              <a:t>’ loop</a:t>
+            </a:r>
+          </a:p>
+          <a:p>
+            <a:pPr lvl="1"/>
+            <a:r>
+              <a:rPr lang="en-US" i="1" dirty="0" smtClean="0">
+                <a:solidFill>
+                  <a:srgbClr val="000000"/>
+                </a:solidFill>
+              </a:rPr>
+              <a:t>‘condition’ </a:t>
+            </a:r>
+            <a:r>
+              <a:rPr lang="en-US" dirty="0" smtClean="0">
+                <a:solidFill>
+                  <a:srgbClr val="000000"/>
+                </a:solidFill>
+              </a:rPr>
+              <a:t>gets tested to determine if the block of statement is executed</a:t>
+            </a:r>
+          </a:p>
+          <a:p>
+            <a:pPr lvl="1"/>
+            <a:r>
+              <a:rPr lang="en-US" i="1" dirty="0">
+                <a:solidFill>
+                  <a:srgbClr val="000000"/>
+                </a:solidFill>
+              </a:rPr>
+              <a:t>‘update’ </a:t>
+            </a:r>
+            <a:r>
+              <a:rPr lang="en-US" dirty="0">
+                <a:solidFill>
+                  <a:srgbClr val="000000"/>
+                </a:solidFill>
+              </a:rPr>
+              <a:t>gets executed after block of statement</a:t>
+            </a:r>
+            <a:endParaRPr lang="en-US" dirty="0">
+              <a:solidFill>
+                <a:srgbClr val="FF6600"/>
+              </a:solidFill>
+            </a:endParaRPr>
+          </a:p>
+          <a:p>
+            <a:pPr lvl="1"/>
+            <a:endParaRPr lang="en-US" dirty="0" smtClean="0">
+              <a:solidFill>
+                <a:srgbClr val="FF6600"/>
+              </a:solidFill>
+            </a:endParaRPr>
+          </a:p>
+        </p:txBody>
+      </p:sp>
+    </p:spTree>
+    <p:extLst>
+      <p:ext uri="{BB962C8B-B14F-4D97-AF65-F5344CB8AC3E}">
+        <p14:creationId xmlns:p14="http://schemas.microsoft.com/office/powerpoint/2010/main" val="2590780461"/>
+      </p:ext>
+    </p:extLst>
+  </p:cSld>
+  <p:clrMapOvr>
+    <a:masterClrMapping/>
+  </p:clrMapOvr>
+</p:sld>
+</file>
+
+<file path=ppt/slides/slide134.xml><?xml version="1.0" encoding="utf-8"?>
+<p:sld xmlns:a="http://schemas.openxmlformats.org/drawingml/2006/main" xmlns:r="http://schemas.openxmlformats.org/officeDocument/2006/relationships" xmlns:p="http://schemas.openxmlformats.org/presentationml/2006/main">
+  <p:cSld>
+    <p:spTree>
+      <p:nvGrpSpPr>
+        <p:cNvPr id="1" name=""/>
+        <p:cNvGrpSpPr/>
+        <p:nvPr/>
+      </p:nvGrpSpPr>
+      <p:grpSpPr>
+        <a:xfrm>
+          <a:off x="0" y="0"/>
+          <a:ext cx="0" cy="0"/>
+          <a:chOff x="0" y="0"/>
+          <a:chExt cx="0" cy="0"/>
+        </a:xfrm>
+      </p:grpSpPr>
+      <p:sp>
+        <p:nvSpPr>
+          <p:cNvPr id="2" name="Title 1"/>
+          <p:cNvSpPr>
+            <a:spLocks noGrp="1"/>
+          </p:cNvSpPr>
+          <p:nvPr>
+            <p:ph type="title"/>
+          </p:nvPr>
+        </p:nvSpPr>
+        <p:spPr/>
+        <p:txBody>
+          <a:bodyPr/>
+          <a:lstStyle/>
+          <a:p>
+            <a:r>
+              <a:rPr lang="en-US" dirty="0" smtClean="0"/>
+              <a:t>Example-03.js</a:t>
+            </a:r>
+            <a:endParaRPr lang="en-US" dirty="0"/>
+          </a:p>
+        </p:txBody>
+      </p:sp>
+      <p:pic>
+        <p:nvPicPr>
+          <p:cNvPr id="4" name="Content Placeholder 3"/>
+          <p:cNvPicPr>
+            <a:picLocks noGrp="1" noChangeAspect="1"/>
+          </p:cNvPicPr>
+          <p:nvPr>
+            <p:ph idx="1"/>
+          </p:nvPr>
+        </p:nvPicPr>
+        <p:blipFill>
+          <a:blip r:embed="rId2"/>
+          <a:srcRect l="-10732" r="-10732"/>
+          <a:stretch>
+            <a:fillRect/>
+          </a:stretch>
+        </p:blipFill>
+        <p:spPr/>
+      </p:pic>
+      <p:sp>
+        <p:nvSpPr>
+          <p:cNvPr id="5" name="Rounded Rectangle 4"/>
+          <p:cNvSpPr/>
+          <p:nvPr/>
+        </p:nvSpPr>
+        <p:spPr>
+          <a:xfrm>
+            <a:off x="2187512" y="3047193"/>
+            <a:ext cx="1316497" cy="227914"/>
+          </a:xfrm>
+          <a:prstGeom prst="roundRect">
+            <a:avLst/>
+          </a:prstGeom>
+          <a:solidFill>
+            <a:schemeClr val="accent6">
+              <a:lumMod val="60000"/>
+              <a:lumOff val="40000"/>
+              <a:alpha val="30000"/>
+            </a:schemeClr>
+          </a:solidFill>
+        </p:spPr>
+        <p:style>
+          <a:lnRef idx="1">
+            <a:schemeClr val="accent1"/>
+          </a:lnRef>
+          <a:fillRef idx="3">
+            <a:schemeClr val="accent1"/>
+          </a:fillRef>
+          <a:effectRef idx="2">
+            <a:schemeClr val="accent1"/>
+          </a:effectRef>
+          <a:fontRef idx="minor">
+            <a:schemeClr val="lt1"/>
+          </a:fontRef>
+        </p:style>
+        <p:txBody>
+          <a:bodyPr rtlCol="0" anchor="ctr"/>
+          <a:lstStyle/>
+          <a:p>
+            <a:pPr algn="ctr"/>
+            <a:endParaRPr lang="en-US"/>
+          </a:p>
+        </p:txBody>
+      </p:sp>
+      <p:sp>
+        <p:nvSpPr>
+          <p:cNvPr id="6" name="Rounded Rectangle 5"/>
+          <p:cNvSpPr/>
+          <p:nvPr/>
+        </p:nvSpPr>
+        <p:spPr>
+          <a:xfrm>
+            <a:off x="3650286" y="3047193"/>
+            <a:ext cx="2018033" cy="227914"/>
+          </a:xfrm>
+          <a:prstGeom prst="roundRect">
+            <a:avLst/>
+          </a:prstGeom>
+          <a:solidFill>
+            <a:schemeClr val="accent5">
+              <a:lumMod val="60000"/>
+              <a:lumOff val="40000"/>
+              <a:alpha val="30000"/>
+            </a:schemeClr>
+          </a:solidFill>
+        </p:spPr>
+        <p:style>
+          <a:lnRef idx="1">
+            <a:schemeClr val="accent1"/>
+          </a:lnRef>
+          <a:fillRef idx="3">
+            <a:schemeClr val="accent1"/>
+          </a:fillRef>
+          <a:effectRef idx="2">
+            <a:schemeClr val="accent1"/>
+          </a:effectRef>
+          <a:fontRef idx="minor">
+            <a:schemeClr val="lt1"/>
+          </a:fontRef>
+        </p:style>
+        <p:txBody>
+          <a:bodyPr rtlCol="0" anchor="ctr"/>
+          <a:lstStyle/>
+          <a:p>
+            <a:pPr algn="ctr"/>
+            <a:endParaRPr lang="en-US"/>
+          </a:p>
+        </p:txBody>
+      </p:sp>
+      <p:sp>
+        <p:nvSpPr>
+          <p:cNvPr id="7" name="Rounded Rectangle 6"/>
+          <p:cNvSpPr/>
+          <p:nvPr/>
+        </p:nvSpPr>
+        <p:spPr>
+          <a:xfrm>
+            <a:off x="5837799" y="3063669"/>
+            <a:ext cx="1730624" cy="211438"/>
+          </a:xfrm>
+          <a:prstGeom prst="roundRect">
+            <a:avLst/>
+          </a:prstGeom>
+          <a:solidFill>
+            <a:schemeClr val="accent3">
+              <a:lumMod val="60000"/>
+              <a:lumOff val="40000"/>
+              <a:alpha val="30000"/>
+            </a:schemeClr>
+          </a:solidFill>
+        </p:spPr>
+        <p:style>
+          <a:lnRef idx="1">
+            <a:schemeClr val="accent1"/>
+          </a:lnRef>
+          <a:fillRef idx="3">
+            <a:schemeClr val="accent1"/>
+          </a:fillRef>
+          <a:effectRef idx="2">
+            <a:schemeClr val="accent1"/>
+          </a:effectRef>
+          <a:fontRef idx="minor">
+            <a:schemeClr val="lt1"/>
+          </a:fontRef>
+        </p:style>
+        <p:txBody>
+          <a:bodyPr rtlCol="0" anchor="ctr"/>
+          <a:lstStyle/>
+          <a:p>
+            <a:pPr algn="ctr"/>
+            <a:endParaRPr lang="en-US"/>
+          </a:p>
+        </p:txBody>
+      </p:sp>
+    </p:spTree>
+    <p:extLst>
+      <p:ext uri="{BB962C8B-B14F-4D97-AF65-F5344CB8AC3E}">
+        <p14:creationId xmlns:p14="http://schemas.microsoft.com/office/powerpoint/2010/main" val="2214476799"/>
+      </p:ext>
+    </p:extLst>
+  </p:cSld>
+  <p:clrMapOvr>
+    <a:masterClrMapping/>
+  </p:clrMapOvr>
+</p:sld>
+</file>
+
+<file path=ppt/slides/slide135.xml><?xml version="1.0" encoding="utf-8"?>
+<p:sld xmlns:a="http://schemas.openxmlformats.org/drawingml/2006/main" xmlns:r="http://schemas.openxmlformats.org/officeDocument/2006/relationships" xmlns:p="http://schemas.openxmlformats.org/presentationml/2006/main">
+  <p:cSld>
+    <p:spTree>
+      <p:nvGrpSpPr>
+        <p:cNvPr id="1" name=""/>
+        <p:cNvGrpSpPr/>
+        <p:nvPr/>
+      </p:nvGrpSpPr>
+      <p:grpSpPr>
+        <a:xfrm>
+          <a:off x="0" y="0"/>
+          <a:ext cx="0" cy="0"/>
+          <a:chOff x="0" y="0"/>
+          <a:chExt cx="0" cy="0"/>
+        </a:xfrm>
+      </p:grpSpPr>
+      <p:sp>
+        <p:nvSpPr>
+          <p:cNvPr id="2" name="Title 1"/>
+          <p:cNvSpPr>
+            <a:spLocks noGrp="1"/>
+          </p:cNvSpPr>
+          <p:nvPr>
+            <p:ph type="title"/>
+          </p:nvPr>
+        </p:nvSpPr>
+        <p:spPr/>
+        <p:txBody>
+          <a:bodyPr/>
+          <a:lstStyle/>
+          <a:p>
+            <a:r>
+              <a:rPr lang="en-US" dirty="0" smtClean="0"/>
+              <a:t>‘for’ Loop Pitfall</a:t>
+            </a:r>
+            <a:endParaRPr lang="en-US" dirty="0"/>
+          </a:p>
+        </p:txBody>
+      </p:sp>
+      <p:sp>
+        <p:nvSpPr>
+          <p:cNvPr id="3" name="Content Placeholder 2"/>
+          <p:cNvSpPr>
+            <a:spLocks noGrp="1"/>
+          </p:cNvSpPr>
+          <p:nvPr>
+            <p:ph idx="1"/>
+          </p:nvPr>
+        </p:nvSpPr>
+        <p:spPr/>
+        <p:txBody>
+          <a:bodyPr/>
+          <a:lstStyle/>
+          <a:p>
+            <a:r>
+              <a:rPr lang="en-US" dirty="0" smtClean="0"/>
+              <a:t>Don’t update ‘for’ loop condition variable(s) multiple times in loop iteration</a:t>
+            </a:r>
+            <a:endParaRPr lang="en-US" dirty="0"/>
+          </a:p>
+        </p:txBody>
+      </p:sp>
+    </p:spTree>
+    <p:extLst>
+      <p:ext uri="{BB962C8B-B14F-4D97-AF65-F5344CB8AC3E}">
+        <p14:creationId xmlns:p14="http://schemas.microsoft.com/office/powerpoint/2010/main" val="2415955060"/>
+      </p:ext>
+    </p:extLst>
+  </p:cSld>
+  <p:clrMapOvr>
+    <a:masterClrMapping/>
+  </p:clrMapOvr>
+</p:sld>
+</file>
+
+<file path=ppt/slides/slide136.xml><?xml version="1.0" encoding="utf-8"?>
+<p:sld xmlns:a="http://schemas.openxmlformats.org/drawingml/2006/main" xmlns:r="http://schemas.openxmlformats.org/officeDocument/2006/relationships" xmlns:p="http://schemas.openxmlformats.org/presentationml/2006/main">
+  <p:cSld>
+    <p:spTree>
+      <p:nvGrpSpPr>
+        <p:cNvPr id="1" name=""/>
+        <p:cNvGrpSpPr/>
+        <p:nvPr/>
+      </p:nvGrpSpPr>
+      <p:grpSpPr>
+        <a:xfrm>
+          <a:off x="0" y="0"/>
+          <a:ext cx="0" cy="0"/>
+          <a:chOff x="0" y="0"/>
+          <a:chExt cx="0" cy="0"/>
+        </a:xfrm>
+      </p:grpSpPr>
+      <p:sp>
+        <p:nvSpPr>
+          <p:cNvPr id="2" name="Title 1"/>
+          <p:cNvSpPr>
+            <a:spLocks noGrp="1"/>
+          </p:cNvSpPr>
+          <p:nvPr>
+            <p:ph type="title"/>
+          </p:nvPr>
+        </p:nvSpPr>
+        <p:spPr/>
+        <p:txBody>
+          <a:bodyPr/>
+          <a:lstStyle/>
+          <a:p>
+            <a:r>
+              <a:rPr lang="en-US" dirty="0" smtClean="0"/>
+              <a:t>Example-04.js</a:t>
+            </a:r>
+            <a:endParaRPr lang="en-US" dirty="0"/>
+          </a:p>
+        </p:txBody>
+      </p:sp>
+      <p:pic>
+        <p:nvPicPr>
+          <p:cNvPr id="5" name="Content Placeholder 4"/>
+          <p:cNvPicPr>
+            <a:picLocks noGrp="1" noChangeAspect="1"/>
+          </p:cNvPicPr>
+          <p:nvPr>
+            <p:ph idx="1"/>
+          </p:nvPr>
+        </p:nvPicPr>
+        <p:blipFill>
+          <a:blip r:embed="rId2"/>
+          <a:srcRect l="-6554" r="-6554"/>
+          <a:stretch>
+            <a:fillRect/>
+          </a:stretch>
+        </p:blipFill>
+        <p:spPr/>
+      </p:pic>
+    </p:spTree>
+    <p:extLst>
+      <p:ext uri="{BB962C8B-B14F-4D97-AF65-F5344CB8AC3E}">
+        <p14:creationId xmlns:p14="http://schemas.microsoft.com/office/powerpoint/2010/main" val="1710654488"/>
+      </p:ext>
+    </p:extLst>
+  </p:cSld>
+  <p:clrMapOvr>
+    <a:masterClrMapping/>
+  </p:clrMapOvr>
+</p:sld>
+</file>
+
+<file path=ppt/slides/slide137.xml><?xml version="1.0" encoding="utf-8"?>
+<p:sld xmlns:a="http://schemas.openxmlformats.org/drawingml/2006/main" xmlns:r="http://schemas.openxmlformats.org/officeDocument/2006/relationships" xmlns:p="http://schemas.openxmlformats.org/presentationml/2006/main">
+  <p:cSld>
+    <p:spTree>
+      <p:nvGrpSpPr>
+        <p:cNvPr id="1" name=""/>
+        <p:cNvGrpSpPr/>
+        <p:nvPr/>
+      </p:nvGrpSpPr>
+      <p:grpSpPr>
+        <a:xfrm>
+          <a:off x="0" y="0"/>
+          <a:ext cx="0" cy="0"/>
+          <a:chOff x="0" y="0"/>
+          <a:chExt cx="0" cy="0"/>
+        </a:xfrm>
+      </p:grpSpPr>
+      <p:sp>
+        <p:nvSpPr>
+          <p:cNvPr id="2" name="Title 1"/>
+          <p:cNvSpPr>
+            <a:spLocks noGrp="1"/>
+          </p:cNvSpPr>
+          <p:nvPr>
+            <p:ph type="title"/>
+          </p:nvPr>
+        </p:nvSpPr>
+        <p:spPr/>
+        <p:txBody>
+          <a:bodyPr/>
+          <a:lstStyle/>
+          <a:p>
+            <a:r>
+              <a:rPr lang="en-US" dirty="0" smtClean="0"/>
+              <a:t>‘for’ Loop Variation</a:t>
+            </a:r>
+            <a:endParaRPr lang="en-US" dirty="0"/>
+          </a:p>
+        </p:txBody>
+      </p:sp>
+      <p:sp>
+        <p:nvSpPr>
+          <p:cNvPr id="3" name="Content Placeholder 2"/>
+          <p:cNvSpPr>
+            <a:spLocks noGrp="1"/>
+          </p:cNvSpPr>
+          <p:nvPr>
+            <p:ph idx="1"/>
+          </p:nvPr>
+        </p:nvSpPr>
+        <p:spPr/>
+        <p:txBody>
+          <a:bodyPr/>
+          <a:lstStyle/>
+          <a:p>
+            <a:r>
+              <a:rPr lang="en-US" dirty="0" smtClean="0"/>
+              <a:t>All parts of the ‘for’ loop statement is optional</a:t>
+            </a:r>
+          </a:p>
+          <a:p>
+            <a:pPr lvl="1"/>
+            <a:r>
+              <a:rPr lang="en-US" dirty="0" smtClean="0"/>
+              <a:t>Provides flexibility in when to initialize</a:t>
+            </a:r>
+          </a:p>
+          <a:p>
+            <a:pPr lvl="1"/>
+            <a:r>
+              <a:rPr lang="en-US" dirty="0" smtClean="0"/>
+              <a:t>When to test and exit loop</a:t>
+            </a:r>
+          </a:p>
+          <a:p>
+            <a:pPr lvl="1"/>
+            <a:r>
+              <a:rPr lang="en-US" dirty="0" smtClean="0"/>
+              <a:t>When to perform condition variable(s) updates</a:t>
+            </a:r>
+          </a:p>
+        </p:txBody>
+      </p:sp>
+    </p:spTree>
+    <p:extLst>
+      <p:ext uri="{BB962C8B-B14F-4D97-AF65-F5344CB8AC3E}">
+        <p14:creationId xmlns:p14="http://schemas.microsoft.com/office/powerpoint/2010/main" val="1065062723"/>
+      </p:ext>
+    </p:extLst>
+  </p:cSld>
+  <p:clrMapOvr>
+    <a:masterClrMapping/>
+  </p:clrMapOvr>
+</p:sld>
+</file>
+
+<file path=ppt/slides/slide138.xml><?xml version="1.0" encoding="utf-8"?>
+<p:sld xmlns:a="http://schemas.openxmlformats.org/drawingml/2006/main" xmlns:r="http://schemas.openxmlformats.org/officeDocument/2006/relationships" xmlns:p="http://schemas.openxmlformats.org/presentationml/2006/main">
+  <p:cSld>
+    <p:spTree>
+      <p:nvGrpSpPr>
+        <p:cNvPr id="1" name=""/>
+        <p:cNvGrpSpPr/>
+        <p:nvPr/>
+      </p:nvGrpSpPr>
+      <p:grpSpPr>
+        <a:xfrm>
+          <a:off x="0" y="0"/>
+          <a:ext cx="0" cy="0"/>
+          <a:chOff x="0" y="0"/>
+          <a:chExt cx="0" cy="0"/>
+        </a:xfrm>
+      </p:grpSpPr>
+      <p:sp>
+        <p:nvSpPr>
+          <p:cNvPr id="2" name="Title 1"/>
+          <p:cNvSpPr>
+            <a:spLocks noGrp="1"/>
+          </p:cNvSpPr>
+          <p:nvPr>
+            <p:ph type="title"/>
+          </p:nvPr>
+        </p:nvSpPr>
+        <p:spPr/>
+        <p:txBody>
+          <a:bodyPr/>
+          <a:lstStyle/>
+          <a:p>
+            <a:r>
+              <a:rPr lang="en-US" dirty="0" smtClean="0"/>
+              <a:t>Example-05.js</a:t>
+            </a:r>
+            <a:endParaRPr lang="en-US" dirty="0"/>
+          </a:p>
+        </p:txBody>
+      </p:sp>
+      <p:pic>
+        <p:nvPicPr>
+          <p:cNvPr id="4" name="Content Placeholder 3"/>
+          <p:cNvPicPr>
+            <a:picLocks noGrp="1" noChangeAspect="1"/>
+          </p:cNvPicPr>
+          <p:nvPr>
+            <p:ph idx="1"/>
+          </p:nvPr>
+        </p:nvPicPr>
+        <p:blipFill>
+          <a:blip r:embed="rId2"/>
+          <a:srcRect l="-27195" r="-27195"/>
+          <a:stretch>
+            <a:fillRect/>
+          </a:stretch>
+        </p:blipFill>
+        <p:spPr/>
+      </p:pic>
+    </p:spTree>
+    <p:extLst>
+      <p:ext uri="{BB962C8B-B14F-4D97-AF65-F5344CB8AC3E}">
+        <p14:creationId xmlns:p14="http://schemas.microsoft.com/office/powerpoint/2010/main" val="288007436"/>
+      </p:ext>
+    </p:extLst>
+  </p:cSld>
+  <p:clrMapOvr>
+    <a:masterClrMapping/>
+  </p:clrMapOvr>
+</p:sld>
+</file>
+
+<file path=ppt/slides/slide139.xml><?xml version="1.0" encoding="utf-8"?>
+<p:sld xmlns:a="http://schemas.openxmlformats.org/drawingml/2006/main" xmlns:r="http://schemas.openxmlformats.org/officeDocument/2006/relationships" xmlns:p="http://schemas.openxmlformats.org/presentationml/2006/main">
+  <p:cSld>
+    <p:spTree>
+      <p:nvGrpSpPr>
+        <p:cNvPr id="1" name=""/>
+        <p:cNvGrpSpPr/>
+        <p:nvPr/>
+      </p:nvGrpSpPr>
+      <p:grpSpPr>
+        <a:xfrm>
+          <a:off x="0" y="0"/>
+          <a:ext cx="0" cy="0"/>
+          <a:chOff x="0" y="0"/>
+          <a:chExt cx="0" cy="0"/>
+        </a:xfrm>
+      </p:grpSpPr>
+      <p:sp>
+        <p:nvSpPr>
+          <p:cNvPr id="2" name="Title 1"/>
+          <p:cNvSpPr>
+            <a:spLocks noGrp="1"/>
+          </p:cNvSpPr>
+          <p:nvPr>
+            <p:ph type="title"/>
+          </p:nvPr>
+        </p:nvSpPr>
+        <p:spPr/>
+        <p:txBody>
+          <a:bodyPr/>
+          <a:lstStyle/>
+          <a:p>
+            <a:r>
+              <a:rPr lang="en-US" dirty="0" smtClean="0"/>
+              <a:t>Example-06.js</a:t>
+            </a:r>
+            <a:endParaRPr lang="en-US" dirty="0"/>
+          </a:p>
+        </p:txBody>
+      </p:sp>
+      <p:pic>
+        <p:nvPicPr>
+          <p:cNvPr id="4" name="Content Placeholder 3"/>
+          <p:cNvPicPr>
+            <a:picLocks noGrp="1" noChangeAspect="1"/>
+          </p:cNvPicPr>
+          <p:nvPr>
+            <p:ph idx="1"/>
+          </p:nvPr>
+        </p:nvPicPr>
+        <p:blipFill>
+          <a:blip r:embed="rId2"/>
+          <a:srcRect l="-34678" r="-34678"/>
+          <a:stretch>
+            <a:fillRect/>
+          </a:stretch>
+        </p:blipFill>
+        <p:spPr/>
+      </p:pic>
+    </p:spTree>
+    <p:extLst>
+      <p:ext uri="{BB962C8B-B14F-4D97-AF65-F5344CB8AC3E}">
+        <p14:creationId xmlns:p14="http://schemas.microsoft.com/office/powerpoint/2010/main" val="3685431213"/>
+      </p:ext>
+    </p:extLst>
+  </p:cSld>
+  <p:clrMapOvr>
+    <a:masterClrMapping/>
+  </p:clrMapOvr>
+</p:sld>
+</file>
+
 <file path=ppt/slides/slide14.xml><?xml version="1.0" encoding="utf-8"?>
 <p:sld xmlns:a="http://schemas.openxmlformats.org/drawingml/2006/main" xmlns:r="http://schemas.openxmlformats.org/officeDocument/2006/relationships" xmlns:p="http://schemas.openxmlformats.org/presentationml/2006/main">
   <p:cSld>
@@ -25828,6 +28248,331 @@
     <p:extLst>
       <p:ext uri="{BB962C8B-B14F-4D97-AF65-F5344CB8AC3E}">
         <p14:creationId xmlns:p14="http://schemas.microsoft.com/office/powerpoint/2010/main" val="2556779502"/>
+      </p:ext>
+    </p:extLst>
+  </p:cSld>
+  <p:clrMapOvr>
+    <a:masterClrMapping/>
+  </p:clrMapOvr>
+</p:sld>
+</file>
+
+<file path=ppt/slides/slide140.xml><?xml version="1.0" encoding="utf-8"?>
+<p:sld xmlns:a="http://schemas.openxmlformats.org/drawingml/2006/main" xmlns:r="http://schemas.openxmlformats.org/officeDocument/2006/relationships" xmlns:p="http://schemas.openxmlformats.org/presentationml/2006/main">
+  <p:cSld>
+    <p:spTree>
+      <p:nvGrpSpPr>
+        <p:cNvPr id="1" name=""/>
+        <p:cNvGrpSpPr/>
+        <p:nvPr/>
+      </p:nvGrpSpPr>
+      <p:grpSpPr>
+        <a:xfrm>
+          <a:off x="0" y="0"/>
+          <a:ext cx="0" cy="0"/>
+          <a:chOff x="0" y="0"/>
+          <a:chExt cx="0" cy="0"/>
+        </a:xfrm>
+      </p:grpSpPr>
+      <p:sp>
+        <p:nvSpPr>
+          <p:cNvPr id="2" name="Title 1"/>
+          <p:cNvSpPr>
+            <a:spLocks noGrp="1"/>
+          </p:cNvSpPr>
+          <p:nvPr>
+            <p:ph type="title"/>
+          </p:nvPr>
+        </p:nvSpPr>
+        <p:spPr/>
+        <p:txBody>
+          <a:bodyPr/>
+          <a:lstStyle/>
+          <a:p>
+            <a:r>
+              <a:rPr lang="en-US" dirty="0" smtClean="0"/>
+              <a:t>Using ‘continue’ in Loops</a:t>
+            </a:r>
+            <a:endParaRPr lang="en-US" dirty="0"/>
+          </a:p>
+        </p:txBody>
+      </p:sp>
+      <p:sp>
+        <p:nvSpPr>
+          <p:cNvPr id="3" name="Content Placeholder 2"/>
+          <p:cNvSpPr>
+            <a:spLocks noGrp="1"/>
+          </p:cNvSpPr>
+          <p:nvPr>
+            <p:ph idx="1"/>
+          </p:nvPr>
+        </p:nvSpPr>
+        <p:spPr/>
+        <p:txBody>
+          <a:bodyPr/>
+          <a:lstStyle/>
+          <a:p>
+            <a:r>
+              <a:rPr lang="en-US" dirty="0" smtClean="0"/>
+              <a:t>The ‘continue’ keyword in a loop is used to skip one or more iteration</a:t>
+            </a:r>
+          </a:p>
+        </p:txBody>
+      </p:sp>
+    </p:spTree>
+    <p:extLst>
+      <p:ext uri="{BB962C8B-B14F-4D97-AF65-F5344CB8AC3E}">
+        <p14:creationId xmlns:p14="http://schemas.microsoft.com/office/powerpoint/2010/main" val="2344863649"/>
+      </p:ext>
+    </p:extLst>
+  </p:cSld>
+  <p:clrMapOvr>
+    <a:masterClrMapping/>
+  </p:clrMapOvr>
+</p:sld>
+</file>
+
+<file path=ppt/slides/slide141.xml><?xml version="1.0" encoding="utf-8"?>
+<p:sld xmlns:a="http://schemas.openxmlformats.org/drawingml/2006/main" xmlns:r="http://schemas.openxmlformats.org/officeDocument/2006/relationships" xmlns:p="http://schemas.openxmlformats.org/presentationml/2006/main">
+  <p:cSld>
+    <p:spTree>
+      <p:nvGrpSpPr>
+        <p:cNvPr id="1" name=""/>
+        <p:cNvGrpSpPr/>
+        <p:nvPr/>
+      </p:nvGrpSpPr>
+      <p:grpSpPr>
+        <a:xfrm>
+          <a:off x="0" y="0"/>
+          <a:ext cx="0" cy="0"/>
+          <a:chOff x="0" y="0"/>
+          <a:chExt cx="0" cy="0"/>
+        </a:xfrm>
+      </p:grpSpPr>
+      <p:sp>
+        <p:nvSpPr>
+          <p:cNvPr id="2" name="Title 1"/>
+          <p:cNvSpPr>
+            <a:spLocks noGrp="1"/>
+          </p:cNvSpPr>
+          <p:nvPr>
+            <p:ph type="title"/>
+          </p:nvPr>
+        </p:nvSpPr>
+        <p:spPr/>
+        <p:txBody>
+          <a:bodyPr/>
+          <a:lstStyle/>
+          <a:p>
+            <a:r>
+              <a:rPr lang="en-US" dirty="0" smtClean="0"/>
+              <a:t>Example-07.js</a:t>
+            </a:r>
+            <a:endParaRPr lang="en-US" dirty="0"/>
+          </a:p>
+        </p:txBody>
+      </p:sp>
+      <p:pic>
+        <p:nvPicPr>
+          <p:cNvPr id="4" name="Content Placeholder 3"/>
+          <p:cNvPicPr>
+            <a:picLocks noGrp="1" noChangeAspect="1"/>
+          </p:cNvPicPr>
+          <p:nvPr>
+            <p:ph idx="1"/>
+          </p:nvPr>
+        </p:nvPicPr>
+        <p:blipFill>
+          <a:blip r:embed="rId2"/>
+          <a:srcRect l="-41342" r="-41342"/>
+          <a:stretch>
+            <a:fillRect/>
+          </a:stretch>
+        </p:blipFill>
+        <p:spPr/>
+      </p:pic>
+    </p:spTree>
+    <p:extLst>
+      <p:ext uri="{BB962C8B-B14F-4D97-AF65-F5344CB8AC3E}">
+        <p14:creationId xmlns:p14="http://schemas.microsoft.com/office/powerpoint/2010/main" val="3339575111"/>
+      </p:ext>
+    </p:extLst>
+  </p:cSld>
+  <p:clrMapOvr>
+    <a:masterClrMapping/>
+  </p:clrMapOvr>
+</p:sld>
+</file>
+
+<file path=ppt/slides/slide142.xml><?xml version="1.0" encoding="utf-8"?>
+<p:sld xmlns:a="http://schemas.openxmlformats.org/drawingml/2006/main" xmlns:r="http://schemas.openxmlformats.org/officeDocument/2006/relationships" xmlns:p="http://schemas.openxmlformats.org/presentationml/2006/main">
+  <p:cSld>
+    <p:spTree>
+      <p:nvGrpSpPr>
+        <p:cNvPr id="1" name=""/>
+        <p:cNvGrpSpPr/>
+        <p:nvPr/>
+      </p:nvGrpSpPr>
+      <p:grpSpPr>
+        <a:xfrm>
+          <a:off x="0" y="0"/>
+          <a:ext cx="0" cy="0"/>
+          <a:chOff x="0" y="0"/>
+          <a:chExt cx="0" cy="0"/>
+        </a:xfrm>
+      </p:grpSpPr>
+      <p:sp>
+        <p:nvSpPr>
+          <p:cNvPr id="2" name="Title 1"/>
+          <p:cNvSpPr>
+            <a:spLocks noGrp="1"/>
+          </p:cNvSpPr>
+          <p:nvPr>
+            <p:ph type="title"/>
+          </p:nvPr>
+        </p:nvSpPr>
+        <p:spPr/>
+        <p:txBody>
+          <a:bodyPr/>
+          <a:lstStyle/>
+          <a:p>
+            <a:r>
+              <a:rPr lang="en-US" dirty="0" smtClean="0"/>
+              <a:t>‘infinite’ Loop</a:t>
+            </a:r>
+            <a:endParaRPr lang="en-US" dirty="0"/>
+          </a:p>
+        </p:txBody>
+      </p:sp>
+      <p:sp>
+        <p:nvSpPr>
+          <p:cNvPr id="3" name="Content Placeholder 2"/>
+          <p:cNvSpPr>
+            <a:spLocks noGrp="1"/>
+          </p:cNvSpPr>
+          <p:nvPr>
+            <p:ph idx="1"/>
+          </p:nvPr>
+        </p:nvSpPr>
+        <p:spPr/>
+        <p:txBody>
+          <a:bodyPr/>
+          <a:lstStyle/>
+          <a:p>
+            <a:r>
+              <a:rPr lang="en-US" dirty="0" smtClean="0"/>
+              <a:t>An ‘infinite’ loop is used when:</a:t>
+            </a:r>
+          </a:p>
+          <a:p>
+            <a:pPr lvl="1"/>
+            <a:r>
+              <a:rPr lang="en-US" dirty="0" smtClean="0"/>
+              <a:t> The number of iterations is not known at loop ‘initialization’</a:t>
+            </a:r>
+          </a:p>
+          <a:p>
+            <a:pPr lvl="2"/>
+            <a:r>
+              <a:rPr lang="en-US" dirty="0" smtClean="0"/>
+              <a:t>Possible an external condition will be used to ‘break’ out of the loop</a:t>
+            </a:r>
+          </a:p>
+          <a:p>
+            <a:pPr lvl="2"/>
+            <a:r>
+              <a:rPr lang="en-US" dirty="0" smtClean="0"/>
+              <a:t>Some form of complex computation will be used to ‘break’ out of the loop</a:t>
+            </a:r>
+          </a:p>
+          <a:p>
+            <a:pPr lvl="1"/>
+            <a:r>
+              <a:rPr lang="en-US" dirty="0" smtClean="0"/>
+              <a:t>The developer wishes to express the intend that this loop will not terminate</a:t>
+            </a:r>
+          </a:p>
+          <a:p>
+            <a:endParaRPr lang="en-US" dirty="0"/>
+          </a:p>
+        </p:txBody>
+      </p:sp>
+    </p:spTree>
+    <p:extLst>
+      <p:ext uri="{BB962C8B-B14F-4D97-AF65-F5344CB8AC3E}">
+        <p14:creationId xmlns:p14="http://schemas.microsoft.com/office/powerpoint/2010/main" val="1464473645"/>
+      </p:ext>
+    </p:extLst>
+  </p:cSld>
+  <p:clrMapOvr>
+    <a:masterClrMapping/>
+  </p:clrMapOvr>
+</p:sld>
+</file>
+
+<file path=ppt/slides/slide143.xml><?xml version="1.0" encoding="utf-8"?>
+<p:sld xmlns:a="http://schemas.openxmlformats.org/drawingml/2006/main" xmlns:r="http://schemas.openxmlformats.org/officeDocument/2006/relationships" xmlns:p="http://schemas.openxmlformats.org/presentationml/2006/main">
+  <p:cSld>
+    <p:spTree>
+      <p:nvGrpSpPr>
+        <p:cNvPr id="1" name=""/>
+        <p:cNvGrpSpPr/>
+        <p:nvPr/>
+      </p:nvGrpSpPr>
+      <p:grpSpPr>
+        <a:xfrm>
+          <a:off x="0" y="0"/>
+          <a:ext cx="0" cy="0"/>
+          <a:chOff x="0" y="0"/>
+          <a:chExt cx="0" cy="0"/>
+        </a:xfrm>
+      </p:grpSpPr>
+      <p:sp>
+        <p:nvSpPr>
+          <p:cNvPr id="2" name="Title 1"/>
+          <p:cNvSpPr>
+            <a:spLocks noGrp="1"/>
+          </p:cNvSpPr>
+          <p:nvPr>
+            <p:ph type="title"/>
+          </p:nvPr>
+        </p:nvSpPr>
+        <p:spPr/>
+        <p:txBody>
+          <a:bodyPr/>
+          <a:lstStyle/>
+          <a:p>
+            <a:r>
+              <a:rPr lang="en-US" dirty="0" smtClean="0"/>
+              <a:t>Example-08.js</a:t>
+            </a:r>
+            <a:endParaRPr lang="en-US" dirty="0"/>
+          </a:p>
+        </p:txBody>
+      </p:sp>
+      <p:pic>
+        <p:nvPicPr>
+          <p:cNvPr id="6" name="Content Placeholder 5"/>
+          <p:cNvPicPr>
+            <a:picLocks noGrp="1" noChangeAspect="1"/>
+          </p:cNvPicPr>
+          <p:nvPr>
+            <p:ph idx="1"/>
+          </p:nvPr>
+        </p:nvPicPr>
+        <p:blipFill>
+          <a:blip r:embed="rId2"/>
+          <a:srcRect t="-2765" b="-2765"/>
+          <a:stretch>
+            <a:fillRect/>
+          </a:stretch>
+        </p:blipFill>
+        <p:spPr/>
+      </p:pic>
+    </p:spTree>
+    <p:extLst>
+      <p:ext uri="{BB962C8B-B14F-4D97-AF65-F5344CB8AC3E}">
+        <p14:creationId xmlns:p14="http://schemas.microsoft.com/office/powerpoint/2010/main" val="2127588631"/>
       </p:ext>
     </p:extLst>
   </p:cSld>

</xml_diff>